<commit_message>
renames teammates::ui to teammates::ui::controller
</commit_message>
<xml_diff>
--- a/doc/diagrams/packageDiagram.pptx
+++ b/doc/diagrams/packageDiagram.pptx
@@ -3426,7 +3426,7 @@
                     <a:schemeClr val="tx2"/>
                   </a:solidFill>
                 </a:rPr>
-                <a:t>::operation</a:t>
+                <a:t>::controller</a:t>
               </a:r>
               <a:endParaRPr lang="en-SG" sz="1400" b="1" dirty="0">
                 <a:solidFill>
@@ -5728,7 +5728,7 @@
                     <a:schemeClr val="tx2"/>
                   </a:solidFill>
                 </a:rPr>
-                <a:t>::page</a:t>
+                <a:t>::view</a:t>
               </a:r>
               <a:endParaRPr lang="en-SG" sz="1400" b="1" dirty="0">
                 <a:solidFill>

</xml_diff>

<commit_message>
tweaked packgeDiagram to fix a typo
</commit_message>
<xml_diff>
--- a/doc/diagrams/packageDiagram.pptx
+++ b/doc/diagrams/packageDiagram.pptx
@@ -289,7 +289,7 @@
             <a:fld id="{1D8BD707-D9CF-40AE-B4C6-C98DA3205C09}" type="datetimeFigureOut">
               <a:rPr lang="en-US" smtClean="0"/>
               <a:pPr/>
-              <a:t>7/8/2012</a:t>
+              <a:t>7/12/2012</a:t>
             </a:fld>
             <a:endParaRPr lang="en-US"/>
           </a:p>
@@ -456,7 +456,7 @@
             <a:fld id="{1D8BD707-D9CF-40AE-B4C6-C98DA3205C09}" type="datetimeFigureOut">
               <a:rPr lang="en-US" smtClean="0"/>
               <a:pPr/>
-              <a:t>7/8/2012</a:t>
+              <a:t>7/12/2012</a:t>
             </a:fld>
             <a:endParaRPr lang="en-US"/>
           </a:p>
@@ -633,7 +633,7 @@
             <a:fld id="{1D8BD707-D9CF-40AE-B4C6-C98DA3205C09}" type="datetimeFigureOut">
               <a:rPr lang="en-US" smtClean="0"/>
               <a:pPr/>
-              <a:t>7/8/2012</a:t>
+              <a:t>7/12/2012</a:t>
             </a:fld>
             <a:endParaRPr lang="en-US"/>
           </a:p>
@@ -800,7 +800,7 @@
             <a:fld id="{1D8BD707-D9CF-40AE-B4C6-C98DA3205C09}" type="datetimeFigureOut">
               <a:rPr lang="en-US" smtClean="0"/>
               <a:pPr/>
-              <a:t>7/8/2012</a:t>
+              <a:t>7/12/2012</a:t>
             </a:fld>
             <a:endParaRPr lang="en-US"/>
           </a:p>
@@ -1043,7 +1043,7 @@
             <a:fld id="{1D8BD707-D9CF-40AE-B4C6-C98DA3205C09}" type="datetimeFigureOut">
               <a:rPr lang="en-US" smtClean="0"/>
               <a:pPr/>
-              <a:t>7/8/2012</a:t>
+              <a:t>7/12/2012</a:t>
             </a:fld>
             <a:endParaRPr lang="en-US"/>
           </a:p>
@@ -1328,7 +1328,7 @@
             <a:fld id="{1D8BD707-D9CF-40AE-B4C6-C98DA3205C09}" type="datetimeFigureOut">
               <a:rPr lang="en-US" smtClean="0"/>
               <a:pPr/>
-              <a:t>7/8/2012</a:t>
+              <a:t>7/12/2012</a:t>
             </a:fld>
             <a:endParaRPr lang="en-US"/>
           </a:p>
@@ -1747,7 +1747,7 @@
             <a:fld id="{1D8BD707-D9CF-40AE-B4C6-C98DA3205C09}" type="datetimeFigureOut">
               <a:rPr lang="en-US" smtClean="0"/>
               <a:pPr/>
-              <a:t>7/8/2012</a:t>
+              <a:t>7/12/2012</a:t>
             </a:fld>
             <a:endParaRPr lang="en-US"/>
           </a:p>
@@ -1862,7 +1862,7 @@
             <a:fld id="{1D8BD707-D9CF-40AE-B4C6-C98DA3205C09}" type="datetimeFigureOut">
               <a:rPr lang="en-US" smtClean="0"/>
               <a:pPr/>
-              <a:t>7/8/2012</a:t>
+              <a:t>7/12/2012</a:t>
             </a:fld>
             <a:endParaRPr lang="en-US"/>
           </a:p>
@@ -1954,7 +1954,7 @@
             <a:fld id="{1D8BD707-D9CF-40AE-B4C6-C98DA3205C09}" type="datetimeFigureOut">
               <a:rPr lang="en-US" smtClean="0"/>
               <a:pPr/>
-              <a:t>7/8/2012</a:t>
+              <a:t>7/12/2012</a:t>
             </a:fld>
             <a:endParaRPr lang="en-US"/>
           </a:p>
@@ -2228,7 +2228,7 @@
             <a:fld id="{1D8BD707-D9CF-40AE-B4C6-C98DA3205C09}" type="datetimeFigureOut">
               <a:rPr lang="en-US" smtClean="0"/>
               <a:pPr/>
-              <a:t>7/8/2012</a:t>
+              <a:t>7/12/2012</a:t>
             </a:fld>
             <a:endParaRPr lang="en-US"/>
           </a:p>
@@ -2478,7 +2478,7 @@
             <a:fld id="{1D8BD707-D9CF-40AE-B4C6-C98DA3205C09}" type="datetimeFigureOut">
               <a:rPr lang="en-US" smtClean="0"/>
               <a:pPr/>
-              <a:t>7/8/2012</a:t>
+              <a:t>7/12/2012</a:t>
             </a:fld>
             <a:endParaRPr lang="en-US"/>
           </a:p>
@@ -2688,7 +2688,7 @@
             <a:fld id="{1D8BD707-D9CF-40AE-B4C6-C98DA3205C09}" type="datetimeFigureOut">
               <a:rPr lang="en-US" smtClean="0"/>
               <a:pPr/>
-              <a:t>7/8/2012</a:t>
+              <a:t>7/12/2012</a:t>
             </a:fld>
             <a:endParaRPr lang="en-US"/>
           </a:p>
@@ -3616,10 +3616,10 @@
         </p:nvGrpSpPr>
         <p:grpSpPr>
           <a:xfrm>
-            <a:off x="7086600" y="2514600"/>
-            <a:ext cx="1371600" cy="762000"/>
-            <a:chOff x="-228600" y="1371600"/>
-            <a:chExt cx="1371600" cy="762000"/>
+            <a:off x="6858000" y="2514600"/>
+            <a:ext cx="1600200" cy="762000"/>
+            <a:chOff x="-457200" y="1371600"/>
+            <a:chExt cx="1600200" cy="762000"/>
           </a:xfrm>
           <a:solidFill>
             <a:schemeClr val="bg1"/>
@@ -3633,8 +3633,8 @@
           </p:nvSpPr>
           <p:spPr>
             <a:xfrm>
-              <a:off x="-228600" y="1524000"/>
-              <a:ext cx="1371600" cy="609600"/>
+              <a:off x="-457200" y="1524000"/>
+              <a:ext cx="1600200" cy="609600"/>
             </a:xfrm>
             <a:prstGeom prst="rect">
               <a:avLst/>
@@ -3799,7 +3799,23 @@
                     <a:srgbClr val="00B050"/>
                   </a:solidFill>
                 </a:rPr>
-                <a:t>storage::manager</a:t>
+                <a:t>storage</a:t>
+              </a:r>
+              <a:r>
+                <a:rPr lang="en-US" sz="1400" b="1" dirty="0" smtClean="0">
+                  <a:solidFill>
+                    <a:srgbClr val="00B050"/>
+                  </a:solidFill>
+                </a:rPr>
+                <a:t>::</a:t>
+              </a:r>
+              <a:r>
+                <a:rPr lang="en-US" sz="1400" b="1" dirty="0" err="1" smtClean="0">
+                  <a:solidFill>
+                    <a:srgbClr val="00B050"/>
+                  </a:solidFill>
+                </a:rPr>
+                <a:t>api</a:t>
               </a:r>
               <a:r>
                 <a:rPr lang="en-SG" sz="1400" b="1" dirty="0" smtClean="0">
@@ -5787,15 +5803,12 @@
       <p:cxnSp>
         <p:nvCxnSpPr>
           <p:cNvPr id="87" name="Straight Arrow Connector 86"/>
-          <p:cNvCxnSpPr>
-            <a:stCxn id="9" idx="0"/>
-            <a:endCxn id="85" idx="2"/>
-          </p:cNvCxnSpPr>
+          <p:cNvCxnSpPr/>
           <p:nvPr/>
         </p:nvCxnSpPr>
         <p:spPr>
           <a:xfrm flipV="1">
-            <a:off x="2133600" y="2895600"/>
+            <a:off x="2057400" y="2895600"/>
             <a:ext cx="0" cy="762000"/>
           </a:xfrm>
           <a:prstGeom prst="straightConnector1">
@@ -5828,7 +5841,7 @@
     </p:spTree>
     <p:extLst>
       <p:ext uri="{BB962C8B-B14F-4D97-AF65-F5344CB8AC3E}">
-        <p14:creationId xmlns:p14="http://schemas.microsoft.com/office/powerpoint/2010/main" xmlns="" val="2312643091"/>
+        <p14:creationId xmlns:p14="http://schemas.microsoft.com/office/powerpoint/2010/main" val="2312643091"/>
       </p:ext>
     </p:extLst>
   </p:cSld>

</xml_diff>

<commit_message>
Reverted packageDiagram.pptx to earlier version. Update Issue 264.
</commit_message>
<xml_diff>
--- a/doc/diagrams/packageDiagram.pptx
+++ b/doc/diagrams/packageDiagram.pptx
@@ -289,7 +289,7 @@
             <a:fld id="{1D8BD707-D9CF-40AE-B4C6-C98DA3205C09}" type="datetimeFigureOut">
               <a:rPr lang="en-US" smtClean="0"/>
               <a:pPr/>
-              <a:t>14/8/12</a:t>
+              <a:t>7/12/2012</a:t>
             </a:fld>
             <a:endParaRPr lang="en-US"/>
           </a:p>
@@ -456,7 +456,7 @@
             <a:fld id="{1D8BD707-D9CF-40AE-B4C6-C98DA3205C09}" type="datetimeFigureOut">
               <a:rPr lang="en-US" smtClean="0"/>
               <a:pPr/>
-              <a:t>14/8/12</a:t>
+              <a:t>7/12/2012</a:t>
             </a:fld>
             <a:endParaRPr lang="en-US"/>
           </a:p>
@@ -633,7 +633,7 @@
             <a:fld id="{1D8BD707-D9CF-40AE-B4C6-C98DA3205C09}" type="datetimeFigureOut">
               <a:rPr lang="en-US" smtClean="0"/>
               <a:pPr/>
-              <a:t>14/8/12</a:t>
+              <a:t>7/12/2012</a:t>
             </a:fld>
             <a:endParaRPr lang="en-US"/>
           </a:p>
@@ -800,7 +800,7 @@
             <a:fld id="{1D8BD707-D9CF-40AE-B4C6-C98DA3205C09}" type="datetimeFigureOut">
               <a:rPr lang="en-US" smtClean="0"/>
               <a:pPr/>
-              <a:t>14/8/12</a:t>
+              <a:t>7/12/2012</a:t>
             </a:fld>
             <a:endParaRPr lang="en-US"/>
           </a:p>
@@ -1043,7 +1043,7 @@
             <a:fld id="{1D8BD707-D9CF-40AE-B4C6-C98DA3205C09}" type="datetimeFigureOut">
               <a:rPr lang="en-US" smtClean="0"/>
               <a:pPr/>
-              <a:t>14/8/12</a:t>
+              <a:t>7/12/2012</a:t>
             </a:fld>
             <a:endParaRPr lang="en-US"/>
           </a:p>
@@ -1328,7 +1328,7 @@
             <a:fld id="{1D8BD707-D9CF-40AE-B4C6-C98DA3205C09}" type="datetimeFigureOut">
               <a:rPr lang="en-US" smtClean="0"/>
               <a:pPr/>
-              <a:t>14/8/12</a:t>
+              <a:t>7/12/2012</a:t>
             </a:fld>
             <a:endParaRPr lang="en-US"/>
           </a:p>
@@ -1747,7 +1747,7 @@
             <a:fld id="{1D8BD707-D9CF-40AE-B4C6-C98DA3205C09}" type="datetimeFigureOut">
               <a:rPr lang="en-US" smtClean="0"/>
               <a:pPr/>
-              <a:t>14/8/12</a:t>
+              <a:t>7/12/2012</a:t>
             </a:fld>
             <a:endParaRPr lang="en-US"/>
           </a:p>
@@ -1862,7 +1862,7 @@
             <a:fld id="{1D8BD707-D9CF-40AE-B4C6-C98DA3205C09}" type="datetimeFigureOut">
               <a:rPr lang="en-US" smtClean="0"/>
               <a:pPr/>
-              <a:t>14/8/12</a:t>
+              <a:t>7/12/2012</a:t>
             </a:fld>
             <a:endParaRPr lang="en-US"/>
           </a:p>
@@ -1954,7 +1954,7 @@
             <a:fld id="{1D8BD707-D9CF-40AE-B4C6-C98DA3205C09}" type="datetimeFigureOut">
               <a:rPr lang="en-US" smtClean="0"/>
               <a:pPr/>
-              <a:t>14/8/12</a:t>
+              <a:t>7/12/2012</a:t>
             </a:fld>
             <a:endParaRPr lang="en-US"/>
           </a:p>
@@ -2228,7 +2228,7 @@
             <a:fld id="{1D8BD707-D9CF-40AE-B4C6-C98DA3205C09}" type="datetimeFigureOut">
               <a:rPr lang="en-US" smtClean="0"/>
               <a:pPr/>
-              <a:t>14/8/12</a:t>
+              <a:t>7/12/2012</a:t>
             </a:fld>
             <a:endParaRPr lang="en-US"/>
           </a:p>
@@ -2478,7 +2478,7 @@
             <a:fld id="{1D8BD707-D9CF-40AE-B4C6-C98DA3205C09}" type="datetimeFigureOut">
               <a:rPr lang="en-US" smtClean="0"/>
               <a:pPr/>
-              <a:t>14/8/12</a:t>
+              <a:t>7/12/2012</a:t>
             </a:fld>
             <a:endParaRPr lang="en-US"/>
           </a:p>
@@ -2688,7 +2688,7 @@
             <a:fld id="{1D8BD707-D9CF-40AE-B4C6-C98DA3205C09}" type="datetimeFigureOut">
               <a:rPr lang="en-US" smtClean="0"/>
               <a:pPr/>
-              <a:t>14/8/12</a:t>
+              <a:t>7/12/2012</a:t>
             </a:fld>
             <a:endParaRPr lang="en-US"/>
           </a:p>
@@ -3799,7 +3799,15 @@
                     <a:srgbClr val="00B050"/>
                   </a:solidFill>
                 </a:rPr>
-                <a:t>storage::</a:t>
+                <a:t>storage</a:t>
+              </a:r>
+              <a:r>
+                <a:rPr lang="en-US" sz="1400" b="1" dirty="0" smtClean="0">
+                  <a:solidFill>
+                    <a:srgbClr val="00B050"/>
+                  </a:solidFill>
+                </a:rPr>
+                <a:t>::</a:t>
               </a:r>
               <a:r>
                 <a:rPr lang="en-US" sz="1400" b="1" dirty="0" err="1" smtClean="0">
@@ -4156,7 +4164,7 @@
         </p:nvGrpSpPr>
         <p:grpSpPr>
           <a:xfrm>
-            <a:off x="6934200" y="381000"/>
+            <a:off x="6705600" y="430849"/>
             <a:ext cx="1371600" cy="762000"/>
             <a:chOff x="-228600" y="1371600"/>
             <a:chExt cx="1371600" cy="762000"/>
@@ -4207,28 +4215,12 @@
             <a:lstStyle/>
             <a:p>
               <a:r>
-                <a:rPr lang="en-US" sz="1400" b="1" dirty="0">
-                  <a:solidFill>
-                    <a:schemeClr val="accent5"/>
-                  </a:solidFill>
-                </a:rPr>
-                <a:t>C</a:t>
-              </a:r>
-              <a:r>
-                <a:rPr lang="en-US" sz="1400" b="1" smtClean="0">
-                  <a:solidFill>
-                    <a:schemeClr val="accent5"/>
-                  </a:solidFill>
-                </a:rPr>
-                <a:t>ommon</a:t>
-              </a:r>
-              <a:r>
                 <a:rPr lang="en-US" sz="1400" b="1" dirty="0" smtClean="0">
                   <a:solidFill>
                     <a:schemeClr val="accent5"/>
                   </a:solidFill>
                 </a:rPr>
-                <a:t/>
+                <a:t>common</a:t>
               </a:r>
               <a:br>
                 <a:rPr lang="en-US" sz="1400" b="1" dirty="0" smtClean="0">
@@ -4319,9 +4311,9 @@
         </p:nvGrpSpPr>
         <p:grpSpPr>
           <a:xfrm>
-            <a:off x="1905000" y="380999"/>
+            <a:off x="1981200" y="380999"/>
             <a:ext cx="1371600" cy="762000"/>
-            <a:chOff x="-304800" y="1371600"/>
+            <a:chOff x="-228600" y="1371600"/>
             <a:chExt cx="1371600" cy="762000"/>
           </a:xfrm>
           <a:solidFill>
@@ -4336,7 +4328,7 @@
           </p:nvSpPr>
           <p:spPr>
             <a:xfrm>
-              <a:off x="-304800" y="1524000"/>
+              <a:off x="-228600" y="1524000"/>
               <a:ext cx="1371600" cy="609600"/>
             </a:xfrm>
             <a:prstGeom prst="rect">
@@ -4371,12 +4363,12 @@
             <a:p>
               <a:pPr algn="ctr"/>
               <a:r>
-                <a:rPr lang="en-US" sz="1400" b="1" dirty="0" err="1" smtClean="0">
+                <a:rPr lang="en-US" sz="1400" b="1" dirty="0" smtClean="0">
                   <a:solidFill>
                     <a:schemeClr val="accent5"/>
                   </a:solidFill>
                 </a:rPr>
-                <a:t>BuildProperties</a:t>
+                <a:t>common</a:t>
               </a:r>
               <a:endParaRPr lang="en-SG" sz="1400" b="1" dirty="0">
                 <a:solidFill>
@@ -4394,7 +4386,7 @@
           </p:nvSpPr>
           <p:spPr>
             <a:xfrm>
-              <a:off x="571500" y="1371600"/>
+              <a:off x="647700" y="1371600"/>
               <a:ext cx="495300" cy="152400"/>
             </a:xfrm>
             <a:prstGeom prst="rect">
@@ -5373,7 +5365,7 @@
         </p:nvGrpSpPr>
         <p:grpSpPr>
           <a:xfrm>
-            <a:off x="5257800" y="380999"/>
+            <a:off x="4343400" y="380999"/>
             <a:ext cx="1371600" cy="762000"/>
             <a:chOff x="-228600" y="1371600"/>
             <a:chExt cx="1371600" cy="762000"/>
@@ -5424,28 +5416,12 @@
             <a:lstStyle/>
             <a:p>
               <a:r>
-                <a:rPr lang="en-US" sz="1400" b="1" dirty="0">
-                  <a:solidFill>
-                    <a:schemeClr val="accent5"/>
-                  </a:solidFill>
-                </a:rPr>
-                <a:t>C</a:t>
-              </a:r>
-              <a:r>
                 <a:rPr lang="en-US" sz="1400" b="1" dirty="0" smtClean="0">
                   <a:solidFill>
                     <a:schemeClr val="accent5"/>
                   </a:solidFill>
                 </a:rPr>
-                <a:t>ommon</a:t>
-              </a:r>
-              <a:r>
-                <a:rPr lang="en-US" sz="1400" b="1" dirty="0" smtClean="0">
-                  <a:solidFill>
-                    <a:schemeClr val="accent5"/>
-                  </a:solidFill>
-                </a:rPr>
-                <a:t/>
+                <a:t>common</a:t>
               </a:r>
               <a:br>
                 <a:rPr lang="en-US" sz="1400" b="1" dirty="0" smtClean="0">
@@ -5862,140 +5838,6 @@
           </a:fontRef>
         </p:style>
       </p:cxnSp>
-      <p:grpSp>
-        <p:nvGrpSpPr>
-          <p:cNvPr id="65" name="Group 64"/>
-          <p:cNvGrpSpPr/>
-          <p:nvPr/>
-        </p:nvGrpSpPr>
-        <p:grpSpPr>
-          <a:xfrm>
-            <a:off x="3581400" y="381000"/>
-            <a:ext cx="1371600" cy="762000"/>
-            <a:chOff x="-228600" y="1371600"/>
-            <a:chExt cx="1371600" cy="762000"/>
-          </a:xfrm>
-          <a:solidFill>
-            <a:schemeClr val="bg1"/>
-          </a:solidFill>
-        </p:grpSpPr>
-        <p:sp>
-          <p:nvSpPr>
-            <p:cNvPr id="66" name="Rectangle 65"/>
-            <p:cNvSpPr/>
-            <p:nvPr/>
-          </p:nvSpPr>
-          <p:spPr>
-            <a:xfrm>
-              <a:off x="-228600" y="1524000"/>
-              <a:ext cx="1371600" cy="609600"/>
-            </a:xfrm>
-            <a:prstGeom prst="rect">
-              <a:avLst/>
-            </a:prstGeom>
-            <a:grpFill/>
-            <a:ln>
-              <a:solidFill>
-                <a:schemeClr val="accent5"/>
-              </a:solidFill>
-            </a:ln>
-          </p:spPr>
-          <p:style>
-            <a:lnRef idx="2">
-              <a:schemeClr val="accent1">
-                <a:shade val="50000"/>
-              </a:schemeClr>
-            </a:lnRef>
-            <a:fillRef idx="1">
-              <a:schemeClr val="accent1"/>
-            </a:fillRef>
-            <a:effectRef idx="0">
-              <a:schemeClr val="accent1"/>
-            </a:effectRef>
-            <a:fontRef idx="minor">
-              <a:schemeClr val="lt1"/>
-            </a:fontRef>
-          </p:style>
-          <p:txBody>
-            <a:bodyPr rtlCol="0" anchor="ctr"/>
-            <a:lstStyle/>
-            <a:p>
-              <a:pPr algn="ctr"/>
-              <a:r>
-                <a:rPr lang="en-US" sz="1400" b="1" dirty="0">
-                  <a:solidFill>
-                    <a:schemeClr val="accent5"/>
-                  </a:solidFill>
-                </a:rPr>
-                <a:t>C</a:t>
-              </a:r>
-              <a:r>
-                <a:rPr lang="en-US" sz="1400" b="1" dirty="0" smtClean="0">
-                  <a:solidFill>
-                    <a:schemeClr val="accent5"/>
-                  </a:solidFill>
-                </a:rPr>
-                <a:t>ommon</a:t>
-              </a:r>
-              <a:endParaRPr lang="en-SG" sz="1400" b="1" dirty="0">
-                <a:solidFill>
-                  <a:schemeClr val="accent5"/>
-                </a:solidFill>
-              </a:endParaRPr>
-            </a:p>
-          </p:txBody>
-        </p:sp>
-        <p:sp>
-          <p:nvSpPr>
-            <p:cNvPr id="67" name="Rectangle 66"/>
-            <p:cNvSpPr/>
-            <p:nvPr/>
-          </p:nvSpPr>
-          <p:spPr>
-            <a:xfrm>
-              <a:off x="647700" y="1371600"/>
-              <a:ext cx="495300" cy="152400"/>
-            </a:xfrm>
-            <a:prstGeom prst="rect">
-              <a:avLst/>
-            </a:prstGeom>
-            <a:grpFill/>
-            <a:ln>
-              <a:solidFill>
-                <a:schemeClr val="accent5"/>
-              </a:solidFill>
-            </a:ln>
-          </p:spPr>
-          <p:style>
-            <a:lnRef idx="2">
-              <a:schemeClr val="accent1">
-                <a:shade val="50000"/>
-              </a:schemeClr>
-            </a:lnRef>
-            <a:fillRef idx="1">
-              <a:schemeClr val="accent1"/>
-            </a:fillRef>
-            <a:effectRef idx="0">
-              <a:schemeClr val="accent1"/>
-            </a:effectRef>
-            <a:fontRef idx="minor">
-              <a:schemeClr val="lt1"/>
-            </a:fontRef>
-          </p:style>
-          <p:txBody>
-            <a:bodyPr rtlCol="0" anchor="ctr"/>
-            <a:lstStyle/>
-            <a:p>
-              <a:pPr algn="ctr"/>
-              <a:endParaRPr lang="en-SG" sz="1400" b="1">
-                <a:solidFill>
-                  <a:schemeClr val="accent5"/>
-                </a:solidFill>
-              </a:endParaRPr>
-            </a:p>
-          </p:txBody>
-        </p:sp>
-      </p:grpSp>
     </p:spTree>
     <p:extLst>
       <p:ext uri="{BB962C8B-B14F-4D97-AF65-F5344CB8AC3E}">
@@ -6009,7 +5851,7 @@
   <p:timing>
     <p:tnLst>
       <p:par>
-        <p:cTn xmlns:p14="http://schemas.microsoft.com/office/powerpoint/2010/main" id="1" dur="indefinite" restart="never" nodeType="tmRoot"/>
+        <p:cTn id="1" dur="indefinite" restart="never" nodeType="tmRoot"/>
       </p:par>
     </p:tnLst>
   </p:timing>

</xml_diff>

<commit_message>
Starting Issue 443 [Update DevMan: Add ui::website and test::scripts to package diagram] Update Issue 443 Modified the diagram and the description.
</commit_message>
<xml_diff>
--- a/doc/diagrams/packageDiagram.pptx
+++ b/doc/diagrams/packageDiagram.pptx
@@ -4,17 +4,20 @@
   <p:sldMasterIdLst>
     <p:sldMasterId id="2147483648" r:id="rId1"/>
   </p:sldMasterIdLst>
+  <p:notesMasterIdLst>
+    <p:notesMasterId r:id="rId3"/>
+  </p:notesMasterIdLst>
   <p:sldIdLst>
     <p:sldId id="256" r:id="rId2"/>
   </p:sldIdLst>
-  <p:sldSz cx="9144000" cy="6858000" type="screen4x3"/>
+  <p:sldSz cx="8640763" cy="6300788"/>
   <p:notesSz cx="6858000" cy="9144000"/>
   <p:defaultTextStyle>
     <a:defPPr>
       <a:defRPr lang="en-US"/>
     </a:defPPr>
-    <a:lvl1pPr marL="0" algn="l" defTabSz="914400" rtl="0" eaLnBrk="1" latinLnBrk="0" hangingPunct="1">
-      <a:defRPr sz="1800" kern="1200">
+    <a:lvl1pPr marL="0" algn="l" defTabSz="853775" rtl="0" eaLnBrk="1" latinLnBrk="0" hangingPunct="1">
+      <a:defRPr sz="1700" kern="1200">
         <a:solidFill>
           <a:schemeClr val="tx1"/>
         </a:solidFill>
@@ -23,8 +26,8 @@
         <a:cs typeface="+mn-cs"/>
       </a:defRPr>
     </a:lvl1pPr>
-    <a:lvl2pPr marL="457200" algn="l" defTabSz="914400" rtl="0" eaLnBrk="1" latinLnBrk="0" hangingPunct="1">
-      <a:defRPr sz="1800" kern="1200">
+    <a:lvl2pPr marL="426888" algn="l" defTabSz="853775" rtl="0" eaLnBrk="1" latinLnBrk="0" hangingPunct="1">
+      <a:defRPr sz="1700" kern="1200">
         <a:solidFill>
           <a:schemeClr val="tx1"/>
         </a:solidFill>
@@ -33,8 +36,8 @@
         <a:cs typeface="+mn-cs"/>
       </a:defRPr>
     </a:lvl2pPr>
-    <a:lvl3pPr marL="914400" algn="l" defTabSz="914400" rtl="0" eaLnBrk="1" latinLnBrk="0" hangingPunct="1">
-      <a:defRPr sz="1800" kern="1200">
+    <a:lvl3pPr marL="853775" algn="l" defTabSz="853775" rtl="0" eaLnBrk="1" latinLnBrk="0" hangingPunct="1">
+      <a:defRPr sz="1700" kern="1200">
         <a:solidFill>
           <a:schemeClr val="tx1"/>
         </a:solidFill>
@@ -43,8 +46,8 @@
         <a:cs typeface="+mn-cs"/>
       </a:defRPr>
     </a:lvl3pPr>
-    <a:lvl4pPr marL="1371600" algn="l" defTabSz="914400" rtl="0" eaLnBrk="1" latinLnBrk="0" hangingPunct="1">
-      <a:defRPr sz="1800" kern="1200">
+    <a:lvl4pPr marL="1280663" algn="l" defTabSz="853775" rtl="0" eaLnBrk="1" latinLnBrk="0" hangingPunct="1">
+      <a:defRPr sz="1700" kern="1200">
         <a:solidFill>
           <a:schemeClr val="tx1"/>
         </a:solidFill>
@@ -53,8 +56,8 @@
         <a:cs typeface="+mn-cs"/>
       </a:defRPr>
     </a:lvl4pPr>
-    <a:lvl5pPr marL="1828800" algn="l" defTabSz="914400" rtl="0" eaLnBrk="1" latinLnBrk="0" hangingPunct="1">
-      <a:defRPr sz="1800" kern="1200">
+    <a:lvl5pPr marL="1707551" algn="l" defTabSz="853775" rtl="0" eaLnBrk="1" latinLnBrk="0" hangingPunct="1">
+      <a:defRPr sz="1700" kern="1200">
         <a:solidFill>
           <a:schemeClr val="tx1"/>
         </a:solidFill>
@@ -63,8 +66,8 @@
         <a:cs typeface="+mn-cs"/>
       </a:defRPr>
     </a:lvl5pPr>
-    <a:lvl6pPr marL="2286000" algn="l" defTabSz="914400" rtl="0" eaLnBrk="1" latinLnBrk="0" hangingPunct="1">
-      <a:defRPr sz="1800" kern="1200">
+    <a:lvl6pPr marL="2134438" algn="l" defTabSz="853775" rtl="0" eaLnBrk="1" latinLnBrk="0" hangingPunct="1">
+      <a:defRPr sz="1700" kern="1200">
         <a:solidFill>
           <a:schemeClr val="tx1"/>
         </a:solidFill>
@@ -73,8 +76,8 @@
         <a:cs typeface="+mn-cs"/>
       </a:defRPr>
     </a:lvl6pPr>
-    <a:lvl7pPr marL="2743200" algn="l" defTabSz="914400" rtl="0" eaLnBrk="1" latinLnBrk="0" hangingPunct="1">
-      <a:defRPr sz="1800" kern="1200">
+    <a:lvl7pPr marL="2561326" algn="l" defTabSz="853775" rtl="0" eaLnBrk="1" latinLnBrk="0" hangingPunct="1">
+      <a:defRPr sz="1700" kern="1200">
         <a:solidFill>
           <a:schemeClr val="tx1"/>
         </a:solidFill>
@@ -83,8 +86,8 @@
         <a:cs typeface="+mn-cs"/>
       </a:defRPr>
     </a:lvl7pPr>
-    <a:lvl8pPr marL="3200400" algn="l" defTabSz="914400" rtl="0" eaLnBrk="1" latinLnBrk="0" hangingPunct="1">
-      <a:defRPr sz="1800" kern="1200">
+    <a:lvl8pPr marL="2988213" algn="l" defTabSz="853775" rtl="0" eaLnBrk="1" latinLnBrk="0" hangingPunct="1">
+      <a:defRPr sz="1700" kern="1200">
         <a:solidFill>
           <a:schemeClr val="tx1"/>
         </a:solidFill>
@@ -93,8 +96,8 @@
         <a:cs typeface="+mn-cs"/>
       </a:defRPr>
     </a:lvl8pPr>
-    <a:lvl9pPr marL="3657600" algn="l" defTabSz="914400" rtl="0" eaLnBrk="1" latinLnBrk="0" hangingPunct="1">
-      <a:defRPr sz="1800" kern="1200">
+    <a:lvl9pPr marL="3415101" algn="l" defTabSz="853775" rtl="0" eaLnBrk="1" latinLnBrk="0" hangingPunct="1">
+      <a:defRPr sz="1700" kern="1200">
         <a:solidFill>
           <a:schemeClr val="tx1"/>
         </a:solidFill>
@@ -105,6 +108,445 @@
     </a:lvl9pPr>
   </p:defaultTextStyle>
 </p:presentation>
+</file>
+
+<file path=ppt/notesMasters/notesMaster1.xml><?xml version="1.0" encoding="utf-8"?>
+<p:notesMaster xmlns:a="http://schemas.openxmlformats.org/drawingml/2006/main" xmlns:r="http://schemas.openxmlformats.org/officeDocument/2006/relationships" xmlns:p="http://schemas.openxmlformats.org/presentationml/2006/main">
+  <p:cSld>
+    <p:bg>
+      <p:bgRef idx="1001">
+        <a:schemeClr val="bg1"/>
+      </p:bgRef>
+    </p:bg>
+    <p:spTree>
+      <p:nvGrpSpPr>
+        <p:cNvPr id="1" name=""/>
+        <p:cNvGrpSpPr/>
+        <p:nvPr/>
+      </p:nvGrpSpPr>
+      <p:grpSpPr>
+        <a:xfrm>
+          <a:off x="0" y="0"/>
+          <a:ext cx="0" cy="0"/>
+          <a:chOff x="0" y="0"/>
+          <a:chExt cx="0" cy="0"/>
+        </a:xfrm>
+      </p:grpSpPr>
+      <p:sp>
+        <p:nvSpPr>
+          <p:cNvPr id="2" name="Header Placeholder 1"/>
+          <p:cNvSpPr>
+            <a:spLocks noGrp="1"/>
+          </p:cNvSpPr>
+          <p:nvPr>
+            <p:ph type="hdr" sz="quarter"/>
+          </p:nvPr>
+        </p:nvSpPr>
+        <p:spPr>
+          <a:xfrm>
+            <a:off x="0" y="0"/>
+            <a:ext cx="2971800" cy="457200"/>
+          </a:xfrm>
+          <a:prstGeom prst="rect">
+            <a:avLst/>
+          </a:prstGeom>
+        </p:spPr>
+        <p:txBody>
+          <a:bodyPr vert="horz" lIns="91440" tIns="45720" rIns="91440" bIns="45720" rtlCol="0"/>
+          <a:lstStyle>
+            <a:lvl1pPr algn="l">
+              <a:defRPr sz="1200"/>
+            </a:lvl1pPr>
+          </a:lstStyle>
+          <a:p>
+            <a:endParaRPr lang="en-SG"/>
+          </a:p>
+        </p:txBody>
+      </p:sp>
+      <p:sp>
+        <p:nvSpPr>
+          <p:cNvPr id="3" name="Date Placeholder 2"/>
+          <p:cNvSpPr>
+            <a:spLocks noGrp="1"/>
+          </p:cNvSpPr>
+          <p:nvPr>
+            <p:ph type="dt" idx="1"/>
+          </p:nvPr>
+        </p:nvSpPr>
+        <p:spPr>
+          <a:xfrm>
+            <a:off x="3884613" y="0"/>
+            <a:ext cx="2971800" cy="457200"/>
+          </a:xfrm>
+          <a:prstGeom prst="rect">
+            <a:avLst/>
+          </a:prstGeom>
+        </p:spPr>
+        <p:txBody>
+          <a:bodyPr vert="horz" lIns="91440" tIns="45720" rIns="91440" bIns="45720" rtlCol="0"/>
+          <a:lstStyle>
+            <a:lvl1pPr algn="r">
+              <a:defRPr sz="1200"/>
+            </a:lvl1pPr>
+          </a:lstStyle>
+          <a:p>
+            <a:fld id="{5D8FA8FF-20DC-44E5-8C35-13EAF0A5698C}" type="datetimeFigureOut">
+              <a:rPr lang="en-SG" smtClean="0"/>
+              <a:t>18/12/2012</a:t>
+            </a:fld>
+            <a:endParaRPr lang="en-SG"/>
+          </a:p>
+        </p:txBody>
+      </p:sp>
+      <p:sp>
+        <p:nvSpPr>
+          <p:cNvPr id="4" name="Slide Image Placeholder 3"/>
+          <p:cNvSpPr>
+            <a:spLocks noGrp="1" noRot="1" noChangeAspect="1"/>
+          </p:cNvSpPr>
+          <p:nvPr>
+            <p:ph type="sldImg" idx="2"/>
+          </p:nvPr>
+        </p:nvSpPr>
+        <p:spPr>
+          <a:xfrm>
+            <a:off x="1077913" y="685800"/>
+            <a:ext cx="4702175" cy="3429000"/>
+          </a:xfrm>
+          <a:prstGeom prst="rect">
+            <a:avLst/>
+          </a:prstGeom>
+          <a:noFill/>
+          <a:ln w="12700">
+            <a:solidFill>
+              <a:prstClr val="black"/>
+            </a:solidFill>
+          </a:ln>
+        </p:spPr>
+        <p:txBody>
+          <a:bodyPr vert="horz" lIns="91440" tIns="45720" rIns="91440" bIns="45720" rtlCol="0" anchor="ctr"/>
+          <a:lstStyle/>
+          <a:p>
+            <a:endParaRPr lang="en-SG"/>
+          </a:p>
+        </p:txBody>
+      </p:sp>
+      <p:sp>
+        <p:nvSpPr>
+          <p:cNvPr id="5" name="Notes Placeholder 4"/>
+          <p:cNvSpPr>
+            <a:spLocks noGrp="1"/>
+          </p:cNvSpPr>
+          <p:nvPr>
+            <p:ph type="body" sz="quarter" idx="3"/>
+          </p:nvPr>
+        </p:nvSpPr>
+        <p:spPr>
+          <a:xfrm>
+            <a:off x="685800" y="4343400"/>
+            <a:ext cx="5486400" cy="4114800"/>
+          </a:xfrm>
+          <a:prstGeom prst="rect">
+            <a:avLst/>
+          </a:prstGeom>
+        </p:spPr>
+        <p:txBody>
+          <a:bodyPr vert="horz" lIns="91440" tIns="45720" rIns="91440" bIns="45720" rtlCol="0"/>
+          <a:lstStyle/>
+          <a:p>
+            <a:pPr lvl="0"/>
+            <a:r>
+              <a:rPr lang="en-US" smtClean="0"/>
+              <a:t>Click to edit Master text styles</a:t>
+            </a:r>
+          </a:p>
+          <a:p>
+            <a:pPr lvl="1"/>
+            <a:r>
+              <a:rPr lang="en-US" smtClean="0"/>
+              <a:t>Second level</a:t>
+            </a:r>
+          </a:p>
+          <a:p>
+            <a:pPr lvl="2"/>
+            <a:r>
+              <a:rPr lang="en-US" smtClean="0"/>
+              <a:t>Third level</a:t>
+            </a:r>
+          </a:p>
+          <a:p>
+            <a:pPr lvl="3"/>
+            <a:r>
+              <a:rPr lang="en-US" smtClean="0"/>
+              <a:t>Fourth level</a:t>
+            </a:r>
+          </a:p>
+          <a:p>
+            <a:pPr lvl="4"/>
+            <a:r>
+              <a:rPr lang="en-US" smtClean="0"/>
+              <a:t>Fifth level</a:t>
+            </a:r>
+            <a:endParaRPr lang="en-SG"/>
+          </a:p>
+        </p:txBody>
+      </p:sp>
+      <p:sp>
+        <p:nvSpPr>
+          <p:cNvPr id="6" name="Footer Placeholder 5"/>
+          <p:cNvSpPr>
+            <a:spLocks noGrp="1"/>
+          </p:cNvSpPr>
+          <p:nvPr>
+            <p:ph type="ftr" sz="quarter" idx="4"/>
+          </p:nvPr>
+        </p:nvSpPr>
+        <p:spPr>
+          <a:xfrm>
+            <a:off x="0" y="8685213"/>
+            <a:ext cx="2971800" cy="457200"/>
+          </a:xfrm>
+          <a:prstGeom prst="rect">
+            <a:avLst/>
+          </a:prstGeom>
+        </p:spPr>
+        <p:txBody>
+          <a:bodyPr vert="horz" lIns="91440" tIns="45720" rIns="91440" bIns="45720" rtlCol="0" anchor="b"/>
+          <a:lstStyle>
+            <a:lvl1pPr algn="l">
+              <a:defRPr sz="1200"/>
+            </a:lvl1pPr>
+          </a:lstStyle>
+          <a:p>
+            <a:endParaRPr lang="en-SG"/>
+          </a:p>
+        </p:txBody>
+      </p:sp>
+      <p:sp>
+        <p:nvSpPr>
+          <p:cNvPr id="7" name="Slide Number Placeholder 6"/>
+          <p:cNvSpPr>
+            <a:spLocks noGrp="1"/>
+          </p:cNvSpPr>
+          <p:nvPr>
+            <p:ph type="sldNum" sz="quarter" idx="5"/>
+          </p:nvPr>
+        </p:nvSpPr>
+        <p:spPr>
+          <a:xfrm>
+            <a:off x="3884613" y="8685213"/>
+            <a:ext cx="2971800" cy="457200"/>
+          </a:xfrm>
+          <a:prstGeom prst="rect">
+            <a:avLst/>
+          </a:prstGeom>
+        </p:spPr>
+        <p:txBody>
+          <a:bodyPr vert="horz" lIns="91440" tIns="45720" rIns="91440" bIns="45720" rtlCol="0" anchor="b"/>
+          <a:lstStyle>
+            <a:lvl1pPr algn="r">
+              <a:defRPr sz="1200"/>
+            </a:lvl1pPr>
+          </a:lstStyle>
+          <a:p>
+            <a:fld id="{533A5AA4-18D7-48CB-8D4B-C9F7395BD002}" type="slidenum">
+              <a:rPr lang="en-SG" smtClean="0"/>
+              <a:t>‹#›</a:t>
+            </a:fld>
+            <a:endParaRPr lang="en-SG"/>
+          </a:p>
+        </p:txBody>
+      </p:sp>
+    </p:spTree>
+    <p:extLst>
+      <p:ext uri="{BB962C8B-B14F-4D97-AF65-F5344CB8AC3E}">
+        <p14:creationId xmlns:p14="http://schemas.microsoft.com/office/powerpoint/2010/main" val="2591710806"/>
+      </p:ext>
+    </p:extLst>
+  </p:cSld>
+  <p:clrMap bg1="lt1" tx1="dk1" bg2="lt2" tx2="dk2" accent1="accent1" accent2="accent2" accent3="accent3" accent4="accent4" accent5="accent5" accent6="accent6" hlink="hlink" folHlink="folHlink"/>
+  <p:notesStyle>
+    <a:lvl1pPr marL="0" algn="l" defTabSz="853775" rtl="0" eaLnBrk="1" latinLnBrk="0" hangingPunct="1">
+      <a:defRPr sz="1100" kern="1200">
+        <a:solidFill>
+          <a:schemeClr val="tx1"/>
+        </a:solidFill>
+        <a:latin typeface="+mn-lt"/>
+        <a:ea typeface="+mn-ea"/>
+        <a:cs typeface="+mn-cs"/>
+      </a:defRPr>
+    </a:lvl1pPr>
+    <a:lvl2pPr marL="426888" algn="l" defTabSz="853775" rtl="0" eaLnBrk="1" latinLnBrk="0" hangingPunct="1">
+      <a:defRPr sz="1100" kern="1200">
+        <a:solidFill>
+          <a:schemeClr val="tx1"/>
+        </a:solidFill>
+        <a:latin typeface="+mn-lt"/>
+        <a:ea typeface="+mn-ea"/>
+        <a:cs typeface="+mn-cs"/>
+      </a:defRPr>
+    </a:lvl2pPr>
+    <a:lvl3pPr marL="853775" algn="l" defTabSz="853775" rtl="0" eaLnBrk="1" latinLnBrk="0" hangingPunct="1">
+      <a:defRPr sz="1100" kern="1200">
+        <a:solidFill>
+          <a:schemeClr val="tx1"/>
+        </a:solidFill>
+        <a:latin typeface="+mn-lt"/>
+        <a:ea typeface="+mn-ea"/>
+        <a:cs typeface="+mn-cs"/>
+      </a:defRPr>
+    </a:lvl3pPr>
+    <a:lvl4pPr marL="1280663" algn="l" defTabSz="853775" rtl="0" eaLnBrk="1" latinLnBrk="0" hangingPunct="1">
+      <a:defRPr sz="1100" kern="1200">
+        <a:solidFill>
+          <a:schemeClr val="tx1"/>
+        </a:solidFill>
+        <a:latin typeface="+mn-lt"/>
+        <a:ea typeface="+mn-ea"/>
+        <a:cs typeface="+mn-cs"/>
+      </a:defRPr>
+    </a:lvl4pPr>
+    <a:lvl5pPr marL="1707551" algn="l" defTabSz="853775" rtl="0" eaLnBrk="1" latinLnBrk="0" hangingPunct="1">
+      <a:defRPr sz="1100" kern="1200">
+        <a:solidFill>
+          <a:schemeClr val="tx1"/>
+        </a:solidFill>
+        <a:latin typeface="+mn-lt"/>
+        <a:ea typeface="+mn-ea"/>
+        <a:cs typeface="+mn-cs"/>
+      </a:defRPr>
+    </a:lvl5pPr>
+    <a:lvl6pPr marL="2134438" algn="l" defTabSz="853775" rtl="0" eaLnBrk="1" latinLnBrk="0" hangingPunct="1">
+      <a:defRPr sz="1100" kern="1200">
+        <a:solidFill>
+          <a:schemeClr val="tx1"/>
+        </a:solidFill>
+        <a:latin typeface="+mn-lt"/>
+        <a:ea typeface="+mn-ea"/>
+        <a:cs typeface="+mn-cs"/>
+      </a:defRPr>
+    </a:lvl6pPr>
+    <a:lvl7pPr marL="2561326" algn="l" defTabSz="853775" rtl="0" eaLnBrk="1" latinLnBrk="0" hangingPunct="1">
+      <a:defRPr sz="1100" kern="1200">
+        <a:solidFill>
+          <a:schemeClr val="tx1"/>
+        </a:solidFill>
+        <a:latin typeface="+mn-lt"/>
+        <a:ea typeface="+mn-ea"/>
+        <a:cs typeface="+mn-cs"/>
+      </a:defRPr>
+    </a:lvl7pPr>
+    <a:lvl8pPr marL="2988213" algn="l" defTabSz="853775" rtl="0" eaLnBrk="1" latinLnBrk="0" hangingPunct="1">
+      <a:defRPr sz="1100" kern="1200">
+        <a:solidFill>
+          <a:schemeClr val="tx1"/>
+        </a:solidFill>
+        <a:latin typeface="+mn-lt"/>
+        <a:ea typeface="+mn-ea"/>
+        <a:cs typeface="+mn-cs"/>
+      </a:defRPr>
+    </a:lvl8pPr>
+    <a:lvl9pPr marL="3415101" algn="l" defTabSz="853775" rtl="0" eaLnBrk="1" latinLnBrk="0" hangingPunct="1">
+      <a:defRPr sz="1100" kern="1200">
+        <a:solidFill>
+          <a:schemeClr val="tx1"/>
+        </a:solidFill>
+        <a:latin typeface="+mn-lt"/>
+        <a:ea typeface="+mn-ea"/>
+        <a:cs typeface="+mn-cs"/>
+      </a:defRPr>
+    </a:lvl9pPr>
+  </p:notesStyle>
+</p:notesMaster>
+</file>
+
+<file path=ppt/notesSlides/notesSlide1.xml><?xml version="1.0" encoding="utf-8"?>
+<p:notes xmlns:a="http://schemas.openxmlformats.org/drawingml/2006/main" xmlns:r="http://schemas.openxmlformats.org/officeDocument/2006/relationships" xmlns:p="http://schemas.openxmlformats.org/presentationml/2006/main">
+  <p:cSld>
+    <p:spTree>
+      <p:nvGrpSpPr>
+        <p:cNvPr id="1" name=""/>
+        <p:cNvGrpSpPr/>
+        <p:nvPr/>
+      </p:nvGrpSpPr>
+      <p:grpSpPr>
+        <a:xfrm>
+          <a:off x="0" y="0"/>
+          <a:ext cx="0" cy="0"/>
+          <a:chOff x="0" y="0"/>
+          <a:chExt cx="0" cy="0"/>
+        </a:xfrm>
+      </p:grpSpPr>
+      <p:sp>
+        <p:nvSpPr>
+          <p:cNvPr id="2" name="Slide Image Placeholder 1"/>
+          <p:cNvSpPr>
+            <a:spLocks noGrp="1" noRot="1" noChangeAspect="1"/>
+          </p:cNvSpPr>
+          <p:nvPr>
+            <p:ph type="sldImg"/>
+          </p:nvPr>
+        </p:nvSpPr>
+        <p:spPr>
+          <a:xfrm>
+            <a:off x="1077913" y="685800"/>
+            <a:ext cx="4702175" cy="3429000"/>
+          </a:xfrm>
+        </p:spPr>
+      </p:sp>
+      <p:sp>
+        <p:nvSpPr>
+          <p:cNvPr id="3" name="Notes Placeholder 2"/>
+          <p:cNvSpPr>
+            <a:spLocks noGrp="1"/>
+          </p:cNvSpPr>
+          <p:nvPr>
+            <p:ph type="body" idx="1"/>
+          </p:nvPr>
+        </p:nvSpPr>
+        <p:spPr/>
+        <p:txBody>
+          <a:bodyPr/>
+          <a:lstStyle/>
+          <a:p>
+            <a:endParaRPr lang="en-SG" dirty="0"/>
+          </a:p>
+        </p:txBody>
+      </p:sp>
+      <p:sp>
+        <p:nvSpPr>
+          <p:cNvPr id="4" name="Slide Number Placeholder 3"/>
+          <p:cNvSpPr>
+            <a:spLocks noGrp="1"/>
+          </p:cNvSpPr>
+          <p:nvPr>
+            <p:ph type="sldNum" sz="quarter" idx="10"/>
+          </p:nvPr>
+        </p:nvSpPr>
+        <p:spPr/>
+        <p:txBody>
+          <a:bodyPr/>
+          <a:lstStyle/>
+          <a:p>
+            <a:fld id="{533A5AA4-18D7-48CB-8D4B-C9F7395BD002}" type="slidenum">
+              <a:rPr lang="en-SG" smtClean="0"/>
+              <a:t>1</a:t>
+            </a:fld>
+            <a:endParaRPr lang="en-SG"/>
+          </a:p>
+        </p:txBody>
+      </p:sp>
+    </p:spTree>
+    <p:extLst>
+      <p:ext uri="{BB962C8B-B14F-4D97-AF65-F5344CB8AC3E}">
+        <p14:creationId xmlns:p14="http://schemas.microsoft.com/office/powerpoint/2010/main" val="3432613659"/>
+      </p:ext>
+    </p:extLst>
+  </p:cSld>
+  <p:clrMapOvr>
+    <a:masterClrMapping/>
+  </p:clrMapOvr>
+</p:notes>
 </file>
 
 <file path=ppt/slideLayouts/slideLayout1.xml><?xml version="1.0" encoding="utf-8"?>
@@ -136,8 +578,8 @@
         </p:nvSpPr>
         <p:spPr>
           <a:xfrm>
-            <a:off x="685800" y="2130425"/>
-            <a:ext cx="7772400" cy="1470025"/>
+            <a:off x="648057" y="1957328"/>
+            <a:ext cx="7344649" cy="1350586"/>
           </a:xfrm>
         </p:spPr>
         <p:txBody>
@@ -164,8 +606,8 @@
         </p:nvSpPr>
         <p:spPr>
           <a:xfrm>
-            <a:off x="1371600" y="3886200"/>
-            <a:ext cx="6400800" cy="1752600"/>
+            <a:off x="1296115" y="3570447"/>
+            <a:ext cx="6048534" cy="1610201"/>
           </a:xfrm>
         </p:spPr>
         <p:txBody>
@@ -181,7 +623,7 @@
                 </a:solidFill>
               </a:defRPr>
             </a:lvl1pPr>
-            <a:lvl2pPr marL="457200" indent="0" algn="ctr">
+            <a:lvl2pPr marL="426888" indent="0" algn="ctr">
               <a:buNone/>
               <a:defRPr>
                 <a:solidFill>
@@ -191,7 +633,7 @@
                 </a:solidFill>
               </a:defRPr>
             </a:lvl2pPr>
-            <a:lvl3pPr marL="914400" indent="0" algn="ctr">
+            <a:lvl3pPr marL="853775" indent="0" algn="ctr">
               <a:buNone/>
               <a:defRPr>
                 <a:solidFill>
@@ -201,7 +643,7 @@
                 </a:solidFill>
               </a:defRPr>
             </a:lvl3pPr>
-            <a:lvl4pPr marL="1371600" indent="0" algn="ctr">
+            <a:lvl4pPr marL="1280663" indent="0" algn="ctr">
               <a:buNone/>
               <a:defRPr>
                 <a:solidFill>
@@ -211,7 +653,7 @@
                 </a:solidFill>
               </a:defRPr>
             </a:lvl4pPr>
-            <a:lvl5pPr marL="1828800" indent="0" algn="ctr">
+            <a:lvl5pPr marL="1707551" indent="0" algn="ctr">
               <a:buNone/>
               <a:defRPr>
                 <a:solidFill>
@@ -221,7 +663,7 @@
                 </a:solidFill>
               </a:defRPr>
             </a:lvl5pPr>
-            <a:lvl6pPr marL="2286000" indent="0" algn="ctr">
+            <a:lvl6pPr marL="2134438" indent="0" algn="ctr">
               <a:buNone/>
               <a:defRPr>
                 <a:solidFill>
@@ -231,7 +673,7 @@
                 </a:solidFill>
               </a:defRPr>
             </a:lvl6pPr>
-            <a:lvl7pPr marL="2743200" indent="0" algn="ctr">
+            <a:lvl7pPr marL="2561326" indent="0" algn="ctr">
               <a:buNone/>
               <a:defRPr>
                 <a:solidFill>
@@ -241,7 +683,7 @@
                 </a:solidFill>
               </a:defRPr>
             </a:lvl7pPr>
-            <a:lvl8pPr marL="3200400" indent="0" algn="ctr">
+            <a:lvl8pPr marL="2988213" indent="0" algn="ctr">
               <a:buNone/>
               <a:defRPr>
                 <a:solidFill>
@@ -251,7 +693,7 @@
                 </a:solidFill>
               </a:defRPr>
             </a:lvl8pPr>
-            <a:lvl9pPr marL="3657600" indent="0" algn="ctr">
+            <a:lvl9pPr marL="3415101" indent="0" algn="ctr">
               <a:buNone/>
               <a:defRPr>
                 <a:solidFill>
@@ -289,7 +731,7 @@
             <a:fld id="{1D8BD707-D9CF-40AE-B4C6-C98DA3205C09}" type="datetimeFigureOut">
               <a:rPr lang="en-US" smtClean="0"/>
               <a:pPr/>
-              <a:t>7/12/2012</a:t>
+              <a:t>12/18/2012</a:t>
             </a:fld>
             <a:endParaRPr lang="en-US"/>
           </a:p>
@@ -456,7 +898,7 @@
             <a:fld id="{1D8BD707-D9CF-40AE-B4C6-C98DA3205C09}" type="datetimeFigureOut">
               <a:rPr lang="en-US" smtClean="0"/>
               <a:pPr/>
-              <a:t>7/12/2012</a:t>
+              <a:t>12/18/2012</a:t>
             </a:fld>
             <a:endParaRPr lang="en-US"/>
           </a:p>
@@ -542,8 +984,8 @@
         </p:nvSpPr>
         <p:spPr>
           <a:xfrm>
-            <a:off x="6629400" y="274638"/>
-            <a:ext cx="2057400" cy="5851525"/>
+            <a:off x="6264553" y="252324"/>
+            <a:ext cx="1944172" cy="5376089"/>
           </a:xfrm>
         </p:spPr>
         <p:txBody>
@@ -570,8 +1012,8 @@
         </p:nvSpPr>
         <p:spPr>
           <a:xfrm>
-            <a:off x="457200" y="274638"/>
-            <a:ext cx="6019800" cy="5851525"/>
+            <a:off x="432038" y="252324"/>
+            <a:ext cx="5688502" cy="5376089"/>
           </a:xfrm>
         </p:spPr>
         <p:txBody>
@@ -633,7 +1075,7 @@
             <a:fld id="{1D8BD707-D9CF-40AE-B4C6-C98DA3205C09}" type="datetimeFigureOut">
               <a:rPr lang="en-US" smtClean="0"/>
               <a:pPr/>
-              <a:t>7/12/2012</a:t>
+              <a:t>12/18/2012</a:t>
             </a:fld>
             <a:endParaRPr lang="en-US"/>
           </a:p>
@@ -800,7 +1242,7 @@
             <a:fld id="{1D8BD707-D9CF-40AE-B4C6-C98DA3205C09}" type="datetimeFigureOut">
               <a:rPr lang="en-US" smtClean="0"/>
               <a:pPr/>
-              <a:t>7/12/2012</a:t>
+              <a:t>12/18/2012</a:t>
             </a:fld>
             <a:endParaRPr lang="en-US"/>
           </a:p>
@@ -886,15 +1328,15 @@
         </p:nvSpPr>
         <p:spPr>
           <a:xfrm>
-            <a:off x="722313" y="4406900"/>
-            <a:ext cx="7772400" cy="1362075"/>
+            <a:off x="682561" y="4048840"/>
+            <a:ext cx="7344649" cy="1251407"/>
           </a:xfrm>
         </p:spPr>
         <p:txBody>
           <a:bodyPr anchor="t"/>
           <a:lstStyle>
             <a:lvl1pPr algn="l">
-              <a:defRPr sz="4000" b="1" cap="all"/>
+              <a:defRPr sz="3700" b="1" cap="all"/>
             </a:lvl1pPr>
           </a:lstStyle>
           <a:p>
@@ -918,8 +1360,8 @@
         </p:nvSpPr>
         <p:spPr>
           <a:xfrm>
-            <a:off x="722313" y="2906713"/>
-            <a:ext cx="7772400" cy="1500187"/>
+            <a:off x="682561" y="2670543"/>
+            <a:ext cx="7344649" cy="1378297"/>
           </a:xfrm>
         </p:spPr>
         <p:txBody>
@@ -927,7 +1369,7 @@
           <a:lstStyle>
             <a:lvl1pPr marL="0" indent="0">
               <a:buNone/>
-              <a:defRPr sz="2000">
+              <a:defRPr sz="1900">
                 <a:solidFill>
                   <a:schemeClr val="tx1">
                     <a:tint val="75000"/>
@@ -935,9 +1377,9 @@
                 </a:solidFill>
               </a:defRPr>
             </a:lvl1pPr>
-            <a:lvl2pPr marL="457200" indent="0">
+            <a:lvl2pPr marL="426888" indent="0">
               <a:buNone/>
-              <a:defRPr sz="1800">
+              <a:defRPr sz="1700">
                 <a:solidFill>
                   <a:schemeClr val="tx1">
                     <a:tint val="75000"/>
@@ -945,9 +1387,9 @@
                 </a:solidFill>
               </a:defRPr>
             </a:lvl2pPr>
-            <a:lvl3pPr marL="914400" indent="0">
+            <a:lvl3pPr marL="853775" indent="0">
               <a:buNone/>
-              <a:defRPr sz="1600">
+              <a:defRPr sz="1500">
                 <a:solidFill>
                   <a:schemeClr val="tx1">
                     <a:tint val="75000"/>
@@ -955,9 +1397,9 @@
                 </a:solidFill>
               </a:defRPr>
             </a:lvl3pPr>
-            <a:lvl4pPr marL="1371600" indent="0">
+            <a:lvl4pPr marL="1280663" indent="0">
               <a:buNone/>
-              <a:defRPr sz="1400">
+              <a:defRPr sz="1300">
                 <a:solidFill>
                   <a:schemeClr val="tx1">
                     <a:tint val="75000"/>
@@ -965,9 +1407,9 @@
                 </a:solidFill>
               </a:defRPr>
             </a:lvl4pPr>
-            <a:lvl5pPr marL="1828800" indent="0">
+            <a:lvl5pPr marL="1707551" indent="0">
               <a:buNone/>
-              <a:defRPr sz="1400">
+              <a:defRPr sz="1300">
                 <a:solidFill>
                   <a:schemeClr val="tx1">
                     <a:tint val="75000"/>
@@ -975,9 +1417,9 @@
                 </a:solidFill>
               </a:defRPr>
             </a:lvl5pPr>
-            <a:lvl6pPr marL="2286000" indent="0">
+            <a:lvl6pPr marL="2134438" indent="0">
               <a:buNone/>
-              <a:defRPr sz="1400">
+              <a:defRPr sz="1300">
                 <a:solidFill>
                   <a:schemeClr val="tx1">
                     <a:tint val="75000"/>
@@ -985,9 +1427,9 @@
                 </a:solidFill>
               </a:defRPr>
             </a:lvl6pPr>
-            <a:lvl7pPr marL="2743200" indent="0">
+            <a:lvl7pPr marL="2561326" indent="0">
               <a:buNone/>
-              <a:defRPr sz="1400">
+              <a:defRPr sz="1300">
                 <a:solidFill>
                   <a:schemeClr val="tx1">
                     <a:tint val="75000"/>
@@ -995,9 +1437,9 @@
                 </a:solidFill>
               </a:defRPr>
             </a:lvl7pPr>
-            <a:lvl8pPr marL="3200400" indent="0">
+            <a:lvl8pPr marL="2988213" indent="0">
               <a:buNone/>
-              <a:defRPr sz="1400">
+              <a:defRPr sz="1300">
                 <a:solidFill>
                   <a:schemeClr val="tx1">
                     <a:tint val="75000"/>
@@ -1005,9 +1447,9 @@
                 </a:solidFill>
               </a:defRPr>
             </a:lvl8pPr>
-            <a:lvl9pPr marL="3657600" indent="0">
+            <a:lvl9pPr marL="3415101" indent="0">
               <a:buNone/>
-              <a:defRPr sz="1400">
+              <a:defRPr sz="1300">
                 <a:solidFill>
                   <a:schemeClr val="tx1">
                     <a:tint val="75000"/>
@@ -1043,7 +1485,7 @@
             <a:fld id="{1D8BD707-D9CF-40AE-B4C6-C98DA3205C09}" type="datetimeFigureOut">
               <a:rPr lang="en-US" smtClean="0"/>
               <a:pPr/>
-              <a:t>7/12/2012</a:t>
+              <a:t>12/18/2012</a:t>
             </a:fld>
             <a:endParaRPr lang="en-US"/>
           </a:p>
@@ -1152,39 +1594,39 @@
         </p:nvSpPr>
         <p:spPr>
           <a:xfrm>
-            <a:off x="457200" y="1600200"/>
-            <a:ext cx="4038600" cy="4525963"/>
+            <a:off x="432038" y="1470184"/>
+            <a:ext cx="3816337" cy="4158229"/>
           </a:xfrm>
         </p:spPr>
         <p:txBody>
           <a:bodyPr/>
           <a:lstStyle>
             <a:lvl1pPr>
-              <a:defRPr sz="2800"/>
+              <a:defRPr sz="2600"/>
             </a:lvl1pPr>
             <a:lvl2pPr>
-              <a:defRPr sz="2400"/>
+              <a:defRPr sz="2200"/>
             </a:lvl2pPr>
             <a:lvl3pPr>
-              <a:defRPr sz="2000"/>
+              <a:defRPr sz="1900"/>
             </a:lvl3pPr>
             <a:lvl4pPr>
-              <a:defRPr sz="1800"/>
+              <a:defRPr sz="1700"/>
             </a:lvl4pPr>
             <a:lvl5pPr>
-              <a:defRPr sz="1800"/>
+              <a:defRPr sz="1700"/>
             </a:lvl5pPr>
             <a:lvl6pPr>
-              <a:defRPr sz="1800"/>
+              <a:defRPr sz="1700"/>
             </a:lvl6pPr>
             <a:lvl7pPr>
-              <a:defRPr sz="1800"/>
+              <a:defRPr sz="1700"/>
             </a:lvl7pPr>
             <a:lvl8pPr>
-              <a:defRPr sz="1800"/>
+              <a:defRPr sz="1700"/>
             </a:lvl8pPr>
             <a:lvl9pPr>
-              <a:defRPr sz="1800"/>
+              <a:defRPr sz="1700"/>
             </a:lvl9pPr>
           </a:lstStyle>
           <a:p>
@@ -1237,39 +1679,39 @@
         </p:nvSpPr>
         <p:spPr>
           <a:xfrm>
-            <a:off x="4648200" y="1600200"/>
-            <a:ext cx="4038600" cy="4525963"/>
+            <a:off x="4392388" y="1470184"/>
+            <a:ext cx="3816337" cy="4158229"/>
           </a:xfrm>
         </p:spPr>
         <p:txBody>
           <a:bodyPr/>
           <a:lstStyle>
             <a:lvl1pPr>
-              <a:defRPr sz="2800"/>
+              <a:defRPr sz="2600"/>
             </a:lvl1pPr>
             <a:lvl2pPr>
-              <a:defRPr sz="2400"/>
+              <a:defRPr sz="2200"/>
             </a:lvl2pPr>
             <a:lvl3pPr>
-              <a:defRPr sz="2000"/>
+              <a:defRPr sz="1900"/>
             </a:lvl3pPr>
             <a:lvl4pPr>
-              <a:defRPr sz="1800"/>
+              <a:defRPr sz="1700"/>
             </a:lvl4pPr>
             <a:lvl5pPr>
-              <a:defRPr sz="1800"/>
+              <a:defRPr sz="1700"/>
             </a:lvl5pPr>
             <a:lvl6pPr>
-              <a:defRPr sz="1800"/>
+              <a:defRPr sz="1700"/>
             </a:lvl6pPr>
             <a:lvl7pPr>
-              <a:defRPr sz="1800"/>
+              <a:defRPr sz="1700"/>
             </a:lvl7pPr>
             <a:lvl8pPr>
-              <a:defRPr sz="1800"/>
+              <a:defRPr sz="1700"/>
             </a:lvl8pPr>
             <a:lvl9pPr>
-              <a:defRPr sz="1800"/>
+              <a:defRPr sz="1700"/>
             </a:lvl9pPr>
           </a:lstStyle>
           <a:p>
@@ -1328,7 +1770,7 @@
             <a:fld id="{1D8BD707-D9CF-40AE-B4C6-C98DA3205C09}" type="datetimeFigureOut">
               <a:rPr lang="en-US" smtClean="0"/>
               <a:pPr/>
-              <a:t>7/12/2012</a:t>
+              <a:t>12/18/2012</a:t>
             </a:fld>
             <a:endParaRPr lang="en-US"/>
           </a:p>
@@ -1441,8 +1883,8 @@
         </p:nvSpPr>
         <p:spPr>
           <a:xfrm>
-            <a:off x="457200" y="1535113"/>
-            <a:ext cx="4040188" cy="639762"/>
+            <a:off x="432038" y="1410385"/>
+            <a:ext cx="3817838" cy="587781"/>
           </a:xfrm>
         </p:spPr>
         <p:txBody>
@@ -1450,39 +1892,39 @@
           <a:lstStyle>
             <a:lvl1pPr marL="0" indent="0">
               <a:buNone/>
-              <a:defRPr sz="2400" b="1"/>
+              <a:defRPr sz="2200" b="1"/>
             </a:lvl1pPr>
-            <a:lvl2pPr marL="457200" indent="0">
+            <a:lvl2pPr marL="426888" indent="0">
               <a:buNone/>
-              <a:defRPr sz="2000" b="1"/>
+              <a:defRPr sz="1900" b="1"/>
             </a:lvl2pPr>
-            <a:lvl3pPr marL="914400" indent="0">
+            <a:lvl3pPr marL="853775" indent="0">
               <a:buNone/>
-              <a:defRPr sz="1800" b="1"/>
+              <a:defRPr sz="1700" b="1"/>
             </a:lvl3pPr>
-            <a:lvl4pPr marL="1371600" indent="0">
+            <a:lvl4pPr marL="1280663" indent="0">
               <a:buNone/>
-              <a:defRPr sz="1600" b="1"/>
+              <a:defRPr sz="1500" b="1"/>
             </a:lvl4pPr>
-            <a:lvl5pPr marL="1828800" indent="0">
+            <a:lvl5pPr marL="1707551" indent="0">
               <a:buNone/>
-              <a:defRPr sz="1600" b="1"/>
+              <a:defRPr sz="1500" b="1"/>
             </a:lvl5pPr>
-            <a:lvl6pPr marL="2286000" indent="0">
+            <a:lvl6pPr marL="2134438" indent="0">
               <a:buNone/>
-              <a:defRPr sz="1600" b="1"/>
+              <a:defRPr sz="1500" b="1"/>
             </a:lvl6pPr>
-            <a:lvl7pPr marL="2743200" indent="0">
+            <a:lvl7pPr marL="2561326" indent="0">
               <a:buNone/>
-              <a:defRPr sz="1600" b="1"/>
+              <a:defRPr sz="1500" b="1"/>
             </a:lvl7pPr>
-            <a:lvl8pPr marL="3200400" indent="0">
+            <a:lvl8pPr marL="2988213" indent="0">
               <a:buNone/>
-              <a:defRPr sz="1600" b="1"/>
+              <a:defRPr sz="1500" b="1"/>
             </a:lvl8pPr>
-            <a:lvl9pPr marL="3657600" indent="0">
+            <a:lvl9pPr marL="3415101" indent="0">
               <a:buNone/>
-              <a:defRPr sz="1600" b="1"/>
+              <a:defRPr sz="1500" b="1"/>
             </a:lvl9pPr>
           </a:lstStyle>
           <a:p>
@@ -1506,39 +1948,39 @@
         </p:nvSpPr>
         <p:spPr>
           <a:xfrm>
-            <a:off x="457200" y="2174875"/>
-            <a:ext cx="4040188" cy="3951288"/>
+            <a:off x="432038" y="1998167"/>
+            <a:ext cx="3817838" cy="3630246"/>
           </a:xfrm>
         </p:spPr>
         <p:txBody>
           <a:bodyPr/>
           <a:lstStyle>
             <a:lvl1pPr>
-              <a:defRPr sz="2400"/>
+              <a:defRPr sz="2200"/>
             </a:lvl1pPr>
             <a:lvl2pPr>
-              <a:defRPr sz="2000"/>
+              <a:defRPr sz="1900"/>
             </a:lvl2pPr>
             <a:lvl3pPr>
-              <a:defRPr sz="1800"/>
+              <a:defRPr sz="1700"/>
             </a:lvl3pPr>
             <a:lvl4pPr>
-              <a:defRPr sz="1600"/>
+              <a:defRPr sz="1500"/>
             </a:lvl4pPr>
             <a:lvl5pPr>
-              <a:defRPr sz="1600"/>
+              <a:defRPr sz="1500"/>
             </a:lvl5pPr>
             <a:lvl6pPr>
-              <a:defRPr sz="1600"/>
+              <a:defRPr sz="1500"/>
             </a:lvl6pPr>
             <a:lvl7pPr>
-              <a:defRPr sz="1600"/>
+              <a:defRPr sz="1500"/>
             </a:lvl7pPr>
             <a:lvl8pPr>
-              <a:defRPr sz="1600"/>
+              <a:defRPr sz="1500"/>
             </a:lvl8pPr>
             <a:lvl9pPr>
-              <a:defRPr sz="1600"/>
+              <a:defRPr sz="1500"/>
             </a:lvl9pPr>
           </a:lstStyle>
           <a:p>
@@ -1591,8 +2033,8 @@
         </p:nvSpPr>
         <p:spPr>
           <a:xfrm>
-            <a:off x="4645025" y="1535113"/>
-            <a:ext cx="4041775" cy="639762"/>
+            <a:off x="4389388" y="1410385"/>
+            <a:ext cx="3819337" cy="587781"/>
           </a:xfrm>
         </p:spPr>
         <p:txBody>
@@ -1600,39 +2042,39 @@
           <a:lstStyle>
             <a:lvl1pPr marL="0" indent="0">
               <a:buNone/>
-              <a:defRPr sz="2400" b="1"/>
+              <a:defRPr sz="2200" b="1"/>
             </a:lvl1pPr>
-            <a:lvl2pPr marL="457200" indent="0">
+            <a:lvl2pPr marL="426888" indent="0">
               <a:buNone/>
-              <a:defRPr sz="2000" b="1"/>
+              <a:defRPr sz="1900" b="1"/>
             </a:lvl2pPr>
-            <a:lvl3pPr marL="914400" indent="0">
+            <a:lvl3pPr marL="853775" indent="0">
               <a:buNone/>
-              <a:defRPr sz="1800" b="1"/>
+              <a:defRPr sz="1700" b="1"/>
             </a:lvl3pPr>
-            <a:lvl4pPr marL="1371600" indent="0">
+            <a:lvl4pPr marL="1280663" indent="0">
               <a:buNone/>
-              <a:defRPr sz="1600" b="1"/>
+              <a:defRPr sz="1500" b="1"/>
             </a:lvl4pPr>
-            <a:lvl5pPr marL="1828800" indent="0">
+            <a:lvl5pPr marL="1707551" indent="0">
               <a:buNone/>
-              <a:defRPr sz="1600" b="1"/>
+              <a:defRPr sz="1500" b="1"/>
             </a:lvl5pPr>
-            <a:lvl6pPr marL="2286000" indent="0">
+            <a:lvl6pPr marL="2134438" indent="0">
               <a:buNone/>
-              <a:defRPr sz="1600" b="1"/>
+              <a:defRPr sz="1500" b="1"/>
             </a:lvl6pPr>
-            <a:lvl7pPr marL="2743200" indent="0">
+            <a:lvl7pPr marL="2561326" indent="0">
               <a:buNone/>
-              <a:defRPr sz="1600" b="1"/>
+              <a:defRPr sz="1500" b="1"/>
             </a:lvl7pPr>
-            <a:lvl8pPr marL="3200400" indent="0">
+            <a:lvl8pPr marL="2988213" indent="0">
               <a:buNone/>
-              <a:defRPr sz="1600" b="1"/>
+              <a:defRPr sz="1500" b="1"/>
             </a:lvl8pPr>
-            <a:lvl9pPr marL="3657600" indent="0">
+            <a:lvl9pPr marL="3415101" indent="0">
               <a:buNone/>
-              <a:defRPr sz="1600" b="1"/>
+              <a:defRPr sz="1500" b="1"/>
             </a:lvl9pPr>
           </a:lstStyle>
           <a:p>
@@ -1656,39 +2098,39 @@
         </p:nvSpPr>
         <p:spPr>
           <a:xfrm>
-            <a:off x="4645025" y="2174875"/>
-            <a:ext cx="4041775" cy="3951288"/>
+            <a:off x="4389388" y="1998167"/>
+            <a:ext cx="3819337" cy="3630246"/>
           </a:xfrm>
         </p:spPr>
         <p:txBody>
           <a:bodyPr/>
           <a:lstStyle>
             <a:lvl1pPr>
-              <a:defRPr sz="2400"/>
+              <a:defRPr sz="2200"/>
             </a:lvl1pPr>
             <a:lvl2pPr>
-              <a:defRPr sz="2000"/>
+              <a:defRPr sz="1900"/>
             </a:lvl2pPr>
             <a:lvl3pPr>
-              <a:defRPr sz="1800"/>
+              <a:defRPr sz="1700"/>
             </a:lvl3pPr>
             <a:lvl4pPr>
-              <a:defRPr sz="1600"/>
+              <a:defRPr sz="1500"/>
             </a:lvl4pPr>
             <a:lvl5pPr>
-              <a:defRPr sz="1600"/>
+              <a:defRPr sz="1500"/>
             </a:lvl5pPr>
             <a:lvl6pPr>
-              <a:defRPr sz="1600"/>
+              <a:defRPr sz="1500"/>
             </a:lvl6pPr>
             <a:lvl7pPr>
-              <a:defRPr sz="1600"/>
+              <a:defRPr sz="1500"/>
             </a:lvl7pPr>
             <a:lvl8pPr>
-              <a:defRPr sz="1600"/>
+              <a:defRPr sz="1500"/>
             </a:lvl8pPr>
             <a:lvl9pPr>
-              <a:defRPr sz="1600"/>
+              <a:defRPr sz="1500"/>
             </a:lvl9pPr>
           </a:lstStyle>
           <a:p>
@@ -1747,7 +2189,7 @@
             <a:fld id="{1D8BD707-D9CF-40AE-B4C6-C98DA3205C09}" type="datetimeFigureOut">
               <a:rPr lang="en-US" smtClean="0"/>
               <a:pPr/>
-              <a:t>7/12/2012</a:t>
+              <a:t>12/18/2012</a:t>
             </a:fld>
             <a:endParaRPr lang="en-US"/>
           </a:p>
@@ -1862,7 +2304,7 @@
             <a:fld id="{1D8BD707-D9CF-40AE-B4C6-C98DA3205C09}" type="datetimeFigureOut">
               <a:rPr lang="en-US" smtClean="0"/>
               <a:pPr/>
-              <a:t>7/12/2012</a:t>
+              <a:t>12/18/2012</a:t>
             </a:fld>
             <a:endParaRPr lang="en-US"/>
           </a:p>
@@ -1954,7 +2396,7 @@
             <a:fld id="{1D8BD707-D9CF-40AE-B4C6-C98DA3205C09}" type="datetimeFigureOut">
               <a:rPr lang="en-US" smtClean="0"/>
               <a:pPr/>
-              <a:t>7/12/2012</a:t>
+              <a:t>12/18/2012</a:t>
             </a:fld>
             <a:endParaRPr lang="en-US"/>
           </a:p>
@@ -2040,15 +2482,15 @@
         </p:nvSpPr>
         <p:spPr>
           <a:xfrm>
-            <a:off x="457200" y="273050"/>
-            <a:ext cx="3008313" cy="1162050"/>
+            <a:off x="432039" y="250864"/>
+            <a:ext cx="2842751" cy="1067634"/>
           </a:xfrm>
         </p:spPr>
         <p:txBody>
           <a:bodyPr anchor="b"/>
           <a:lstStyle>
             <a:lvl1pPr algn="l">
-              <a:defRPr sz="2000" b="1"/>
+              <a:defRPr sz="1900" b="1"/>
             </a:lvl1pPr>
           </a:lstStyle>
           <a:p>
@@ -2072,39 +2514,39 @@
         </p:nvSpPr>
         <p:spPr>
           <a:xfrm>
-            <a:off x="3575050" y="273050"/>
-            <a:ext cx="5111750" cy="5853113"/>
+            <a:off x="3378298" y="250865"/>
+            <a:ext cx="4830427" cy="5377548"/>
           </a:xfrm>
         </p:spPr>
         <p:txBody>
           <a:bodyPr/>
           <a:lstStyle>
             <a:lvl1pPr>
-              <a:defRPr sz="3200"/>
+              <a:defRPr sz="3000"/>
             </a:lvl1pPr>
             <a:lvl2pPr>
-              <a:defRPr sz="2800"/>
+              <a:defRPr sz="2600"/>
             </a:lvl2pPr>
             <a:lvl3pPr>
-              <a:defRPr sz="2400"/>
+              <a:defRPr sz="2200"/>
             </a:lvl3pPr>
             <a:lvl4pPr>
-              <a:defRPr sz="2000"/>
+              <a:defRPr sz="1900"/>
             </a:lvl4pPr>
             <a:lvl5pPr>
-              <a:defRPr sz="2000"/>
+              <a:defRPr sz="1900"/>
             </a:lvl5pPr>
             <a:lvl6pPr>
-              <a:defRPr sz="2000"/>
+              <a:defRPr sz="1900"/>
             </a:lvl6pPr>
             <a:lvl7pPr>
-              <a:defRPr sz="2000"/>
+              <a:defRPr sz="1900"/>
             </a:lvl7pPr>
             <a:lvl8pPr>
-              <a:defRPr sz="2000"/>
+              <a:defRPr sz="1900"/>
             </a:lvl8pPr>
             <a:lvl9pPr>
-              <a:defRPr sz="2000"/>
+              <a:defRPr sz="1900"/>
             </a:lvl9pPr>
           </a:lstStyle>
           <a:p>
@@ -2157,8 +2599,8 @@
         </p:nvSpPr>
         <p:spPr>
           <a:xfrm>
-            <a:off x="457200" y="1435100"/>
-            <a:ext cx="3008313" cy="4691063"/>
+            <a:off x="432039" y="1318499"/>
+            <a:ext cx="2842751" cy="4309914"/>
           </a:xfrm>
         </p:spPr>
         <p:txBody>
@@ -2166,39 +2608,39 @@
           <a:lstStyle>
             <a:lvl1pPr marL="0" indent="0">
               <a:buNone/>
-              <a:defRPr sz="1400"/>
+              <a:defRPr sz="1300"/>
             </a:lvl1pPr>
-            <a:lvl2pPr marL="457200" indent="0">
+            <a:lvl2pPr marL="426888" indent="0">
               <a:buNone/>
-              <a:defRPr sz="1200"/>
+              <a:defRPr sz="1100"/>
             </a:lvl2pPr>
-            <a:lvl3pPr marL="914400" indent="0">
-              <a:buNone/>
-              <a:defRPr sz="1000"/>
-            </a:lvl3pPr>
-            <a:lvl4pPr marL="1371600" indent="0">
+            <a:lvl3pPr marL="853775" indent="0">
               <a:buNone/>
               <a:defRPr sz="900"/>
+            </a:lvl3pPr>
+            <a:lvl4pPr marL="1280663" indent="0">
+              <a:buNone/>
+              <a:defRPr sz="800"/>
             </a:lvl4pPr>
-            <a:lvl5pPr marL="1828800" indent="0">
+            <a:lvl5pPr marL="1707551" indent="0">
               <a:buNone/>
-              <a:defRPr sz="900"/>
+              <a:defRPr sz="800"/>
             </a:lvl5pPr>
-            <a:lvl6pPr marL="2286000" indent="0">
+            <a:lvl6pPr marL="2134438" indent="0">
               <a:buNone/>
-              <a:defRPr sz="900"/>
+              <a:defRPr sz="800"/>
             </a:lvl6pPr>
-            <a:lvl7pPr marL="2743200" indent="0">
+            <a:lvl7pPr marL="2561326" indent="0">
               <a:buNone/>
-              <a:defRPr sz="900"/>
+              <a:defRPr sz="800"/>
             </a:lvl7pPr>
-            <a:lvl8pPr marL="3200400" indent="0">
+            <a:lvl8pPr marL="2988213" indent="0">
               <a:buNone/>
-              <a:defRPr sz="900"/>
+              <a:defRPr sz="800"/>
             </a:lvl8pPr>
-            <a:lvl9pPr marL="3657600" indent="0">
+            <a:lvl9pPr marL="3415101" indent="0">
               <a:buNone/>
-              <a:defRPr sz="900"/>
+              <a:defRPr sz="800"/>
             </a:lvl9pPr>
           </a:lstStyle>
           <a:p>
@@ -2228,7 +2670,7 @@
             <a:fld id="{1D8BD707-D9CF-40AE-B4C6-C98DA3205C09}" type="datetimeFigureOut">
               <a:rPr lang="en-US" smtClean="0"/>
               <a:pPr/>
-              <a:t>7/12/2012</a:t>
+              <a:t>12/18/2012</a:t>
             </a:fld>
             <a:endParaRPr lang="en-US"/>
           </a:p>
@@ -2314,15 +2756,15 @@
         </p:nvSpPr>
         <p:spPr>
           <a:xfrm>
-            <a:off x="1792288" y="4800600"/>
-            <a:ext cx="5486400" cy="566738"/>
+            <a:off x="1693650" y="4410551"/>
+            <a:ext cx="5184458" cy="520691"/>
           </a:xfrm>
         </p:spPr>
         <p:txBody>
           <a:bodyPr anchor="b"/>
           <a:lstStyle>
             <a:lvl1pPr algn="l">
-              <a:defRPr sz="2000" b="1"/>
+              <a:defRPr sz="1900" b="1"/>
             </a:lvl1pPr>
           </a:lstStyle>
           <a:p>
@@ -2346,8 +2788,8 @@
         </p:nvSpPr>
         <p:spPr>
           <a:xfrm>
-            <a:off x="1792288" y="612775"/>
-            <a:ext cx="5486400" cy="4114800"/>
+            <a:off x="1693650" y="562987"/>
+            <a:ext cx="5184458" cy="3780473"/>
           </a:xfrm>
         </p:spPr>
         <p:txBody>
@@ -2355,39 +2797,39 @@
           <a:lstStyle>
             <a:lvl1pPr marL="0" indent="0">
               <a:buNone/>
-              <a:defRPr sz="3200"/>
+              <a:defRPr sz="3000"/>
             </a:lvl1pPr>
-            <a:lvl2pPr marL="457200" indent="0">
+            <a:lvl2pPr marL="426888" indent="0">
               <a:buNone/>
-              <a:defRPr sz="2800"/>
+              <a:defRPr sz="2600"/>
             </a:lvl2pPr>
-            <a:lvl3pPr marL="914400" indent="0">
+            <a:lvl3pPr marL="853775" indent="0">
               <a:buNone/>
-              <a:defRPr sz="2400"/>
+              <a:defRPr sz="2200"/>
             </a:lvl3pPr>
-            <a:lvl4pPr marL="1371600" indent="0">
+            <a:lvl4pPr marL="1280663" indent="0">
               <a:buNone/>
-              <a:defRPr sz="2000"/>
+              <a:defRPr sz="1900"/>
             </a:lvl4pPr>
-            <a:lvl5pPr marL="1828800" indent="0">
+            <a:lvl5pPr marL="1707551" indent="0">
               <a:buNone/>
-              <a:defRPr sz="2000"/>
+              <a:defRPr sz="1900"/>
             </a:lvl5pPr>
-            <a:lvl6pPr marL="2286000" indent="0">
+            <a:lvl6pPr marL="2134438" indent="0">
               <a:buNone/>
-              <a:defRPr sz="2000"/>
+              <a:defRPr sz="1900"/>
             </a:lvl6pPr>
-            <a:lvl7pPr marL="2743200" indent="0">
+            <a:lvl7pPr marL="2561326" indent="0">
               <a:buNone/>
-              <a:defRPr sz="2000"/>
+              <a:defRPr sz="1900"/>
             </a:lvl7pPr>
-            <a:lvl8pPr marL="3200400" indent="0">
+            <a:lvl8pPr marL="2988213" indent="0">
               <a:buNone/>
-              <a:defRPr sz="2000"/>
+              <a:defRPr sz="1900"/>
             </a:lvl8pPr>
-            <a:lvl9pPr marL="3657600" indent="0">
+            <a:lvl9pPr marL="3415101" indent="0">
               <a:buNone/>
-              <a:defRPr sz="2000"/>
+              <a:defRPr sz="1900"/>
             </a:lvl9pPr>
           </a:lstStyle>
           <a:p>
@@ -2407,8 +2849,8 @@
         </p:nvSpPr>
         <p:spPr>
           <a:xfrm>
-            <a:off x="1792288" y="5367338"/>
-            <a:ext cx="5486400" cy="804862"/>
+            <a:off x="1693650" y="4931242"/>
+            <a:ext cx="5184458" cy="739467"/>
           </a:xfrm>
         </p:spPr>
         <p:txBody>
@@ -2416,39 +2858,39 @@
           <a:lstStyle>
             <a:lvl1pPr marL="0" indent="0">
               <a:buNone/>
-              <a:defRPr sz="1400"/>
+              <a:defRPr sz="1300"/>
             </a:lvl1pPr>
-            <a:lvl2pPr marL="457200" indent="0">
+            <a:lvl2pPr marL="426888" indent="0">
               <a:buNone/>
-              <a:defRPr sz="1200"/>
+              <a:defRPr sz="1100"/>
             </a:lvl2pPr>
-            <a:lvl3pPr marL="914400" indent="0">
-              <a:buNone/>
-              <a:defRPr sz="1000"/>
-            </a:lvl3pPr>
-            <a:lvl4pPr marL="1371600" indent="0">
+            <a:lvl3pPr marL="853775" indent="0">
               <a:buNone/>
               <a:defRPr sz="900"/>
+            </a:lvl3pPr>
+            <a:lvl4pPr marL="1280663" indent="0">
+              <a:buNone/>
+              <a:defRPr sz="800"/>
             </a:lvl4pPr>
-            <a:lvl5pPr marL="1828800" indent="0">
+            <a:lvl5pPr marL="1707551" indent="0">
               <a:buNone/>
-              <a:defRPr sz="900"/>
+              <a:defRPr sz="800"/>
             </a:lvl5pPr>
-            <a:lvl6pPr marL="2286000" indent="0">
+            <a:lvl6pPr marL="2134438" indent="0">
               <a:buNone/>
-              <a:defRPr sz="900"/>
+              <a:defRPr sz="800"/>
             </a:lvl6pPr>
-            <a:lvl7pPr marL="2743200" indent="0">
+            <a:lvl7pPr marL="2561326" indent="0">
               <a:buNone/>
-              <a:defRPr sz="900"/>
+              <a:defRPr sz="800"/>
             </a:lvl7pPr>
-            <a:lvl8pPr marL="3200400" indent="0">
+            <a:lvl8pPr marL="2988213" indent="0">
               <a:buNone/>
-              <a:defRPr sz="900"/>
+              <a:defRPr sz="800"/>
             </a:lvl8pPr>
-            <a:lvl9pPr marL="3657600" indent="0">
+            <a:lvl9pPr marL="3415101" indent="0">
               <a:buNone/>
-              <a:defRPr sz="900"/>
+              <a:defRPr sz="800"/>
             </a:lvl9pPr>
           </a:lstStyle>
           <a:p>
@@ -2478,7 +2920,7 @@
             <a:fld id="{1D8BD707-D9CF-40AE-B4C6-C98DA3205C09}" type="datetimeFigureOut">
               <a:rPr lang="en-US" smtClean="0"/>
               <a:pPr/>
-              <a:t>7/12/2012</a:t>
+              <a:t>12/18/2012</a:t>
             </a:fld>
             <a:endParaRPr lang="en-US"/>
           </a:p>
@@ -2569,15 +3011,15 @@
         </p:nvSpPr>
         <p:spPr>
           <a:xfrm>
-            <a:off x="457200" y="274638"/>
-            <a:ext cx="8229600" cy="1143000"/>
+            <a:off x="432038" y="252324"/>
+            <a:ext cx="7776687" cy="1050131"/>
           </a:xfrm>
           <a:prstGeom prst="rect">
             <a:avLst/>
           </a:prstGeom>
         </p:spPr>
         <p:txBody>
-          <a:bodyPr vert="horz" lIns="91440" tIns="45720" rIns="91440" bIns="45720" rtlCol="0" anchor="ctr">
+          <a:bodyPr vert="horz" lIns="85378" tIns="42689" rIns="85378" bIns="42689" rtlCol="0" anchor="ctr">
             <a:normAutofit/>
           </a:bodyPr>
           <a:lstStyle/>
@@ -2602,15 +3044,15 @@
         </p:nvSpPr>
         <p:spPr>
           <a:xfrm>
-            <a:off x="457200" y="1600200"/>
-            <a:ext cx="8229600" cy="4525963"/>
+            <a:off x="432038" y="1470184"/>
+            <a:ext cx="7776687" cy="4158229"/>
           </a:xfrm>
           <a:prstGeom prst="rect">
             <a:avLst/>
           </a:prstGeom>
         </p:spPr>
         <p:txBody>
-          <a:bodyPr vert="horz" lIns="91440" tIns="45720" rIns="91440" bIns="45720" rtlCol="0">
+          <a:bodyPr vert="horz" lIns="85378" tIns="42689" rIns="85378" bIns="42689" rtlCol="0">
             <a:normAutofit/>
           </a:bodyPr>
           <a:lstStyle/>
@@ -2664,18 +3106,18 @@
         </p:nvSpPr>
         <p:spPr>
           <a:xfrm>
-            <a:off x="457200" y="6356350"/>
-            <a:ext cx="2133600" cy="365125"/>
+            <a:off x="432038" y="5839897"/>
+            <a:ext cx="2016178" cy="335459"/>
           </a:xfrm>
           <a:prstGeom prst="rect">
             <a:avLst/>
           </a:prstGeom>
         </p:spPr>
         <p:txBody>
-          <a:bodyPr vert="horz" lIns="91440" tIns="45720" rIns="91440" bIns="45720" rtlCol="0" anchor="ctr"/>
+          <a:bodyPr vert="horz" lIns="85378" tIns="42689" rIns="85378" bIns="42689" rtlCol="0" anchor="ctr"/>
           <a:lstStyle>
             <a:lvl1pPr algn="l">
-              <a:defRPr sz="1200">
+              <a:defRPr sz="1100">
                 <a:solidFill>
                   <a:schemeClr val="tx1">
                     <a:tint val="75000"/>
@@ -2688,7 +3130,7 @@
             <a:fld id="{1D8BD707-D9CF-40AE-B4C6-C98DA3205C09}" type="datetimeFigureOut">
               <a:rPr lang="en-US" smtClean="0"/>
               <a:pPr/>
-              <a:t>7/12/2012</a:t>
+              <a:t>12/18/2012</a:t>
             </a:fld>
             <a:endParaRPr lang="en-US"/>
           </a:p>
@@ -2706,18 +3148,18 @@
         </p:nvSpPr>
         <p:spPr>
           <a:xfrm>
-            <a:off x="3124200" y="6356350"/>
-            <a:ext cx="2895600" cy="365125"/>
+            <a:off x="2952261" y="5839897"/>
+            <a:ext cx="2736242" cy="335459"/>
           </a:xfrm>
           <a:prstGeom prst="rect">
             <a:avLst/>
           </a:prstGeom>
         </p:spPr>
         <p:txBody>
-          <a:bodyPr vert="horz" lIns="91440" tIns="45720" rIns="91440" bIns="45720" rtlCol="0" anchor="ctr"/>
+          <a:bodyPr vert="horz" lIns="85378" tIns="42689" rIns="85378" bIns="42689" rtlCol="0" anchor="ctr"/>
           <a:lstStyle>
             <a:lvl1pPr algn="ctr">
-              <a:defRPr sz="1200">
+              <a:defRPr sz="1100">
                 <a:solidFill>
                   <a:schemeClr val="tx1">
                     <a:tint val="75000"/>
@@ -2743,18 +3185,18 @@
         </p:nvSpPr>
         <p:spPr>
           <a:xfrm>
-            <a:off x="6553200" y="6356350"/>
-            <a:ext cx="2133600" cy="365125"/>
+            <a:off x="6192547" y="5839897"/>
+            <a:ext cx="2016178" cy="335459"/>
           </a:xfrm>
           <a:prstGeom prst="rect">
             <a:avLst/>
           </a:prstGeom>
         </p:spPr>
         <p:txBody>
-          <a:bodyPr vert="horz" lIns="91440" tIns="45720" rIns="91440" bIns="45720" rtlCol="0" anchor="ctr"/>
+          <a:bodyPr vert="horz" lIns="85378" tIns="42689" rIns="85378" bIns="42689" rtlCol="0" anchor="ctr"/>
           <a:lstStyle>
             <a:lvl1pPr algn="r">
-              <a:defRPr sz="1200">
+              <a:defRPr sz="1100">
                 <a:solidFill>
                   <a:schemeClr val="tx1">
                     <a:tint val="75000"/>
@@ -2791,12 +3233,12 @@
   </p:sldLayoutIdLst>
   <p:txStyles>
     <p:titleStyle>
-      <a:lvl1pPr algn="ctr" defTabSz="914400" rtl="0" eaLnBrk="1" latinLnBrk="0" hangingPunct="1">
+      <a:lvl1pPr algn="ctr" defTabSz="853775" rtl="0" eaLnBrk="1" latinLnBrk="0" hangingPunct="1">
         <a:spcBef>
           <a:spcPct val="0"/>
         </a:spcBef>
         <a:buNone/>
-        <a:defRPr sz="4400" kern="1200">
+        <a:defRPr sz="4100" kern="1200">
           <a:solidFill>
             <a:schemeClr val="tx1"/>
           </a:solidFill>
@@ -2807,13 +3249,13 @@
       </a:lvl1pPr>
     </p:titleStyle>
     <p:bodyStyle>
-      <a:lvl1pPr marL="342900" indent="-342900" algn="l" defTabSz="914400" rtl="0" eaLnBrk="1" latinLnBrk="0" hangingPunct="1">
+      <a:lvl1pPr marL="320166" indent="-320166" algn="l" defTabSz="853775" rtl="0" eaLnBrk="1" latinLnBrk="0" hangingPunct="1">
         <a:spcBef>
           <a:spcPct val="20000"/>
         </a:spcBef>
         <a:buFont typeface="Arial" pitchFamily="34" charset="0"/>
         <a:buChar char="•"/>
-        <a:defRPr sz="3200" kern="1200">
+        <a:defRPr sz="3000" kern="1200">
           <a:solidFill>
             <a:schemeClr val="tx1"/>
           </a:solidFill>
@@ -2822,13 +3264,13 @@
           <a:cs typeface="+mn-cs"/>
         </a:defRPr>
       </a:lvl1pPr>
-      <a:lvl2pPr marL="742950" indent="-285750" algn="l" defTabSz="914400" rtl="0" eaLnBrk="1" latinLnBrk="0" hangingPunct="1">
+      <a:lvl2pPr marL="693692" indent="-266805" algn="l" defTabSz="853775" rtl="0" eaLnBrk="1" latinLnBrk="0" hangingPunct="1">
         <a:spcBef>
           <a:spcPct val="20000"/>
         </a:spcBef>
         <a:buFont typeface="Arial" pitchFamily="34" charset="0"/>
         <a:buChar char="–"/>
-        <a:defRPr sz="2800" kern="1200">
+        <a:defRPr sz="2600" kern="1200">
           <a:solidFill>
             <a:schemeClr val="tx1"/>
           </a:solidFill>
@@ -2837,13 +3279,13 @@
           <a:cs typeface="+mn-cs"/>
         </a:defRPr>
       </a:lvl2pPr>
-      <a:lvl3pPr marL="1143000" indent="-228600" algn="l" defTabSz="914400" rtl="0" eaLnBrk="1" latinLnBrk="0" hangingPunct="1">
+      <a:lvl3pPr marL="1067219" indent="-213444" algn="l" defTabSz="853775" rtl="0" eaLnBrk="1" latinLnBrk="0" hangingPunct="1">
         <a:spcBef>
           <a:spcPct val="20000"/>
         </a:spcBef>
         <a:buFont typeface="Arial" pitchFamily="34" charset="0"/>
         <a:buChar char="•"/>
-        <a:defRPr sz="2400" kern="1200">
+        <a:defRPr sz="2200" kern="1200">
           <a:solidFill>
             <a:schemeClr val="tx1"/>
           </a:solidFill>
@@ -2852,13 +3294,13 @@
           <a:cs typeface="+mn-cs"/>
         </a:defRPr>
       </a:lvl3pPr>
-      <a:lvl4pPr marL="1600200" indent="-228600" algn="l" defTabSz="914400" rtl="0" eaLnBrk="1" latinLnBrk="0" hangingPunct="1">
+      <a:lvl4pPr marL="1494107" indent="-213444" algn="l" defTabSz="853775" rtl="0" eaLnBrk="1" latinLnBrk="0" hangingPunct="1">
         <a:spcBef>
           <a:spcPct val="20000"/>
         </a:spcBef>
         <a:buFont typeface="Arial" pitchFamily="34" charset="0"/>
         <a:buChar char="–"/>
-        <a:defRPr sz="2000" kern="1200">
+        <a:defRPr sz="1900" kern="1200">
           <a:solidFill>
             <a:schemeClr val="tx1"/>
           </a:solidFill>
@@ -2867,13 +3309,13 @@
           <a:cs typeface="+mn-cs"/>
         </a:defRPr>
       </a:lvl4pPr>
-      <a:lvl5pPr marL="2057400" indent="-228600" algn="l" defTabSz="914400" rtl="0" eaLnBrk="1" latinLnBrk="0" hangingPunct="1">
+      <a:lvl5pPr marL="1920994" indent="-213444" algn="l" defTabSz="853775" rtl="0" eaLnBrk="1" latinLnBrk="0" hangingPunct="1">
         <a:spcBef>
           <a:spcPct val="20000"/>
         </a:spcBef>
         <a:buFont typeface="Arial" pitchFamily="34" charset="0"/>
         <a:buChar char="»"/>
-        <a:defRPr sz="2000" kern="1200">
+        <a:defRPr sz="1900" kern="1200">
           <a:solidFill>
             <a:schemeClr val="tx1"/>
           </a:solidFill>
@@ -2882,13 +3324,13 @@
           <a:cs typeface="+mn-cs"/>
         </a:defRPr>
       </a:lvl5pPr>
-      <a:lvl6pPr marL="2514600" indent="-228600" algn="l" defTabSz="914400" rtl="0" eaLnBrk="1" latinLnBrk="0" hangingPunct="1">
+      <a:lvl6pPr marL="2347882" indent="-213444" algn="l" defTabSz="853775" rtl="0" eaLnBrk="1" latinLnBrk="0" hangingPunct="1">
         <a:spcBef>
           <a:spcPct val="20000"/>
         </a:spcBef>
         <a:buFont typeface="Arial" pitchFamily="34" charset="0"/>
         <a:buChar char="•"/>
-        <a:defRPr sz="2000" kern="1200">
+        <a:defRPr sz="1900" kern="1200">
           <a:solidFill>
             <a:schemeClr val="tx1"/>
           </a:solidFill>
@@ -2897,13 +3339,13 @@
           <a:cs typeface="+mn-cs"/>
         </a:defRPr>
       </a:lvl6pPr>
-      <a:lvl7pPr marL="2971800" indent="-228600" algn="l" defTabSz="914400" rtl="0" eaLnBrk="1" latinLnBrk="0" hangingPunct="1">
+      <a:lvl7pPr marL="2774770" indent="-213444" algn="l" defTabSz="853775" rtl="0" eaLnBrk="1" latinLnBrk="0" hangingPunct="1">
         <a:spcBef>
           <a:spcPct val="20000"/>
         </a:spcBef>
         <a:buFont typeface="Arial" pitchFamily="34" charset="0"/>
         <a:buChar char="•"/>
-        <a:defRPr sz="2000" kern="1200">
+        <a:defRPr sz="1900" kern="1200">
           <a:solidFill>
             <a:schemeClr val="tx1"/>
           </a:solidFill>
@@ -2912,13 +3354,13 @@
           <a:cs typeface="+mn-cs"/>
         </a:defRPr>
       </a:lvl7pPr>
-      <a:lvl8pPr marL="3429000" indent="-228600" algn="l" defTabSz="914400" rtl="0" eaLnBrk="1" latinLnBrk="0" hangingPunct="1">
+      <a:lvl8pPr marL="3201657" indent="-213444" algn="l" defTabSz="853775" rtl="0" eaLnBrk="1" latinLnBrk="0" hangingPunct="1">
         <a:spcBef>
           <a:spcPct val="20000"/>
         </a:spcBef>
         <a:buFont typeface="Arial" pitchFamily="34" charset="0"/>
         <a:buChar char="•"/>
-        <a:defRPr sz="2000" kern="1200">
+        <a:defRPr sz="1900" kern="1200">
           <a:solidFill>
             <a:schemeClr val="tx1"/>
           </a:solidFill>
@@ -2927,13 +3369,13 @@
           <a:cs typeface="+mn-cs"/>
         </a:defRPr>
       </a:lvl8pPr>
-      <a:lvl9pPr marL="3886200" indent="-228600" algn="l" defTabSz="914400" rtl="0" eaLnBrk="1" latinLnBrk="0" hangingPunct="1">
+      <a:lvl9pPr marL="3628545" indent="-213444" algn="l" defTabSz="853775" rtl="0" eaLnBrk="1" latinLnBrk="0" hangingPunct="1">
         <a:spcBef>
           <a:spcPct val="20000"/>
         </a:spcBef>
         <a:buFont typeface="Arial" pitchFamily="34" charset="0"/>
         <a:buChar char="•"/>
-        <a:defRPr sz="2000" kern="1200">
+        <a:defRPr sz="1900" kern="1200">
           <a:solidFill>
             <a:schemeClr val="tx1"/>
           </a:solidFill>
@@ -2947,8 +3389,8 @@
       <a:defPPr>
         <a:defRPr lang="en-US"/>
       </a:defPPr>
-      <a:lvl1pPr marL="0" algn="l" defTabSz="914400" rtl="0" eaLnBrk="1" latinLnBrk="0" hangingPunct="1">
-        <a:defRPr sz="1800" kern="1200">
+      <a:lvl1pPr marL="0" algn="l" defTabSz="853775" rtl="0" eaLnBrk="1" latinLnBrk="0" hangingPunct="1">
+        <a:defRPr sz="1700" kern="1200">
           <a:solidFill>
             <a:schemeClr val="tx1"/>
           </a:solidFill>
@@ -2957,8 +3399,8 @@
           <a:cs typeface="+mn-cs"/>
         </a:defRPr>
       </a:lvl1pPr>
-      <a:lvl2pPr marL="457200" algn="l" defTabSz="914400" rtl="0" eaLnBrk="1" latinLnBrk="0" hangingPunct="1">
-        <a:defRPr sz="1800" kern="1200">
+      <a:lvl2pPr marL="426888" algn="l" defTabSz="853775" rtl="0" eaLnBrk="1" latinLnBrk="0" hangingPunct="1">
+        <a:defRPr sz="1700" kern="1200">
           <a:solidFill>
             <a:schemeClr val="tx1"/>
           </a:solidFill>
@@ -2967,8 +3409,8 @@
           <a:cs typeface="+mn-cs"/>
         </a:defRPr>
       </a:lvl2pPr>
-      <a:lvl3pPr marL="914400" algn="l" defTabSz="914400" rtl="0" eaLnBrk="1" latinLnBrk="0" hangingPunct="1">
-        <a:defRPr sz="1800" kern="1200">
+      <a:lvl3pPr marL="853775" algn="l" defTabSz="853775" rtl="0" eaLnBrk="1" latinLnBrk="0" hangingPunct="1">
+        <a:defRPr sz="1700" kern="1200">
           <a:solidFill>
             <a:schemeClr val="tx1"/>
           </a:solidFill>
@@ -2977,8 +3419,8 @@
           <a:cs typeface="+mn-cs"/>
         </a:defRPr>
       </a:lvl3pPr>
-      <a:lvl4pPr marL="1371600" algn="l" defTabSz="914400" rtl="0" eaLnBrk="1" latinLnBrk="0" hangingPunct="1">
-        <a:defRPr sz="1800" kern="1200">
+      <a:lvl4pPr marL="1280663" algn="l" defTabSz="853775" rtl="0" eaLnBrk="1" latinLnBrk="0" hangingPunct="1">
+        <a:defRPr sz="1700" kern="1200">
           <a:solidFill>
             <a:schemeClr val="tx1"/>
           </a:solidFill>
@@ -2987,8 +3429,8 @@
           <a:cs typeface="+mn-cs"/>
         </a:defRPr>
       </a:lvl4pPr>
-      <a:lvl5pPr marL="1828800" algn="l" defTabSz="914400" rtl="0" eaLnBrk="1" latinLnBrk="0" hangingPunct="1">
-        <a:defRPr sz="1800" kern="1200">
+      <a:lvl5pPr marL="1707551" algn="l" defTabSz="853775" rtl="0" eaLnBrk="1" latinLnBrk="0" hangingPunct="1">
+        <a:defRPr sz="1700" kern="1200">
           <a:solidFill>
             <a:schemeClr val="tx1"/>
           </a:solidFill>
@@ -2997,8 +3439,8 @@
           <a:cs typeface="+mn-cs"/>
         </a:defRPr>
       </a:lvl5pPr>
-      <a:lvl6pPr marL="2286000" algn="l" defTabSz="914400" rtl="0" eaLnBrk="1" latinLnBrk="0" hangingPunct="1">
-        <a:defRPr sz="1800" kern="1200">
+      <a:lvl6pPr marL="2134438" algn="l" defTabSz="853775" rtl="0" eaLnBrk="1" latinLnBrk="0" hangingPunct="1">
+        <a:defRPr sz="1700" kern="1200">
           <a:solidFill>
             <a:schemeClr val="tx1"/>
           </a:solidFill>
@@ -3007,8 +3449,8 @@
           <a:cs typeface="+mn-cs"/>
         </a:defRPr>
       </a:lvl6pPr>
-      <a:lvl7pPr marL="2743200" algn="l" defTabSz="914400" rtl="0" eaLnBrk="1" latinLnBrk="0" hangingPunct="1">
-        <a:defRPr sz="1800" kern="1200">
+      <a:lvl7pPr marL="2561326" algn="l" defTabSz="853775" rtl="0" eaLnBrk="1" latinLnBrk="0" hangingPunct="1">
+        <a:defRPr sz="1700" kern="1200">
           <a:solidFill>
             <a:schemeClr val="tx1"/>
           </a:solidFill>
@@ -3017,8 +3459,8 @@
           <a:cs typeface="+mn-cs"/>
         </a:defRPr>
       </a:lvl7pPr>
-      <a:lvl8pPr marL="3200400" algn="l" defTabSz="914400" rtl="0" eaLnBrk="1" latinLnBrk="0" hangingPunct="1">
-        <a:defRPr sz="1800" kern="1200">
+      <a:lvl8pPr marL="2988213" algn="l" defTabSz="853775" rtl="0" eaLnBrk="1" latinLnBrk="0" hangingPunct="1">
+        <a:defRPr sz="1700" kern="1200">
           <a:solidFill>
             <a:schemeClr val="tx1"/>
           </a:solidFill>
@@ -3027,8 +3469,8 @@
           <a:cs typeface="+mn-cs"/>
         </a:defRPr>
       </a:lvl8pPr>
-      <a:lvl9pPr marL="3657600" algn="l" defTabSz="914400" rtl="0" eaLnBrk="1" latinLnBrk="0" hangingPunct="1">
-        <a:defRPr sz="1800" kern="1200">
+      <a:lvl9pPr marL="3415101" algn="l" defTabSz="853775" rtl="0" eaLnBrk="1" latinLnBrk="0" hangingPunct="1">
+        <a:defRPr sz="1700" kern="1200">
           <a:solidFill>
             <a:schemeClr val="tx1"/>
           </a:solidFill>
@@ -3061,14 +3503,14 @@
       </p:grpSpPr>
       <p:sp>
         <p:nvSpPr>
-          <p:cNvPr id="4" name="Rounded Rectangle 3"/>
+          <p:cNvPr id="89" name="Rounded Rectangle 88"/>
           <p:cNvSpPr/>
           <p:nvPr/>
         </p:nvSpPr>
         <p:spPr>
           <a:xfrm>
-            <a:off x="381000" y="4644640"/>
-            <a:ext cx="2133600" cy="1984760"/>
+            <a:off x="129381" y="4111239"/>
+            <a:ext cx="2133600" cy="2060961"/>
           </a:xfrm>
           <a:prstGeom prst="roundRect">
             <a:avLst>
@@ -3107,10 +3549,9 @@
           </a:fontRef>
         </p:style>
         <p:txBody>
-          <a:bodyPr rtlCol="0" anchor="t" anchorCtr="1"/>
+          <a:bodyPr rtlCol="0" anchor="t" anchorCtr="0"/>
           <a:lstStyle/>
           <a:p>
-            <a:pPr algn="ctr"/>
             <a:r>
               <a:rPr lang="en-US" sz="1600" b="1" dirty="0" smtClean="0"/>
               <a:t>Test Driver</a:t>
@@ -3121,13 +3562,13 @@
       </p:sp>
       <p:sp>
         <p:nvSpPr>
-          <p:cNvPr id="5" name="Rounded Rectangle 4"/>
+          <p:cNvPr id="90" name="Rounded Rectangle 89"/>
           <p:cNvSpPr/>
           <p:nvPr/>
         </p:nvSpPr>
         <p:spPr>
           <a:xfrm>
-            <a:off x="3810000" y="1905713"/>
+            <a:off x="3558381" y="1372313"/>
             <a:ext cx="2286000" cy="4799888"/>
           </a:xfrm>
           <a:prstGeom prst="roundRect">
@@ -3181,13 +3622,13 @@
       </p:sp>
       <p:sp>
         <p:nvSpPr>
-          <p:cNvPr id="6" name="Rounded Rectangle 5"/>
+          <p:cNvPr id="91" name="Rounded Rectangle 90"/>
           <p:cNvSpPr/>
           <p:nvPr/>
         </p:nvSpPr>
         <p:spPr>
           <a:xfrm>
-            <a:off x="6477000" y="1905712"/>
+            <a:off x="6225381" y="1372312"/>
             <a:ext cx="2286000" cy="4799889"/>
           </a:xfrm>
           <a:prstGeom prst="roundRect">
@@ -3241,13 +3682,13 @@
       </p:sp>
       <p:sp>
         <p:nvSpPr>
-          <p:cNvPr id="7" name="Rounded Rectangle 6"/>
+          <p:cNvPr id="92" name="Rounded Rectangle 91"/>
           <p:cNvSpPr/>
           <p:nvPr/>
         </p:nvSpPr>
         <p:spPr>
           <a:xfrm>
-            <a:off x="1219200" y="1905000"/>
+            <a:off x="967581" y="1371600"/>
             <a:ext cx="1752600" cy="2514600"/>
           </a:xfrm>
           <a:prstGeom prst="roundRect">
@@ -3301,14 +3742,14 @@
       </p:sp>
       <p:sp>
         <p:nvSpPr>
-          <p:cNvPr id="8" name="Rounded Rectangle 7"/>
+          <p:cNvPr id="93" name="Rounded Rectangle 92"/>
           <p:cNvSpPr/>
           <p:nvPr/>
         </p:nvSpPr>
         <p:spPr>
           <a:xfrm>
-            <a:off x="381000" y="152400"/>
-            <a:ext cx="8382000" cy="1295400"/>
+            <a:off x="129381" y="76200"/>
+            <a:ext cx="8382000" cy="838200"/>
           </a:xfrm>
           <a:prstGeom prst="roundRect">
             <a:avLst>
@@ -3360,13 +3801,13 @@
       </p:sp>
       <p:grpSp>
         <p:nvGrpSpPr>
-          <p:cNvPr id="11" name="Group 10"/>
+          <p:cNvPr id="94" name="Group 93"/>
           <p:cNvGrpSpPr/>
           <p:nvPr/>
         </p:nvGrpSpPr>
         <p:grpSpPr>
           <a:xfrm>
-            <a:off x="1447800" y="3505200"/>
+            <a:off x="1196181" y="3124200"/>
             <a:ext cx="1371600" cy="609600"/>
             <a:chOff x="-228600" y="1371600"/>
             <a:chExt cx="1371600" cy="609600"/>
@@ -3377,7 +3818,7 @@
         </p:grpSpPr>
         <p:sp>
           <p:nvSpPr>
-            <p:cNvPr id="9" name="Rectangle 8"/>
+            <p:cNvPr id="95" name="Rectangle 94"/>
             <p:cNvSpPr/>
             <p:nvPr/>
           </p:nvSpPr>
@@ -3438,7 +3879,7 @@
         </p:sp>
         <p:sp>
           <p:nvSpPr>
-            <p:cNvPr id="10" name="Rectangle 9"/>
+            <p:cNvPr id="96" name="Rectangle 95"/>
             <p:cNvSpPr/>
             <p:nvPr/>
           </p:nvSpPr>
@@ -3484,13 +3925,13 @@
       </p:grpSp>
       <p:grpSp>
         <p:nvGrpSpPr>
-          <p:cNvPr id="15" name="Group 14"/>
+          <p:cNvPr id="97" name="Group 96"/>
           <p:cNvGrpSpPr/>
           <p:nvPr/>
         </p:nvGrpSpPr>
         <p:grpSpPr>
           <a:xfrm>
-            <a:off x="4267200" y="2362200"/>
+            <a:off x="4015581" y="1828800"/>
             <a:ext cx="1371600" cy="762000"/>
             <a:chOff x="-228600" y="1371600"/>
             <a:chExt cx="1371600" cy="762000"/>
@@ -3501,7 +3942,7 @@
         </p:grpSpPr>
         <p:sp>
           <p:nvSpPr>
-            <p:cNvPr id="16" name="Rectangle 15"/>
+            <p:cNvPr id="98" name="Rectangle 97"/>
             <p:cNvSpPr/>
             <p:nvPr/>
           </p:nvSpPr>
@@ -3559,7 +4000,7 @@
         </p:sp>
         <p:sp>
           <p:nvSpPr>
-            <p:cNvPr id="17" name="Rectangle 16"/>
+            <p:cNvPr id="99" name="Rectangle 98"/>
             <p:cNvSpPr/>
             <p:nvPr/>
           </p:nvSpPr>
@@ -3610,13 +4051,13 @@
       </p:grpSp>
       <p:grpSp>
         <p:nvGrpSpPr>
-          <p:cNvPr id="18" name="Group 17"/>
+          <p:cNvPr id="100" name="Group 99"/>
           <p:cNvGrpSpPr/>
           <p:nvPr/>
         </p:nvGrpSpPr>
         <p:grpSpPr>
           <a:xfrm>
-            <a:off x="6858000" y="2514600"/>
+            <a:off x="6606381" y="1981200"/>
             <a:ext cx="1600200" cy="762000"/>
             <a:chOff x="-457200" y="1371600"/>
             <a:chExt cx="1600200" cy="762000"/>
@@ -3627,7 +4068,7 @@
         </p:grpSpPr>
         <p:sp>
           <p:nvSpPr>
-            <p:cNvPr id="19" name="Rectangle 18"/>
+            <p:cNvPr id="101" name="Rectangle 100"/>
             <p:cNvSpPr/>
             <p:nvPr/>
           </p:nvSpPr>
@@ -3685,7 +4126,7 @@
         </p:sp>
         <p:sp>
           <p:nvSpPr>
-            <p:cNvPr id="20" name="Rectangle 19"/>
+            <p:cNvPr id="102" name="Rectangle 101"/>
             <p:cNvSpPr/>
             <p:nvPr/>
           </p:nvSpPr>
@@ -3736,13 +4177,13 @@
       </p:grpSp>
       <p:grpSp>
         <p:nvGrpSpPr>
-          <p:cNvPr id="21" name="Group 20"/>
+          <p:cNvPr id="103" name="Group 102"/>
           <p:cNvGrpSpPr/>
           <p:nvPr/>
         </p:nvGrpSpPr>
         <p:grpSpPr>
           <a:xfrm>
-            <a:off x="6858000" y="3958839"/>
+            <a:off x="6606381" y="3425439"/>
             <a:ext cx="1600200" cy="762000"/>
             <a:chOff x="-457200" y="1371600"/>
             <a:chExt cx="1600200" cy="762000"/>
@@ -3753,7 +4194,7 @@
         </p:grpSpPr>
         <p:sp>
           <p:nvSpPr>
-            <p:cNvPr id="22" name="Rectangle 21"/>
+            <p:cNvPr id="104" name="Rectangle 103"/>
             <p:cNvSpPr/>
             <p:nvPr/>
           </p:nvSpPr>
@@ -3799,15 +4240,7 @@
                     <a:srgbClr val="00B050"/>
                   </a:solidFill>
                 </a:rPr>
-                <a:t>storage</a:t>
-              </a:r>
-              <a:r>
-                <a:rPr lang="en-US" sz="1400" b="1" dirty="0" smtClean="0">
-                  <a:solidFill>
-                    <a:srgbClr val="00B050"/>
-                  </a:solidFill>
-                </a:rPr>
-                <a:t>::</a:t>
+                <a:t>storage::</a:t>
               </a:r>
               <a:r>
                 <a:rPr lang="en-US" sz="1400" b="1" dirty="0" err="1" smtClean="0">
@@ -3835,7 +4268,7 @@
         </p:sp>
         <p:sp>
           <p:nvSpPr>
-            <p:cNvPr id="23" name="Rectangle 22"/>
+            <p:cNvPr id="105" name="Rectangle 104"/>
             <p:cNvSpPr/>
             <p:nvPr/>
           </p:nvSpPr>
@@ -3886,16 +4319,16 @@
       </p:grpSp>
       <p:grpSp>
         <p:nvGrpSpPr>
-          <p:cNvPr id="24" name="Group 23"/>
+          <p:cNvPr id="106" name="Group 105"/>
           <p:cNvGrpSpPr/>
           <p:nvPr/>
         </p:nvGrpSpPr>
         <p:grpSpPr>
           <a:xfrm>
-            <a:off x="762000" y="5863839"/>
-            <a:ext cx="1371600" cy="536961"/>
+            <a:off x="510381" y="4980061"/>
+            <a:ext cx="1371600" cy="506339"/>
             <a:chOff x="-228600" y="1371600"/>
-            <a:chExt cx="1371600" cy="536961"/>
+            <a:chExt cx="1371600" cy="506339"/>
           </a:xfrm>
           <a:solidFill>
             <a:schemeClr val="bg1"/>
@@ -3903,14 +4336,14 @@
         </p:grpSpPr>
         <p:sp>
           <p:nvSpPr>
-            <p:cNvPr id="25" name="Rectangle 24"/>
+            <p:cNvPr id="107" name="Rectangle 106"/>
             <p:cNvSpPr/>
             <p:nvPr/>
           </p:nvSpPr>
           <p:spPr>
             <a:xfrm>
               <a:off x="-228600" y="1524000"/>
-              <a:ext cx="1371600" cy="384561"/>
+              <a:ext cx="1371600" cy="353939"/>
             </a:xfrm>
             <a:prstGeom prst="rect">
               <a:avLst/>
@@ -3967,7 +4400,7 @@
         </p:sp>
         <p:sp>
           <p:nvSpPr>
-            <p:cNvPr id="26" name="Rectangle 25"/>
+            <p:cNvPr id="108" name="Rectangle 107"/>
             <p:cNvSpPr/>
             <p:nvPr/>
           </p:nvSpPr>
@@ -4022,16 +4455,16 @@
       </p:grpSp>
       <p:grpSp>
         <p:nvGrpSpPr>
-          <p:cNvPr id="30" name="Group 29"/>
+          <p:cNvPr id="109" name="Group 108"/>
           <p:cNvGrpSpPr/>
           <p:nvPr/>
         </p:nvGrpSpPr>
         <p:grpSpPr>
           <a:xfrm>
-            <a:off x="762000" y="4998578"/>
-            <a:ext cx="1371600" cy="602833"/>
-            <a:chOff x="-228600" y="1371600"/>
-            <a:chExt cx="1371600" cy="602833"/>
+            <a:off x="1196181" y="254950"/>
+            <a:ext cx="1676400" cy="507050"/>
+            <a:chOff x="-533400" y="1371600"/>
+            <a:chExt cx="1676400" cy="507050"/>
           </a:xfrm>
           <a:solidFill>
             <a:schemeClr val="bg1"/>
@@ -4039,297 +4472,14 @@
         </p:grpSpPr>
         <p:sp>
           <p:nvSpPr>
-            <p:cNvPr id="31" name="Rectangle 30"/>
+            <p:cNvPr id="110" name="Rectangle 109"/>
             <p:cNvSpPr/>
             <p:nvPr/>
           </p:nvSpPr>
           <p:spPr>
             <a:xfrm>
-              <a:off x="-228600" y="1524000"/>
-              <a:ext cx="1371600" cy="450433"/>
-            </a:xfrm>
-            <a:prstGeom prst="rect">
-              <a:avLst/>
-            </a:prstGeom>
-            <a:grpFill/>
-            <a:ln>
-              <a:solidFill>
-                <a:schemeClr val="accent2">
-                  <a:lumMod val="75000"/>
-                </a:schemeClr>
-              </a:solidFill>
-            </a:ln>
-          </p:spPr>
-          <p:style>
-            <a:lnRef idx="2">
-              <a:schemeClr val="accent1">
-                <a:shade val="50000"/>
-              </a:schemeClr>
-            </a:lnRef>
-            <a:fillRef idx="1">
-              <a:schemeClr val="accent1"/>
-            </a:fillRef>
-            <a:effectRef idx="0">
-              <a:schemeClr val="accent1"/>
-            </a:effectRef>
-            <a:fontRef idx="minor">
-              <a:schemeClr val="lt1"/>
-            </a:fontRef>
-          </p:style>
-          <p:txBody>
-            <a:bodyPr rtlCol="0" anchor="ctr"/>
-            <a:lstStyle/>
-            <a:p>
-              <a:pPr algn="ctr"/>
-              <a:r>
-                <a:rPr lang="en-US" sz="1400" b="1" dirty="0" smtClean="0">
-                  <a:solidFill>
-                    <a:schemeClr val="accent2">
-                      <a:lumMod val="75000"/>
-                    </a:schemeClr>
-                  </a:solidFill>
-                </a:rPr>
-                <a:t>test::cases</a:t>
-              </a:r>
-              <a:endParaRPr lang="en-SG" sz="1400" b="1" dirty="0">
-                <a:solidFill>
-                  <a:schemeClr val="accent2">
-                    <a:lumMod val="75000"/>
-                  </a:schemeClr>
-                </a:solidFill>
-              </a:endParaRPr>
-            </a:p>
-          </p:txBody>
-        </p:sp>
-        <p:sp>
-          <p:nvSpPr>
-            <p:cNvPr id="32" name="Rectangle 31"/>
-            <p:cNvSpPr/>
-            <p:nvPr/>
-          </p:nvSpPr>
-          <p:spPr>
-            <a:xfrm>
-              <a:off x="647700" y="1371600"/>
-              <a:ext cx="495300" cy="152400"/>
-            </a:xfrm>
-            <a:prstGeom prst="rect">
-              <a:avLst/>
-            </a:prstGeom>
-            <a:grpFill/>
-            <a:ln>
-              <a:solidFill>
-                <a:schemeClr val="accent2">
-                  <a:lumMod val="75000"/>
-                </a:schemeClr>
-              </a:solidFill>
-            </a:ln>
-          </p:spPr>
-          <p:style>
-            <a:lnRef idx="2">
-              <a:schemeClr val="accent1">
-                <a:shade val="50000"/>
-              </a:schemeClr>
-            </a:lnRef>
-            <a:fillRef idx="1">
-              <a:schemeClr val="accent1"/>
-            </a:fillRef>
-            <a:effectRef idx="0">
-              <a:schemeClr val="accent1"/>
-            </a:effectRef>
-            <a:fontRef idx="minor">
-              <a:schemeClr val="lt1"/>
-            </a:fontRef>
-          </p:style>
-          <p:txBody>
-            <a:bodyPr rtlCol="0" anchor="ctr"/>
-            <a:lstStyle/>
-            <a:p>
-              <a:pPr algn="ctr"/>
-              <a:endParaRPr lang="en-SG" sz="1400" b="1">
-                <a:solidFill>
-                  <a:schemeClr val="accent2">
-                    <a:lumMod val="75000"/>
-                  </a:schemeClr>
-                </a:solidFill>
-              </a:endParaRPr>
-            </a:p>
-          </p:txBody>
-        </p:sp>
-      </p:grpSp>
-      <p:grpSp>
-        <p:nvGrpSpPr>
-          <p:cNvPr id="33" name="Group 32"/>
-          <p:cNvGrpSpPr/>
-          <p:nvPr/>
-        </p:nvGrpSpPr>
-        <p:grpSpPr>
-          <a:xfrm>
-            <a:off x="6705600" y="430849"/>
-            <a:ext cx="1371600" cy="762000"/>
-            <a:chOff x="-228600" y="1371600"/>
-            <a:chExt cx="1371600" cy="762000"/>
-          </a:xfrm>
-          <a:solidFill>
-            <a:schemeClr val="bg1"/>
-          </a:solidFill>
-        </p:grpSpPr>
-        <p:sp>
-          <p:nvSpPr>
-            <p:cNvPr id="34" name="Rectangle 33"/>
-            <p:cNvSpPr/>
-            <p:nvPr/>
-          </p:nvSpPr>
-          <p:spPr>
-            <a:xfrm>
-              <a:off x="-228600" y="1524000"/>
-              <a:ext cx="1371600" cy="609600"/>
-            </a:xfrm>
-            <a:prstGeom prst="rect">
-              <a:avLst/>
-            </a:prstGeom>
-            <a:grpFill/>
-            <a:ln>
-              <a:solidFill>
-                <a:schemeClr val="accent5"/>
-              </a:solidFill>
-            </a:ln>
-          </p:spPr>
-          <p:style>
-            <a:lnRef idx="2">
-              <a:schemeClr val="accent1">
-                <a:shade val="50000"/>
-              </a:schemeClr>
-            </a:lnRef>
-            <a:fillRef idx="1">
-              <a:schemeClr val="accent1"/>
-            </a:fillRef>
-            <a:effectRef idx="0">
-              <a:schemeClr val="accent1"/>
-            </a:effectRef>
-            <a:fontRef idx="minor">
-              <a:schemeClr val="lt1"/>
-            </a:fontRef>
-          </p:style>
-          <p:txBody>
-            <a:bodyPr rtlCol="0" anchor="ctr"/>
-            <a:lstStyle/>
-            <a:p>
-              <a:r>
-                <a:rPr lang="en-US" sz="1400" b="1" dirty="0" smtClean="0">
-                  <a:solidFill>
-                    <a:schemeClr val="accent5"/>
-                  </a:solidFill>
-                </a:rPr>
-                <a:t>common</a:t>
-              </a:r>
-              <a:br>
-                <a:rPr lang="en-US" sz="1400" b="1" dirty="0" smtClean="0">
-                  <a:solidFill>
-                    <a:schemeClr val="accent5"/>
-                  </a:solidFill>
-                </a:rPr>
-              </a:br>
-              <a:r>
-                <a:rPr lang="en-US" sz="1400" b="1" dirty="0" smtClean="0">
-                  <a:solidFill>
-                    <a:schemeClr val="accent5"/>
-                  </a:solidFill>
-                </a:rPr>
-                <a:t>    ::</a:t>
-              </a:r>
-              <a:r>
-                <a:rPr lang="en-US" sz="1400" b="1" dirty="0" err="1" smtClean="0">
-                  <a:solidFill>
-                    <a:schemeClr val="accent5"/>
-                  </a:solidFill>
-                </a:rPr>
-                <a:t>datatransfer</a:t>
-              </a:r>
-              <a:endParaRPr lang="en-SG" sz="1400" b="1" dirty="0">
-                <a:solidFill>
-                  <a:schemeClr val="accent5"/>
-                </a:solidFill>
-              </a:endParaRPr>
-            </a:p>
-          </p:txBody>
-        </p:sp>
-        <p:sp>
-          <p:nvSpPr>
-            <p:cNvPr id="35" name="Rectangle 34"/>
-            <p:cNvSpPr/>
-            <p:nvPr/>
-          </p:nvSpPr>
-          <p:spPr>
-            <a:xfrm>
-              <a:off x="647700" y="1371600"/>
-              <a:ext cx="495300" cy="152400"/>
-            </a:xfrm>
-            <a:prstGeom prst="rect">
-              <a:avLst/>
-            </a:prstGeom>
-            <a:grpFill/>
-            <a:ln>
-              <a:solidFill>
-                <a:schemeClr val="accent5"/>
-              </a:solidFill>
-            </a:ln>
-          </p:spPr>
-          <p:style>
-            <a:lnRef idx="2">
-              <a:schemeClr val="accent1">
-                <a:shade val="50000"/>
-              </a:schemeClr>
-            </a:lnRef>
-            <a:fillRef idx="1">
-              <a:schemeClr val="accent1"/>
-            </a:fillRef>
-            <a:effectRef idx="0">
-              <a:schemeClr val="accent1"/>
-            </a:effectRef>
-            <a:fontRef idx="minor">
-              <a:schemeClr val="lt1"/>
-            </a:fontRef>
-          </p:style>
-          <p:txBody>
-            <a:bodyPr rtlCol="0" anchor="ctr"/>
-            <a:lstStyle/>
-            <a:p>
-              <a:endParaRPr lang="en-SG" sz="1400" b="1">
-                <a:solidFill>
-                  <a:schemeClr val="accent5"/>
-                </a:solidFill>
-              </a:endParaRPr>
-            </a:p>
-          </p:txBody>
-        </p:sp>
-      </p:grpSp>
-      <p:grpSp>
-        <p:nvGrpSpPr>
-          <p:cNvPr id="36" name="Group 35"/>
-          <p:cNvGrpSpPr/>
-          <p:nvPr/>
-        </p:nvGrpSpPr>
-        <p:grpSpPr>
-          <a:xfrm>
-            <a:off x="1981200" y="380999"/>
-            <a:ext cx="1371600" cy="762000"/>
-            <a:chOff x="-228600" y="1371600"/>
-            <a:chExt cx="1371600" cy="762000"/>
-          </a:xfrm>
-          <a:solidFill>
-            <a:schemeClr val="bg1"/>
-          </a:solidFill>
-        </p:grpSpPr>
-        <p:sp>
-          <p:nvSpPr>
-            <p:cNvPr id="37" name="Rectangle 36"/>
-            <p:cNvSpPr/>
-            <p:nvPr/>
-          </p:nvSpPr>
-          <p:spPr>
-            <a:xfrm>
-              <a:off x="-228600" y="1524000"/>
-              <a:ext cx="1371600" cy="609600"/>
+              <a:off x="-533400" y="1524000"/>
+              <a:ext cx="1676400" cy="354650"/>
             </a:xfrm>
             <a:prstGeom prst="rect">
               <a:avLst/>
@@ -4380,7 +4530,7 @@
         </p:sp>
         <p:sp>
           <p:nvSpPr>
-            <p:cNvPr id="38" name="Rectangle 37"/>
+            <p:cNvPr id="111" name="Rectangle 110"/>
             <p:cNvSpPr/>
             <p:nvPr/>
           </p:nvSpPr>
@@ -4431,13 +4581,13 @@
       </p:grpSp>
       <p:cxnSp>
         <p:nvCxnSpPr>
-          <p:cNvPr id="40" name="Straight Arrow Connector 39"/>
+          <p:cNvPr id="112" name="Straight Arrow Connector 111"/>
           <p:cNvCxnSpPr/>
           <p:nvPr/>
         </p:nvCxnSpPr>
         <p:spPr>
           <a:xfrm>
-            <a:off x="6096000" y="4495800"/>
+            <a:off x="5844381" y="3962400"/>
             <a:ext cx="762000" cy="0"/>
           </a:xfrm>
           <a:prstGeom prst="straightConnector1">
@@ -4448,7 +4598,8 @@
               <a:srgbClr val="7030A0"/>
             </a:solidFill>
             <a:prstDash val="sysDot"/>
-            <a:tailEnd type="arrow"/>
+            <a:headEnd type="none" w="med" len="med"/>
+            <a:tailEnd type="triangle" w="med" len="med"/>
           </a:ln>
         </p:spPr>
         <p:style>
@@ -4468,13 +4619,13 @@
       </p:cxnSp>
       <p:cxnSp>
         <p:nvCxnSpPr>
-          <p:cNvPr id="44" name="Straight Arrow Connector 43"/>
+          <p:cNvPr id="113" name="Straight Arrow Connector 112"/>
           <p:cNvCxnSpPr/>
           <p:nvPr/>
         </p:nvCxnSpPr>
         <p:spPr>
           <a:xfrm>
-            <a:off x="2514600" y="5105400"/>
+            <a:off x="2262981" y="4572000"/>
             <a:ext cx="1752600" cy="0"/>
           </a:xfrm>
           <a:prstGeom prst="straightConnector1">
@@ -4487,7 +4638,8 @@
               </a:schemeClr>
             </a:solidFill>
             <a:prstDash val="sysDot"/>
-            <a:tailEnd type="arrow"/>
+            <a:headEnd type="none" w="med" len="med"/>
+            <a:tailEnd type="triangle" w="med" len="med"/>
           </a:ln>
         </p:spPr>
         <p:style>
@@ -4507,13 +4659,13 @@
       </p:cxnSp>
       <p:cxnSp>
         <p:nvCxnSpPr>
-          <p:cNvPr id="49" name="Straight Arrow Connector 48"/>
+          <p:cNvPr id="114" name="Straight Arrow Connector 113"/>
           <p:cNvCxnSpPr/>
           <p:nvPr/>
         </p:nvCxnSpPr>
         <p:spPr>
           <a:xfrm flipV="1">
-            <a:off x="7620000" y="3276600"/>
+            <a:off x="7368381" y="2743200"/>
             <a:ext cx="0" cy="834640"/>
           </a:xfrm>
           <a:prstGeom prst="straightConnector1">
@@ -4524,7 +4676,8 @@
               <a:srgbClr val="00B050"/>
             </a:solidFill>
             <a:prstDash val="sysDot"/>
-            <a:tailEnd type="arrow"/>
+            <a:headEnd type="none" w="med" len="med"/>
+            <a:tailEnd type="triangle" w="med" len="med"/>
           </a:ln>
         </p:spPr>
         <p:style>
@@ -4544,13 +4697,13 @@
       </p:cxnSp>
       <p:cxnSp>
         <p:nvCxnSpPr>
-          <p:cNvPr id="52" name="Straight Arrow Connector 51"/>
+          <p:cNvPr id="115" name="Straight Arrow Connector 114"/>
           <p:cNvCxnSpPr/>
           <p:nvPr/>
         </p:nvCxnSpPr>
         <p:spPr>
           <a:xfrm>
-            <a:off x="2057400" y="1441391"/>
+            <a:off x="1805781" y="907991"/>
             <a:ext cx="0" cy="457198"/>
           </a:xfrm>
           <a:prstGeom prst="straightConnector1">
@@ -4561,7 +4714,7 @@
               <a:schemeClr val="accent1"/>
             </a:solidFill>
             <a:prstDash val="sysDot"/>
-            <a:headEnd type="arrow" w="med" len="med"/>
+            <a:headEnd type="triangle" w="med" len="med"/>
             <a:tailEnd type="none" w="med" len="med"/>
           </a:ln>
         </p:spPr>
@@ -4582,13 +4735,13 @@
       </p:cxnSp>
       <p:cxnSp>
         <p:nvCxnSpPr>
-          <p:cNvPr id="54" name="Straight Arrow Connector 53"/>
+          <p:cNvPr id="116" name="Straight Arrow Connector 115"/>
           <p:cNvCxnSpPr/>
           <p:nvPr/>
         </p:nvCxnSpPr>
         <p:spPr>
           <a:xfrm>
-            <a:off x="4876800" y="1443528"/>
+            <a:off x="4625181" y="910128"/>
             <a:ext cx="0" cy="457198"/>
           </a:xfrm>
           <a:prstGeom prst="straightConnector1">
@@ -4599,7 +4752,7 @@
               <a:srgbClr val="7030A0"/>
             </a:solidFill>
             <a:prstDash val="sysDot"/>
-            <a:headEnd type="arrow" w="med" len="med"/>
+            <a:headEnd type="triangle" w="med" len="med"/>
             <a:tailEnd type="none" w="med" len="med"/>
           </a:ln>
         </p:spPr>
@@ -4620,13 +4773,13 @@
       </p:cxnSp>
       <p:cxnSp>
         <p:nvCxnSpPr>
-          <p:cNvPr id="55" name="Straight Arrow Connector 54"/>
+          <p:cNvPr id="117" name="Straight Arrow Connector 116"/>
           <p:cNvCxnSpPr/>
           <p:nvPr/>
         </p:nvCxnSpPr>
         <p:spPr>
           <a:xfrm>
-            <a:off x="7620000" y="1192849"/>
+            <a:off x="7368381" y="659449"/>
             <a:ext cx="0" cy="1460975"/>
           </a:xfrm>
           <a:prstGeom prst="straightConnector1">
@@ -4638,7 +4791,7 @@
             </a:solidFill>
             <a:prstDash val="sysDot"/>
             <a:headEnd type="none" w="med" len="med"/>
-            <a:tailEnd type="arrow" w="med" len="med"/>
+            <a:tailEnd type="triangle" w="med" len="med"/>
           </a:ln>
         </p:spPr>
         <p:style>
@@ -4658,13 +4811,13 @@
       </p:cxnSp>
       <p:cxnSp>
         <p:nvCxnSpPr>
-          <p:cNvPr id="56" name="Straight Arrow Connector 55"/>
+          <p:cNvPr id="118" name="Straight Arrow Connector 117"/>
           <p:cNvCxnSpPr/>
           <p:nvPr/>
         </p:nvCxnSpPr>
         <p:spPr>
           <a:xfrm>
-            <a:off x="750962" y="1447802"/>
+            <a:off x="499343" y="914402"/>
             <a:ext cx="11038" cy="3200398"/>
           </a:xfrm>
           <a:prstGeom prst="straightConnector1">
@@ -4677,7 +4830,7 @@
               </a:schemeClr>
             </a:solidFill>
             <a:prstDash val="sysDot"/>
-            <a:headEnd type="arrow" w="med" len="med"/>
+            <a:headEnd type="triangle" w="med" len="med"/>
             <a:tailEnd type="none" w="med" len="med"/>
           </a:ln>
         </p:spPr>
@@ -4698,13 +4851,13 @@
       </p:cxnSp>
       <p:cxnSp>
         <p:nvCxnSpPr>
-          <p:cNvPr id="59" name="Straight Arrow Connector 58"/>
+          <p:cNvPr id="119" name="Straight Arrow Connector 118"/>
           <p:cNvCxnSpPr/>
           <p:nvPr/>
         </p:nvCxnSpPr>
         <p:spPr>
           <a:xfrm>
-            <a:off x="4876800" y="3124200"/>
+            <a:off x="4625181" y="2590800"/>
             <a:ext cx="0" cy="457200"/>
           </a:xfrm>
           <a:prstGeom prst="straightConnector1">
@@ -4715,7 +4868,7 @@
               <a:srgbClr val="7030A0"/>
             </a:solidFill>
             <a:prstDash val="sysDot"/>
-            <a:headEnd type="arrow" w="med" len="med"/>
+            <a:headEnd type="triangle" w="med" len="med"/>
             <a:tailEnd type="none" w="med" len="med"/>
           </a:ln>
         </p:spPr>
@@ -4736,13 +4889,13 @@
       </p:cxnSp>
       <p:cxnSp>
         <p:nvCxnSpPr>
-          <p:cNvPr id="63" name="Straight Arrow Connector 62"/>
+          <p:cNvPr id="120" name="Straight Arrow Connector 119"/>
           <p:cNvCxnSpPr/>
           <p:nvPr/>
         </p:nvCxnSpPr>
         <p:spPr>
           <a:xfrm>
-            <a:off x="1219200" y="5638800"/>
+            <a:off x="967581" y="4755022"/>
             <a:ext cx="0" cy="379221"/>
           </a:xfrm>
           <a:prstGeom prst="straightConnector1">
@@ -4756,7 +4909,7 @@
             </a:solidFill>
             <a:prstDash val="sysDot"/>
             <a:headEnd type="none" w="med" len="med"/>
-            <a:tailEnd type="arrow" w="med" len="med"/>
+            <a:tailEnd type="triangle" w="med" len="med"/>
           </a:ln>
         </p:spPr>
         <p:style>
@@ -4776,13 +4929,13 @@
       </p:cxnSp>
       <p:grpSp>
         <p:nvGrpSpPr>
-          <p:cNvPr id="69" name="Group 68"/>
+          <p:cNvPr id="121" name="Group 120"/>
           <p:cNvGrpSpPr/>
           <p:nvPr/>
         </p:nvGrpSpPr>
         <p:grpSpPr>
           <a:xfrm>
-            <a:off x="4267200" y="4648200"/>
+            <a:off x="4015581" y="4114800"/>
             <a:ext cx="1371600" cy="762000"/>
             <a:chOff x="-228600" y="1371600"/>
             <a:chExt cx="1371600" cy="762000"/>
@@ -4793,7 +4946,7 @@
         </p:grpSpPr>
         <p:sp>
           <p:nvSpPr>
-            <p:cNvPr id="70" name="Rectangle 69"/>
+            <p:cNvPr id="122" name="Rectangle 121"/>
             <p:cNvSpPr/>
             <p:nvPr/>
           </p:nvSpPr>
@@ -4851,7 +5004,7 @@
         </p:sp>
         <p:sp>
           <p:nvSpPr>
-            <p:cNvPr id="71" name="Rectangle 70"/>
+            <p:cNvPr id="123" name="Rectangle 122"/>
             <p:cNvSpPr/>
             <p:nvPr/>
           </p:nvSpPr>
@@ -4902,13 +5055,13 @@
       </p:grpSp>
       <p:cxnSp>
         <p:nvCxnSpPr>
-          <p:cNvPr id="72" name="Straight Arrow Connector 71"/>
+          <p:cNvPr id="124" name="Straight Arrow Connector 123"/>
           <p:cNvCxnSpPr/>
           <p:nvPr/>
         </p:nvCxnSpPr>
         <p:spPr>
           <a:xfrm>
-            <a:off x="4876800" y="4191000"/>
+            <a:off x="4625181" y="3657600"/>
             <a:ext cx="0" cy="609600"/>
           </a:xfrm>
           <a:prstGeom prst="straightConnector1">
@@ -4919,7 +5072,7 @@
               <a:srgbClr val="7030A0"/>
             </a:solidFill>
             <a:prstDash val="sysDot"/>
-            <a:headEnd type="arrow" w="med" len="med"/>
+            <a:headEnd type="triangle" w="med" len="med"/>
             <a:tailEnd type="none" w="med" len="med"/>
           </a:ln>
         </p:spPr>
@@ -4940,13 +5093,13 @@
       </p:cxnSp>
       <p:cxnSp>
         <p:nvCxnSpPr>
-          <p:cNvPr id="75" name="Straight Arrow Connector 74"/>
+          <p:cNvPr id="125" name="Straight Arrow Connector 124"/>
           <p:cNvCxnSpPr/>
           <p:nvPr/>
         </p:nvCxnSpPr>
         <p:spPr>
           <a:xfrm flipV="1">
-            <a:off x="7010400" y="1443528"/>
+            <a:off x="6758781" y="910128"/>
             <a:ext cx="0" cy="462186"/>
           </a:xfrm>
           <a:prstGeom prst="straightConnector1">
@@ -4958,7 +5111,7 @@
             </a:solidFill>
             <a:prstDash val="sysDot"/>
             <a:headEnd type="none" w="med" len="med"/>
-            <a:tailEnd type="arrow" w="med" len="med"/>
+            <a:tailEnd type="triangle" w="med" len="med"/>
           </a:ln>
         </p:spPr>
         <p:style>
@@ -4978,13 +5131,13 @@
       </p:cxnSp>
       <p:grpSp>
         <p:nvGrpSpPr>
-          <p:cNvPr id="12" name="Group 11"/>
+          <p:cNvPr id="126" name="Group 125"/>
           <p:cNvGrpSpPr/>
           <p:nvPr/>
         </p:nvGrpSpPr>
         <p:grpSpPr>
           <a:xfrm>
-            <a:off x="4267200" y="3429000"/>
+            <a:off x="4015581" y="2895600"/>
             <a:ext cx="1371600" cy="762000"/>
             <a:chOff x="-228600" y="1371600"/>
             <a:chExt cx="1371600" cy="762000"/>
@@ -4995,7 +5148,7 @@
         </p:grpSpPr>
         <p:sp>
           <p:nvSpPr>
-            <p:cNvPr id="13" name="Rectangle 12"/>
+            <p:cNvPr id="127" name="Rectangle 126"/>
             <p:cNvSpPr/>
             <p:nvPr/>
           </p:nvSpPr>
@@ -5061,7 +5214,7 @@
         </p:sp>
         <p:sp>
           <p:nvSpPr>
-            <p:cNvPr id="14" name="Rectangle 13"/>
+            <p:cNvPr id="128" name="Rectangle 127"/>
             <p:cNvSpPr/>
             <p:nvPr/>
           </p:nvSpPr>
@@ -5112,13 +5265,13 @@
       </p:grpSp>
       <p:grpSp>
         <p:nvGrpSpPr>
-          <p:cNvPr id="57" name="Group 56"/>
+          <p:cNvPr id="129" name="Group 128"/>
           <p:cNvGrpSpPr/>
           <p:nvPr/>
         </p:nvGrpSpPr>
         <p:grpSpPr>
           <a:xfrm>
-            <a:off x="4191000" y="5867400"/>
+            <a:off x="3939381" y="5334000"/>
             <a:ext cx="1447800" cy="762000"/>
             <a:chOff x="-304800" y="1371600"/>
             <a:chExt cx="1447800" cy="762000"/>
@@ -5129,7 +5282,7 @@
         </p:grpSpPr>
         <p:sp>
           <p:nvSpPr>
-            <p:cNvPr id="58" name="Rectangle 57"/>
+            <p:cNvPr id="130" name="Rectangle 129"/>
             <p:cNvSpPr/>
             <p:nvPr/>
           </p:nvSpPr>
@@ -5187,7 +5340,7 @@
         </p:sp>
         <p:sp>
           <p:nvSpPr>
-            <p:cNvPr id="60" name="Rectangle 59"/>
+            <p:cNvPr id="131" name="Rectangle 130"/>
             <p:cNvSpPr/>
             <p:nvPr/>
           </p:nvSpPr>
@@ -5238,13 +5391,13 @@
       </p:grpSp>
       <p:cxnSp>
         <p:nvCxnSpPr>
-          <p:cNvPr id="62" name="Straight Arrow Connector 61"/>
+          <p:cNvPr id="132" name="Straight Arrow Connector 131"/>
           <p:cNvCxnSpPr/>
           <p:nvPr/>
         </p:nvCxnSpPr>
         <p:spPr>
           <a:xfrm>
-            <a:off x="4876800" y="5410200"/>
+            <a:off x="4625181" y="4876800"/>
             <a:ext cx="0" cy="609600"/>
           </a:xfrm>
           <a:prstGeom prst="straightConnector1">
@@ -5255,7 +5408,7 @@
               <a:srgbClr val="7030A0"/>
             </a:solidFill>
             <a:prstDash val="sysDot"/>
-            <a:headEnd type="arrow" w="med" len="med"/>
+            <a:headEnd type="triangle" w="med" len="med"/>
             <a:tailEnd type="none" w="med" len="med"/>
           </a:ln>
         </p:spPr>
@@ -5276,15 +5429,15 @@
       </p:cxnSp>
       <p:cxnSp>
         <p:nvCxnSpPr>
-          <p:cNvPr id="41" name="Elbow Connector 40"/>
+          <p:cNvPr id="133" name="Elbow Connector 132"/>
           <p:cNvCxnSpPr>
-            <a:endCxn id="16" idx="3"/>
+            <a:endCxn id="98" idx="3"/>
           </p:cNvCxnSpPr>
           <p:nvPr/>
         </p:nvCxnSpPr>
         <p:spPr>
           <a:xfrm rot="5400000" flipH="1" flipV="1">
-            <a:off x="4419600" y="3276600"/>
+            <a:off x="4167981" y="2743200"/>
             <a:ext cx="1676400" cy="762000"/>
           </a:xfrm>
           <a:prstGeom prst="bentConnector4">
@@ -5299,7 +5452,7 @@
             </a:solidFill>
             <a:prstDash val="sysDot"/>
             <a:headEnd type="none" w="med" len="med"/>
-            <a:tailEnd type="arrow" w="med" len="med"/>
+            <a:tailEnd type="triangle" w="med" len="med"/>
           </a:ln>
         </p:spPr>
         <p:style>
@@ -5319,15 +5472,15 @@
       </p:cxnSp>
       <p:cxnSp>
         <p:nvCxnSpPr>
-          <p:cNvPr id="64" name="Straight Arrow Connector 63"/>
+          <p:cNvPr id="134" name="Straight Arrow Connector 133"/>
           <p:cNvCxnSpPr>
-            <a:stCxn id="13" idx="1"/>
+            <a:stCxn id="127" idx="1"/>
           </p:cNvCxnSpPr>
           <p:nvPr/>
         </p:nvCxnSpPr>
         <p:spPr>
           <a:xfrm flipH="1">
-            <a:off x="2819400" y="3886200"/>
+            <a:off x="2567781" y="3352800"/>
             <a:ext cx="1447800" cy="0"/>
           </a:xfrm>
           <a:prstGeom prst="straightConnector1">
@@ -5338,7 +5491,7 @@
               <a:schemeClr val="accent1"/>
             </a:solidFill>
             <a:prstDash val="sysDot"/>
-            <a:headEnd type="arrow" w="med" len="med"/>
+            <a:headEnd type="triangle" w="med" len="med"/>
             <a:tailEnd type="none" w="med" len="med"/>
           </a:ln>
         </p:spPr>
@@ -5359,16 +5512,16 @@
       </p:cxnSp>
       <p:grpSp>
         <p:nvGrpSpPr>
-          <p:cNvPr id="73" name="Group 72"/>
+          <p:cNvPr id="135" name="Group 134"/>
           <p:cNvGrpSpPr/>
           <p:nvPr/>
         </p:nvGrpSpPr>
         <p:grpSpPr>
           <a:xfrm>
-            <a:off x="4343400" y="380999"/>
-            <a:ext cx="1371600" cy="762000"/>
-            <a:chOff x="-228600" y="1371600"/>
-            <a:chExt cx="1371600" cy="762000"/>
+            <a:off x="3786981" y="254950"/>
+            <a:ext cx="1676400" cy="507050"/>
+            <a:chOff x="-533400" y="1371600"/>
+            <a:chExt cx="1676400" cy="507050"/>
           </a:xfrm>
           <a:solidFill>
             <a:schemeClr val="bg1"/>
@@ -5376,14 +5529,14 @@
         </p:grpSpPr>
         <p:sp>
           <p:nvSpPr>
-            <p:cNvPr id="74" name="Rectangle 73"/>
+            <p:cNvPr id="136" name="Rectangle 135"/>
             <p:cNvSpPr/>
             <p:nvPr/>
           </p:nvSpPr>
           <p:spPr>
             <a:xfrm>
-              <a:off x="-228600" y="1524000"/>
-              <a:ext cx="1371600" cy="609600"/>
+              <a:off x="-533400" y="1524000"/>
+              <a:ext cx="1676400" cy="354650"/>
             </a:xfrm>
             <a:prstGeom prst="rect">
               <a:avLst/>
@@ -5421,22 +5574,15 @@
                     <a:schemeClr val="accent5"/>
                   </a:solidFill>
                 </a:rPr>
-                <a:t>common</a:t>
+                <a:t>common::</a:t>
               </a:r>
-              <a:br>
-                <a:rPr lang="en-US" sz="1400" b="1" dirty="0" smtClean="0">
-                  <a:solidFill>
-                    <a:schemeClr val="accent5"/>
-                  </a:solidFill>
-                </a:rPr>
-              </a:br>
               <a:r>
                 <a:rPr lang="en-US" sz="1400" b="1" dirty="0" smtClean="0">
                   <a:solidFill>
                     <a:schemeClr val="accent5"/>
                   </a:solidFill>
                 </a:rPr>
-                <a:t>    ::exception</a:t>
+                <a:t>exception</a:t>
               </a:r>
               <a:endParaRPr lang="en-SG" sz="1400" b="1" dirty="0">
                 <a:solidFill>
@@ -5448,7 +5594,7 @@
         </p:sp>
         <p:sp>
           <p:nvSpPr>
-            <p:cNvPr id="76" name="Rectangle 75"/>
+            <p:cNvPr id="137" name="Rectangle 136"/>
             <p:cNvSpPr/>
             <p:nvPr/>
           </p:nvSpPr>
@@ -5498,13 +5644,13 @@
       </p:grpSp>
       <p:grpSp>
         <p:nvGrpSpPr>
-          <p:cNvPr id="77" name="Group 76"/>
+          <p:cNvPr id="138" name="Group 137"/>
           <p:cNvGrpSpPr/>
           <p:nvPr/>
         </p:nvGrpSpPr>
         <p:grpSpPr>
           <a:xfrm>
-            <a:off x="6781800" y="5422306"/>
+            <a:off x="6530181" y="4888906"/>
             <a:ext cx="1676400" cy="762000"/>
             <a:chOff x="-533400" y="1371600"/>
             <a:chExt cx="1676400" cy="762000"/>
@@ -5515,7 +5661,7 @@
         </p:grpSpPr>
         <p:sp>
           <p:nvSpPr>
-            <p:cNvPr id="78" name="Rectangle 77"/>
+            <p:cNvPr id="139" name="Rectangle 138"/>
             <p:cNvSpPr/>
             <p:nvPr/>
           </p:nvSpPr>
@@ -5589,7 +5735,7 @@
         </p:sp>
         <p:sp>
           <p:nvSpPr>
-            <p:cNvPr id="79" name="Rectangle 78"/>
+            <p:cNvPr id="140" name="Rectangle 139"/>
             <p:cNvSpPr/>
             <p:nvPr/>
           </p:nvSpPr>
@@ -5640,13 +5786,13 @@
       </p:grpSp>
       <p:cxnSp>
         <p:nvCxnSpPr>
-          <p:cNvPr id="80" name="Straight Arrow Connector 79"/>
+          <p:cNvPr id="141" name="Straight Arrow Connector 140"/>
           <p:cNvCxnSpPr/>
           <p:nvPr/>
         </p:nvCxnSpPr>
         <p:spPr>
           <a:xfrm>
-            <a:off x="7620000" y="4724400"/>
+            <a:off x="7368381" y="4191000"/>
             <a:ext cx="0" cy="841403"/>
           </a:xfrm>
           <a:prstGeom prst="straightConnector1">
@@ -5658,7 +5804,7 @@
             </a:solidFill>
             <a:prstDash val="sysDot"/>
             <a:headEnd type="none" w="med" len="med"/>
-            <a:tailEnd type="arrow" w="med" len="med"/>
+            <a:tailEnd type="triangle" w="med" len="med"/>
           </a:ln>
         </p:spPr>
         <p:style>
@@ -5678,13 +5824,13 @@
       </p:cxnSp>
       <p:grpSp>
         <p:nvGrpSpPr>
-          <p:cNvPr id="84" name="Group 83"/>
+          <p:cNvPr id="142" name="Group 141"/>
           <p:cNvGrpSpPr/>
           <p:nvPr/>
         </p:nvGrpSpPr>
         <p:grpSpPr>
           <a:xfrm>
-            <a:off x="1447800" y="2286000"/>
+            <a:off x="1196181" y="2362200"/>
             <a:ext cx="1371600" cy="609600"/>
             <a:chOff x="-228600" y="1371600"/>
             <a:chExt cx="1371600" cy="609600"/>
@@ -5695,7 +5841,7 @@
         </p:grpSpPr>
         <p:sp>
           <p:nvSpPr>
-            <p:cNvPr id="85" name="Rectangle 84"/>
+            <p:cNvPr id="143" name="Rectangle 142"/>
             <p:cNvSpPr/>
             <p:nvPr/>
           </p:nvSpPr>
@@ -5756,7 +5902,7 @@
         </p:sp>
         <p:sp>
           <p:nvSpPr>
-            <p:cNvPr id="86" name="Rectangle 85"/>
+            <p:cNvPr id="144" name="Rectangle 143"/>
             <p:cNvSpPr/>
             <p:nvPr/>
           </p:nvSpPr>
@@ -5802,14 +5948,14 @@
       </p:grpSp>
       <p:cxnSp>
         <p:nvCxnSpPr>
-          <p:cNvPr id="87" name="Straight Arrow Connector 86"/>
+          <p:cNvPr id="145" name="Straight Arrow Connector 144"/>
           <p:cNvCxnSpPr/>
           <p:nvPr/>
         </p:nvCxnSpPr>
         <p:spPr>
           <a:xfrm flipV="1">
-            <a:off x="2057400" y="2895600"/>
-            <a:ext cx="0" cy="762000"/>
+            <a:off x="1805781" y="2971800"/>
+            <a:ext cx="0" cy="304800"/>
           </a:xfrm>
           <a:prstGeom prst="straightConnector1">
             <a:avLst/>
@@ -5819,7 +5965,7 @@
               <a:schemeClr val="accent1"/>
             </a:solidFill>
             <a:prstDash val="sysDot"/>
-            <a:headEnd type="arrow" w="med" len="med"/>
+            <a:headEnd type="triangle" w="med" len="med"/>
             <a:tailEnd type="none" w="med" len="med"/>
           </a:ln>
         </p:spPr>
@@ -5838,6 +5984,592 @@
           </a:fontRef>
         </p:style>
       </p:cxnSp>
+      <p:grpSp>
+        <p:nvGrpSpPr>
+          <p:cNvPr id="146" name="Group 145"/>
+          <p:cNvGrpSpPr/>
+          <p:nvPr/>
+        </p:nvGrpSpPr>
+        <p:grpSpPr>
+          <a:xfrm>
+            <a:off x="1196181" y="1600200"/>
+            <a:ext cx="1371600" cy="609600"/>
+            <a:chOff x="-228600" y="1371600"/>
+            <a:chExt cx="1371600" cy="609600"/>
+          </a:xfrm>
+          <a:solidFill>
+            <a:schemeClr val="bg1"/>
+          </a:solidFill>
+        </p:grpSpPr>
+        <p:sp>
+          <p:nvSpPr>
+            <p:cNvPr id="147" name="Rectangle 146"/>
+            <p:cNvSpPr/>
+            <p:nvPr/>
+          </p:nvSpPr>
+          <p:spPr>
+            <a:xfrm>
+              <a:off x="-228600" y="1524000"/>
+              <a:ext cx="1371600" cy="457200"/>
+            </a:xfrm>
+            <a:prstGeom prst="rect">
+              <a:avLst/>
+            </a:prstGeom>
+            <a:grpFill/>
+          </p:spPr>
+          <p:style>
+            <a:lnRef idx="2">
+              <a:schemeClr val="accent1">
+                <a:shade val="50000"/>
+              </a:schemeClr>
+            </a:lnRef>
+            <a:fillRef idx="1">
+              <a:schemeClr val="accent1"/>
+            </a:fillRef>
+            <a:effectRef idx="0">
+              <a:schemeClr val="accent1"/>
+            </a:effectRef>
+            <a:fontRef idx="minor">
+              <a:schemeClr val="lt1"/>
+            </a:fontRef>
+          </p:style>
+          <p:txBody>
+            <a:bodyPr rtlCol="0" anchor="ctr"/>
+            <a:lstStyle/>
+            <a:p>
+              <a:pPr algn="ctr"/>
+              <a:r>
+                <a:rPr lang="en-US" sz="1400" b="1" dirty="0" err="1" smtClean="0">
+                  <a:solidFill>
+                    <a:schemeClr val="tx2"/>
+                  </a:solidFill>
+                </a:rPr>
+                <a:t>ui</a:t>
+              </a:r>
+              <a:r>
+                <a:rPr lang="en-US" sz="1400" b="1" dirty="0" smtClean="0">
+                  <a:solidFill>
+                    <a:schemeClr val="tx2"/>
+                  </a:solidFill>
+                </a:rPr>
+                <a:t>::</a:t>
+              </a:r>
+              <a:r>
+                <a:rPr lang="en-US" sz="1400" b="1" dirty="0" smtClean="0">
+                  <a:solidFill>
+                    <a:schemeClr val="tx2"/>
+                  </a:solidFill>
+                </a:rPr>
+                <a:t>website</a:t>
+              </a:r>
+              <a:endParaRPr lang="en-SG" sz="1400" b="1" dirty="0">
+                <a:solidFill>
+                  <a:schemeClr val="tx2"/>
+                </a:solidFill>
+              </a:endParaRPr>
+            </a:p>
+          </p:txBody>
+        </p:sp>
+        <p:sp>
+          <p:nvSpPr>
+            <p:cNvPr id="148" name="Rectangle 147"/>
+            <p:cNvSpPr/>
+            <p:nvPr/>
+          </p:nvSpPr>
+          <p:spPr>
+            <a:xfrm>
+              <a:off x="647700" y="1371600"/>
+              <a:ext cx="495300" cy="152400"/>
+            </a:xfrm>
+            <a:prstGeom prst="rect">
+              <a:avLst/>
+            </a:prstGeom>
+            <a:grpFill/>
+          </p:spPr>
+          <p:style>
+            <a:lnRef idx="2">
+              <a:schemeClr val="accent1">
+                <a:shade val="50000"/>
+              </a:schemeClr>
+            </a:lnRef>
+            <a:fillRef idx="1">
+              <a:schemeClr val="accent1"/>
+            </a:fillRef>
+            <a:effectRef idx="0">
+              <a:schemeClr val="accent1"/>
+            </a:effectRef>
+            <a:fontRef idx="minor">
+              <a:schemeClr val="lt1"/>
+            </a:fontRef>
+          </p:style>
+          <p:txBody>
+            <a:bodyPr rtlCol="0" anchor="ctr"/>
+            <a:lstStyle/>
+            <a:p>
+              <a:pPr algn="ctr"/>
+              <a:endParaRPr lang="en-SG" sz="1400" b="1">
+                <a:solidFill>
+                  <a:schemeClr val="tx2"/>
+                </a:solidFill>
+              </a:endParaRPr>
+            </a:p>
+          </p:txBody>
+        </p:sp>
+      </p:grpSp>
+      <p:grpSp>
+        <p:nvGrpSpPr>
+          <p:cNvPr id="149" name="Group 148"/>
+          <p:cNvGrpSpPr/>
+          <p:nvPr/>
+        </p:nvGrpSpPr>
+        <p:grpSpPr>
+          <a:xfrm>
+            <a:off x="510381" y="4343400"/>
+            <a:ext cx="1371600" cy="499929"/>
+            <a:chOff x="-228600" y="1371600"/>
+            <a:chExt cx="1371600" cy="499929"/>
+          </a:xfrm>
+          <a:solidFill>
+            <a:schemeClr val="bg1"/>
+          </a:solidFill>
+        </p:grpSpPr>
+        <p:sp>
+          <p:nvSpPr>
+            <p:cNvPr id="150" name="Rectangle 149"/>
+            <p:cNvSpPr/>
+            <p:nvPr/>
+          </p:nvSpPr>
+          <p:spPr>
+            <a:xfrm>
+              <a:off x="-228600" y="1524001"/>
+              <a:ext cx="1371600" cy="347528"/>
+            </a:xfrm>
+            <a:prstGeom prst="rect">
+              <a:avLst/>
+            </a:prstGeom>
+            <a:grpFill/>
+            <a:ln>
+              <a:solidFill>
+                <a:schemeClr val="accent2">
+                  <a:lumMod val="75000"/>
+                </a:schemeClr>
+              </a:solidFill>
+            </a:ln>
+          </p:spPr>
+          <p:style>
+            <a:lnRef idx="2">
+              <a:schemeClr val="accent1">
+                <a:shade val="50000"/>
+              </a:schemeClr>
+            </a:lnRef>
+            <a:fillRef idx="1">
+              <a:schemeClr val="accent1"/>
+            </a:fillRef>
+            <a:effectRef idx="0">
+              <a:schemeClr val="accent1"/>
+            </a:effectRef>
+            <a:fontRef idx="minor">
+              <a:schemeClr val="lt1"/>
+            </a:fontRef>
+          </p:style>
+          <p:txBody>
+            <a:bodyPr rtlCol="0" anchor="ctr"/>
+            <a:lstStyle/>
+            <a:p>
+              <a:pPr algn="ctr"/>
+              <a:r>
+                <a:rPr lang="en-US" sz="1400" b="1" dirty="0" smtClean="0">
+                  <a:solidFill>
+                    <a:schemeClr val="accent2">
+                      <a:lumMod val="75000"/>
+                    </a:schemeClr>
+                  </a:solidFill>
+                </a:rPr>
+                <a:t>test::cases</a:t>
+              </a:r>
+              <a:endParaRPr lang="en-SG" sz="1400" b="1" dirty="0">
+                <a:solidFill>
+                  <a:schemeClr val="accent2">
+                    <a:lumMod val="75000"/>
+                  </a:schemeClr>
+                </a:solidFill>
+              </a:endParaRPr>
+            </a:p>
+          </p:txBody>
+        </p:sp>
+        <p:sp>
+          <p:nvSpPr>
+            <p:cNvPr id="151" name="Rectangle 150"/>
+            <p:cNvSpPr/>
+            <p:nvPr/>
+          </p:nvSpPr>
+          <p:spPr>
+            <a:xfrm>
+              <a:off x="647700" y="1371600"/>
+              <a:ext cx="495300" cy="152400"/>
+            </a:xfrm>
+            <a:prstGeom prst="rect">
+              <a:avLst/>
+            </a:prstGeom>
+            <a:grpFill/>
+            <a:ln>
+              <a:solidFill>
+                <a:schemeClr val="accent2">
+                  <a:lumMod val="75000"/>
+                </a:schemeClr>
+              </a:solidFill>
+            </a:ln>
+          </p:spPr>
+          <p:style>
+            <a:lnRef idx="2">
+              <a:schemeClr val="accent1">
+                <a:shade val="50000"/>
+              </a:schemeClr>
+            </a:lnRef>
+            <a:fillRef idx="1">
+              <a:schemeClr val="accent1"/>
+            </a:fillRef>
+            <a:effectRef idx="0">
+              <a:schemeClr val="accent1"/>
+            </a:effectRef>
+            <a:fontRef idx="minor">
+              <a:schemeClr val="lt1"/>
+            </a:fontRef>
+          </p:style>
+          <p:txBody>
+            <a:bodyPr rtlCol="0" anchor="ctr"/>
+            <a:lstStyle/>
+            <a:p>
+              <a:pPr algn="ctr"/>
+              <a:endParaRPr lang="en-SG" sz="1400" b="1">
+                <a:solidFill>
+                  <a:schemeClr val="accent2">
+                    <a:lumMod val="75000"/>
+                  </a:schemeClr>
+                </a:solidFill>
+              </a:endParaRPr>
+            </a:p>
+          </p:txBody>
+        </p:sp>
+      </p:grpSp>
+      <p:grpSp>
+        <p:nvGrpSpPr>
+          <p:cNvPr id="152" name="Group 151"/>
+          <p:cNvGrpSpPr/>
+          <p:nvPr/>
+        </p:nvGrpSpPr>
+        <p:grpSpPr>
+          <a:xfrm>
+            <a:off x="510381" y="5589661"/>
+            <a:ext cx="1371600" cy="506339"/>
+            <a:chOff x="-228600" y="1371600"/>
+            <a:chExt cx="1371600" cy="506339"/>
+          </a:xfrm>
+          <a:solidFill>
+            <a:schemeClr val="bg1"/>
+          </a:solidFill>
+        </p:grpSpPr>
+        <p:sp>
+          <p:nvSpPr>
+            <p:cNvPr id="153" name="Rectangle 152"/>
+            <p:cNvSpPr/>
+            <p:nvPr/>
+          </p:nvSpPr>
+          <p:spPr>
+            <a:xfrm>
+              <a:off x="-228600" y="1524000"/>
+              <a:ext cx="1371600" cy="353939"/>
+            </a:xfrm>
+            <a:prstGeom prst="rect">
+              <a:avLst/>
+            </a:prstGeom>
+            <a:grpFill/>
+            <a:ln>
+              <a:solidFill>
+                <a:schemeClr val="accent2">
+                  <a:lumMod val="75000"/>
+                </a:schemeClr>
+              </a:solidFill>
+            </a:ln>
+          </p:spPr>
+          <p:style>
+            <a:lnRef idx="2">
+              <a:schemeClr val="accent1">
+                <a:shade val="50000"/>
+              </a:schemeClr>
+            </a:lnRef>
+            <a:fillRef idx="1">
+              <a:schemeClr val="accent1"/>
+            </a:fillRef>
+            <a:effectRef idx="0">
+              <a:schemeClr val="accent1"/>
+            </a:effectRef>
+            <a:fontRef idx="minor">
+              <a:schemeClr val="lt1"/>
+            </a:fontRef>
+          </p:style>
+          <p:txBody>
+            <a:bodyPr rtlCol="0" anchor="ctr"/>
+            <a:lstStyle/>
+            <a:p>
+              <a:pPr algn="ctr"/>
+              <a:r>
+                <a:rPr lang="en-US" sz="1400" b="1" dirty="0" smtClean="0">
+                  <a:solidFill>
+                    <a:schemeClr val="accent2">
+                      <a:lumMod val="75000"/>
+                    </a:schemeClr>
+                  </a:solidFill>
+                </a:rPr>
+                <a:t>test</a:t>
+              </a:r>
+              <a:r>
+                <a:rPr lang="en-US" sz="1400" b="1" dirty="0" smtClean="0">
+                  <a:solidFill>
+                    <a:schemeClr val="accent2">
+                      <a:lumMod val="75000"/>
+                    </a:schemeClr>
+                  </a:solidFill>
+                </a:rPr>
+                <a:t>::scripts</a:t>
+              </a:r>
+              <a:endParaRPr lang="en-SG" sz="1400" b="1" dirty="0">
+                <a:solidFill>
+                  <a:schemeClr val="accent2">
+                    <a:lumMod val="75000"/>
+                  </a:schemeClr>
+                </a:solidFill>
+              </a:endParaRPr>
+            </a:p>
+          </p:txBody>
+        </p:sp>
+        <p:sp>
+          <p:nvSpPr>
+            <p:cNvPr id="154" name="Rectangle 153"/>
+            <p:cNvSpPr/>
+            <p:nvPr/>
+          </p:nvSpPr>
+          <p:spPr>
+            <a:xfrm>
+              <a:off x="647700" y="1371600"/>
+              <a:ext cx="495300" cy="152400"/>
+            </a:xfrm>
+            <a:prstGeom prst="rect">
+              <a:avLst/>
+            </a:prstGeom>
+            <a:grpFill/>
+            <a:ln>
+              <a:solidFill>
+                <a:schemeClr val="accent2">
+                  <a:lumMod val="75000"/>
+                </a:schemeClr>
+              </a:solidFill>
+            </a:ln>
+          </p:spPr>
+          <p:style>
+            <a:lnRef idx="2">
+              <a:schemeClr val="accent1">
+                <a:shade val="50000"/>
+              </a:schemeClr>
+            </a:lnRef>
+            <a:fillRef idx="1">
+              <a:schemeClr val="accent1"/>
+            </a:fillRef>
+            <a:effectRef idx="0">
+              <a:schemeClr val="accent1"/>
+            </a:effectRef>
+            <a:fontRef idx="minor">
+              <a:schemeClr val="lt1"/>
+            </a:fontRef>
+          </p:style>
+          <p:txBody>
+            <a:bodyPr rtlCol="0" anchor="ctr"/>
+            <a:lstStyle/>
+            <a:p>
+              <a:pPr algn="ctr"/>
+              <a:endParaRPr lang="en-SG" sz="1400" b="1">
+                <a:solidFill>
+                  <a:schemeClr val="accent2">
+                    <a:lumMod val="75000"/>
+                  </a:schemeClr>
+                </a:solidFill>
+              </a:endParaRPr>
+            </a:p>
+          </p:txBody>
+        </p:sp>
+      </p:grpSp>
+      <p:cxnSp>
+        <p:nvCxnSpPr>
+          <p:cNvPr id="155" name="Straight Arrow Connector 154"/>
+          <p:cNvCxnSpPr/>
+          <p:nvPr/>
+        </p:nvCxnSpPr>
+        <p:spPr>
+          <a:xfrm flipV="1">
+            <a:off x="967581" y="5511682"/>
+            <a:ext cx="0" cy="230379"/>
+          </a:xfrm>
+          <a:prstGeom prst="straightConnector1">
+            <a:avLst/>
+          </a:prstGeom>
+          <a:ln w="38100">
+            <a:solidFill>
+              <a:schemeClr val="accent2">
+                <a:lumMod val="75000"/>
+              </a:schemeClr>
+            </a:solidFill>
+            <a:prstDash val="sysDot"/>
+            <a:headEnd type="none" w="med" len="med"/>
+            <a:tailEnd type="triangle" w="med" len="med"/>
+          </a:ln>
+        </p:spPr>
+        <p:style>
+          <a:lnRef idx="1">
+            <a:schemeClr val="accent1"/>
+          </a:lnRef>
+          <a:fillRef idx="0">
+            <a:schemeClr val="accent1"/>
+          </a:fillRef>
+          <a:effectRef idx="0">
+            <a:schemeClr val="accent1"/>
+          </a:effectRef>
+          <a:fontRef idx="minor">
+            <a:schemeClr val="tx1"/>
+          </a:fontRef>
+        </p:style>
+      </p:cxnSp>
+      <p:grpSp>
+        <p:nvGrpSpPr>
+          <p:cNvPr id="156" name="Group 155"/>
+          <p:cNvGrpSpPr/>
+          <p:nvPr/>
+        </p:nvGrpSpPr>
+        <p:grpSpPr>
+          <a:xfrm>
+            <a:off x="6225381" y="256308"/>
+            <a:ext cx="1905000" cy="505692"/>
+            <a:chOff x="-762000" y="1371600"/>
+            <a:chExt cx="1905000" cy="505692"/>
+          </a:xfrm>
+          <a:solidFill>
+            <a:schemeClr val="bg1"/>
+          </a:solidFill>
+        </p:grpSpPr>
+        <p:sp>
+          <p:nvSpPr>
+            <p:cNvPr id="157" name="Rectangle 156"/>
+            <p:cNvSpPr/>
+            <p:nvPr/>
+          </p:nvSpPr>
+          <p:spPr>
+            <a:xfrm>
+              <a:off x="-762000" y="1524000"/>
+              <a:ext cx="1905000" cy="353292"/>
+            </a:xfrm>
+            <a:prstGeom prst="rect">
+              <a:avLst/>
+            </a:prstGeom>
+            <a:grpFill/>
+            <a:ln>
+              <a:solidFill>
+                <a:schemeClr val="accent5"/>
+              </a:solidFill>
+            </a:ln>
+          </p:spPr>
+          <p:style>
+            <a:lnRef idx="2">
+              <a:schemeClr val="accent1">
+                <a:shade val="50000"/>
+              </a:schemeClr>
+            </a:lnRef>
+            <a:fillRef idx="1">
+              <a:schemeClr val="accent1"/>
+            </a:fillRef>
+            <a:effectRef idx="0">
+              <a:schemeClr val="accent1"/>
+            </a:effectRef>
+            <a:fontRef idx="minor">
+              <a:schemeClr val="lt1"/>
+            </a:fontRef>
+          </p:style>
+          <p:txBody>
+            <a:bodyPr rtlCol="0" anchor="ctr"/>
+            <a:lstStyle/>
+            <a:p>
+              <a:r>
+                <a:rPr lang="en-US" sz="1400" b="1" dirty="0" smtClean="0">
+                  <a:solidFill>
+                    <a:schemeClr val="accent5"/>
+                  </a:solidFill>
+                </a:rPr>
+                <a:t>common::</a:t>
+              </a:r>
+              <a:r>
+                <a:rPr lang="en-US" sz="1400" b="1" dirty="0" err="1" smtClean="0">
+                  <a:solidFill>
+                    <a:schemeClr val="accent5"/>
+                  </a:solidFill>
+                </a:rPr>
+                <a:t>datatransfer</a:t>
+              </a:r>
+              <a:endParaRPr lang="en-SG" sz="1400" b="1" dirty="0">
+                <a:solidFill>
+                  <a:schemeClr val="accent5"/>
+                </a:solidFill>
+              </a:endParaRPr>
+            </a:p>
+          </p:txBody>
+        </p:sp>
+        <p:sp>
+          <p:nvSpPr>
+            <p:cNvPr id="158" name="Rectangle 157"/>
+            <p:cNvSpPr/>
+            <p:nvPr/>
+          </p:nvSpPr>
+          <p:spPr>
+            <a:xfrm>
+              <a:off x="647700" y="1371600"/>
+              <a:ext cx="495300" cy="152400"/>
+            </a:xfrm>
+            <a:prstGeom prst="rect">
+              <a:avLst/>
+            </a:prstGeom>
+            <a:grpFill/>
+            <a:ln>
+              <a:solidFill>
+                <a:schemeClr val="accent5"/>
+              </a:solidFill>
+            </a:ln>
+          </p:spPr>
+          <p:style>
+            <a:lnRef idx="2">
+              <a:schemeClr val="accent1">
+                <a:shade val="50000"/>
+              </a:schemeClr>
+            </a:lnRef>
+            <a:fillRef idx="1">
+              <a:schemeClr val="accent1"/>
+            </a:fillRef>
+            <a:effectRef idx="0">
+              <a:schemeClr val="accent1"/>
+            </a:effectRef>
+            <a:fontRef idx="minor">
+              <a:schemeClr val="lt1"/>
+            </a:fontRef>
+          </p:style>
+          <p:txBody>
+            <a:bodyPr rtlCol="0" anchor="ctr"/>
+            <a:lstStyle/>
+            <a:p>
+              <a:endParaRPr lang="en-SG" sz="1400" b="1">
+                <a:solidFill>
+                  <a:schemeClr val="accent5"/>
+                </a:solidFill>
+              </a:endParaRPr>
+            </a:p>
+          </p:txBody>
+        </p:sp>
+      </p:grpSp>
     </p:spTree>
     <p:extLst>
       <p:ext uri="{BB962C8B-B14F-4D97-AF65-F5344CB8AC3E}">
@@ -6139,4 +6871,289 @@
   <a:objectDefaults/>
   <a:extraClrSchemeLst/>
 </a:theme>
+</file>
+
+<file path=ppt/theme/theme2.xml><?xml version="1.0" encoding="utf-8"?>
+<a:theme xmlns:a="http://schemas.openxmlformats.org/drawingml/2006/main" name="Office Theme">
+  <a:themeElements>
+    <a:clrScheme name="Office">
+      <a:dk1>
+        <a:sysClr val="windowText" lastClr="000000"/>
+      </a:dk1>
+      <a:lt1>
+        <a:sysClr val="window" lastClr="FFFFFF"/>
+      </a:lt1>
+      <a:dk2>
+        <a:srgbClr val="1F497D"/>
+      </a:dk2>
+      <a:lt2>
+        <a:srgbClr val="EEECE1"/>
+      </a:lt2>
+      <a:accent1>
+        <a:srgbClr val="4F81BD"/>
+      </a:accent1>
+      <a:accent2>
+        <a:srgbClr val="C0504D"/>
+      </a:accent2>
+      <a:accent3>
+        <a:srgbClr val="9BBB59"/>
+      </a:accent3>
+      <a:accent4>
+        <a:srgbClr val="8064A2"/>
+      </a:accent4>
+      <a:accent5>
+        <a:srgbClr val="4BACC6"/>
+      </a:accent5>
+      <a:accent6>
+        <a:srgbClr val="F79646"/>
+      </a:accent6>
+      <a:hlink>
+        <a:srgbClr val="0000FF"/>
+      </a:hlink>
+      <a:folHlink>
+        <a:srgbClr val="800080"/>
+      </a:folHlink>
+    </a:clrScheme>
+    <a:fontScheme name="Office">
+      <a:majorFont>
+        <a:latin typeface="Calibri"/>
+        <a:ea typeface=""/>
+        <a:cs typeface=""/>
+        <a:font script="Jpan" typeface="ＭＳ Ｐゴシック"/>
+        <a:font script="Hang" typeface="맑은 고딕"/>
+        <a:font script="Hans" typeface="宋体"/>
+        <a:font script="Hant" typeface="新細明體"/>
+        <a:font script="Arab" typeface="Times New Roman"/>
+        <a:font script="Hebr" typeface="Times New Roman"/>
+        <a:font script="Thai" typeface="Angsana New"/>
+        <a:font script="Ethi" typeface="Nyala"/>
+        <a:font script="Beng" typeface="Vrinda"/>
+        <a:font script="Gujr" typeface="Shruti"/>
+        <a:font script="Khmr" typeface="MoolBoran"/>
+        <a:font script="Knda" typeface="Tunga"/>
+        <a:font script="Guru" typeface="Raavi"/>
+        <a:font script="Cans" typeface="Euphemia"/>
+        <a:font script="Cher" typeface="Plantagenet Cherokee"/>
+        <a:font script="Yiii" typeface="Microsoft Yi Baiti"/>
+        <a:font script="Tibt" typeface="Microsoft Himalaya"/>
+        <a:font script="Thaa" typeface="MV Boli"/>
+        <a:font script="Deva" typeface="Mangal"/>
+        <a:font script="Telu" typeface="Gautami"/>
+        <a:font script="Taml" typeface="Latha"/>
+        <a:font script="Syrc" typeface="Estrangelo Edessa"/>
+        <a:font script="Orya" typeface="Kalinga"/>
+        <a:font script="Mlym" typeface="Kartika"/>
+        <a:font script="Laoo" typeface="DokChampa"/>
+        <a:font script="Sinh" typeface="Iskoola Pota"/>
+        <a:font script="Mong" typeface="Mongolian Baiti"/>
+        <a:font script="Viet" typeface="Times New Roman"/>
+        <a:font script="Uigh" typeface="Microsoft Uighur"/>
+        <a:font script="Geor" typeface="Sylfaen"/>
+      </a:majorFont>
+      <a:minorFont>
+        <a:latin typeface="Calibri"/>
+        <a:ea typeface=""/>
+        <a:cs typeface=""/>
+        <a:font script="Jpan" typeface="ＭＳ Ｐゴシック"/>
+        <a:font script="Hang" typeface="맑은 고딕"/>
+        <a:font script="Hans" typeface="宋体"/>
+        <a:font script="Hant" typeface="新細明體"/>
+        <a:font script="Arab" typeface="Arial"/>
+        <a:font script="Hebr" typeface="Arial"/>
+        <a:font script="Thai" typeface="Cordia New"/>
+        <a:font script="Ethi" typeface="Nyala"/>
+        <a:font script="Beng" typeface="Vrinda"/>
+        <a:font script="Gujr" typeface="Shruti"/>
+        <a:font script="Khmr" typeface="DaunPenh"/>
+        <a:font script="Knda" typeface="Tunga"/>
+        <a:font script="Guru" typeface="Raavi"/>
+        <a:font script="Cans" typeface="Euphemia"/>
+        <a:font script="Cher" typeface="Plantagenet Cherokee"/>
+        <a:font script="Yiii" typeface="Microsoft Yi Baiti"/>
+        <a:font script="Tibt" typeface="Microsoft Himalaya"/>
+        <a:font script="Thaa" typeface="MV Boli"/>
+        <a:font script="Deva" typeface="Mangal"/>
+        <a:font script="Telu" typeface="Gautami"/>
+        <a:font script="Taml" typeface="Latha"/>
+        <a:font script="Syrc" typeface="Estrangelo Edessa"/>
+        <a:font script="Orya" typeface="Kalinga"/>
+        <a:font script="Mlym" typeface="Kartika"/>
+        <a:font script="Laoo" typeface="DokChampa"/>
+        <a:font script="Sinh" typeface="Iskoola Pota"/>
+        <a:font script="Mong" typeface="Mongolian Baiti"/>
+        <a:font script="Viet" typeface="Arial"/>
+        <a:font script="Uigh" typeface="Microsoft Uighur"/>
+        <a:font script="Geor" typeface="Sylfaen"/>
+      </a:minorFont>
+    </a:fontScheme>
+    <a:fmtScheme name="Office">
+      <a:fillStyleLst>
+        <a:solidFill>
+          <a:schemeClr val="phClr"/>
+        </a:solidFill>
+        <a:gradFill rotWithShape="1">
+          <a:gsLst>
+            <a:gs pos="0">
+              <a:schemeClr val="phClr">
+                <a:tint val="50000"/>
+                <a:satMod val="300000"/>
+              </a:schemeClr>
+            </a:gs>
+            <a:gs pos="35000">
+              <a:schemeClr val="phClr">
+                <a:tint val="37000"/>
+                <a:satMod val="300000"/>
+              </a:schemeClr>
+            </a:gs>
+            <a:gs pos="100000">
+              <a:schemeClr val="phClr">
+                <a:tint val="15000"/>
+                <a:satMod val="350000"/>
+              </a:schemeClr>
+            </a:gs>
+          </a:gsLst>
+          <a:lin ang="16200000" scaled="1"/>
+        </a:gradFill>
+        <a:gradFill rotWithShape="1">
+          <a:gsLst>
+            <a:gs pos="0">
+              <a:schemeClr val="phClr">
+                <a:shade val="51000"/>
+                <a:satMod val="130000"/>
+              </a:schemeClr>
+            </a:gs>
+            <a:gs pos="80000">
+              <a:schemeClr val="phClr">
+                <a:shade val="93000"/>
+                <a:satMod val="130000"/>
+              </a:schemeClr>
+            </a:gs>
+            <a:gs pos="100000">
+              <a:schemeClr val="phClr">
+                <a:shade val="94000"/>
+                <a:satMod val="135000"/>
+              </a:schemeClr>
+            </a:gs>
+          </a:gsLst>
+          <a:lin ang="16200000" scaled="0"/>
+        </a:gradFill>
+      </a:fillStyleLst>
+      <a:lnStyleLst>
+        <a:ln w="9525" cap="flat" cmpd="sng" algn="ctr">
+          <a:solidFill>
+            <a:schemeClr val="phClr">
+              <a:shade val="95000"/>
+              <a:satMod val="105000"/>
+            </a:schemeClr>
+          </a:solidFill>
+          <a:prstDash val="solid"/>
+        </a:ln>
+        <a:ln w="25400" cap="flat" cmpd="sng" algn="ctr">
+          <a:solidFill>
+            <a:schemeClr val="phClr"/>
+          </a:solidFill>
+          <a:prstDash val="solid"/>
+        </a:ln>
+        <a:ln w="38100" cap="flat" cmpd="sng" algn="ctr">
+          <a:solidFill>
+            <a:schemeClr val="phClr"/>
+          </a:solidFill>
+          <a:prstDash val="solid"/>
+        </a:ln>
+      </a:lnStyleLst>
+      <a:effectStyleLst>
+        <a:effectStyle>
+          <a:effectLst>
+            <a:outerShdw blurRad="40000" dist="20000" dir="5400000" rotWithShape="0">
+              <a:srgbClr val="000000">
+                <a:alpha val="38000"/>
+              </a:srgbClr>
+            </a:outerShdw>
+          </a:effectLst>
+        </a:effectStyle>
+        <a:effectStyle>
+          <a:effectLst>
+            <a:outerShdw blurRad="40000" dist="23000" dir="5400000" rotWithShape="0">
+              <a:srgbClr val="000000">
+                <a:alpha val="35000"/>
+              </a:srgbClr>
+            </a:outerShdw>
+          </a:effectLst>
+        </a:effectStyle>
+        <a:effectStyle>
+          <a:effectLst>
+            <a:outerShdw blurRad="40000" dist="23000" dir="5400000" rotWithShape="0">
+              <a:srgbClr val="000000">
+                <a:alpha val="35000"/>
+              </a:srgbClr>
+            </a:outerShdw>
+          </a:effectLst>
+          <a:scene3d>
+            <a:camera prst="orthographicFront">
+              <a:rot lat="0" lon="0" rev="0"/>
+            </a:camera>
+            <a:lightRig rig="threePt" dir="t">
+              <a:rot lat="0" lon="0" rev="1200000"/>
+            </a:lightRig>
+          </a:scene3d>
+          <a:sp3d>
+            <a:bevelT w="63500" h="25400"/>
+          </a:sp3d>
+        </a:effectStyle>
+      </a:effectStyleLst>
+      <a:bgFillStyleLst>
+        <a:solidFill>
+          <a:schemeClr val="phClr"/>
+        </a:solidFill>
+        <a:gradFill rotWithShape="1">
+          <a:gsLst>
+            <a:gs pos="0">
+              <a:schemeClr val="phClr">
+                <a:tint val="40000"/>
+                <a:satMod val="350000"/>
+              </a:schemeClr>
+            </a:gs>
+            <a:gs pos="40000">
+              <a:schemeClr val="phClr">
+                <a:tint val="45000"/>
+                <a:shade val="99000"/>
+                <a:satMod val="350000"/>
+              </a:schemeClr>
+            </a:gs>
+            <a:gs pos="100000">
+              <a:schemeClr val="phClr">
+                <a:shade val="20000"/>
+                <a:satMod val="255000"/>
+              </a:schemeClr>
+            </a:gs>
+          </a:gsLst>
+          <a:path path="circle">
+            <a:fillToRect l="50000" t="-80000" r="50000" b="180000"/>
+          </a:path>
+        </a:gradFill>
+        <a:gradFill rotWithShape="1">
+          <a:gsLst>
+            <a:gs pos="0">
+              <a:schemeClr val="phClr">
+                <a:tint val="80000"/>
+                <a:satMod val="300000"/>
+              </a:schemeClr>
+            </a:gs>
+            <a:gs pos="100000">
+              <a:schemeClr val="phClr">
+                <a:shade val="30000"/>
+                <a:satMod val="200000"/>
+              </a:schemeClr>
+            </a:gs>
+          </a:gsLst>
+          <a:path path="circle">
+            <a:fillToRect l="50000" t="50000" r="50000" b="50000"/>
+          </a:path>
+        </a:gradFill>
+      </a:bgFillStyleLst>
+    </a:fmtScheme>
+  </a:themeElements>
+  <a:objectDefaults/>
+  <a:extraClrSchemeLst/>
+</a:theme>
 </file>
</xml_diff>

<commit_message>
Continuing Issue 310 [Allow apostrophe in student names] Update Issue 310 merged with default Tweaked the regular expression in instructor.js
</commit_message>
<xml_diff>
--- a/doc/diagrams/packageDiagram.pptx
+++ b/doc/diagrams/packageDiagram.pptx
@@ -4,17 +4,20 @@
   <p:sldMasterIdLst>
     <p:sldMasterId id="2147483648" r:id="rId1"/>
   </p:sldMasterIdLst>
+  <p:notesMasterIdLst>
+    <p:notesMasterId r:id="rId3"/>
+  </p:notesMasterIdLst>
   <p:sldIdLst>
     <p:sldId id="256" r:id="rId2"/>
   </p:sldIdLst>
-  <p:sldSz cx="9144000" cy="6858000" type="screen4x3"/>
+  <p:sldSz cx="8640763" cy="6300788"/>
   <p:notesSz cx="6858000" cy="9144000"/>
   <p:defaultTextStyle>
     <a:defPPr>
       <a:defRPr lang="en-US"/>
     </a:defPPr>
-    <a:lvl1pPr marL="0" algn="l" defTabSz="914400" rtl="0" eaLnBrk="1" latinLnBrk="0" hangingPunct="1">
-      <a:defRPr sz="1800" kern="1200">
+    <a:lvl1pPr marL="0" algn="l" defTabSz="853775" rtl="0" eaLnBrk="1" latinLnBrk="0" hangingPunct="1">
+      <a:defRPr sz="1700" kern="1200">
         <a:solidFill>
           <a:schemeClr val="tx1"/>
         </a:solidFill>
@@ -23,8 +26,8 @@
         <a:cs typeface="+mn-cs"/>
       </a:defRPr>
     </a:lvl1pPr>
-    <a:lvl2pPr marL="457200" algn="l" defTabSz="914400" rtl="0" eaLnBrk="1" latinLnBrk="0" hangingPunct="1">
-      <a:defRPr sz="1800" kern="1200">
+    <a:lvl2pPr marL="426888" algn="l" defTabSz="853775" rtl="0" eaLnBrk="1" latinLnBrk="0" hangingPunct="1">
+      <a:defRPr sz="1700" kern="1200">
         <a:solidFill>
           <a:schemeClr val="tx1"/>
         </a:solidFill>
@@ -33,8 +36,8 @@
         <a:cs typeface="+mn-cs"/>
       </a:defRPr>
     </a:lvl2pPr>
-    <a:lvl3pPr marL="914400" algn="l" defTabSz="914400" rtl="0" eaLnBrk="1" latinLnBrk="0" hangingPunct="1">
-      <a:defRPr sz="1800" kern="1200">
+    <a:lvl3pPr marL="853775" algn="l" defTabSz="853775" rtl="0" eaLnBrk="1" latinLnBrk="0" hangingPunct="1">
+      <a:defRPr sz="1700" kern="1200">
         <a:solidFill>
           <a:schemeClr val="tx1"/>
         </a:solidFill>
@@ -43,8 +46,8 @@
         <a:cs typeface="+mn-cs"/>
       </a:defRPr>
     </a:lvl3pPr>
-    <a:lvl4pPr marL="1371600" algn="l" defTabSz="914400" rtl="0" eaLnBrk="1" latinLnBrk="0" hangingPunct="1">
-      <a:defRPr sz="1800" kern="1200">
+    <a:lvl4pPr marL="1280663" algn="l" defTabSz="853775" rtl="0" eaLnBrk="1" latinLnBrk="0" hangingPunct="1">
+      <a:defRPr sz="1700" kern="1200">
         <a:solidFill>
           <a:schemeClr val="tx1"/>
         </a:solidFill>
@@ -53,8 +56,8 @@
         <a:cs typeface="+mn-cs"/>
       </a:defRPr>
     </a:lvl4pPr>
-    <a:lvl5pPr marL="1828800" algn="l" defTabSz="914400" rtl="0" eaLnBrk="1" latinLnBrk="0" hangingPunct="1">
-      <a:defRPr sz="1800" kern="1200">
+    <a:lvl5pPr marL="1707551" algn="l" defTabSz="853775" rtl="0" eaLnBrk="1" latinLnBrk="0" hangingPunct="1">
+      <a:defRPr sz="1700" kern="1200">
         <a:solidFill>
           <a:schemeClr val="tx1"/>
         </a:solidFill>
@@ -63,8 +66,8 @@
         <a:cs typeface="+mn-cs"/>
       </a:defRPr>
     </a:lvl5pPr>
-    <a:lvl6pPr marL="2286000" algn="l" defTabSz="914400" rtl="0" eaLnBrk="1" latinLnBrk="0" hangingPunct="1">
-      <a:defRPr sz="1800" kern="1200">
+    <a:lvl6pPr marL="2134438" algn="l" defTabSz="853775" rtl="0" eaLnBrk="1" latinLnBrk="0" hangingPunct="1">
+      <a:defRPr sz="1700" kern="1200">
         <a:solidFill>
           <a:schemeClr val="tx1"/>
         </a:solidFill>
@@ -73,8 +76,8 @@
         <a:cs typeface="+mn-cs"/>
       </a:defRPr>
     </a:lvl6pPr>
-    <a:lvl7pPr marL="2743200" algn="l" defTabSz="914400" rtl="0" eaLnBrk="1" latinLnBrk="0" hangingPunct="1">
-      <a:defRPr sz="1800" kern="1200">
+    <a:lvl7pPr marL="2561326" algn="l" defTabSz="853775" rtl="0" eaLnBrk="1" latinLnBrk="0" hangingPunct="1">
+      <a:defRPr sz="1700" kern="1200">
         <a:solidFill>
           <a:schemeClr val="tx1"/>
         </a:solidFill>
@@ -83,8 +86,8 @@
         <a:cs typeface="+mn-cs"/>
       </a:defRPr>
     </a:lvl7pPr>
-    <a:lvl8pPr marL="3200400" algn="l" defTabSz="914400" rtl="0" eaLnBrk="1" latinLnBrk="0" hangingPunct="1">
-      <a:defRPr sz="1800" kern="1200">
+    <a:lvl8pPr marL="2988213" algn="l" defTabSz="853775" rtl="0" eaLnBrk="1" latinLnBrk="0" hangingPunct="1">
+      <a:defRPr sz="1700" kern="1200">
         <a:solidFill>
           <a:schemeClr val="tx1"/>
         </a:solidFill>
@@ -93,8 +96,8 @@
         <a:cs typeface="+mn-cs"/>
       </a:defRPr>
     </a:lvl8pPr>
-    <a:lvl9pPr marL="3657600" algn="l" defTabSz="914400" rtl="0" eaLnBrk="1" latinLnBrk="0" hangingPunct="1">
-      <a:defRPr sz="1800" kern="1200">
+    <a:lvl9pPr marL="3415101" algn="l" defTabSz="853775" rtl="0" eaLnBrk="1" latinLnBrk="0" hangingPunct="1">
+      <a:defRPr sz="1700" kern="1200">
         <a:solidFill>
           <a:schemeClr val="tx1"/>
         </a:solidFill>
@@ -105,6 +108,445 @@
     </a:lvl9pPr>
   </p:defaultTextStyle>
 </p:presentation>
+</file>
+
+<file path=ppt/notesMasters/notesMaster1.xml><?xml version="1.0" encoding="utf-8"?>
+<p:notesMaster xmlns:a="http://schemas.openxmlformats.org/drawingml/2006/main" xmlns:r="http://schemas.openxmlformats.org/officeDocument/2006/relationships" xmlns:p="http://schemas.openxmlformats.org/presentationml/2006/main">
+  <p:cSld>
+    <p:bg>
+      <p:bgRef idx="1001">
+        <a:schemeClr val="bg1"/>
+      </p:bgRef>
+    </p:bg>
+    <p:spTree>
+      <p:nvGrpSpPr>
+        <p:cNvPr id="1" name=""/>
+        <p:cNvGrpSpPr/>
+        <p:nvPr/>
+      </p:nvGrpSpPr>
+      <p:grpSpPr>
+        <a:xfrm>
+          <a:off x="0" y="0"/>
+          <a:ext cx="0" cy="0"/>
+          <a:chOff x="0" y="0"/>
+          <a:chExt cx="0" cy="0"/>
+        </a:xfrm>
+      </p:grpSpPr>
+      <p:sp>
+        <p:nvSpPr>
+          <p:cNvPr id="2" name="Header Placeholder 1"/>
+          <p:cNvSpPr>
+            <a:spLocks noGrp="1"/>
+          </p:cNvSpPr>
+          <p:nvPr>
+            <p:ph type="hdr" sz="quarter"/>
+          </p:nvPr>
+        </p:nvSpPr>
+        <p:spPr>
+          <a:xfrm>
+            <a:off x="0" y="0"/>
+            <a:ext cx="2971800" cy="457200"/>
+          </a:xfrm>
+          <a:prstGeom prst="rect">
+            <a:avLst/>
+          </a:prstGeom>
+        </p:spPr>
+        <p:txBody>
+          <a:bodyPr vert="horz" lIns="91440" tIns="45720" rIns="91440" bIns="45720" rtlCol="0"/>
+          <a:lstStyle>
+            <a:lvl1pPr algn="l">
+              <a:defRPr sz="1200"/>
+            </a:lvl1pPr>
+          </a:lstStyle>
+          <a:p>
+            <a:endParaRPr lang="en-SG"/>
+          </a:p>
+        </p:txBody>
+      </p:sp>
+      <p:sp>
+        <p:nvSpPr>
+          <p:cNvPr id="3" name="Date Placeholder 2"/>
+          <p:cNvSpPr>
+            <a:spLocks noGrp="1"/>
+          </p:cNvSpPr>
+          <p:nvPr>
+            <p:ph type="dt" idx="1"/>
+          </p:nvPr>
+        </p:nvSpPr>
+        <p:spPr>
+          <a:xfrm>
+            <a:off x="3884613" y="0"/>
+            <a:ext cx="2971800" cy="457200"/>
+          </a:xfrm>
+          <a:prstGeom prst="rect">
+            <a:avLst/>
+          </a:prstGeom>
+        </p:spPr>
+        <p:txBody>
+          <a:bodyPr vert="horz" lIns="91440" tIns="45720" rIns="91440" bIns="45720" rtlCol="0"/>
+          <a:lstStyle>
+            <a:lvl1pPr algn="r">
+              <a:defRPr sz="1200"/>
+            </a:lvl1pPr>
+          </a:lstStyle>
+          <a:p>
+            <a:fld id="{5D8FA8FF-20DC-44E5-8C35-13EAF0A5698C}" type="datetimeFigureOut">
+              <a:rPr lang="en-SG" smtClean="0"/>
+              <a:t>18/12/2012</a:t>
+            </a:fld>
+            <a:endParaRPr lang="en-SG"/>
+          </a:p>
+        </p:txBody>
+      </p:sp>
+      <p:sp>
+        <p:nvSpPr>
+          <p:cNvPr id="4" name="Slide Image Placeholder 3"/>
+          <p:cNvSpPr>
+            <a:spLocks noGrp="1" noRot="1" noChangeAspect="1"/>
+          </p:cNvSpPr>
+          <p:nvPr>
+            <p:ph type="sldImg" idx="2"/>
+          </p:nvPr>
+        </p:nvSpPr>
+        <p:spPr>
+          <a:xfrm>
+            <a:off x="1077913" y="685800"/>
+            <a:ext cx="4702175" cy="3429000"/>
+          </a:xfrm>
+          <a:prstGeom prst="rect">
+            <a:avLst/>
+          </a:prstGeom>
+          <a:noFill/>
+          <a:ln w="12700">
+            <a:solidFill>
+              <a:prstClr val="black"/>
+            </a:solidFill>
+          </a:ln>
+        </p:spPr>
+        <p:txBody>
+          <a:bodyPr vert="horz" lIns="91440" tIns="45720" rIns="91440" bIns="45720" rtlCol="0" anchor="ctr"/>
+          <a:lstStyle/>
+          <a:p>
+            <a:endParaRPr lang="en-SG"/>
+          </a:p>
+        </p:txBody>
+      </p:sp>
+      <p:sp>
+        <p:nvSpPr>
+          <p:cNvPr id="5" name="Notes Placeholder 4"/>
+          <p:cNvSpPr>
+            <a:spLocks noGrp="1"/>
+          </p:cNvSpPr>
+          <p:nvPr>
+            <p:ph type="body" sz="quarter" idx="3"/>
+          </p:nvPr>
+        </p:nvSpPr>
+        <p:spPr>
+          <a:xfrm>
+            <a:off x="685800" y="4343400"/>
+            <a:ext cx="5486400" cy="4114800"/>
+          </a:xfrm>
+          <a:prstGeom prst="rect">
+            <a:avLst/>
+          </a:prstGeom>
+        </p:spPr>
+        <p:txBody>
+          <a:bodyPr vert="horz" lIns="91440" tIns="45720" rIns="91440" bIns="45720" rtlCol="0"/>
+          <a:lstStyle/>
+          <a:p>
+            <a:pPr lvl="0"/>
+            <a:r>
+              <a:rPr lang="en-US" smtClean="0"/>
+              <a:t>Click to edit Master text styles</a:t>
+            </a:r>
+          </a:p>
+          <a:p>
+            <a:pPr lvl="1"/>
+            <a:r>
+              <a:rPr lang="en-US" smtClean="0"/>
+              <a:t>Second level</a:t>
+            </a:r>
+          </a:p>
+          <a:p>
+            <a:pPr lvl="2"/>
+            <a:r>
+              <a:rPr lang="en-US" smtClean="0"/>
+              <a:t>Third level</a:t>
+            </a:r>
+          </a:p>
+          <a:p>
+            <a:pPr lvl="3"/>
+            <a:r>
+              <a:rPr lang="en-US" smtClean="0"/>
+              <a:t>Fourth level</a:t>
+            </a:r>
+          </a:p>
+          <a:p>
+            <a:pPr lvl="4"/>
+            <a:r>
+              <a:rPr lang="en-US" smtClean="0"/>
+              <a:t>Fifth level</a:t>
+            </a:r>
+            <a:endParaRPr lang="en-SG"/>
+          </a:p>
+        </p:txBody>
+      </p:sp>
+      <p:sp>
+        <p:nvSpPr>
+          <p:cNvPr id="6" name="Footer Placeholder 5"/>
+          <p:cNvSpPr>
+            <a:spLocks noGrp="1"/>
+          </p:cNvSpPr>
+          <p:nvPr>
+            <p:ph type="ftr" sz="quarter" idx="4"/>
+          </p:nvPr>
+        </p:nvSpPr>
+        <p:spPr>
+          <a:xfrm>
+            <a:off x="0" y="8685213"/>
+            <a:ext cx="2971800" cy="457200"/>
+          </a:xfrm>
+          <a:prstGeom prst="rect">
+            <a:avLst/>
+          </a:prstGeom>
+        </p:spPr>
+        <p:txBody>
+          <a:bodyPr vert="horz" lIns="91440" tIns="45720" rIns="91440" bIns="45720" rtlCol="0" anchor="b"/>
+          <a:lstStyle>
+            <a:lvl1pPr algn="l">
+              <a:defRPr sz="1200"/>
+            </a:lvl1pPr>
+          </a:lstStyle>
+          <a:p>
+            <a:endParaRPr lang="en-SG"/>
+          </a:p>
+        </p:txBody>
+      </p:sp>
+      <p:sp>
+        <p:nvSpPr>
+          <p:cNvPr id="7" name="Slide Number Placeholder 6"/>
+          <p:cNvSpPr>
+            <a:spLocks noGrp="1"/>
+          </p:cNvSpPr>
+          <p:nvPr>
+            <p:ph type="sldNum" sz="quarter" idx="5"/>
+          </p:nvPr>
+        </p:nvSpPr>
+        <p:spPr>
+          <a:xfrm>
+            <a:off x="3884613" y="8685213"/>
+            <a:ext cx="2971800" cy="457200"/>
+          </a:xfrm>
+          <a:prstGeom prst="rect">
+            <a:avLst/>
+          </a:prstGeom>
+        </p:spPr>
+        <p:txBody>
+          <a:bodyPr vert="horz" lIns="91440" tIns="45720" rIns="91440" bIns="45720" rtlCol="0" anchor="b"/>
+          <a:lstStyle>
+            <a:lvl1pPr algn="r">
+              <a:defRPr sz="1200"/>
+            </a:lvl1pPr>
+          </a:lstStyle>
+          <a:p>
+            <a:fld id="{533A5AA4-18D7-48CB-8D4B-C9F7395BD002}" type="slidenum">
+              <a:rPr lang="en-SG" smtClean="0"/>
+              <a:t>‹#›</a:t>
+            </a:fld>
+            <a:endParaRPr lang="en-SG"/>
+          </a:p>
+        </p:txBody>
+      </p:sp>
+    </p:spTree>
+    <p:extLst>
+      <p:ext uri="{BB962C8B-B14F-4D97-AF65-F5344CB8AC3E}">
+        <p14:creationId xmlns:p14="http://schemas.microsoft.com/office/powerpoint/2010/main" val="2591710806"/>
+      </p:ext>
+    </p:extLst>
+  </p:cSld>
+  <p:clrMap bg1="lt1" tx1="dk1" bg2="lt2" tx2="dk2" accent1="accent1" accent2="accent2" accent3="accent3" accent4="accent4" accent5="accent5" accent6="accent6" hlink="hlink" folHlink="folHlink"/>
+  <p:notesStyle>
+    <a:lvl1pPr marL="0" algn="l" defTabSz="853775" rtl="0" eaLnBrk="1" latinLnBrk="0" hangingPunct="1">
+      <a:defRPr sz="1100" kern="1200">
+        <a:solidFill>
+          <a:schemeClr val="tx1"/>
+        </a:solidFill>
+        <a:latin typeface="+mn-lt"/>
+        <a:ea typeface="+mn-ea"/>
+        <a:cs typeface="+mn-cs"/>
+      </a:defRPr>
+    </a:lvl1pPr>
+    <a:lvl2pPr marL="426888" algn="l" defTabSz="853775" rtl="0" eaLnBrk="1" latinLnBrk="0" hangingPunct="1">
+      <a:defRPr sz="1100" kern="1200">
+        <a:solidFill>
+          <a:schemeClr val="tx1"/>
+        </a:solidFill>
+        <a:latin typeface="+mn-lt"/>
+        <a:ea typeface="+mn-ea"/>
+        <a:cs typeface="+mn-cs"/>
+      </a:defRPr>
+    </a:lvl2pPr>
+    <a:lvl3pPr marL="853775" algn="l" defTabSz="853775" rtl="0" eaLnBrk="1" latinLnBrk="0" hangingPunct="1">
+      <a:defRPr sz="1100" kern="1200">
+        <a:solidFill>
+          <a:schemeClr val="tx1"/>
+        </a:solidFill>
+        <a:latin typeface="+mn-lt"/>
+        <a:ea typeface="+mn-ea"/>
+        <a:cs typeface="+mn-cs"/>
+      </a:defRPr>
+    </a:lvl3pPr>
+    <a:lvl4pPr marL="1280663" algn="l" defTabSz="853775" rtl="0" eaLnBrk="1" latinLnBrk="0" hangingPunct="1">
+      <a:defRPr sz="1100" kern="1200">
+        <a:solidFill>
+          <a:schemeClr val="tx1"/>
+        </a:solidFill>
+        <a:latin typeface="+mn-lt"/>
+        <a:ea typeface="+mn-ea"/>
+        <a:cs typeface="+mn-cs"/>
+      </a:defRPr>
+    </a:lvl4pPr>
+    <a:lvl5pPr marL="1707551" algn="l" defTabSz="853775" rtl="0" eaLnBrk="1" latinLnBrk="0" hangingPunct="1">
+      <a:defRPr sz="1100" kern="1200">
+        <a:solidFill>
+          <a:schemeClr val="tx1"/>
+        </a:solidFill>
+        <a:latin typeface="+mn-lt"/>
+        <a:ea typeface="+mn-ea"/>
+        <a:cs typeface="+mn-cs"/>
+      </a:defRPr>
+    </a:lvl5pPr>
+    <a:lvl6pPr marL="2134438" algn="l" defTabSz="853775" rtl="0" eaLnBrk="1" latinLnBrk="0" hangingPunct="1">
+      <a:defRPr sz="1100" kern="1200">
+        <a:solidFill>
+          <a:schemeClr val="tx1"/>
+        </a:solidFill>
+        <a:latin typeface="+mn-lt"/>
+        <a:ea typeface="+mn-ea"/>
+        <a:cs typeface="+mn-cs"/>
+      </a:defRPr>
+    </a:lvl6pPr>
+    <a:lvl7pPr marL="2561326" algn="l" defTabSz="853775" rtl="0" eaLnBrk="1" latinLnBrk="0" hangingPunct="1">
+      <a:defRPr sz="1100" kern="1200">
+        <a:solidFill>
+          <a:schemeClr val="tx1"/>
+        </a:solidFill>
+        <a:latin typeface="+mn-lt"/>
+        <a:ea typeface="+mn-ea"/>
+        <a:cs typeface="+mn-cs"/>
+      </a:defRPr>
+    </a:lvl7pPr>
+    <a:lvl8pPr marL="2988213" algn="l" defTabSz="853775" rtl="0" eaLnBrk="1" latinLnBrk="0" hangingPunct="1">
+      <a:defRPr sz="1100" kern="1200">
+        <a:solidFill>
+          <a:schemeClr val="tx1"/>
+        </a:solidFill>
+        <a:latin typeface="+mn-lt"/>
+        <a:ea typeface="+mn-ea"/>
+        <a:cs typeface="+mn-cs"/>
+      </a:defRPr>
+    </a:lvl8pPr>
+    <a:lvl9pPr marL="3415101" algn="l" defTabSz="853775" rtl="0" eaLnBrk="1" latinLnBrk="0" hangingPunct="1">
+      <a:defRPr sz="1100" kern="1200">
+        <a:solidFill>
+          <a:schemeClr val="tx1"/>
+        </a:solidFill>
+        <a:latin typeface="+mn-lt"/>
+        <a:ea typeface="+mn-ea"/>
+        <a:cs typeface="+mn-cs"/>
+      </a:defRPr>
+    </a:lvl9pPr>
+  </p:notesStyle>
+</p:notesMaster>
+</file>
+
+<file path=ppt/notesSlides/notesSlide1.xml><?xml version="1.0" encoding="utf-8"?>
+<p:notes xmlns:a="http://schemas.openxmlformats.org/drawingml/2006/main" xmlns:r="http://schemas.openxmlformats.org/officeDocument/2006/relationships" xmlns:p="http://schemas.openxmlformats.org/presentationml/2006/main">
+  <p:cSld>
+    <p:spTree>
+      <p:nvGrpSpPr>
+        <p:cNvPr id="1" name=""/>
+        <p:cNvGrpSpPr/>
+        <p:nvPr/>
+      </p:nvGrpSpPr>
+      <p:grpSpPr>
+        <a:xfrm>
+          <a:off x="0" y="0"/>
+          <a:ext cx="0" cy="0"/>
+          <a:chOff x="0" y="0"/>
+          <a:chExt cx="0" cy="0"/>
+        </a:xfrm>
+      </p:grpSpPr>
+      <p:sp>
+        <p:nvSpPr>
+          <p:cNvPr id="2" name="Slide Image Placeholder 1"/>
+          <p:cNvSpPr>
+            <a:spLocks noGrp="1" noRot="1" noChangeAspect="1"/>
+          </p:cNvSpPr>
+          <p:nvPr>
+            <p:ph type="sldImg"/>
+          </p:nvPr>
+        </p:nvSpPr>
+        <p:spPr>
+          <a:xfrm>
+            <a:off x="1077913" y="685800"/>
+            <a:ext cx="4702175" cy="3429000"/>
+          </a:xfrm>
+        </p:spPr>
+      </p:sp>
+      <p:sp>
+        <p:nvSpPr>
+          <p:cNvPr id="3" name="Notes Placeholder 2"/>
+          <p:cNvSpPr>
+            <a:spLocks noGrp="1"/>
+          </p:cNvSpPr>
+          <p:nvPr>
+            <p:ph type="body" idx="1"/>
+          </p:nvPr>
+        </p:nvSpPr>
+        <p:spPr/>
+        <p:txBody>
+          <a:bodyPr/>
+          <a:lstStyle/>
+          <a:p>
+            <a:endParaRPr lang="en-SG" dirty="0"/>
+          </a:p>
+        </p:txBody>
+      </p:sp>
+      <p:sp>
+        <p:nvSpPr>
+          <p:cNvPr id="4" name="Slide Number Placeholder 3"/>
+          <p:cNvSpPr>
+            <a:spLocks noGrp="1"/>
+          </p:cNvSpPr>
+          <p:nvPr>
+            <p:ph type="sldNum" sz="quarter" idx="10"/>
+          </p:nvPr>
+        </p:nvSpPr>
+        <p:spPr/>
+        <p:txBody>
+          <a:bodyPr/>
+          <a:lstStyle/>
+          <a:p>
+            <a:fld id="{533A5AA4-18D7-48CB-8D4B-C9F7395BD002}" type="slidenum">
+              <a:rPr lang="en-SG" smtClean="0"/>
+              <a:t>1</a:t>
+            </a:fld>
+            <a:endParaRPr lang="en-SG"/>
+          </a:p>
+        </p:txBody>
+      </p:sp>
+    </p:spTree>
+    <p:extLst>
+      <p:ext uri="{BB962C8B-B14F-4D97-AF65-F5344CB8AC3E}">
+        <p14:creationId xmlns:p14="http://schemas.microsoft.com/office/powerpoint/2010/main" val="3432613659"/>
+      </p:ext>
+    </p:extLst>
+  </p:cSld>
+  <p:clrMapOvr>
+    <a:masterClrMapping/>
+  </p:clrMapOvr>
+</p:notes>
 </file>
 
 <file path=ppt/slideLayouts/slideLayout1.xml><?xml version="1.0" encoding="utf-8"?>
@@ -136,8 +578,8 @@
         </p:nvSpPr>
         <p:spPr>
           <a:xfrm>
-            <a:off x="685800" y="2130425"/>
-            <a:ext cx="7772400" cy="1470025"/>
+            <a:off x="648057" y="1957328"/>
+            <a:ext cx="7344649" cy="1350586"/>
           </a:xfrm>
         </p:spPr>
         <p:txBody>
@@ -164,8 +606,8 @@
         </p:nvSpPr>
         <p:spPr>
           <a:xfrm>
-            <a:off x="1371600" y="3886200"/>
-            <a:ext cx="6400800" cy="1752600"/>
+            <a:off x="1296115" y="3570447"/>
+            <a:ext cx="6048534" cy="1610201"/>
           </a:xfrm>
         </p:spPr>
         <p:txBody>
@@ -181,7 +623,7 @@
                 </a:solidFill>
               </a:defRPr>
             </a:lvl1pPr>
-            <a:lvl2pPr marL="457200" indent="0" algn="ctr">
+            <a:lvl2pPr marL="426888" indent="0" algn="ctr">
               <a:buNone/>
               <a:defRPr>
                 <a:solidFill>
@@ -191,7 +633,7 @@
                 </a:solidFill>
               </a:defRPr>
             </a:lvl2pPr>
-            <a:lvl3pPr marL="914400" indent="0" algn="ctr">
+            <a:lvl3pPr marL="853775" indent="0" algn="ctr">
               <a:buNone/>
               <a:defRPr>
                 <a:solidFill>
@@ -201,7 +643,7 @@
                 </a:solidFill>
               </a:defRPr>
             </a:lvl3pPr>
-            <a:lvl4pPr marL="1371600" indent="0" algn="ctr">
+            <a:lvl4pPr marL="1280663" indent="0" algn="ctr">
               <a:buNone/>
               <a:defRPr>
                 <a:solidFill>
@@ -211,7 +653,7 @@
                 </a:solidFill>
               </a:defRPr>
             </a:lvl4pPr>
-            <a:lvl5pPr marL="1828800" indent="0" algn="ctr">
+            <a:lvl5pPr marL="1707551" indent="0" algn="ctr">
               <a:buNone/>
               <a:defRPr>
                 <a:solidFill>
@@ -221,7 +663,7 @@
                 </a:solidFill>
               </a:defRPr>
             </a:lvl5pPr>
-            <a:lvl6pPr marL="2286000" indent="0" algn="ctr">
+            <a:lvl6pPr marL="2134438" indent="0" algn="ctr">
               <a:buNone/>
               <a:defRPr>
                 <a:solidFill>
@@ -231,7 +673,7 @@
                 </a:solidFill>
               </a:defRPr>
             </a:lvl6pPr>
-            <a:lvl7pPr marL="2743200" indent="0" algn="ctr">
+            <a:lvl7pPr marL="2561326" indent="0" algn="ctr">
               <a:buNone/>
               <a:defRPr>
                 <a:solidFill>
@@ -241,7 +683,7 @@
                 </a:solidFill>
               </a:defRPr>
             </a:lvl7pPr>
-            <a:lvl8pPr marL="3200400" indent="0" algn="ctr">
+            <a:lvl8pPr marL="2988213" indent="0" algn="ctr">
               <a:buNone/>
               <a:defRPr>
                 <a:solidFill>
@@ -251,7 +693,7 @@
                 </a:solidFill>
               </a:defRPr>
             </a:lvl8pPr>
-            <a:lvl9pPr marL="3657600" indent="0" algn="ctr">
+            <a:lvl9pPr marL="3415101" indent="0" algn="ctr">
               <a:buNone/>
               <a:defRPr>
                 <a:solidFill>
@@ -289,7 +731,7 @@
             <a:fld id="{1D8BD707-D9CF-40AE-B4C6-C98DA3205C09}" type="datetimeFigureOut">
               <a:rPr lang="en-US" smtClean="0"/>
               <a:pPr/>
-              <a:t>7/12/2012</a:t>
+              <a:t>12/18/2012</a:t>
             </a:fld>
             <a:endParaRPr lang="en-US"/>
           </a:p>
@@ -456,7 +898,7 @@
             <a:fld id="{1D8BD707-D9CF-40AE-B4C6-C98DA3205C09}" type="datetimeFigureOut">
               <a:rPr lang="en-US" smtClean="0"/>
               <a:pPr/>
-              <a:t>7/12/2012</a:t>
+              <a:t>12/18/2012</a:t>
             </a:fld>
             <a:endParaRPr lang="en-US"/>
           </a:p>
@@ -542,8 +984,8 @@
         </p:nvSpPr>
         <p:spPr>
           <a:xfrm>
-            <a:off x="6629400" y="274638"/>
-            <a:ext cx="2057400" cy="5851525"/>
+            <a:off x="6264553" y="252324"/>
+            <a:ext cx="1944172" cy="5376089"/>
           </a:xfrm>
         </p:spPr>
         <p:txBody>
@@ -570,8 +1012,8 @@
         </p:nvSpPr>
         <p:spPr>
           <a:xfrm>
-            <a:off x="457200" y="274638"/>
-            <a:ext cx="6019800" cy="5851525"/>
+            <a:off x="432038" y="252324"/>
+            <a:ext cx="5688502" cy="5376089"/>
           </a:xfrm>
         </p:spPr>
         <p:txBody>
@@ -633,7 +1075,7 @@
             <a:fld id="{1D8BD707-D9CF-40AE-B4C6-C98DA3205C09}" type="datetimeFigureOut">
               <a:rPr lang="en-US" smtClean="0"/>
               <a:pPr/>
-              <a:t>7/12/2012</a:t>
+              <a:t>12/18/2012</a:t>
             </a:fld>
             <a:endParaRPr lang="en-US"/>
           </a:p>
@@ -800,7 +1242,7 @@
             <a:fld id="{1D8BD707-D9CF-40AE-B4C6-C98DA3205C09}" type="datetimeFigureOut">
               <a:rPr lang="en-US" smtClean="0"/>
               <a:pPr/>
-              <a:t>7/12/2012</a:t>
+              <a:t>12/18/2012</a:t>
             </a:fld>
             <a:endParaRPr lang="en-US"/>
           </a:p>
@@ -886,15 +1328,15 @@
         </p:nvSpPr>
         <p:spPr>
           <a:xfrm>
-            <a:off x="722313" y="4406900"/>
-            <a:ext cx="7772400" cy="1362075"/>
+            <a:off x="682561" y="4048840"/>
+            <a:ext cx="7344649" cy="1251407"/>
           </a:xfrm>
         </p:spPr>
         <p:txBody>
           <a:bodyPr anchor="t"/>
           <a:lstStyle>
             <a:lvl1pPr algn="l">
-              <a:defRPr sz="4000" b="1" cap="all"/>
+              <a:defRPr sz="3700" b="1" cap="all"/>
             </a:lvl1pPr>
           </a:lstStyle>
           <a:p>
@@ -918,8 +1360,8 @@
         </p:nvSpPr>
         <p:spPr>
           <a:xfrm>
-            <a:off x="722313" y="2906713"/>
-            <a:ext cx="7772400" cy="1500187"/>
+            <a:off x="682561" y="2670543"/>
+            <a:ext cx="7344649" cy="1378297"/>
           </a:xfrm>
         </p:spPr>
         <p:txBody>
@@ -927,7 +1369,7 @@
           <a:lstStyle>
             <a:lvl1pPr marL="0" indent="0">
               <a:buNone/>
-              <a:defRPr sz="2000">
+              <a:defRPr sz="1900">
                 <a:solidFill>
                   <a:schemeClr val="tx1">
                     <a:tint val="75000"/>
@@ -935,9 +1377,9 @@
                 </a:solidFill>
               </a:defRPr>
             </a:lvl1pPr>
-            <a:lvl2pPr marL="457200" indent="0">
+            <a:lvl2pPr marL="426888" indent="0">
               <a:buNone/>
-              <a:defRPr sz="1800">
+              <a:defRPr sz="1700">
                 <a:solidFill>
                   <a:schemeClr val="tx1">
                     <a:tint val="75000"/>
@@ -945,9 +1387,9 @@
                 </a:solidFill>
               </a:defRPr>
             </a:lvl2pPr>
-            <a:lvl3pPr marL="914400" indent="0">
+            <a:lvl3pPr marL="853775" indent="0">
               <a:buNone/>
-              <a:defRPr sz="1600">
+              <a:defRPr sz="1500">
                 <a:solidFill>
                   <a:schemeClr val="tx1">
                     <a:tint val="75000"/>
@@ -955,9 +1397,9 @@
                 </a:solidFill>
               </a:defRPr>
             </a:lvl3pPr>
-            <a:lvl4pPr marL="1371600" indent="0">
+            <a:lvl4pPr marL="1280663" indent="0">
               <a:buNone/>
-              <a:defRPr sz="1400">
+              <a:defRPr sz="1300">
                 <a:solidFill>
                   <a:schemeClr val="tx1">
                     <a:tint val="75000"/>
@@ -965,9 +1407,9 @@
                 </a:solidFill>
               </a:defRPr>
             </a:lvl4pPr>
-            <a:lvl5pPr marL="1828800" indent="0">
+            <a:lvl5pPr marL="1707551" indent="0">
               <a:buNone/>
-              <a:defRPr sz="1400">
+              <a:defRPr sz="1300">
                 <a:solidFill>
                   <a:schemeClr val="tx1">
                     <a:tint val="75000"/>
@@ -975,9 +1417,9 @@
                 </a:solidFill>
               </a:defRPr>
             </a:lvl5pPr>
-            <a:lvl6pPr marL="2286000" indent="0">
+            <a:lvl6pPr marL="2134438" indent="0">
               <a:buNone/>
-              <a:defRPr sz="1400">
+              <a:defRPr sz="1300">
                 <a:solidFill>
                   <a:schemeClr val="tx1">
                     <a:tint val="75000"/>
@@ -985,9 +1427,9 @@
                 </a:solidFill>
               </a:defRPr>
             </a:lvl6pPr>
-            <a:lvl7pPr marL="2743200" indent="0">
+            <a:lvl7pPr marL="2561326" indent="0">
               <a:buNone/>
-              <a:defRPr sz="1400">
+              <a:defRPr sz="1300">
                 <a:solidFill>
                   <a:schemeClr val="tx1">
                     <a:tint val="75000"/>
@@ -995,9 +1437,9 @@
                 </a:solidFill>
               </a:defRPr>
             </a:lvl7pPr>
-            <a:lvl8pPr marL="3200400" indent="0">
+            <a:lvl8pPr marL="2988213" indent="0">
               <a:buNone/>
-              <a:defRPr sz="1400">
+              <a:defRPr sz="1300">
                 <a:solidFill>
                   <a:schemeClr val="tx1">
                     <a:tint val="75000"/>
@@ -1005,9 +1447,9 @@
                 </a:solidFill>
               </a:defRPr>
             </a:lvl8pPr>
-            <a:lvl9pPr marL="3657600" indent="0">
+            <a:lvl9pPr marL="3415101" indent="0">
               <a:buNone/>
-              <a:defRPr sz="1400">
+              <a:defRPr sz="1300">
                 <a:solidFill>
                   <a:schemeClr val="tx1">
                     <a:tint val="75000"/>
@@ -1043,7 +1485,7 @@
             <a:fld id="{1D8BD707-D9CF-40AE-B4C6-C98DA3205C09}" type="datetimeFigureOut">
               <a:rPr lang="en-US" smtClean="0"/>
               <a:pPr/>
-              <a:t>7/12/2012</a:t>
+              <a:t>12/18/2012</a:t>
             </a:fld>
             <a:endParaRPr lang="en-US"/>
           </a:p>
@@ -1152,39 +1594,39 @@
         </p:nvSpPr>
         <p:spPr>
           <a:xfrm>
-            <a:off x="457200" y="1600200"/>
-            <a:ext cx="4038600" cy="4525963"/>
+            <a:off x="432038" y="1470184"/>
+            <a:ext cx="3816337" cy="4158229"/>
           </a:xfrm>
         </p:spPr>
         <p:txBody>
           <a:bodyPr/>
           <a:lstStyle>
             <a:lvl1pPr>
-              <a:defRPr sz="2800"/>
+              <a:defRPr sz="2600"/>
             </a:lvl1pPr>
             <a:lvl2pPr>
-              <a:defRPr sz="2400"/>
+              <a:defRPr sz="2200"/>
             </a:lvl2pPr>
             <a:lvl3pPr>
-              <a:defRPr sz="2000"/>
+              <a:defRPr sz="1900"/>
             </a:lvl3pPr>
             <a:lvl4pPr>
-              <a:defRPr sz="1800"/>
+              <a:defRPr sz="1700"/>
             </a:lvl4pPr>
             <a:lvl5pPr>
-              <a:defRPr sz="1800"/>
+              <a:defRPr sz="1700"/>
             </a:lvl5pPr>
             <a:lvl6pPr>
-              <a:defRPr sz="1800"/>
+              <a:defRPr sz="1700"/>
             </a:lvl6pPr>
             <a:lvl7pPr>
-              <a:defRPr sz="1800"/>
+              <a:defRPr sz="1700"/>
             </a:lvl7pPr>
             <a:lvl8pPr>
-              <a:defRPr sz="1800"/>
+              <a:defRPr sz="1700"/>
             </a:lvl8pPr>
             <a:lvl9pPr>
-              <a:defRPr sz="1800"/>
+              <a:defRPr sz="1700"/>
             </a:lvl9pPr>
           </a:lstStyle>
           <a:p>
@@ -1237,39 +1679,39 @@
         </p:nvSpPr>
         <p:spPr>
           <a:xfrm>
-            <a:off x="4648200" y="1600200"/>
-            <a:ext cx="4038600" cy="4525963"/>
+            <a:off x="4392388" y="1470184"/>
+            <a:ext cx="3816337" cy="4158229"/>
           </a:xfrm>
         </p:spPr>
         <p:txBody>
           <a:bodyPr/>
           <a:lstStyle>
             <a:lvl1pPr>
-              <a:defRPr sz="2800"/>
+              <a:defRPr sz="2600"/>
             </a:lvl1pPr>
             <a:lvl2pPr>
-              <a:defRPr sz="2400"/>
+              <a:defRPr sz="2200"/>
             </a:lvl2pPr>
             <a:lvl3pPr>
-              <a:defRPr sz="2000"/>
+              <a:defRPr sz="1900"/>
             </a:lvl3pPr>
             <a:lvl4pPr>
-              <a:defRPr sz="1800"/>
+              <a:defRPr sz="1700"/>
             </a:lvl4pPr>
             <a:lvl5pPr>
-              <a:defRPr sz="1800"/>
+              <a:defRPr sz="1700"/>
             </a:lvl5pPr>
             <a:lvl6pPr>
-              <a:defRPr sz="1800"/>
+              <a:defRPr sz="1700"/>
             </a:lvl6pPr>
             <a:lvl7pPr>
-              <a:defRPr sz="1800"/>
+              <a:defRPr sz="1700"/>
             </a:lvl7pPr>
             <a:lvl8pPr>
-              <a:defRPr sz="1800"/>
+              <a:defRPr sz="1700"/>
             </a:lvl8pPr>
             <a:lvl9pPr>
-              <a:defRPr sz="1800"/>
+              <a:defRPr sz="1700"/>
             </a:lvl9pPr>
           </a:lstStyle>
           <a:p>
@@ -1328,7 +1770,7 @@
             <a:fld id="{1D8BD707-D9CF-40AE-B4C6-C98DA3205C09}" type="datetimeFigureOut">
               <a:rPr lang="en-US" smtClean="0"/>
               <a:pPr/>
-              <a:t>7/12/2012</a:t>
+              <a:t>12/18/2012</a:t>
             </a:fld>
             <a:endParaRPr lang="en-US"/>
           </a:p>
@@ -1441,8 +1883,8 @@
         </p:nvSpPr>
         <p:spPr>
           <a:xfrm>
-            <a:off x="457200" y="1535113"/>
-            <a:ext cx="4040188" cy="639762"/>
+            <a:off x="432038" y="1410385"/>
+            <a:ext cx="3817838" cy="587781"/>
           </a:xfrm>
         </p:spPr>
         <p:txBody>
@@ -1450,39 +1892,39 @@
           <a:lstStyle>
             <a:lvl1pPr marL="0" indent="0">
               <a:buNone/>
-              <a:defRPr sz="2400" b="1"/>
+              <a:defRPr sz="2200" b="1"/>
             </a:lvl1pPr>
-            <a:lvl2pPr marL="457200" indent="0">
+            <a:lvl2pPr marL="426888" indent="0">
               <a:buNone/>
-              <a:defRPr sz="2000" b="1"/>
+              <a:defRPr sz="1900" b="1"/>
             </a:lvl2pPr>
-            <a:lvl3pPr marL="914400" indent="0">
+            <a:lvl3pPr marL="853775" indent="0">
               <a:buNone/>
-              <a:defRPr sz="1800" b="1"/>
+              <a:defRPr sz="1700" b="1"/>
             </a:lvl3pPr>
-            <a:lvl4pPr marL="1371600" indent="0">
+            <a:lvl4pPr marL="1280663" indent="0">
               <a:buNone/>
-              <a:defRPr sz="1600" b="1"/>
+              <a:defRPr sz="1500" b="1"/>
             </a:lvl4pPr>
-            <a:lvl5pPr marL="1828800" indent="0">
+            <a:lvl5pPr marL="1707551" indent="0">
               <a:buNone/>
-              <a:defRPr sz="1600" b="1"/>
+              <a:defRPr sz="1500" b="1"/>
             </a:lvl5pPr>
-            <a:lvl6pPr marL="2286000" indent="0">
+            <a:lvl6pPr marL="2134438" indent="0">
               <a:buNone/>
-              <a:defRPr sz="1600" b="1"/>
+              <a:defRPr sz="1500" b="1"/>
             </a:lvl6pPr>
-            <a:lvl7pPr marL="2743200" indent="0">
+            <a:lvl7pPr marL="2561326" indent="0">
               <a:buNone/>
-              <a:defRPr sz="1600" b="1"/>
+              <a:defRPr sz="1500" b="1"/>
             </a:lvl7pPr>
-            <a:lvl8pPr marL="3200400" indent="0">
+            <a:lvl8pPr marL="2988213" indent="0">
               <a:buNone/>
-              <a:defRPr sz="1600" b="1"/>
+              <a:defRPr sz="1500" b="1"/>
             </a:lvl8pPr>
-            <a:lvl9pPr marL="3657600" indent="0">
+            <a:lvl9pPr marL="3415101" indent="0">
               <a:buNone/>
-              <a:defRPr sz="1600" b="1"/>
+              <a:defRPr sz="1500" b="1"/>
             </a:lvl9pPr>
           </a:lstStyle>
           <a:p>
@@ -1506,39 +1948,39 @@
         </p:nvSpPr>
         <p:spPr>
           <a:xfrm>
-            <a:off x="457200" y="2174875"/>
-            <a:ext cx="4040188" cy="3951288"/>
+            <a:off x="432038" y="1998167"/>
+            <a:ext cx="3817838" cy="3630246"/>
           </a:xfrm>
         </p:spPr>
         <p:txBody>
           <a:bodyPr/>
           <a:lstStyle>
             <a:lvl1pPr>
-              <a:defRPr sz="2400"/>
+              <a:defRPr sz="2200"/>
             </a:lvl1pPr>
             <a:lvl2pPr>
-              <a:defRPr sz="2000"/>
+              <a:defRPr sz="1900"/>
             </a:lvl2pPr>
             <a:lvl3pPr>
-              <a:defRPr sz="1800"/>
+              <a:defRPr sz="1700"/>
             </a:lvl3pPr>
             <a:lvl4pPr>
-              <a:defRPr sz="1600"/>
+              <a:defRPr sz="1500"/>
             </a:lvl4pPr>
             <a:lvl5pPr>
-              <a:defRPr sz="1600"/>
+              <a:defRPr sz="1500"/>
             </a:lvl5pPr>
             <a:lvl6pPr>
-              <a:defRPr sz="1600"/>
+              <a:defRPr sz="1500"/>
             </a:lvl6pPr>
             <a:lvl7pPr>
-              <a:defRPr sz="1600"/>
+              <a:defRPr sz="1500"/>
             </a:lvl7pPr>
             <a:lvl8pPr>
-              <a:defRPr sz="1600"/>
+              <a:defRPr sz="1500"/>
             </a:lvl8pPr>
             <a:lvl9pPr>
-              <a:defRPr sz="1600"/>
+              <a:defRPr sz="1500"/>
             </a:lvl9pPr>
           </a:lstStyle>
           <a:p>
@@ -1591,8 +2033,8 @@
         </p:nvSpPr>
         <p:spPr>
           <a:xfrm>
-            <a:off x="4645025" y="1535113"/>
-            <a:ext cx="4041775" cy="639762"/>
+            <a:off x="4389388" y="1410385"/>
+            <a:ext cx="3819337" cy="587781"/>
           </a:xfrm>
         </p:spPr>
         <p:txBody>
@@ -1600,39 +2042,39 @@
           <a:lstStyle>
             <a:lvl1pPr marL="0" indent="0">
               <a:buNone/>
-              <a:defRPr sz="2400" b="1"/>
+              <a:defRPr sz="2200" b="1"/>
             </a:lvl1pPr>
-            <a:lvl2pPr marL="457200" indent="0">
+            <a:lvl2pPr marL="426888" indent="0">
               <a:buNone/>
-              <a:defRPr sz="2000" b="1"/>
+              <a:defRPr sz="1900" b="1"/>
             </a:lvl2pPr>
-            <a:lvl3pPr marL="914400" indent="0">
+            <a:lvl3pPr marL="853775" indent="0">
               <a:buNone/>
-              <a:defRPr sz="1800" b="1"/>
+              <a:defRPr sz="1700" b="1"/>
             </a:lvl3pPr>
-            <a:lvl4pPr marL="1371600" indent="0">
+            <a:lvl4pPr marL="1280663" indent="0">
               <a:buNone/>
-              <a:defRPr sz="1600" b="1"/>
+              <a:defRPr sz="1500" b="1"/>
             </a:lvl4pPr>
-            <a:lvl5pPr marL="1828800" indent="0">
+            <a:lvl5pPr marL="1707551" indent="0">
               <a:buNone/>
-              <a:defRPr sz="1600" b="1"/>
+              <a:defRPr sz="1500" b="1"/>
             </a:lvl5pPr>
-            <a:lvl6pPr marL="2286000" indent="0">
+            <a:lvl6pPr marL="2134438" indent="0">
               <a:buNone/>
-              <a:defRPr sz="1600" b="1"/>
+              <a:defRPr sz="1500" b="1"/>
             </a:lvl6pPr>
-            <a:lvl7pPr marL="2743200" indent="0">
+            <a:lvl7pPr marL="2561326" indent="0">
               <a:buNone/>
-              <a:defRPr sz="1600" b="1"/>
+              <a:defRPr sz="1500" b="1"/>
             </a:lvl7pPr>
-            <a:lvl8pPr marL="3200400" indent="0">
+            <a:lvl8pPr marL="2988213" indent="0">
               <a:buNone/>
-              <a:defRPr sz="1600" b="1"/>
+              <a:defRPr sz="1500" b="1"/>
             </a:lvl8pPr>
-            <a:lvl9pPr marL="3657600" indent="0">
+            <a:lvl9pPr marL="3415101" indent="0">
               <a:buNone/>
-              <a:defRPr sz="1600" b="1"/>
+              <a:defRPr sz="1500" b="1"/>
             </a:lvl9pPr>
           </a:lstStyle>
           <a:p>
@@ -1656,39 +2098,39 @@
         </p:nvSpPr>
         <p:spPr>
           <a:xfrm>
-            <a:off x="4645025" y="2174875"/>
-            <a:ext cx="4041775" cy="3951288"/>
+            <a:off x="4389388" y="1998167"/>
+            <a:ext cx="3819337" cy="3630246"/>
           </a:xfrm>
         </p:spPr>
         <p:txBody>
           <a:bodyPr/>
           <a:lstStyle>
             <a:lvl1pPr>
-              <a:defRPr sz="2400"/>
+              <a:defRPr sz="2200"/>
             </a:lvl1pPr>
             <a:lvl2pPr>
-              <a:defRPr sz="2000"/>
+              <a:defRPr sz="1900"/>
             </a:lvl2pPr>
             <a:lvl3pPr>
-              <a:defRPr sz="1800"/>
+              <a:defRPr sz="1700"/>
             </a:lvl3pPr>
             <a:lvl4pPr>
-              <a:defRPr sz="1600"/>
+              <a:defRPr sz="1500"/>
             </a:lvl4pPr>
             <a:lvl5pPr>
-              <a:defRPr sz="1600"/>
+              <a:defRPr sz="1500"/>
             </a:lvl5pPr>
             <a:lvl6pPr>
-              <a:defRPr sz="1600"/>
+              <a:defRPr sz="1500"/>
             </a:lvl6pPr>
             <a:lvl7pPr>
-              <a:defRPr sz="1600"/>
+              <a:defRPr sz="1500"/>
             </a:lvl7pPr>
             <a:lvl8pPr>
-              <a:defRPr sz="1600"/>
+              <a:defRPr sz="1500"/>
             </a:lvl8pPr>
             <a:lvl9pPr>
-              <a:defRPr sz="1600"/>
+              <a:defRPr sz="1500"/>
             </a:lvl9pPr>
           </a:lstStyle>
           <a:p>
@@ -1747,7 +2189,7 @@
             <a:fld id="{1D8BD707-D9CF-40AE-B4C6-C98DA3205C09}" type="datetimeFigureOut">
               <a:rPr lang="en-US" smtClean="0"/>
               <a:pPr/>
-              <a:t>7/12/2012</a:t>
+              <a:t>12/18/2012</a:t>
             </a:fld>
             <a:endParaRPr lang="en-US"/>
           </a:p>
@@ -1862,7 +2304,7 @@
             <a:fld id="{1D8BD707-D9CF-40AE-B4C6-C98DA3205C09}" type="datetimeFigureOut">
               <a:rPr lang="en-US" smtClean="0"/>
               <a:pPr/>
-              <a:t>7/12/2012</a:t>
+              <a:t>12/18/2012</a:t>
             </a:fld>
             <a:endParaRPr lang="en-US"/>
           </a:p>
@@ -1954,7 +2396,7 @@
             <a:fld id="{1D8BD707-D9CF-40AE-B4C6-C98DA3205C09}" type="datetimeFigureOut">
               <a:rPr lang="en-US" smtClean="0"/>
               <a:pPr/>
-              <a:t>7/12/2012</a:t>
+              <a:t>12/18/2012</a:t>
             </a:fld>
             <a:endParaRPr lang="en-US"/>
           </a:p>
@@ -2040,15 +2482,15 @@
         </p:nvSpPr>
         <p:spPr>
           <a:xfrm>
-            <a:off x="457200" y="273050"/>
-            <a:ext cx="3008313" cy="1162050"/>
+            <a:off x="432039" y="250864"/>
+            <a:ext cx="2842751" cy="1067634"/>
           </a:xfrm>
         </p:spPr>
         <p:txBody>
           <a:bodyPr anchor="b"/>
           <a:lstStyle>
             <a:lvl1pPr algn="l">
-              <a:defRPr sz="2000" b="1"/>
+              <a:defRPr sz="1900" b="1"/>
             </a:lvl1pPr>
           </a:lstStyle>
           <a:p>
@@ -2072,39 +2514,39 @@
         </p:nvSpPr>
         <p:spPr>
           <a:xfrm>
-            <a:off x="3575050" y="273050"/>
-            <a:ext cx="5111750" cy="5853113"/>
+            <a:off x="3378298" y="250865"/>
+            <a:ext cx="4830427" cy="5377548"/>
           </a:xfrm>
         </p:spPr>
         <p:txBody>
           <a:bodyPr/>
           <a:lstStyle>
             <a:lvl1pPr>
-              <a:defRPr sz="3200"/>
+              <a:defRPr sz="3000"/>
             </a:lvl1pPr>
             <a:lvl2pPr>
-              <a:defRPr sz="2800"/>
+              <a:defRPr sz="2600"/>
             </a:lvl2pPr>
             <a:lvl3pPr>
-              <a:defRPr sz="2400"/>
+              <a:defRPr sz="2200"/>
             </a:lvl3pPr>
             <a:lvl4pPr>
-              <a:defRPr sz="2000"/>
+              <a:defRPr sz="1900"/>
             </a:lvl4pPr>
             <a:lvl5pPr>
-              <a:defRPr sz="2000"/>
+              <a:defRPr sz="1900"/>
             </a:lvl5pPr>
             <a:lvl6pPr>
-              <a:defRPr sz="2000"/>
+              <a:defRPr sz="1900"/>
             </a:lvl6pPr>
             <a:lvl7pPr>
-              <a:defRPr sz="2000"/>
+              <a:defRPr sz="1900"/>
             </a:lvl7pPr>
             <a:lvl8pPr>
-              <a:defRPr sz="2000"/>
+              <a:defRPr sz="1900"/>
             </a:lvl8pPr>
             <a:lvl9pPr>
-              <a:defRPr sz="2000"/>
+              <a:defRPr sz="1900"/>
             </a:lvl9pPr>
           </a:lstStyle>
           <a:p>
@@ -2157,8 +2599,8 @@
         </p:nvSpPr>
         <p:spPr>
           <a:xfrm>
-            <a:off x="457200" y="1435100"/>
-            <a:ext cx="3008313" cy="4691063"/>
+            <a:off x="432039" y="1318499"/>
+            <a:ext cx="2842751" cy="4309914"/>
           </a:xfrm>
         </p:spPr>
         <p:txBody>
@@ -2166,39 +2608,39 @@
           <a:lstStyle>
             <a:lvl1pPr marL="0" indent="0">
               <a:buNone/>
-              <a:defRPr sz="1400"/>
+              <a:defRPr sz="1300"/>
             </a:lvl1pPr>
-            <a:lvl2pPr marL="457200" indent="0">
+            <a:lvl2pPr marL="426888" indent="0">
               <a:buNone/>
-              <a:defRPr sz="1200"/>
+              <a:defRPr sz="1100"/>
             </a:lvl2pPr>
-            <a:lvl3pPr marL="914400" indent="0">
-              <a:buNone/>
-              <a:defRPr sz="1000"/>
-            </a:lvl3pPr>
-            <a:lvl4pPr marL="1371600" indent="0">
+            <a:lvl3pPr marL="853775" indent="0">
               <a:buNone/>
               <a:defRPr sz="900"/>
+            </a:lvl3pPr>
+            <a:lvl4pPr marL="1280663" indent="0">
+              <a:buNone/>
+              <a:defRPr sz="800"/>
             </a:lvl4pPr>
-            <a:lvl5pPr marL="1828800" indent="0">
+            <a:lvl5pPr marL="1707551" indent="0">
               <a:buNone/>
-              <a:defRPr sz="900"/>
+              <a:defRPr sz="800"/>
             </a:lvl5pPr>
-            <a:lvl6pPr marL="2286000" indent="0">
+            <a:lvl6pPr marL="2134438" indent="0">
               <a:buNone/>
-              <a:defRPr sz="900"/>
+              <a:defRPr sz="800"/>
             </a:lvl6pPr>
-            <a:lvl7pPr marL="2743200" indent="0">
+            <a:lvl7pPr marL="2561326" indent="0">
               <a:buNone/>
-              <a:defRPr sz="900"/>
+              <a:defRPr sz="800"/>
             </a:lvl7pPr>
-            <a:lvl8pPr marL="3200400" indent="0">
+            <a:lvl8pPr marL="2988213" indent="0">
               <a:buNone/>
-              <a:defRPr sz="900"/>
+              <a:defRPr sz="800"/>
             </a:lvl8pPr>
-            <a:lvl9pPr marL="3657600" indent="0">
+            <a:lvl9pPr marL="3415101" indent="0">
               <a:buNone/>
-              <a:defRPr sz="900"/>
+              <a:defRPr sz="800"/>
             </a:lvl9pPr>
           </a:lstStyle>
           <a:p>
@@ -2228,7 +2670,7 @@
             <a:fld id="{1D8BD707-D9CF-40AE-B4C6-C98DA3205C09}" type="datetimeFigureOut">
               <a:rPr lang="en-US" smtClean="0"/>
               <a:pPr/>
-              <a:t>7/12/2012</a:t>
+              <a:t>12/18/2012</a:t>
             </a:fld>
             <a:endParaRPr lang="en-US"/>
           </a:p>
@@ -2314,15 +2756,15 @@
         </p:nvSpPr>
         <p:spPr>
           <a:xfrm>
-            <a:off x="1792288" y="4800600"/>
-            <a:ext cx="5486400" cy="566738"/>
+            <a:off x="1693650" y="4410551"/>
+            <a:ext cx="5184458" cy="520691"/>
           </a:xfrm>
         </p:spPr>
         <p:txBody>
           <a:bodyPr anchor="b"/>
           <a:lstStyle>
             <a:lvl1pPr algn="l">
-              <a:defRPr sz="2000" b="1"/>
+              <a:defRPr sz="1900" b="1"/>
             </a:lvl1pPr>
           </a:lstStyle>
           <a:p>
@@ -2346,8 +2788,8 @@
         </p:nvSpPr>
         <p:spPr>
           <a:xfrm>
-            <a:off x="1792288" y="612775"/>
-            <a:ext cx="5486400" cy="4114800"/>
+            <a:off x="1693650" y="562987"/>
+            <a:ext cx="5184458" cy="3780473"/>
           </a:xfrm>
         </p:spPr>
         <p:txBody>
@@ -2355,39 +2797,39 @@
           <a:lstStyle>
             <a:lvl1pPr marL="0" indent="0">
               <a:buNone/>
-              <a:defRPr sz="3200"/>
+              <a:defRPr sz="3000"/>
             </a:lvl1pPr>
-            <a:lvl2pPr marL="457200" indent="0">
+            <a:lvl2pPr marL="426888" indent="0">
               <a:buNone/>
-              <a:defRPr sz="2800"/>
+              <a:defRPr sz="2600"/>
             </a:lvl2pPr>
-            <a:lvl3pPr marL="914400" indent="0">
+            <a:lvl3pPr marL="853775" indent="0">
               <a:buNone/>
-              <a:defRPr sz="2400"/>
+              <a:defRPr sz="2200"/>
             </a:lvl3pPr>
-            <a:lvl4pPr marL="1371600" indent="0">
+            <a:lvl4pPr marL="1280663" indent="0">
               <a:buNone/>
-              <a:defRPr sz="2000"/>
+              <a:defRPr sz="1900"/>
             </a:lvl4pPr>
-            <a:lvl5pPr marL="1828800" indent="0">
+            <a:lvl5pPr marL="1707551" indent="0">
               <a:buNone/>
-              <a:defRPr sz="2000"/>
+              <a:defRPr sz="1900"/>
             </a:lvl5pPr>
-            <a:lvl6pPr marL="2286000" indent="0">
+            <a:lvl6pPr marL="2134438" indent="0">
               <a:buNone/>
-              <a:defRPr sz="2000"/>
+              <a:defRPr sz="1900"/>
             </a:lvl6pPr>
-            <a:lvl7pPr marL="2743200" indent="0">
+            <a:lvl7pPr marL="2561326" indent="0">
               <a:buNone/>
-              <a:defRPr sz="2000"/>
+              <a:defRPr sz="1900"/>
             </a:lvl7pPr>
-            <a:lvl8pPr marL="3200400" indent="0">
+            <a:lvl8pPr marL="2988213" indent="0">
               <a:buNone/>
-              <a:defRPr sz="2000"/>
+              <a:defRPr sz="1900"/>
             </a:lvl8pPr>
-            <a:lvl9pPr marL="3657600" indent="0">
+            <a:lvl9pPr marL="3415101" indent="0">
               <a:buNone/>
-              <a:defRPr sz="2000"/>
+              <a:defRPr sz="1900"/>
             </a:lvl9pPr>
           </a:lstStyle>
           <a:p>
@@ -2407,8 +2849,8 @@
         </p:nvSpPr>
         <p:spPr>
           <a:xfrm>
-            <a:off x="1792288" y="5367338"/>
-            <a:ext cx="5486400" cy="804862"/>
+            <a:off x="1693650" y="4931242"/>
+            <a:ext cx="5184458" cy="739467"/>
           </a:xfrm>
         </p:spPr>
         <p:txBody>
@@ -2416,39 +2858,39 @@
           <a:lstStyle>
             <a:lvl1pPr marL="0" indent="0">
               <a:buNone/>
-              <a:defRPr sz="1400"/>
+              <a:defRPr sz="1300"/>
             </a:lvl1pPr>
-            <a:lvl2pPr marL="457200" indent="0">
+            <a:lvl2pPr marL="426888" indent="0">
               <a:buNone/>
-              <a:defRPr sz="1200"/>
+              <a:defRPr sz="1100"/>
             </a:lvl2pPr>
-            <a:lvl3pPr marL="914400" indent="0">
-              <a:buNone/>
-              <a:defRPr sz="1000"/>
-            </a:lvl3pPr>
-            <a:lvl4pPr marL="1371600" indent="0">
+            <a:lvl3pPr marL="853775" indent="0">
               <a:buNone/>
               <a:defRPr sz="900"/>
+            </a:lvl3pPr>
+            <a:lvl4pPr marL="1280663" indent="0">
+              <a:buNone/>
+              <a:defRPr sz="800"/>
             </a:lvl4pPr>
-            <a:lvl5pPr marL="1828800" indent="0">
+            <a:lvl5pPr marL="1707551" indent="0">
               <a:buNone/>
-              <a:defRPr sz="900"/>
+              <a:defRPr sz="800"/>
             </a:lvl5pPr>
-            <a:lvl6pPr marL="2286000" indent="0">
+            <a:lvl6pPr marL="2134438" indent="0">
               <a:buNone/>
-              <a:defRPr sz="900"/>
+              <a:defRPr sz="800"/>
             </a:lvl6pPr>
-            <a:lvl7pPr marL="2743200" indent="0">
+            <a:lvl7pPr marL="2561326" indent="0">
               <a:buNone/>
-              <a:defRPr sz="900"/>
+              <a:defRPr sz="800"/>
             </a:lvl7pPr>
-            <a:lvl8pPr marL="3200400" indent="0">
+            <a:lvl8pPr marL="2988213" indent="0">
               <a:buNone/>
-              <a:defRPr sz="900"/>
+              <a:defRPr sz="800"/>
             </a:lvl8pPr>
-            <a:lvl9pPr marL="3657600" indent="0">
+            <a:lvl9pPr marL="3415101" indent="0">
               <a:buNone/>
-              <a:defRPr sz="900"/>
+              <a:defRPr sz="800"/>
             </a:lvl9pPr>
           </a:lstStyle>
           <a:p>
@@ -2478,7 +2920,7 @@
             <a:fld id="{1D8BD707-D9CF-40AE-B4C6-C98DA3205C09}" type="datetimeFigureOut">
               <a:rPr lang="en-US" smtClean="0"/>
               <a:pPr/>
-              <a:t>7/12/2012</a:t>
+              <a:t>12/18/2012</a:t>
             </a:fld>
             <a:endParaRPr lang="en-US"/>
           </a:p>
@@ -2569,15 +3011,15 @@
         </p:nvSpPr>
         <p:spPr>
           <a:xfrm>
-            <a:off x="457200" y="274638"/>
-            <a:ext cx="8229600" cy="1143000"/>
+            <a:off x="432038" y="252324"/>
+            <a:ext cx="7776687" cy="1050131"/>
           </a:xfrm>
           <a:prstGeom prst="rect">
             <a:avLst/>
           </a:prstGeom>
         </p:spPr>
         <p:txBody>
-          <a:bodyPr vert="horz" lIns="91440" tIns="45720" rIns="91440" bIns="45720" rtlCol="0" anchor="ctr">
+          <a:bodyPr vert="horz" lIns="85378" tIns="42689" rIns="85378" bIns="42689" rtlCol="0" anchor="ctr">
             <a:normAutofit/>
           </a:bodyPr>
           <a:lstStyle/>
@@ -2602,15 +3044,15 @@
         </p:nvSpPr>
         <p:spPr>
           <a:xfrm>
-            <a:off x="457200" y="1600200"/>
-            <a:ext cx="8229600" cy="4525963"/>
+            <a:off x="432038" y="1470184"/>
+            <a:ext cx="7776687" cy="4158229"/>
           </a:xfrm>
           <a:prstGeom prst="rect">
             <a:avLst/>
           </a:prstGeom>
         </p:spPr>
         <p:txBody>
-          <a:bodyPr vert="horz" lIns="91440" tIns="45720" rIns="91440" bIns="45720" rtlCol="0">
+          <a:bodyPr vert="horz" lIns="85378" tIns="42689" rIns="85378" bIns="42689" rtlCol="0">
             <a:normAutofit/>
           </a:bodyPr>
           <a:lstStyle/>
@@ -2664,18 +3106,18 @@
         </p:nvSpPr>
         <p:spPr>
           <a:xfrm>
-            <a:off x="457200" y="6356350"/>
-            <a:ext cx="2133600" cy="365125"/>
+            <a:off x="432038" y="5839897"/>
+            <a:ext cx="2016178" cy="335459"/>
           </a:xfrm>
           <a:prstGeom prst="rect">
             <a:avLst/>
           </a:prstGeom>
         </p:spPr>
         <p:txBody>
-          <a:bodyPr vert="horz" lIns="91440" tIns="45720" rIns="91440" bIns="45720" rtlCol="0" anchor="ctr"/>
+          <a:bodyPr vert="horz" lIns="85378" tIns="42689" rIns="85378" bIns="42689" rtlCol="0" anchor="ctr"/>
           <a:lstStyle>
             <a:lvl1pPr algn="l">
-              <a:defRPr sz="1200">
+              <a:defRPr sz="1100">
                 <a:solidFill>
                   <a:schemeClr val="tx1">
                     <a:tint val="75000"/>
@@ -2688,7 +3130,7 @@
             <a:fld id="{1D8BD707-D9CF-40AE-B4C6-C98DA3205C09}" type="datetimeFigureOut">
               <a:rPr lang="en-US" smtClean="0"/>
               <a:pPr/>
-              <a:t>7/12/2012</a:t>
+              <a:t>12/18/2012</a:t>
             </a:fld>
             <a:endParaRPr lang="en-US"/>
           </a:p>
@@ -2706,18 +3148,18 @@
         </p:nvSpPr>
         <p:spPr>
           <a:xfrm>
-            <a:off x="3124200" y="6356350"/>
-            <a:ext cx="2895600" cy="365125"/>
+            <a:off x="2952261" y="5839897"/>
+            <a:ext cx="2736242" cy="335459"/>
           </a:xfrm>
           <a:prstGeom prst="rect">
             <a:avLst/>
           </a:prstGeom>
         </p:spPr>
         <p:txBody>
-          <a:bodyPr vert="horz" lIns="91440" tIns="45720" rIns="91440" bIns="45720" rtlCol="0" anchor="ctr"/>
+          <a:bodyPr vert="horz" lIns="85378" tIns="42689" rIns="85378" bIns="42689" rtlCol="0" anchor="ctr"/>
           <a:lstStyle>
             <a:lvl1pPr algn="ctr">
-              <a:defRPr sz="1200">
+              <a:defRPr sz="1100">
                 <a:solidFill>
                   <a:schemeClr val="tx1">
                     <a:tint val="75000"/>
@@ -2743,18 +3185,18 @@
         </p:nvSpPr>
         <p:spPr>
           <a:xfrm>
-            <a:off x="6553200" y="6356350"/>
-            <a:ext cx="2133600" cy="365125"/>
+            <a:off x="6192547" y="5839897"/>
+            <a:ext cx="2016178" cy="335459"/>
           </a:xfrm>
           <a:prstGeom prst="rect">
             <a:avLst/>
           </a:prstGeom>
         </p:spPr>
         <p:txBody>
-          <a:bodyPr vert="horz" lIns="91440" tIns="45720" rIns="91440" bIns="45720" rtlCol="0" anchor="ctr"/>
+          <a:bodyPr vert="horz" lIns="85378" tIns="42689" rIns="85378" bIns="42689" rtlCol="0" anchor="ctr"/>
           <a:lstStyle>
             <a:lvl1pPr algn="r">
-              <a:defRPr sz="1200">
+              <a:defRPr sz="1100">
                 <a:solidFill>
                   <a:schemeClr val="tx1">
                     <a:tint val="75000"/>
@@ -2791,12 +3233,12 @@
   </p:sldLayoutIdLst>
   <p:txStyles>
     <p:titleStyle>
-      <a:lvl1pPr algn="ctr" defTabSz="914400" rtl="0" eaLnBrk="1" latinLnBrk="0" hangingPunct="1">
+      <a:lvl1pPr algn="ctr" defTabSz="853775" rtl="0" eaLnBrk="1" latinLnBrk="0" hangingPunct="1">
         <a:spcBef>
           <a:spcPct val="0"/>
         </a:spcBef>
         <a:buNone/>
-        <a:defRPr sz="4400" kern="1200">
+        <a:defRPr sz="4100" kern="1200">
           <a:solidFill>
             <a:schemeClr val="tx1"/>
           </a:solidFill>
@@ -2807,13 +3249,13 @@
       </a:lvl1pPr>
     </p:titleStyle>
     <p:bodyStyle>
-      <a:lvl1pPr marL="342900" indent="-342900" algn="l" defTabSz="914400" rtl="0" eaLnBrk="1" latinLnBrk="0" hangingPunct="1">
+      <a:lvl1pPr marL="320166" indent="-320166" algn="l" defTabSz="853775" rtl="0" eaLnBrk="1" latinLnBrk="0" hangingPunct="1">
         <a:spcBef>
           <a:spcPct val="20000"/>
         </a:spcBef>
         <a:buFont typeface="Arial" pitchFamily="34" charset="0"/>
         <a:buChar char="•"/>
-        <a:defRPr sz="3200" kern="1200">
+        <a:defRPr sz="3000" kern="1200">
           <a:solidFill>
             <a:schemeClr val="tx1"/>
           </a:solidFill>
@@ -2822,13 +3264,13 @@
           <a:cs typeface="+mn-cs"/>
         </a:defRPr>
       </a:lvl1pPr>
-      <a:lvl2pPr marL="742950" indent="-285750" algn="l" defTabSz="914400" rtl="0" eaLnBrk="1" latinLnBrk="0" hangingPunct="1">
+      <a:lvl2pPr marL="693692" indent="-266805" algn="l" defTabSz="853775" rtl="0" eaLnBrk="1" latinLnBrk="0" hangingPunct="1">
         <a:spcBef>
           <a:spcPct val="20000"/>
         </a:spcBef>
         <a:buFont typeface="Arial" pitchFamily="34" charset="0"/>
         <a:buChar char="–"/>
-        <a:defRPr sz="2800" kern="1200">
+        <a:defRPr sz="2600" kern="1200">
           <a:solidFill>
             <a:schemeClr val="tx1"/>
           </a:solidFill>
@@ -2837,13 +3279,13 @@
           <a:cs typeface="+mn-cs"/>
         </a:defRPr>
       </a:lvl2pPr>
-      <a:lvl3pPr marL="1143000" indent="-228600" algn="l" defTabSz="914400" rtl="0" eaLnBrk="1" latinLnBrk="0" hangingPunct="1">
+      <a:lvl3pPr marL="1067219" indent="-213444" algn="l" defTabSz="853775" rtl="0" eaLnBrk="1" latinLnBrk="0" hangingPunct="1">
         <a:spcBef>
           <a:spcPct val="20000"/>
         </a:spcBef>
         <a:buFont typeface="Arial" pitchFamily="34" charset="0"/>
         <a:buChar char="•"/>
-        <a:defRPr sz="2400" kern="1200">
+        <a:defRPr sz="2200" kern="1200">
           <a:solidFill>
             <a:schemeClr val="tx1"/>
           </a:solidFill>
@@ -2852,13 +3294,13 @@
           <a:cs typeface="+mn-cs"/>
         </a:defRPr>
       </a:lvl3pPr>
-      <a:lvl4pPr marL="1600200" indent="-228600" algn="l" defTabSz="914400" rtl="0" eaLnBrk="1" latinLnBrk="0" hangingPunct="1">
+      <a:lvl4pPr marL="1494107" indent="-213444" algn="l" defTabSz="853775" rtl="0" eaLnBrk="1" latinLnBrk="0" hangingPunct="1">
         <a:spcBef>
           <a:spcPct val="20000"/>
         </a:spcBef>
         <a:buFont typeface="Arial" pitchFamily="34" charset="0"/>
         <a:buChar char="–"/>
-        <a:defRPr sz="2000" kern="1200">
+        <a:defRPr sz="1900" kern="1200">
           <a:solidFill>
             <a:schemeClr val="tx1"/>
           </a:solidFill>
@@ -2867,13 +3309,13 @@
           <a:cs typeface="+mn-cs"/>
         </a:defRPr>
       </a:lvl4pPr>
-      <a:lvl5pPr marL="2057400" indent="-228600" algn="l" defTabSz="914400" rtl="0" eaLnBrk="1" latinLnBrk="0" hangingPunct="1">
+      <a:lvl5pPr marL="1920994" indent="-213444" algn="l" defTabSz="853775" rtl="0" eaLnBrk="1" latinLnBrk="0" hangingPunct="1">
         <a:spcBef>
           <a:spcPct val="20000"/>
         </a:spcBef>
         <a:buFont typeface="Arial" pitchFamily="34" charset="0"/>
         <a:buChar char="»"/>
-        <a:defRPr sz="2000" kern="1200">
+        <a:defRPr sz="1900" kern="1200">
           <a:solidFill>
             <a:schemeClr val="tx1"/>
           </a:solidFill>
@@ -2882,13 +3324,13 @@
           <a:cs typeface="+mn-cs"/>
         </a:defRPr>
       </a:lvl5pPr>
-      <a:lvl6pPr marL="2514600" indent="-228600" algn="l" defTabSz="914400" rtl="0" eaLnBrk="1" latinLnBrk="0" hangingPunct="1">
+      <a:lvl6pPr marL="2347882" indent="-213444" algn="l" defTabSz="853775" rtl="0" eaLnBrk="1" latinLnBrk="0" hangingPunct="1">
         <a:spcBef>
           <a:spcPct val="20000"/>
         </a:spcBef>
         <a:buFont typeface="Arial" pitchFamily="34" charset="0"/>
         <a:buChar char="•"/>
-        <a:defRPr sz="2000" kern="1200">
+        <a:defRPr sz="1900" kern="1200">
           <a:solidFill>
             <a:schemeClr val="tx1"/>
           </a:solidFill>
@@ -2897,13 +3339,13 @@
           <a:cs typeface="+mn-cs"/>
         </a:defRPr>
       </a:lvl6pPr>
-      <a:lvl7pPr marL="2971800" indent="-228600" algn="l" defTabSz="914400" rtl="0" eaLnBrk="1" latinLnBrk="0" hangingPunct="1">
+      <a:lvl7pPr marL="2774770" indent="-213444" algn="l" defTabSz="853775" rtl="0" eaLnBrk="1" latinLnBrk="0" hangingPunct="1">
         <a:spcBef>
           <a:spcPct val="20000"/>
         </a:spcBef>
         <a:buFont typeface="Arial" pitchFamily="34" charset="0"/>
         <a:buChar char="•"/>
-        <a:defRPr sz="2000" kern="1200">
+        <a:defRPr sz="1900" kern="1200">
           <a:solidFill>
             <a:schemeClr val="tx1"/>
           </a:solidFill>
@@ -2912,13 +3354,13 @@
           <a:cs typeface="+mn-cs"/>
         </a:defRPr>
       </a:lvl7pPr>
-      <a:lvl8pPr marL="3429000" indent="-228600" algn="l" defTabSz="914400" rtl="0" eaLnBrk="1" latinLnBrk="0" hangingPunct="1">
+      <a:lvl8pPr marL="3201657" indent="-213444" algn="l" defTabSz="853775" rtl="0" eaLnBrk="1" latinLnBrk="0" hangingPunct="1">
         <a:spcBef>
           <a:spcPct val="20000"/>
         </a:spcBef>
         <a:buFont typeface="Arial" pitchFamily="34" charset="0"/>
         <a:buChar char="•"/>
-        <a:defRPr sz="2000" kern="1200">
+        <a:defRPr sz="1900" kern="1200">
           <a:solidFill>
             <a:schemeClr val="tx1"/>
           </a:solidFill>
@@ -2927,13 +3369,13 @@
           <a:cs typeface="+mn-cs"/>
         </a:defRPr>
       </a:lvl8pPr>
-      <a:lvl9pPr marL="3886200" indent="-228600" algn="l" defTabSz="914400" rtl="0" eaLnBrk="1" latinLnBrk="0" hangingPunct="1">
+      <a:lvl9pPr marL="3628545" indent="-213444" algn="l" defTabSz="853775" rtl="0" eaLnBrk="1" latinLnBrk="0" hangingPunct="1">
         <a:spcBef>
           <a:spcPct val="20000"/>
         </a:spcBef>
         <a:buFont typeface="Arial" pitchFamily="34" charset="0"/>
         <a:buChar char="•"/>
-        <a:defRPr sz="2000" kern="1200">
+        <a:defRPr sz="1900" kern="1200">
           <a:solidFill>
             <a:schemeClr val="tx1"/>
           </a:solidFill>
@@ -2947,8 +3389,8 @@
       <a:defPPr>
         <a:defRPr lang="en-US"/>
       </a:defPPr>
-      <a:lvl1pPr marL="0" algn="l" defTabSz="914400" rtl="0" eaLnBrk="1" latinLnBrk="0" hangingPunct="1">
-        <a:defRPr sz="1800" kern="1200">
+      <a:lvl1pPr marL="0" algn="l" defTabSz="853775" rtl="0" eaLnBrk="1" latinLnBrk="0" hangingPunct="1">
+        <a:defRPr sz="1700" kern="1200">
           <a:solidFill>
             <a:schemeClr val="tx1"/>
           </a:solidFill>
@@ -2957,8 +3399,8 @@
           <a:cs typeface="+mn-cs"/>
         </a:defRPr>
       </a:lvl1pPr>
-      <a:lvl2pPr marL="457200" algn="l" defTabSz="914400" rtl="0" eaLnBrk="1" latinLnBrk="0" hangingPunct="1">
-        <a:defRPr sz="1800" kern="1200">
+      <a:lvl2pPr marL="426888" algn="l" defTabSz="853775" rtl="0" eaLnBrk="1" latinLnBrk="0" hangingPunct="1">
+        <a:defRPr sz="1700" kern="1200">
           <a:solidFill>
             <a:schemeClr val="tx1"/>
           </a:solidFill>
@@ -2967,8 +3409,8 @@
           <a:cs typeface="+mn-cs"/>
         </a:defRPr>
       </a:lvl2pPr>
-      <a:lvl3pPr marL="914400" algn="l" defTabSz="914400" rtl="0" eaLnBrk="1" latinLnBrk="0" hangingPunct="1">
-        <a:defRPr sz="1800" kern="1200">
+      <a:lvl3pPr marL="853775" algn="l" defTabSz="853775" rtl="0" eaLnBrk="1" latinLnBrk="0" hangingPunct="1">
+        <a:defRPr sz="1700" kern="1200">
           <a:solidFill>
             <a:schemeClr val="tx1"/>
           </a:solidFill>
@@ -2977,8 +3419,8 @@
           <a:cs typeface="+mn-cs"/>
         </a:defRPr>
       </a:lvl3pPr>
-      <a:lvl4pPr marL="1371600" algn="l" defTabSz="914400" rtl="0" eaLnBrk="1" latinLnBrk="0" hangingPunct="1">
-        <a:defRPr sz="1800" kern="1200">
+      <a:lvl4pPr marL="1280663" algn="l" defTabSz="853775" rtl="0" eaLnBrk="1" latinLnBrk="0" hangingPunct="1">
+        <a:defRPr sz="1700" kern="1200">
           <a:solidFill>
             <a:schemeClr val="tx1"/>
           </a:solidFill>
@@ -2987,8 +3429,8 @@
           <a:cs typeface="+mn-cs"/>
         </a:defRPr>
       </a:lvl4pPr>
-      <a:lvl5pPr marL="1828800" algn="l" defTabSz="914400" rtl="0" eaLnBrk="1" latinLnBrk="0" hangingPunct="1">
-        <a:defRPr sz="1800" kern="1200">
+      <a:lvl5pPr marL="1707551" algn="l" defTabSz="853775" rtl="0" eaLnBrk="1" latinLnBrk="0" hangingPunct="1">
+        <a:defRPr sz="1700" kern="1200">
           <a:solidFill>
             <a:schemeClr val="tx1"/>
           </a:solidFill>
@@ -2997,8 +3439,8 @@
           <a:cs typeface="+mn-cs"/>
         </a:defRPr>
       </a:lvl5pPr>
-      <a:lvl6pPr marL="2286000" algn="l" defTabSz="914400" rtl="0" eaLnBrk="1" latinLnBrk="0" hangingPunct="1">
-        <a:defRPr sz="1800" kern="1200">
+      <a:lvl6pPr marL="2134438" algn="l" defTabSz="853775" rtl="0" eaLnBrk="1" latinLnBrk="0" hangingPunct="1">
+        <a:defRPr sz="1700" kern="1200">
           <a:solidFill>
             <a:schemeClr val="tx1"/>
           </a:solidFill>
@@ -3007,8 +3449,8 @@
           <a:cs typeface="+mn-cs"/>
         </a:defRPr>
       </a:lvl6pPr>
-      <a:lvl7pPr marL="2743200" algn="l" defTabSz="914400" rtl="0" eaLnBrk="1" latinLnBrk="0" hangingPunct="1">
-        <a:defRPr sz="1800" kern="1200">
+      <a:lvl7pPr marL="2561326" algn="l" defTabSz="853775" rtl="0" eaLnBrk="1" latinLnBrk="0" hangingPunct="1">
+        <a:defRPr sz="1700" kern="1200">
           <a:solidFill>
             <a:schemeClr val="tx1"/>
           </a:solidFill>
@@ -3017,8 +3459,8 @@
           <a:cs typeface="+mn-cs"/>
         </a:defRPr>
       </a:lvl7pPr>
-      <a:lvl8pPr marL="3200400" algn="l" defTabSz="914400" rtl="0" eaLnBrk="1" latinLnBrk="0" hangingPunct="1">
-        <a:defRPr sz="1800" kern="1200">
+      <a:lvl8pPr marL="2988213" algn="l" defTabSz="853775" rtl="0" eaLnBrk="1" latinLnBrk="0" hangingPunct="1">
+        <a:defRPr sz="1700" kern="1200">
           <a:solidFill>
             <a:schemeClr val="tx1"/>
           </a:solidFill>
@@ -3027,8 +3469,8 @@
           <a:cs typeface="+mn-cs"/>
         </a:defRPr>
       </a:lvl8pPr>
-      <a:lvl9pPr marL="3657600" algn="l" defTabSz="914400" rtl="0" eaLnBrk="1" latinLnBrk="0" hangingPunct="1">
-        <a:defRPr sz="1800" kern="1200">
+      <a:lvl9pPr marL="3415101" algn="l" defTabSz="853775" rtl="0" eaLnBrk="1" latinLnBrk="0" hangingPunct="1">
+        <a:defRPr sz="1700" kern="1200">
           <a:solidFill>
             <a:schemeClr val="tx1"/>
           </a:solidFill>
@@ -3061,14 +3503,14 @@
       </p:grpSpPr>
       <p:sp>
         <p:nvSpPr>
-          <p:cNvPr id="4" name="Rounded Rectangle 3"/>
+          <p:cNvPr id="89" name="Rounded Rectangle 88"/>
           <p:cNvSpPr/>
           <p:nvPr/>
         </p:nvSpPr>
         <p:spPr>
           <a:xfrm>
-            <a:off x="381000" y="4644640"/>
-            <a:ext cx="2133600" cy="1984760"/>
+            <a:off x="129381" y="4111239"/>
+            <a:ext cx="2133600" cy="2060961"/>
           </a:xfrm>
           <a:prstGeom prst="roundRect">
             <a:avLst>
@@ -3107,10 +3549,9 @@
           </a:fontRef>
         </p:style>
         <p:txBody>
-          <a:bodyPr rtlCol="0" anchor="t" anchorCtr="1"/>
+          <a:bodyPr rtlCol="0" anchor="t" anchorCtr="0"/>
           <a:lstStyle/>
           <a:p>
-            <a:pPr algn="ctr"/>
             <a:r>
               <a:rPr lang="en-US" sz="1600" b="1" dirty="0" smtClean="0"/>
               <a:t>Test Driver</a:t>
@@ -3121,13 +3562,13 @@
       </p:sp>
       <p:sp>
         <p:nvSpPr>
-          <p:cNvPr id="5" name="Rounded Rectangle 4"/>
+          <p:cNvPr id="90" name="Rounded Rectangle 89"/>
           <p:cNvSpPr/>
           <p:nvPr/>
         </p:nvSpPr>
         <p:spPr>
           <a:xfrm>
-            <a:off x="3810000" y="1905713"/>
+            <a:off x="3558381" y="1372313"/>
             <a:ext cx="2286000" cy="4799888"/>
           </a:xfrm>
           <a:prstGeom prst="roundRect">
@@ -3181,13 +3622,13 @@
       </p:sp>
       <p:sp>
         <p:nvSpPr>
-          <p:cNvPr id="6" name="Rounded Rectangle 5"/>
+          <p:cNvPr id="91" name="Rounded Rectangle 90"/>
           <p:cNvSpPr/>
           <p:nvPr/>
         </p:nvSpPr>
         <p:spPr>
           <a:xfrm>
-            <a:off x="6477000" y="1905712"/>
+            <a:off x="6225381" y="1372312"/>
             <a:ext cx="2286000" cy="4799889"/>
           </a:xfrm>
           <a:prstGeom prst="roundRect">
@@ -3241,13 +3682,13 @@
       </p:sp>
       <p:sp>
         <p:nvSpPr>
-          <p:cNvPr id="7" name="Rounded Rectangle 6"/>
+          <p:cNvPr id="92" name="Rounded Rectangle 91"/>
           <p:cNvSpPr/>
           <p:nvPr/>
         </p:nvSpPr>
         <p:spPr>
           <a:xfrm>
-            <a:off x="1219200" y="1905000"/>
+            <a:off x="967581" y="1371600"/>
             <a:ext cx="1752600" cy="2514600"/>
           </a:xfrm>
           <a:prstGeom prst="roundRect">
@@ -3301,14 +3742,14 @@
       </p:sp>
       <p:sp>
         <p:nvSpPr>
-          <p:cNvPr id="8" name="Rounded Rectangle 7"/>
+          <p:cNvPr id="93" name="Rounded Rectangle 92"/>
           <p:cNvSpPr/>
           <p:nvPr/>
         </p:nvSpPr>
         <p:spPr>
           <a:xfrm>
-            <a:off x="381000" y="152400"/>
-            <a:ext cx="8382000" cy="1295400"/>
+            <a:off x="129381" y="76200"/>
+            <a:ext cx="8382000" cy="838200"/>
           </a:xfrm>
           <a:prstGeom prst="roundRect">
             <a:avLst>
@@ -3360,13 +3801,13 @@
       </p:sp>
       <p:grpSp>
         <p:nvGrpSpPr>
-          <p:cNvPr id="11" name="Group 10"/>
+          <p:cNvPr id="94" name="Group 93"/>
           <p:cNvGrpSpPr/>
           <p:nvPr/>
         </p:nvGrpSpPr>
         <p:grpSpPr>
           <a:xfrm>
-            <a:off x="1447800" y="3505200"/>
+            <a:off x="1196181" y="3124200"/>
             <a:ext cx="1371600" cy="609600"/>
             <a:chOff x="-228600" y="1371600"/>
             <a:chExt cx="1371600" cy="609600"/>
@@ -3377,7 +3818,7 @@
         </p:grpSpPr>
         <p:sp>
           <p:nvSpPr>
-            <p:cNvPr id="9" name="Rectangle 8"/>
+            <p:cNvPr id="95" name="Rectangle 94"/>
             <p:cNvSpPr/>
             <p:nvPr/>
           </p:nvSpPr>
@@ -3438,7 +3879,7 @@
         </p:sp>
         <p:sp>
           <p:nvSpPr>
-            <p:cNvPr id="10" name="Rectangle 9"/>
+            <p:cNvPr id="96" name="Rectangle 95"/>
             <p:cNvSpPr/>
             <p:nvPr/>
           </p:nvSpPr>
@@ -3484,13 +3925,13 @@
       </p:grpSp>
       <p:grpSp>
         <p:nvGrpSpPr>
-          <p:cNvPr id="15" name="Group 14"/>
+          <p:cNvPr id="97" name="Group 96"/>
           <p:cNvGrpSpPr/>
           <p:nvPr/>
         </p:nvGrpSpPr>
         <p:grpSpPr>
           <a:xfrm>
-            <a:off x="4267200" y="2362200"/>
+            <a:off x="4015581" y="1828800"/>
             <a:ext cx="1371600" cy="762000"/>
             <a:chOff x="-228600" y="1371600"/>
             <a:chExt cx="1371600" cy="762000"/>
@@ -3501,7 +3942,7 @@
         </p:grpSpPr>
         <p:sp>
           <p:nvSpPr>
-            <p:cNvPr id="16" name="Rectangle 15"/>
+            <p:cNvPr id="98" name="Rectangle 97"/>
             <p:cNvSpPr/>
             <p:nvPr/>
           </p:nvSpPr>
@@ -3559,7 +4000,7 @@
         </p:sp>
         <p:sp>
           <p:nvSpPr>
-            <p:cNvPr id="17" name="Rectangle 16"/>
+            <p:cNvPr id="99" name="Rectangle 98"/>
             <p:cNvSpPr/>
             <p:nvPr/>
           </p:nvSpPr>
@@ -3610,13 +4051,13 @@
       </p:grpSp>
       <p:grpSp>
         <p:nvGrpSpPr>
-          <p:cNvPr id="18" name="Group 17"/>
+          <p:cNvPr id="100" name="Group 99"/>
           <p:cNvGrpSpPr/>
           <p:nvPr/>
         </p:nvGrpSpPr>
         <p:grpSpPr>
           <a:xfrm>
-            <a:off x="6858000" y="2514600"/>
+            <a:off x="6606381" y="1981200"/>
             <a:ext cx="1600200" cy="762000"/>
             <a:chOff x="-457200" y="1371600"/>
             <a:chExt cx="1600200" cy="762000"/>
@@ -3627,7 +4068,7 @@
         </p:grpSpPr>
         <p:sp>
           <p:nvSpPr>
-            <p:cNvPr id="19" name="Rectangle 18"/>
+            <p:cNvPr id="101" name="Rectangle 100"/>
             <p:cNvSpPr/>
             <p:nvPr/>
           </p:nvSpPr>
@@ -3685,7 +4126,7 @@
         </p:sp>
         <p:sp>
           <p:nvSpPr>
-            <p:cNvPr id="20" name="Rectangle 19"/>
+            <p:cNvPr id="102" name="Rectangle 101"/>
             <p:cNvSpPr/>
             <p:nvPr/>
           </p:nvSpPr>
@@ -3736,13 +4177,13 @@
       </p:grpSp>
       <p:grpSp>
         <p:nvGrpSpPr>
-          <p:cNvPr id="21" name="Group 20"/>
+          <p:cNvPr id="103" name="Group 102"/>
           <p:cNvGrpSpPr/>
           <p:nvPr/>
         </p:nvGrpSpPr>
         <p:grpSpPr>
           <a:xfrm>
-            <a:off x="6858000" y="3958839"/>
+            <a:off x="6606381" y="3425439"/>
             <a:ext cx="1600200" cy="762000"/>
             <a:chOff x="-457200" y="1371600"/>
             <a:chExt cx="1600200" cy="762000"/>
@@ -3753,7 +4194,7 @@
         </p:grpSpPr>
         <p:sp>
           <p:nvSpPr>
-            <p:cNvPr id="22" name="Rectangle 21"/>
+            <p:cNvPr id="104" name="Rectangle 103"/>
             <p:cNvSpPr/>
             <p:nvPr/>
           </p:nvSpPr>
@@ -3799,15 +4240,7 @@
                     <a:srgbClr val="00B050"/>
                   </a:solidFill>
                 </a:rPr>
-                <a:t>storage</a:t>
-              </a:r>
-              <a:r>
-                <a:rPr lang="en-US" sz="1400" b="1" dirty="0" smtClean="0">
-                  <a:solidFill>
-                    <a:srgbClr val="00B050"/>
-                  </a:solidFill>
-                </a:rPr>
-                <a:t>::</a:t>
+                <a:t>storage::</a:t>
               </a:r>
               <a:r>
                 <a:rPr lang="en-US" sz="1400" b="1" dirty="0" err="1" smtClean="0">
@@ -3835,7 +4268,7 @@
         </p:sp>
         <p:sp>
           <p:nvSpPr>
-            <p:cNvPr id="23" name="Rectangle 22"/>
+            <p:cNvPr id="105" name="Rectangle 104"/>
             <p:cNvSpPr/>
             <p:nvPr/>
           </p:nvSpPr>
@@ -3886,16 +4319,16 @@
       </p:grpSp>
       <p:grpSp>
         <p:nvGrpSpPr>
-          <p:cNvPr id="24" name="Group 23"/>
+          <p:cNvPr id="106" name="Group 105"/>
           <p:cNvGrpSpPr/>
           <p:nvPr/>
         </p:nvGrpSpPr>
         <p:grpSpPr>
           <a:xfrm>
-            <a:off x="762000" y="5863839"/>
-            <a:ext cx="1371600" cy="536961"/>
+            <a:off x="510381" y="4980061"/>
+            <a:ext cx="1371600" cy="506339"/>
             <a:chOff x="-228600" y="1371600"/>
-            <a:chExt cx="1371600" cy="536961"/>
+            <a:chExt cx="1371600" cy="506339"/>
           </a:xfrm>
           <a:solidFill>
             <a:schemeClr val="bg1"/>
@@ -3903,14 +4336,14 @@
         </p:grpSpPr>
         <p:sp>
           <p:nvSpPr>
-            <p:cNvPr id="25" name="Rectangle 24"/>
+            <p:cNvPr id="107" name="Rectangle 106"/>
             <p:cNvSpPr/>
             <p:nvPr/>
           </p:nvSpPr>
           <p:spPr>
             <a:xfrm>
               <a:off x="-228600" y="1524000"/>
-              <a:ext cx="1371600" cy="384561"/>
+              <a:ext cx="1371600" cy="353939"/>
             </a:xfrm>
             <a:prstGeom prst="rect">
               <a:avLst/>
@@ -3967,7 +4400,7 @@
         </p:sp>
         <p:sp>
           <p:nvSpPr>
-            <p:cNvPr id="26" name="Rectangle 25"/>
+            <p:cNvPr id="108" name="Rectangle 107"/>
             <p:cNvSpPr/>
             <p:nvPr/>
           </p:nvSpPr>
@@ -4022,16 +4455,16 @@
       </p:grpSp>
       <p:grpSp>
         <p:nvGrpSpPr>
-          <p:cNvPr id="30" name="Group 29"/>
+          <p:cNvPr id="109" name="Group 108"/>
           <p:cNvGrpSpPr/>
           <p:nvPr/>
         </p:nvGrpSpPr>
         <p:grpSpPr>
           <a:xfrm>
-            <a:off x="762000" y="4998578"/>
-            <a:ext cx="1371600" cy="602833"/>
-            <a:chOff x="-228600" y="1371600"/>
-            <a:chExt cx="1371600" cy="602833"/>
+            <a:off x="1196181" y="254950"/>
+            <a:ext cx="1676400" cy="507050"/>
+            <a:chOff x="-533400" y="1371600"/>
+            <a:chExt cx="1676400" cy="507050"/>
           </a:xfrm>
           <a:solidFill>
             <a:schemeClr val="bg1"/>
@@ -4039,297 +4472,14 @@
         </p:grpSpPr>
         <p:sp>
           <p:nvSpPr>
-            <p:cNvPr id="31" name="Rectangle 30"/>
+            <p:cNvPr id="110" name="Rectangle 109"/>
             <p:cNvSpPr/>
             <p:nvPr/>
           </p:nvSpPr>
           <p:spPr>
             <a:xfrm>
-              <a:off x="-228600" y="1524000"/>
-              <a:ext cx="1371600" cy="450433"/>
-            </a:xfrm>
-            <a:prstGeom prst="rect">
-              <a:avLst/>
-            </a:prstGeom>
-            <a:grpFill/>
-            <a:ln>
-              <a:solidFill>
-                <a:schemeClr val="accent2">
-                  <a:lumMod val="75000"/>
-                </a:schemeClr>
-              </a:solidFill>
-            </a:ln>
-          </p:spPr>
-          <p:style>
-            <a:lnRef idx="2">
-              <a:schemeClr val="accent1">
-                <a:shade val="50000"/>
-              </a:schemeClr>
-            </a:lnRef>
-            <a:fillRef idx="1">
-              <a:schemeClr val="accent1"/>
-            </a:fillRef>
-            <a:effectRef idx="0">
-              <a:schemeClr val="accent1"/>
-            </a:effectRef>
-            <a:fontRef idx="minor">
-              <a:schemeClr val="lt1"/>
-            </a:fontRef>
-          </p:style>
-          <p:txBody>
-            <a:bodyPr rtlCol="0" anchor="ctr"/>
-            <a:lstStyle/>
-            <a:p>
-              <a:pPr algn="ctr"/>
-              <a:r>
-                <a:rPr lang="en-US" sz="1400" b="1" dirty="0" smtClean="0">
-                  <a:solidFill>
-                    <a:schemeClr val="accent2">
-                      <a:lumMod val="75000"/>
-                    </a:schemeClr>
-                  </a:solidFill>
-                </a:rPr>
-                <a:t>test::cases</a:t>
-              </a:r>
-              <a:endParaRPr lang="en-SG" sz="1400" b="1" dirty="0">
-                <a:solidFill>
-                  <a:schemeClr val="accent2">
-                    <a:lumMod val="75000"/>
-                  </a:schemeClr>
-                </a:solidFill>
-              </a:endParaRPr>
-            </a:p>
-          </p:txBody>
-        </p:sp>
-        <p:sp>
-          <p:nvSpPr>
-            <p:cNvPr id="32" name="Rectangle 31"/>
-            <p:cNvSpPr/>
-            <p:nvPr/>
-          </p:nvSpPr>
-          <p:spPr>
-            <a:xfrm>
-              <a:off x="647700" y="1371600"/>
-              <a:ext cx="495300" cy="152400"/>
-            </a:xfrm>
-            <a:prstGeom prst="rect">
-              <a:avLst/>
-            </a:prstGeom>
-            <a:grpFill/>
-            <a:ln>
-              <a:solidFill>
-                <a:schemeClr val="accent2">
-                  <a:lumMod val="75000"/>
-                </a:schemeClr>
-              </a:solidFill>
-            </a:ln>
-          </p:spPr>
-          <p:style>
-            <a:lnRef idx="2">
-              <a:schemeClr val="accent1">
-                <a:shade val="50000"/>
-              </a:schemeClr>
-            </a:lnRef>
-            <a:fillRef idx="1">
-              <a:schemeClr val="accent1"/>
-            </a:fillRef>
-            <a:effectRef idx="0">
-              <a:schemeClr val="accent1"/>
-            </a:effectRef>
-            <a:fontRef idx="minor">
-              <a:schemeClr val="lt1"/>
-            </a:fontRef>
-          </p:style>
-          <p:txBody>
-            <a:bodyPr rtlCol="0" anchor="ctr"/>
-            <a:lstStyle/>
-            <a:p>
-              <a:pPr algn="ctr"/>
-              <a:endParaRPr lang="en-SG" sz="1400" b="1">
-                <a:solidFill>
-                  <a:schemeClr val="accent2">
-                    <a:lumMod val="75000"/>
-                  </a:schemeClr>
-                </a:solidFill>
-              </a:endParaRPr>
-            </a:p>
-          </p:txBody>
-        </p:sp>
-      </p:grpSp>
-      <p:grpSp>
-        <p:nvGrpSpPr>
-          <p:cNvPr id="33" name="Group 32"/>
-          <p:cNvGrpSpPr/>
-          <p:nvPr/>
-        </p:nvGrpSpPr>
-        <p:grpSpPr>
-          <a:xfrm>
-            <a:off x="6705600" y="430849"/>
-            <a:ext cx="1371600" cy="762000"/>
-            <a:chOff x="-228600" y="1371600"/>
-            <a:chExt cx="1371600" cy="762000"/>
-          </a:xfrm>
-          <a:solidFill>
-            <a:schemeClr val="bg1"/>
-          </a:solidFill>
-        </p:grpSpPr>
-        <p:sp>
-          <p:nvSpPr>
-            <p:cNvPr id="34" name="Rectangle 33"/>
-            <p:cNvSpPr/>
-            <p:nvPr/>
-          </p:nvSpPr>
-          <p:spPr>
-            <a:xfrm>
-              <a:off x="-228600" y="1524000"/>
-              <a:ext cx="1371600" cy="609600"/>
-            </a:xfrm>
-            <a:prstGeom prst="rect">
-              <a:avLst/>
-            </a:prstGeom>
-            <a:grpFill/>
-            <a:ln>
-              <a:solidFill>
-                <a:schemeClr val="accent5"/>
-              </a:solidFill>
-            </a:ln>
-          </p:spPr>
-          <p:style>
-            <a:lnRef idx="2">
-              <a:schemeClr val="accent1">
-                <a:shade val="50000"/>
-              </a:schemeClr>
-            </a:lnRef>
-            <a:fillRef idx="1">
-              <a:schemeClr val="accent1"/>
-            </a:fillRef>
-            <a:effectRef idx="0">
-              <a:schemeClr val="accent1"/>
-            </a:effectRef>
-            <a:fontRef idx="minor">
-              <a:schemeClr val="lt1"/>
-            </a:fontRef>
-          </p:style>
-          <p:txBody>
-            <a:bodyPr rtlCol="0" anchor="ctr"/>
-            <a:lstStyle/>
-            <a:p>
-              <a:r>
-                <a:rPr lang="en-US" sz="1400" b="1" dirty="0" smtClean="0">
-                  <a:solidFill>
-                    <a:schemeClr val="accent5"/>
-                  </a:solidFill>
-                </a:rPr>
-                <a:t>common</a:t>
-              </a:r>
-              <a:br>
-                <a:rPr lang="en-US" sz="1400" b="1" dirty="0" smtClean="0">
-                  <a:solidFill>
-                    <a:schemeClr val="accent5"/>
-                  </a:solidFill>
-                </a:rPr>
-              </a:br>
-              <a:r>
-                <a:rPr lang="en-US" sz="1400" b="1" dirty="0" smtClean="0">
-                  <a:solidFill>
-                    <a:schemeClr val="accent5"/>
-                  </a:solidFill>
-                </a:rPr>
-                <a:t>    ::</a:t>
-              </a:r>
-              <a:r>
-                <a:rPr lang="en-US" sz="1400" b="1" dirty="0" err="1" smtClean="0">
-                  <a:solidFill>
-                    <a:schemeClr val="accent5"/>
-                  </a:solidFill>
-                </a:rPr>
-                <a:t>datatransfer</a:t>
-              </a:r>
-              <a:endParaRPr lang="en-SG" sz="1400" b="1" dirty="0">
-                <a:solidFill>
-                  <a:schemeClr val="accent5"/>
-                </a:solidFill>
-              </a:endParaRPr>
-            </a:p>
-          </p:txBody>
-        </p:sp>
-        <p:sp>
-          <p:nvSpPr>
-            <p:cNvPr id="35" name="Rectangle 34"/>
-            <p:cNvSpPr/>
-            <p:nvPr/>
-          </p:nvSpPr>
-          <p:spPr>
-            <a:xfrm>
-              <a:off x="647700" y="1371600"/>
-              <a:ext cx="495300" cy="152400"/>
-            </a:xfrm>
-            <a:prstGeom prst="rect">
-              <a:avLst/>
-            </a:prstGeom>
-            <a:grpFill/>
-            <a:ln>
-              <a:solidFill>
-                <a:schemeClr val="accent5"/>
-              </a:solidFill>
-            </a:ln>
-          </p:spPr>
-          <p:style>
-            <a:lnRef idx="2">
-              <a:schemeClr val="accent1">
-                <a:shade val="50000"/>
-              </a:schemeClr>
-            </a:lnRef>
-            <a:fillRef idx="1">
-              <a:schemeClr val="accent1"/>
-            </a:fillRef>
-            <a:effectRef idx="0">
-              <a:schemeClr val="accent1"/>
-            </a:effectRef>
-            <a:fontRef idx="minor">
-              <a:schemeClr val="lt1"/>
-            </a:fontRef>
-          </p:style>
-          <p:txBody>
-            <a:bodyPr rtlCol="0" anchor="ctr"/>
-            <a:lstStyle/>
-            <a:p>
-              <a:endParaRPr lang="en-SG" sz="1400" b="1">
-                <a:solidFill>
-                  <a:schemeClr val="accent5"/>
-                </a:solidFill>
-              </a:endParaRPr>
-            </a:p>
-          </p:txBody>
-        </p:sp>
-      </p:grpSp>
-      <p:grpSp>
-        <p:nvGrpSpPr>
-          <p:cNvPr id="36" name="Group 35"/>
-          <p:cNvGrpSpPr/>
-          <p:nvPr/>
-        </p:nvGrpSpPr>
-        <p:grpSpPr>
-          <a:xfrm>
-            <a:off x="1981200" y="380999"/>
-            <a:ext cx="1371600" cy="762000"/>
-            <a:chOff x="-228600" y="1371600"/>
-            <a:chExt cx="1371600" cy="762000"/>
-          </a:xfrm>
-          <a:solidFill>
-            <a:schemeClr val="bg1"/>
-          </a:solidFill>
-        </p:grpSpPr>
-        <p:sp>
-          <p:nvSpPr>
-            <p:cNvPr id="37" name="Rectangle 36"/>
-            <p:cNvSpPr/>
-            <p:nvPr/>
-          </p:nvSpPr>
-          <p:spPr>
-            <a:xfrm>
-              <a:off x="-228600" y="1524000"/>
-              <a:ext cx="1371600" cy="609600"/>
+              <a:off x="-533400" y="1524000"/>
+              <a:ext cx="1676400" cy="354650"/>
             </a:xfrm>
             <a:prstGeom prst="rect">
               <a:avLst/>
@@ -4380,7 +4530,7 @@
         </p:sp>
         <p:sp>
           <p:nvSpPr>
-            <p:cNvPr id="38" name="Rectangle 37"/>
+            <p:cNvPr id="111" name="Rectangle 110"/>
             <p:cNvSpPr/>
             <p:nvPr/>
           </p:nvSpPr>
@@ -4431,13 +4581,13 @@
       </p:grpSp>
       <p:cxnSp>
         <p:nvCxnSpPr>
-          <p:cNvPr id="40" name="Straight Arrow Connector 39"/>
+          <p:cNvPr id="112" name="Straight Arrow Connector 111"/>
           <p:cNvCxnSpPr/>
           <p:nvPr/>
         </p:nvCxnSpPr>
         <p:spPr>
           <a:xfrm>
-            <a:off x="6096000" y="4495800"/>
+            <a:off x="5844381" y="3962400"/>
             <a:ext cx="762000" cy="0"/>
           </a:xfrm>
           <a:prstGeom prst="straightConnector1">
@@ -4448,7 +4598,8 @@
               <a:srgbClr val="7030A0"/>
             </a:solidFill>
             <a:prstDash val="sysDot"/>
-            <a:tailEnd type="arrow"/>
+            <a:headEnd type="none" w="med" len="med"/>
+            <a:tailEnd type="triangle" w="med" len="med"/>
           </a:ln>
         </p:spPr>
         <p:style>
@@ -4468,13 +4619,13 @@
       </p:cxnSp>
       <p:cxnSp>
         <p:nvCxnSpPr>
-          <p:cNvPr id="44" name="Straight Arrow Connector 43"/>
+          <p:cNvPr id="113" name="Straight Arrow Connector 112"/>
           <p:cNvCxnSpPr/>
           <p:nvPr/>
         </p:nvCxnSpPr>
         <p:spPr>
           <a:xfrm>
-            <a:off x="2514600" y="5105400"/>
+            <a:off x="2262981" y="4572000"/>
             <a:ext cx="1752600" cy="0"/>
           </a:xfrm>
           <a:prstGeom prst="straightConnector1">
@@ -4487,7 +4638,8 @@
               </a:schemeClr>
             </a:solidFill>
             <a:prstDash val="sysDot"/>
-            <a:tailEnd type="arrow"/>
+            <a:headEnd type="none" w="med" len="med"/>
+            <a:tailEnd type="triangle" w="med" len="med"/>
           </a:ln>
         </p:spPr>
         <p:style>
@@ -4507,13 +4659,13 @@
       </p:cxnSp>
       <p:cxnSp>
         <p:nvCxnSpPr>
-          <p:cNvPr id="49" name="Straight Arrow Connector 48"/>
+          <p:cNvPr id="114" name="Straight Arrow Connector 113"/>
           <p:cNvCxnSpPr/>
           <p:nvPr/>
         </p:nvCxnSpPr>
         <p:spPr>
           <a:xfrm flipV="1">
-            <a:off x="7620000" y="3276600"/>
+            <a:off x="7368381" y="2743200"/>
             <a:ext cx="0" cy="834640"/>
           </a:xfrm>
           <a:prstGeom prst="straightConnector1">
@@ -4524,7 +4676,8 @@
               <a:srgbClr val="00B050"/>
             </a:solidFill>
             <a:prstDash val="sysDot"/>
-            <a:tailEnd type="arrow"/>
+            <a:headEnd type="none" w="med" len="med"/>
+            <a:tailEnd type="triangle" w="med" len="med"/>
           </a:ln>
         </p:spPr>
         <p:style>
@@ -4544,13 +4697,13 @@
       </p:cxnSp>
       <p:cxnSp>
         <p:nvCxnSpPr>
-          <p:cNvPr id="52" name="Straight Arrow Connector 51"/>
+          <p:cNvPr id="115" name="Straight Arrow Connector 114"/>
           <p:cNvCxnSpPr/>
           <p:nvPr/>
         </p:nvCxnSpPr>
         <p:spPr>
           <a:xfrm>
-            <a:off x="2057400" y="1441391"/>
+            <a:off x="1805781" y="907991"/>
             <a:ext cx="0" cy="457198"/>
           </a:xfrm>
           <a:prstGeom prst="straightConnector1">
@@ -4561,7 +4714,7 @@
               <a:schemeClr val="accent1"/>
             </a:solidFill>
             <a:prstDash val="sysDot"/>
-            <a:headEnd type="arrow" w="med" len="med"/>
+            <a:headEnd type="triangle" w="med" len="med"/>
             <a:tailEnd type="none" w="med" len="med"/>
           </a:ln>
         </p:spPr>
@@ -4582,13 +4735,13 @@
       </p:cxnSp>
       <p:cxnSp>
         <p:nvCxnSpPr>
-          <p:cNvPr id="54" name="Straight Arrow Connector 53"/>
+          <p:cNvPr id="116" name="Straight Arrow Connector 115"/>
           <p:cNvCxnSpPr/>
           <p:nvPr/>
         </p:nvCxnSpPr>
         <p:spPr>
           <a:xfrm>
-            <a:off x="4876800" y="1443528"/>
+            <a:off x="4625181" y="910128"/>
             <a:ext cx="0" cy="457198"/>
           </a:xfrm>
           <a:prstGeom prst="straightConnector1">
@@ -4599,7 +4752,7 @@
               <a:srgbClr val="7030A0"/>
             </a:solidFill>
             <a:prstDash val="sysDot"/>
-            <a:headEnd type="arrow" w="med" len="med"/>
+            <a:headEnd type="triangle" w="med" len="med"/>
             <a:tailEnd type="none" w="med" len="med"/>
           </a:ln>
         </p:spPr>
@@ -4620,13 +4773,13 @@
       </p:cxnSp>
       <p:cxnSp>
         <p:nvCxnSpPr>
-          <p:cNvPr id="55" name="Straight Arrow Connector 54"/>
+          <p:cNvPr id="117" name="Straight Arrow Connector 116"/>
           <p:cNvCxnSpPr/>
           <p:nvPr/>
         </p:nvCxnSpPr>
         <p:spPr>
           <a:xfrm>
-            <a:off x="7620000" y="1192849"/>
+            <a:off x="7368381" y="659449"/>
             <a:ext cx="0" cy="1460975"/>
           </a:xfrm>
           <a:prstGeom prst="straightConnector1">
@@ -4638,7 +4791,7 @@
             </a:solidFill>
             <a:prstDash val="sysDot"/>
             <a:headEnd type="none" w="med" len="med"/>
-            <a:tailEnd type="arrow" w="med" len="med"/>
+            <a:tailEnd type="triangle" w="med" len="med"/>
           </a:ln>
         </p:spPr>
         <p:style>
@@ -4658,13 +4811,13 @@
       </p:cxnSp>
       <p:cxnSp>
         <p:nvCxnSpPr>
-          <p:cNvPr id="56" name="Straight Arrow Connector 55"/>
+          <p:cNvPr id="118" name="Straight Arrow Connector 117"/>
           <p:cNvCxnSpPr/>
           <p:nvPr/>
         </p:nvCxnSpPr>
         <p:spPr>
           <a:xfrm>
-            <a:off x="750962" y="1447802"/>
+            <a:off x="499343" y="914402"/>
             <a:ext cx="11038" cy="3200398"/>
           </a:xfrm>
           <a:prstGeom prst="straightConnector1">
@@ -4677,7 +4830,7 @@
               </a:schemeClr>
             </a:solidFill>
             <a:prstDash val="sysDot"/>
-            <a:headEnd type="arrow" w="med" len="med"/>
+            <a:headEnd type="triangle" w="med" len="med"/>
             <a:tailEnd type="none" w="med" len="med"/>
           </a:ln>
         </p:spPr>
@@ -4698,13 +4851,13 @@
       </p:cxnSp>
       <p:cxnSp>
         <p:nvCxnSpPr>
-          <p:cNvPr id="59" name="Straight Arrow Connector 58"/>
+          <p:cNvPr id="119" name="Straight Arrow Connector 118"/>
           <p:cNvCxnSpPr/>
           <p:nvPr/>
         </p:nvCxnSpPr>
         <p:spPr>
           <a:xfrm>
-            <a:off x="4876800" y="3124200"/>
+            <a:off x="4625181" y="2590800"/>
             <a:ext cx="0" cy="457200"/>
           </a:xfrm>
           <a:prstGeom prst="straightConnector1">
@@ -4715,7 +4868,7 @@
               <a:srgbClr val="7030A0"/>
             </a:solidFill>
             <a:prstDash val="sysDot"/>
-            <a:headEnd type="arrow" w="med" len="med"/>
+            <a:headEnd type="triangle" w="med" len="med"/>
             <a:tailEnd type="none" w="med" len="med"/>
           </a:ln>
         </p:spPr>
@@ -4736,13 +4889,13 @@
       </p:cxnSp>
       <p:cxnSp>
         <p:nvCxnSpPr>
-          <p:cNvPr id="63" name="Straight Arrow Connector 62"/>
+          <p:cNvPr id="120" name="Straight Arrow Connector 119"/>
           <p:cNvCxnSpPr/>
           <p:nvPr/>
         </p:nvCxnSpPr>
         <p:spPr>
           <a:xfrm>
-            <a:off x="1219200" y="5638800"/>
+            <a:off x="967581" y="4755022"/>
             <a:ext cx="0" cy="379221"/>
           </a:xfrm>
           <a:prstGeom prst="straightConnector1">
@@ -4756,7 +4909,7 @@
             </a:solidFill>
             <a:prstDash val="sysDot"/>
             <a:headEnd type="none" w="med" len="med"/>
-            <a:tailEnd type="arrow" w="med" len="med"/>
+            <a:tailEnd type="triangle" w="med" len="med"/>
           </a:ln>
         </p:spPr>
         <p:style>
@@ -4776,13 +4929,13 @@
       </p:cxnSp>
       <p:grpSp>
         <p:nvGrpSpPr>
-          <p:cNvPr id="69" name="Group 68"/>
+          <p:cNvPr id="121" name="Group 120"/>
           <p:cNvGrpSpPr/>
           <p:nvPr/>
         </p:nvGrpSpPr>
         <p:grpSpPr>
           <a:xfrm>
-            <a:off x="4267200" y="4648200"/>
+            <a:off x="4015581" y="4114800"/>
             <a:ext cx="1371600" cy="762000"/>
             <a:chOff x="-228600" y="1371600"/>
             <a:chExt cx="1371600" cy="762000"/>
@@ -4793,7 +4946,7 @@
         </p:grpSpPr>
         <p:sp>
           <p:nvSpPr>
-            <p:cNvPr id="70" name="Rectangle 69"/>
+            <p:cNvPr id="122" name="Rectangle 121"/>
             <p:cNvSpPr/>
             <p:nvPr/>
           </p:nvSpPr>
@@ -4851,7 +5004,7 @@
         </p:sp>
         <p:sp>
           <p:nvSpPr>
-            <p:cNvPr id="71" name="Rectangle 70"/>
+            <p:cNvPr id="123" name="Rectangle 122"/>
             <p:cNvSpPr/>
             <p:nvPr/>
           </p:nvSpPr>
@@ -4902,13 +5055,13 @@
       </p:grpSp>
       <p:cxnSp>
         <p:nvCxnSpPr>
-          <p:cNvPr id="72" name="Straight Arrow Connector 71"/>
+          <p:cNvPr id="124" name="Straight Arrow Connector 123"/>
           <p:cNvCxnSpPr/>
           <p:nvPr/>
         </p:nvCxnSpPr>
         <p:spPr>
           <a:xfrm>
-            <a:off x="4876800" y="4191000"/>
+            <a:off x="4625181" y="3657600"/>
             <a:ext cx="0" cy="609600"/>
           </a:xfrm>
           <a:prstGeom prst="straightConnector1">
@@ -4919,7 +5072,7 @@
               <a:srgbClr val="7030A0"/>
             </a:solidFill>
             <a:prstDash val="sysDot"/>
-            <a:headEnd type="arrow" w="med" len="med"/>
+            <a:headEnd type="triangle" w="med" len="med"/>
             <a:tailEnd type="none" w="med" len="med"/>
           </a:ln>
         </p:spPr>
@@ -4940,13 +5093,13 @@
       </p:cxnSp>
       <p:cxnSp>
         <p:nvCxnSpPr>
-          <p:cNvPr id="75" name="Straight Arrow Connector 74"/>
+          <p:cNvPr id="125" name="Straight Arrow Connector 124"/>
           <p:cNvCxnSpPr/>
           <p:nvPr/>
         </p:nvCxnSpPr>
         <p:spPr>
           <a:xfrm flipV="1">
-            <a:off x="7010400" y="1443528"/>
+            <a:off x="6758781" y="910128"/>
             <a:ext cx="0" cy="462186"/>
           </a:xfrm>
           <a:prstGeom prst="straightConnector1">
@@ -4958,7 +5111,7 @@
             </a:solidFill>
             <a:prstDash val="sysDot"/>
             <a:headEnd type="none" w="med" len="med"/>
-            <a:tailEnd type="arrow" w="med" len="med"/>
+            <a:tailEnd type="triangle" w="med" len="med"/>
           </a:ln>
         </p:spPr>
         <p:style>
@@ -4978,13 +5131,13 @@
       </p:cxnSp>
       <p:grpSp>
         <p:nvGrpSpPr>
-          <p:cNvPr id="12" name="Group 11"/>
+          <p:cNvPr id="126" name="Group 125"/>
           <p:cNvGrpSpPr/>
           <p:nvPr/>
         </p:nvGrpSpPr>
         <p:grpSpPr>
           <a:xfrm>
-            <a:off x="4267200" y="3429000"/>
+            <a:off x="4015581" y="2895600"/>
             <a:ext cx="1371600" cy="762000"/>
             <a:chOff x="-228600" y="1371600"/>
             <a:chExt cx="1371600" cy="762000"/>
@@ -4995,7 +5148,7 @@
         </p:grpSpPr>
         <p:sp>
           <p:nvSpPr>
-            <p:cNvPr id="13" name="Rectangle 12"/>
+            <p:cNvPr id="127" name="Rectangle 126"/>
             <p:cNvSpPr/>
             <p:nvPr/>
           </p:nvSpPr>
@@ -5061,7 +5214,7 @@
         </p:sp>
         <p:sp>
           <p:nvSpPr>
-            <p:cNvPr id="14" name="Rectangle 13"/>
+            <p:cNvPr id="128" name="Rectangle 127"/>
             <p:cNvSpPr/>
             <p:nvPr/>
           </p:nvSpPr>
@@ -5112,13 +5265,13 @@
       </p:grpSp>
       <p:grpSp>
         <p:nvGrpSpPr>
-          <p:cNvPr id="57" name="Group 56"/>
+          <p:cNvPr id="129" name="Group 128"/>
           <p:cNvGrpSpPr/>
           <p:nvPr/>
         </p:nvGrpSpPr>
         <p:grpSpPr>
           <a:xfrm>
-            <a:off x="4191000" y="5867400"/>
+            <a:off x="3939381" y="5334000"/>
             <a:ext cx="1447800" cy="762000"/>
             <a:chOff x="-304800" y="1371600"/>
             <a:chExt cx="1447800" cy="762000"/>
@@ -5129,7 +5282,7 @@
         </p:grpSpPr>
         <p:sp>
           <p:nvSpPr>
-            <p:cNvPr id="58" name="Rectangle 57"/>
+            <p:cNvPr id="130" name="Rectangle 129"/>
             <p:cNvSpPr/>
             <p:nvPr/>
           </p:nvSpPr>
@@ -5187,7 +5340,7 @@
         </p:sp>
         <p:sp>
           <p:nvSpPr>
-            <p:cNvPr id="60" name="Rectangle 59"/>
+            <p:cNvPr id="131" name="Rectangle 130"/>
             <p:cNvSpPr/>
             <p:nvPr/>
           </p:nvSpPr>
@@ -5238,13 +5391,13 @@
       </p:grpSp>
       <p:cxnSp>
         <p:nvCxnSpPr>
-          <p:cNvPr id="62" name="Straight Arrow Connector 61"/>
+          <p:cNvPr id="132" name="Straight Arrow Connector 131"/>
           <p:cNvCxnSpPr/>
           <p:nvPr/>
         </p:nvCxnSpPr>
         <p:spPr>
           <a:xfrm>
-            <a:off x="4876800" y="5410200"/>
+            <a:off x="4625181" y="4876800"/>
             <a:ext cx="0" cy="609600"/>
           </a:xfrm>
           <a:prstGeom prst="straightConnector1">
@@ -5255,7 +5408,7 @@
               <a:srgbClr val="7030A0"/>
             </a:solidFill>
             <a:prstDash val="sysDot"/>
-            <a:headEnd type="arrow" w="med" len="med"/>
+            <a:headEnd type="triangle" w="med" len="med"/>
             <a:tailEnd type="none" w="med" len="med"/>
           </a:ln>
         </p:spPr>
@@ -5276,15 +5429,15 @@
       </p:cxnSp>
       <p:cxnSp>
         <p:nvCxnSpPr>
-          <p:cNvPr id="41" name="Elbow Connector 40"/>
+          <p:cNvPr id="133" name="Elbow Connector 132"/>
           <p:cNvCxnSpPr>
-            <a:endCxn id="16" idx="3"/>
+            <a:endCxn id="98" idx="3"/>
           </p:cNvCxnSpPr>
           <p:nvPr/>
         </p:nvCxnSpPr>
         <p:spPr>
           <a:xfrm rot="5400000" flipH="1" flipV="1">
-            <a:off x="4419600" y="3276600"/>
+            <a:off x="4167981" y="2743200"/>
             <a:ext cx="1676400" cy="762000"/>
           </a:xfrm>
           <a:prstGeom prst="bentConnector4">
@@ -5299,7 +5452,7 @@
             </a:solidFill>
             <a:prstDash val="sysDot"/>
             <a:headEnd type="none" w="med" len="med"/>
-            <a:tailEnd type="arrow" w="med" len="med"/>
+            <a:tailEnd type="triangle" w="med" len="med"/>
           </a:ln>
         </p:spPr>
         <p:style>
@@ -5319,15 +5472,15 @@
       </p:cxnSp>
       <p:cxnSp>
         <p:nvCxnSpPr>
-          <p:cNvPr id="64" name="Straight Arrow Connector 63"/>
+          <p:cNvPr id="134" name="Straight Arrow Connector 133"/>
           <p:cNvCxnSpPr>
-            <a:stCxn id="13" idx="1"/>
+            <a:stCxn id="127" idx="1"/>
           </p:cNvCxnSpPr>
           <p:nvPr/>
         </p:nvCxnSpPr>
         <p:spPr>
           <a:xfrm flipH="1">
-            <a:off x="2819400" y="3886200"/>
+            <a:off x="2567781" y="3352800"/>
             <a:ext cx="1447800" cy="0"/>
           </a:xfrm>
           <a:prstGeom prst="straightConnector1">
@@ -5338,7 +5491,7 @@
               <a:schemeClr val="accent1"/>
             </a:solidFill>
             <a:prstDash val="sysDot"/>
-            <a:headEnd type="arrow" w="med" len="med"/>
+            <a:headEnd type="triangle" w="med" len="med"/>
             <a:tailEnd type="none" w="med" len="med"/>
           </a:ln>
         </p:spPr>
@@ -5359,16 +5512,16 @@
       </p:cxnSp>
       <p:grpSp>
         <p:nvGrpSpPr>
-          <p:cNvPr id="73" name="Group 72"/>
+          <p:cNvPr id="135" name="Group 134"/>
           <p:cNvGrpSpPr/>
           <p:nvPr/>
         </p:nvGrpSpPr>
         <p:grpSpPr>
           <a:xfrm>
-            <a:off x="4343400" y="380999"/>
-            <a:ext cx="1371600" cy="762000"/>
-            <a:chOff x="-228600" y="1371600"/>
-            <a:chExt cx="1371600" cy="762000"/>
+            <a:off x="3786981" y="254950"/>
+            <a:ext cx="1676400" cy="507050"/>
+            <a:chOff x="-533400" y="1371600"/>
+            <a:chExt cx="1676400" cy="507050"/>
           </a:xfrm>
           <a:solidFill>
             <a:schemeClr val="bg1"/>
@@ -5376,14 +5529,14 @@
         </p:grpSpPr>
         <p:sp>
           <p:nvSpPr>
-            <p:cNvPr id="74" name="Rectangle 73"/>
+            <p:cNvPr id="136" name="Rectangle 135"/>
             <p:cNvSpPr/>
             <p:nvPr/>
           </p:nvSpPr>
           <p:spPr>
             <a:xfrm>
-              <a:off x="-228600" y="1524000"/>
-              <a:ext cx="1371600" cy="609600"/>
+              <a:off x="-533400" y="1524000"/>
+              <a:ext cx="1676400" cy="354650"/>
             </a:xfrm>
             <a:prstGeom prst="rect">
               <a:avLst/>
@@ -5421,22 +5574,15 @@
                     <a:schemeClr val="accent5"/>
                   </a:solidFill>
                 </a:rPr>
-                <a:t>common</a:t>
+                <a:t>common::</a:t>
               </a:r>
-              <a:br>
-                <a:rPr lang="en-US" sz="1400" b="1" dirty="0" smtClean="0">
-                  <a:solidFill>
-                    <a:schemeClr val="accent5"/>
-                  </a:solidFill>
-                </a:rPr>
-              </a:br>
               <a:r>
                 <a:rPr lang="en-US" sz="1400" b="1" dirty="0" smtClean="0">
                   <a:solidFill>
                     <a:schemeClr val="accent5"/>
                   </a:solidFill>
                 </a:rPr>
-                <a:t>    ::exception</a:t>
+                <a:t>exception</a:t>
               </a:r>
               <a:endParaRPr lang="en-SG" sz="1400" b="1" dirty="0">
                 <a:solidFill>
@@ -5448,7 +5594,7 @@
         </p:sp>
         <p:sp>
           <p:nvSpPr>
-            <p:cNvPr id="76" name="Rectangle 75"/>
+            <p:cNvPr id="137" name="Rectangle 136"/>
             <p:cNvSpPr/>
             <p:nvPr/>
           </p:nvSpPr>
@@ -5498,13 +5644,13 @@
       </p:grpSp>
       <p:grpSp>
         <p:nvGrpSpPr>
-          <p:cNvPr id="77" name="Group 76"/>
+          <p:cNvPr id="138" name="Group 137"/>
           <p:cNvGrpSpPr/>
           <p:nvPr/>
         </p:nvGrpSpPr>
         <p:grpSpPr>
           <a:xfrm>
-            <a:off x="6781800" y="5422306"/>
+            <a:off x="6530181" y="4888906"/>
             <a:ext cx="1676400" cy="762000"/>
             <a:chOff x="-533400" y="1371600"/>
             <a:chExt cx="1676400" cy="762000"/>
@@ -5515,7 +5661,7 @@
         </p:grpSpPr>
         <p:sp>
           <p:nvSpPr>
-            <p:cNvPr id="78" name="Rectangle 77"/>
+            <p:cNvPr id="139" name="Rectangle 138"/>
             <p:cNvSpPr/>
             <p:nvPr/>
           </p:nvSpPr>
@@ -5589,7 +5735,7 @@
         </p:sp>
         <p:sp>
           <p:nvSpPr>
-            <p:cNvPr id="79" name="Rectangle 78"/>
+            <p:cNvPr id="140" name="Rectangle 139"/>
             <p:cNvSpPr/>
             <p:nvPr/>
           </p:nvSpPr>
@@ -5640,13 +5786,13 @@
       </p:grpSp>
       <p:cxnSp>
         <p:nvCxnSpPr>
-          <p:cNvPr id="80" name="Straight Arrow Connector 79"/>
+          <p:cNvPr id="141" name="Straight Arrow Connector 140"/>
           <p:cNvCxnSpPr/>
           <p:nvPr/>
         </p:nvCxnSpPr>
         <p:spPr>
           <a:xfrm>
-            <a:off x="7620000" y="4724400"/>
+            <a:off x="7368381" y="4191000"/>
             <a:ext cx="0" cy="841403"/>
           </a:xfrm>
           <a:prstGeom prst="straightConnector1">
@@ -5658,7 +5804,7 @@
             </a:solidFill>
             <a:prstDash val="sysDot"/>
             <a:headEnd type="none" w="med" len="med"/>
-            <a:tailEnd type="arrow" w="med" len="med"/>
+            <a:tailEnd type="triangle" w="med" len="med"/>
           </a:ln>
         </p:spPr>
         <p:style>
@@ -5678,13 +5824,13 @@
       </p:cxnSp>
       <p:grpSp>
         <p:nvGrpSpPr>
-          <p:cNvPr id="84" name="Group 83"/>
+          <p:cNvPr id="142" name="Group 141"/>
           <p:cNvGrpSpPr/>
           <p:nvPr/>
         </p:nvGrpSpPr>
         <p:grpSpPr>
           <a:xfrm>
-            <a:off x="1447800" y="2286000"/>
+            <a:off x="1196181" y="2362200"/>
             <a:ext cx="1371600" cy="609600"/>
             <a:chOff x="-228600" y="1371600"/>
             <a:chExt cx="1371600" cy="609600"/>
@@ -5695,7 +5841,7 @@
         </p:grpSpPr>
         <p:sp>
           <p:nvSpPr>
-            <p:cNvPr id="85" name="Rectangle 84"/>
+            <p:cNvPr id="143" name="Rectangle 142"/>
             <p:cNvSpPr/>
             <p:nvPr/>
           </p:nvSpPr>
@@ -5756,7 +5902,7 @@
         </p:sp>
         <p:sp>
           <p:nvSpPr>
-            <p:cNvPr id="86" name="Rectangle 85"/>
+            <p:cNvPr id="144" name="Rectangle 143"/>
             <p:cNvSpPr/>
             <p:nvPr/>
           </p:nvSpPr>
@@ -5802,14 +5948,14 @@
       </p:grpSp>
       <p:cxnSp>
         <p:nvCxnSpPr>
-          <p:cNvPr id="87" name="Straight Arrow Connector 86"/>
+          <p:cNvPr id="145" name="Straight Arrow Connector 144"/>
           <p:cNvCxnSpPr/>
           <p:nvPr/>
         </p:nvCxnSpPr>
         <p:spPr>
           <a:xfrm flipV="1">
-            <a:off x="2057400" y="2895600"/>
-            <a:ext cx="0" cy="762000"/>
+            <a:off x="1805781" y="2971800"/>
+            <a:ext cx="0" cy="304800"/>
           </a:xfrm>
           <a:prstGeom prst="straightConnector1">
             <a:avLst/>
@@ -5819,7 +5965,7 @@
               <a:schemeClr val="accent1"/>
             </a:solidFill>
             <a:prstDash val="sysDot"/>
-            <a:headEnd type="arrow" w="med" len="med"/>
+            <a:headEnd type="triangle" w="med" len="med"/>
             <a:tailEnd type="none" w="med" len="med"/>
           </a:ln>
         </p:spPr>
@@ -5838,6 +5984,592 @@
           </a:fontRef>
         </p:style>
       </p:cxnSp>
+      <p:grpSp>
+        <p:nvGrpSpPr>
+          <p:cNvPr id="146" name="Group 145"/>
+          <p:cNvGrpSpPr/>
+          <p:nvPr/>
+        </p:nvGrpSpPr>
+        <p:grpSpPr>
+          <a:xfrm>
+            <a:off x="1196181" y="1600200"/>
+            <a:ext cx="1371600" cy="609600"/>
+            <a:chOff x="-228600" y="1371600"/>
+            <a:chExt cx="1371600" cy="609600"/>
+          </a:xfrm>
+          <a:solidFill>
+            <a:schemeClr val="bg1"/>
+          </a:solidFill>
+        </p:grpSpPr>
+        <p:sp>
+          <p:nvSpPr>
+            <p:cNvPr id="147" name="Rectangle 146"/>
+            <p:cNvSpPr/>
+            <p:nvPr/>
+          </p:nvSpPr>
+          <p:spPr>
+            <a:xfrm>
+              <a:off x="-228600" y="1524000"/>
+              <a:ext cx="1371600" cy="457200"/>
+            </a:xfrm>
+            <a:prstGeom prst="rect">
+              <a:avLst/>
+            </a:prstGeom>
+            <a:grpFill/>
+          </p:spPr>
+          <p:style>
+            <a:lnRef idx="2">
+              <a:schemeClr val="accent1">
+                <a:shade val="50000"/>
+              </a:schemeClr>
+            </a:lnRef>
+            <a:fillRef idx="1">
+              <a:schemeClr val="accent1"/>
+            </a:fillRef>
+            <a:effectRef idx="0">
+              <a:schemeClr val="accent1"/>
+            </a:effectRef>
+            <a:fontRef idx="minor">
+              <a:schemeClr val="lt1"/>
+            </a:fontRef>
+          </p:style>
+          <p:txBody>
+            <a:bodyPr rtlCol="0" anchor="ctr"/>
+            <a:lstStyle/>
+            <a:p>
+              <a:pPr algn="ctr"/>
+              <a:r>
+                <a:rPr lang="en-US" sz="1400" b="1" dirty="0" err="1" smtClean="0">
+                  <a:solidFill>
+                    <a:schemeClr val="tx2"/>
+                  </a:solidFill>
+                </a:rPr>
+                <a:t>ui</a:t>
+              </a:r>
+              <a:r>
+                <a:rPr lang="en-US" sz="1400" b="1" dirty="0" smtClean="0">
+                  <a:solidFill>
+                    <a:schemeClr val="tx2"/>
+                  </a:solidFill>
+                </a:rPr>
+                <a:t>::</a:t>
+              </a:r>
+              <a:r>
+                <a:rPr lang="en-US" sz="1400" b="1" dirty="0" smtClean="0">
+                  <a:solidFill>
+                    <a:schemeClr val="tx2"/>
+                  </a:solidFill>
+                </a:rPr>
+                <a:t>website</a:t>
+              </a:r>
+              <a:endParaRPr lang="en-SG" sz="1400" b="1" dirty="0">
+                <a:solidFill>
+                  <a:schemeClr val="tx2"/>
+                </a:solidFill>
+              </a:endParaRPr>
+            </a:p>
+          </p:txBody>
+        </p:sp>
+        <p:sp>
+          <p:nvSpPr>
+            <p:cNvPr id="148" name="Rectangle 147"/>
+            <p:cNvSpPr/>
+            <p:nvPr/>
+          </p:nvSpPr>
+          <p:spPr>
+            <a:xfrm>
+              <a:off x="647700" y="1371600"/>
+              <a:ext cx="495300" cy="152400"/>
+            </a:xfrm>
+            <a:prstGeom prst="rect">
+              <a:avLst/>
+            </a:prstGeom>
+            <a:grpFill/>
+          </p:spPr>
+          <p:style>
+            <a:lnRef idx="2">
+              <a:schemeClr val="accent1">
+                <a:shade val="50000"/>
+              </a:schemeClr>
+            </a:lnRef>
+            <a:fillRef idx="1">
+              <a:schemeClr val="accent1"/>
+            </a:fillRef>
+            <a:effectRef idx="0">
+              <a:schemeClr val="accent1"/>
+            </a:effectRef>
+            <a:fontRef idx="minor">
+              <a:schemeClr val="lt1"/>
+            </a:fontRef>
+          </p:style>
+          <p:txBody>
+            <a:bodyPr rtlCol="0" anchor="ctr"/>
+            <a:lstStyle/>
+            <a:p>
+              <a:pPr algn="ctr"/>
+              <a:endParaRPr lang="en-SG" sz="1400" b="1">
+                <a:solidFill>
+                  <a:schemeClr val="tx2"/>
+                </a:solidFill>
+              </a:endParaRPr>
+            </a:p>
+          </p:txBody>
+        </p:sp>
+      </p:grpSp>
+      <p:grpSp>
+        <p:nvGrpSpPr>
+          <p:cNvPr id="149" name="Group 148"/>
+          <p:cNvGrpSpPr/>
+          <p:nvPr/>
+        </p:nvGrpSpPr>
+        <p:grpSpPr>
+          <a:xfrm>
+            <a:off x="510381" y="4343400"/>
+            <a:ext cx="1371600" cy="499929"/>
+            <a:chOff x="-228600" y="1371600"/>
+            <a:chExt cx="1371600" cy="499929"/>
+          </a:xfrm>
+          <a:solidFill>
+            <a:schemeClr val="bg1"/>
+          </a:solidFill>
+        </p:grpSpPr>
+        <p:sp>
+          <p:nvSpPr>
+            <p:cNvPr id="150" name="Rectangle 149"/>
+            <p:cNvSpPr/>
+            <p:nvPr/>
+          </p:nvSpPr>
+          <p:spPr>
+            <a:xfrm>
+              <a:off x="-228600" y="1524001"/>
+              <a:ext cx="1371600" cy="347528"/>
+            </a:xfrm>
+            <a:prstGeom prst="rect">
+              <a:avLst/>
+            </a:prstGeom>
+            <a:grpFill/>
+            <a:ln>
+              <a:solidFill>
+                <a:schemeClr val="accent2">
+                  <a:lumMod val="75000"/>
+                </a:schemeClr>
+              </a:solidFill>
+            </a:ln>
+          </p:spPr>
+          <p:style>
+            <a:lnRef idx="2">
+              <a:schemeClr val="accent1">
+                <a:shade val="50000"/>
+              </a:schemeClr>
+            </a:lnRef>
+            <a:fillRef idx="1">
+              <a:schemeClr val="accent1"/>
+            </a:fillRef>
+            <a:effectRef idx="0">
+              <a:schemeClr val="accent1"/>
+            </a:effectRef>
+            <a:fontRef idx="minor">
+              <a:schemeClr val="lt1"/>
+            </a:fontRef>
+          </p:style>
+          <p:txBody>
+            <a:bodyPr rtlCol="0" anchor="ctr"/>
+            <a:lstStyle/>
+            <a:p>
+              <a:pPr algn="ctr"/>
+              <a:r>
+                <a:rPr lang="en-US" sz="1400" b="1" dirty="0" smtClean="0">
+                  <a:solidFill>
+                    <a:schemeClr val="accent2">
+                      <a:lumMod val="75000"/>
+                    </a:schemeClr>
+                  </a:solidFill>
+                </a:rPr>
+                <a:t>test::cases</a:t>
+              </a:r>
+              <a:endParaRPr lang="en-SG" sz="1400" b="1" dirty="0">
+                <a:solidFill>
+                  <a:schemeClr val="accent2">
+                    <a:lumMod val="75000"/>
+                  </a:schemeClr>
+                </a:solidFill>
+              </a:endParaRPr>
+            </a:p>
+          </p:txBody>
+        </p:sp>
+        <p:sp>
+          <p:nvSpPr>
+            <p:cNvPr id="151" name="Rectangle 150"/>
+            <p:cNvSpPr/>
+            <p:nvPr/>
+          </p:nvSpPr>
+          <p:spPr>
+            <a:xfrm>
+              <a:off x="647700" y="1371600"/>
+              <a:ext cx="495300" cy="152400"/>
+            </a:xfrm>
+            <a:prstGeom prst="rect">
+              <a:avLst/>
+            </a:prstGeom>
+            <a:grpFill/>
+            <a:ln>
+              <a:solidFill>
+                <a:schemeClr val="accent2">
+                  <a:lumMod val="75000"/>
+                </a:schemeClr>
+              </a:solidFill>
+            </a:ln>
+          </p:spPr>
+          <p:style>
+            <a:lnRef idx="2">
+              <a:schemeClr val="accent1">
+                <a:shade val="50000"/>
+              </a:schemeClr>
+            </a:lnRef>
+            <a:fillRef idx="1">
+              <a:schemeClr val="accent1"/>
+            </a:fillRef>
+            <a:effectRef idx="0">
+              <a:schemeClr val="accent1"/>
+            </a:effectRef>
+            <a:fontRef idx="minor">
+              <a:schemeClr val="lt1"/>
+            </a:fontRef>
+          </p:style>
+          <p:txBody>
+            <a:bodyPr rtlCol="0" anchor="ctr"/>
+            <a:lstStyle/>
+            <a:p>
+              <a:pPr algn="ctr"/>
+              <a:endParaRPr lang="en-SG" sz="1400" b="1">
+                <a:solidFill>
+                  <a:schemeClr val="accent2">
+                    <a:lumMod val="75000"/>
+                  </a:schemeClr>
+                </a:solidFill>
+              </a:endParaRPr>
+            </a:p>
+          </p:txBody>
+        </p:sp>
+      </p:grpSp>
+      <p:grpSp>
+        <p:nvGrpSpPr>
+          <p:cNvPr id="152" name="Group 151"/>
+          <p:cNvGrpSpPr/>
+          <p:nvPr/>
+        </p:nvGrpSpPr>
+        <p:grpSpPr>
+          <a:xfrm>
+            <a:off x="510381" y="5589661"/>
+            <a:ext cx="1371600" cy="506339"/>
+            <a:chOff x="-228600" y="1371600"/>
+            <a:chExt cx="1371600" cy="506339"/>
+          </a:xfrm>
+          <a:solidFill>
+            <a:schemeClr val="bg1"/>
+          </a:solidFill>
+        </p:grpSpPr>
+        <p:sp>
+          <p:nvSpPr>
+            <p:cNvPr id="153" name="Rectangle 152"/>
+            <p:cNvSpPr/>
+            <p:nvPr/>
+          </p:nvSpPr>
+          <p:spPr>
+            <a:xfrm>
+              <a:off x="-228600" y="1524000"/>
+              <a:ext cx="1371600" cy="353939"/>
+            </a:xfrm>
+            <a:prstGeom prst="rect">
+              <a:avLst/>
+            </a:prstGeom>
+            <a:grpFill/>
+            <a:ln>
+              <a:solidFill>
+                <a:schemeClr val="accent2">
+                  <a:lumMod val="75000"/>
+                </a:schemeClr>
+              </a:solidFill>
+            </a:ln>
+          </p:spPr>
+          <p:style>
+            <a:lnRef idx="2">
+              <a:schemeClr val="accent1">
+                <a:shade val="50000"/>
+              </a:schemeClr>
+            </a:lnRef>
+            <a:fillRef idx="1">
+              <a:schemeClr val="accent1"/>
+            </a:fillRef>
+            <a:effectRef idx="0">
+              <a:schemeClr val="accent1"/>
+            </a:effectRef>
+            <a:fontRef idx="minor">
+              <a:schemeClr val="lt1"/>
+            </a:fontRef>
+          </p:style>
+          <p:txBody>
+            <a:bodyPr rtlCol="0" anchor="ctr"/>
+            <a:lstStyle/>
+            <a:p>
+              <a:pPr algn="ctr"/>
+              <a:r>
+                <a:rPr lang="en-US" sz="1400" b="1" dirty="0" smtClean="0">
+                  <a:solidFill>
+                    <a:schemeClr val="accent2">
+                      <a:lumMod val="75000"/>
+                    </a:schemeClr>
+                  </a:solidFill>
+                </a:rPr>
+                <a:t>test</a:t>
+              </a:r>
+              <a:r>
+                <a:rPr lang="en-US" sz="1400" b="1" dirty="0" smtClean="0">
+                  <a:solidFill>
+                    <a:schemeClr val="accent2">
+                      <a:lumMod val="75000"/>
+                    </a:schemeClr>
+                  </a:solidFill>
+                </a:rPr>
+                <a:t>::scripts</a:t>
+              </a:r>
+              <a:endParaRPr lang="en-SG" sz="1400" b="1" dirty="0">
+                <a:solidFill>
+                  <a:schemeClr val="accent2">
+                    <a:lumMod val="75000"/>
+                  </a:schemeClr>
+                </a:solidFill>
+              </a:endParaRPr>
+            </a:p>
+          </p:txBody>
+        </p:sp>
+        <p:sp>
+          <p:nvSpPr>
+            <p:cNvPr id="154" name="Rectangle 153"/>
+            <p:cNvSpPr/>
+            <p:nvPr/>
+          </p:nvSpPr>
+          <p:spPr>
+            <a:xfrm>
+              <a:off x="647700" y="1371600"/>
+              <a:ext cx="495300" cy="152400"/>
+            </a:xfrm>
+            <a:prstGeom prst="rect">
+              <a:avLst/>
+            </a:prstGeom>
+            <a:grpFill/>
+            <a:ln>
+              <a:solidFill>
+                <a:schemeClr val="accent2">
+                  <a:lumMod val="75000"/>
+                </a:schemeClr>
+              </a:solidFill>
+            </a:ln>
+          </p:spPr>
+          <p:style>
+            <a:lnRef idx="2">
+              <a:schemeClr val="accent1">
+                <a:shade val="50000"/>
+              </a:schemeClr>
+            </a:lnRef>
+            <a:fillRef idx="1">
+              <a:schemeClr val="accent1"/>
+            </a:fillRef>
+            <a:effectRef idx="0">
+              <a:schemeClr val="accent1"/>
+            </a:effectRef>
+            <a:fontRef idx="minor">
+              <a:schemeClr val="lt1"/>
+            </a:fontRef>
+          </p:style>
+          <p:txBody>
+            <a:bodyPr rtlCol="0" anchor="ctr"/>
+            <a:lstStyle/>
+            <a:p>
+              <a:pPr algn="ctr"/>
+              <a:endParaRPr lang="en-SG" sz="1400" b="1">
+                <a:solidFill>
+                  <a:schemeClr val="accent2">
+                    <a:lumMod val="75000"/>
+                  </a:schemeClr>
+                </a:solidFill>
+              </a:endParaRPr>
+            </a:p>
+          </p:txBody>
+        </p:sp>
+      </p:grpSp>
+      <p:cxnSp>
+        <p:nvCxnSpPr>
+          <p:cNvPr id="155" name="Straight Arrow Connector 154"/>
+          <p:cNvCxnSpPr/>
+          <p:nvPr/>
+        </p:nvCxnSpPr>
+        <p:spPr>
+          <a:xfrm flipV="1">
+            <a:off x="967581" y="5511682"/>
+            <a:ext cx="0" cy="230379"/>
+          </a:xfrm>
+          <a:prstGeom prst="straightConnector1">
+            <a:avLst/>
+          </a:prstGeom>
+          <a:ln w="38100">
+            <a:solidFill>
+              <a:schemeClr val="accent2">
+                <a:lumMod val="75000"/>
+              </a:schemeClr>
+            </a:solidFill>
+            <a:prstDash val="sysDot"/>
+            <a:headEnd type="none" w="med" len="med"/>
+            <a:tailEnd type="triangle" w="med" len="med"/>
+          </a:ln>
+        </p:spPr>
+        <p:style>
+          <a:lnRef idx="1">
+            <a:schemeClr val="accent1"/>
+          </a:lnRef>
+          <a:fillRef idx="0">
+            <a:schemeClr val="accent1"/>
+          </a:fillRef>
+          <a:effectRef idx="0">
+            <a:schemeClr val="accent1"/>
+          </a:effectRef>
+          <a:fontRef idx="minor">
+            <a:schemeClr val="tx1"/>
+          </a:fontRef>
+        </p:style>
+      </p:cxnSp>
+      <p:grpSp>
+        <p:nvGrpSpPr>
+          <p:cNvPr id="156" name="Group 155"/>
+          <p:cNvGrpSpPr/>
+          <p:nvPr/>
+        </p:nvGrpSpPr>
+        <p:grpSpPr>
+          <a:xfrm>
+            <a:off x="6225381" y="256308"/>
+            <a:ext cx="1905000" cy="505692"/>
+            <a:chOff x="-762000" y="1371600"/>
+            <a:chExt cx="1905000" cy="505692"/>
+          </a:xfrm>
+          <a:solidFill>
+            <a:schemeClr val="bg1"/>
+          </a:solidFill>
+        </p:grpSpPr>
+        <p:sp>
+          <p:nvSpPr>
+            <p:cNvPr id="157" name="Rectangle 156"/>
+            <p:cNvSpPr/>
+            <p:nvPr/>
+          </p:nvSpPr>
+          <p:spPr>
+            <a:xfrm>
+              <a:off x="-762000" y="1524000"/>
+              <a:ext cx="1905000" cy="353292"/>
+            </a:xfrm>
+            <a:prstGeom prst="rect">
+              <a:avLst/>
+            </a:prstGeom>
+            <a:grpFill/>
+            <a:ln>
+              <a:solidFill>
+                <a:schemeClr val="accent5"/>
+              </a:solidFill>
+            </a:ln>
+          </p:spPr>
+          <p:style>
+            <a:lnRef idx="2">
+              <a:schemeClr val="accent1">
+                <a:shade val="50000"/>
+              </a:schemeClr>
+            </a:lnRef>
+            <a:fillRef idx="1">
+              <a:schemeClr val="accent1"/>
+            </a:fillRef>
+            <a:effectRef idx="0">
+              <a:schemeClr val="accent1"/>
+            </a:effectRef>
+            <a:fontRef idx="minor">
+              <a:schemeClr val="lt1"/>
+            </a:fontRef>
+          </p:style>
+          <p:txBody>
+            <a:bodyPr rtlCol="0" anchor="ctr"/>
+            <a:lstStyle/>
+            <a:p>
+              <a:r>
+                <a:rPr lang="en-US" sz="1400" b="1" dirty="0" smtClean="0">
+                  <a:solidFill>
+                    <a:schemeClr val="accent5"/>
+                  </a:solidFill>
+                </a:rPr>
+                <a:t>common::</a:t>
+              </a:r>
+              <a:r>
+                <a:rPr lang="en-US" sz="1400" b="1" dirty="0" err="1" smtClean="0">
+                  <a:solidFill>
+                    <a:schemeClr val="accent5"/>
+                  </a:solidFill>
+                </a:rPr>
+                <a:t>datatransfer</a:t>
+              </a:r>
+              <a:endParaRPr lang="en-SG" sz="1400" b="1" dirty="0">
+                <a:solidFill>
+                  <a:schemeClr val="accent5"/>
+                </a:solidFill>
+              </a:endParaRPr>
+            </a:p>
+          </p:txBody>
+        </p:sp>
+        <p:sp>
+          <p:nvSpPr>
+            <p:cNvPr id="158" name="Rectangle 157"/>
+            <p:cNvSpPr/>
+            <p:nvPr/>
+          </p:nvSpPr>
+          <p:spPr>
+            <a:xfrm>
+              <a:off x="647700" y="1371600"/>
+              <a:ext cx="495300" cy="152400"/>
+            </a:xfrm>
+            <a:prstGeom prst="rect">
+              <a:avLst/>
+            </a:prstGeom>
+            <a:grpFill/>
+            <a:ln>
+              <a:solidFill>
+                <a:schemeClr val="accent5"/>
+              </a:solidFill>
+            </a:ln>
+          </p:spPr>
+          <p:style>
+            <a:lnRef idx="2">
+              <a:schemeClr val="accent1">
+                <a:shade val="50000"/>
+              </a:schemeClr>
+            </a:lnRef>
+            <a:fillRef idx="1">
+              <a:schemeClr val="accent1"/>
+            </a:fillRef>
+            <a:effectRef idx="0">
+              <a:schemeClr val="accent1"/>
+            </a:effectRef>
+            <a:fontRef idx="minor">
+              <a:schemeClr val="lt1"/>
+            </a:fontRef>
+          </p:style>
+          <p:txBody>
+            <a:bodyPr rtlCol="0" anchor="ctr"/>
+            <a:lstStyle/>
+            <a:p>
+              <a:endParaRPr lang="en-SG" sz="1400" b="1">
+                <a:solidFill>
+                  <a:schemeClr val="accent5"/>
+                </a:solidFill>
+              </a:endParaRPr>
+            </a:p>
+          </p:txBody>
+        </p:sp>
+      </p:grpSp>
     </p:spTree>
     <p:extLst>
       <p:ext uri="{BB962C8B-B14F-4D97-AF65-F5344CB8AC3E}">
@@ -6139,4 +6871,289 @@
   <a:objectDefaults/>
   <a:extraClrSchemeLst/>
 </a:theme>
+</file>
+
+<file path=ppt/theme/theme2.xml><?xml version="1.0" encoding="utf-8"?>
+<a:theme xmlns:a="http://schemas.openxmlformats.org/drawingml/2006/main" name="Office Theme">
+  <a:themeElements>
+    <a:clrScheme name="Office">
+      <a:dk1>
+        <a:sysClr val="windowText" lastClr="000000"/>
+      </a:dk1>
+      <a:lt1>
+        <a:sysClr val="window" lastClr="FFFFFF"/>
+      </a:lt1>
+      <a:dk2>
+        <a:srgbClr val="1F497D"/>
+      </a:dk2>
+      <a:lt2>
+        <a:srgbClr val="EEECE1"/>
+      </a:lt2>
+      <a:accent1>
+        <a:srgbClr val="4F81BD"/>
+      </a:accent1>
+      <a:accent2>
+        <a:srgbClr val="C0504D"/>
+      </a:accent2>
+      <a:accent3>
+        <a:srgbClr val="9BBB59"/>
+      </a:accent3>
+      <a:accent4>
+        <a:srgbClr val="8064A2"/>
+      </a:accent4>
+      <a:accent5>
+        <a:srgbClr val="4BACC6"/>
+      </a:accent5>
+      <a:accent6>
+        <a:srgbClr val="F79646"/>
+      </a:accent6>
+      <a:hlink>
+        <a:srgbClr val="0000FF"/>
+      </a:hlink>
+      <a:folHlink>
+        <a:srgbClr val="800080"/>
+      </a:folHlink>
+    </a:clrScheme>
+    <a:fontScheme name="Office">
+      <a:majorFont>
+        <a:latin typeface="Calibri"/>
+        <a:ea typeface=""/>
+        <a:cs typeface=""/>
+        <a:font script="Jpan" typeface="ＭＳ Ｐゴシック"/>
+        <a:font script="Hang" typeface="맑은 고딕"/>
+        <a:font script="Hans" typeface="宋体"/>
+        <a:font script="Hant" typeface="新細明體"/>
+        <a:font script="Arab" typeface="Times New Roman"/>
+        <a:font script="Hebr" typeface="Times New Roman"/>
+        <a:font script="Thai" typeface="Angsana New"/>
+        <a:font script="Ethi" typeface="Nyala"/>
+        <a:font script="Beng" typeface="Vrinda"/>
+        <a:font script="Gujr" typeface="Shruti"/>
+        <a:font script="Khmr" typeface="MoolBoran"/>
+        <a:font script="Knda" typeface="Tunga"/>
+        <a:font script="Guru" typeface="Raavi"/>
+        <a:font script="Cans" typeface="Euphemia"/>
+        <a:font script="Cher" typeface="Plantagenet Cherokee"/>
+        <a:font script="Yiii" typeface="Microsoft Yi Baiti"/>
+        <a:font script="Tibt" typeface="Microsoft Himalaya"/>
+        <a:font script="Thaa" typeface="MV Boli"/>
+        <a:font script="Deva" typeface="Mangal"/>
+        <a:font script="Telu" typeface="Gautami"/>
+        <a:font script="Taml" typeface="Latha"/>
+        <a:font script="Syrc" typeface="Estrangelo Edessa"/>
+        <a:font script="Orya" typeface="Kalinga"/>
+        <a:font script="Mlym" typeface="Kartika"/>
+        <a:font script="Laoo" typeface="DokChampa"/>
+        <a:font script="Sinh" typeface="Iskoola Pota"/>
+        <a:font script="Mong" typeface="Mongolian Baiti"/>
+        <a:font script="Viet" typeface="Times New Roman"/>
+        <a:font script="Uigh" typeface="Microsoft Uighur"/>
+        <a:font script="Geor" typeface="Sylfaen"/>
+      </a:majorFont>
+      <a:minorFont>
+        <a:latin typeface="Calibri"/>
+        <a:ea typeface=""/>
+        <a:cs typeface=""/>
+        <a:font script="Jpan" typeface="ＭＳ Ｐゴシック"/>
+        <a:font script="Hang" typeface="맑은 고딕"/>
+        <a:font script="Hans" typeface="宋体"/>
+        <a:font script="Hant" typeface="新細明體"/>
+        <a:font script="Arab" typeface="Arial"/>
+        <a:font script="Hebr" typeface="Arial"/>
+        <a:font script="Thai" typeface="Cordia New"/>
+        <a:font script="Ethi" typeface="Nyala"/>
+        <a:font script="Beng" typeface="Vrinda"/>
+        <a:font script="Gujr" typeface="Shruti"/>
+        <a:font script="Khmr" typeface="DaunPenh"/>
+        <a:font script="Knda" typeface="Tunga"/>
+        <a:font script="Guru" typeface="Raavi"/>
+        <a:font script="Cans" typeface="Euphemia"/>
+        <a:font script="Cher" typeface="Plantagenet Cherokee"/>
+        <a:font script="Yiii" typeface="Microsoft Yi Baiti"/>
+        <a:font script="Tibt" typeface="Microsoft Himalaya"/>
+        <a:font script="Thaa" typeface="MV Boli"/>
+        <a:font script="Deva" typeface="Mangal"/>
+        <a:font script="Telu" typeface="Gautami"/>
+        <a:font script="Taml" typeface="Latha"/>
+        <a:font script="Syrc" typeface="Estrangelo Edessa"/>
+        <a:font script="Orya" typeface="Kalinga"/>
+        <a:font script="Mlym" typeface="Kartika"/>
+        <a:font script="Laoo" typeface="DokChampa"/>
+        <a:font script="Sinh" typeface="Iskoola Pota"/>
+        <a:font script="Mong" typeface="Mongolian Baiti"/>
+        <a:font script="Viet" typeface="Arial"/>
+        <a:font script="Uigh" typeface="Microsoft Uighur"/>
+        <a:font script="Geor" typeface="Sylfaen"/>
+      </a:minorFont>
+    </a:fontScheme>
+    <a:fmtScheme name="Office">
+      <a:fillStyleLst>
+        <a:solidFill>
+          <a:schemeClr val="phClr"/>
+        </a:solidFill>
+        <a:gradFill rotWithShape="1">
+          <a:gsLst>
+            <a:gs pos="0">
+              <a:schemeClr val="phClr">
+                <a:tint val="50000"/>
+                <a:satMod val="300000"/>
+              </a:schemeClr>
+            </a:gs>
+            <a:gs pos="35000">
+              <a:schemeClr val="phClr">
+                <a:tint val="37000"/>
+                <a:satMod val="300000"/>
+              </a:schemeClr>
+            </a:gs>
+            <a:gs pos="100000">
+              <a:schemeClr val="phClr">
+                <a:tint val="15000"/>
+                <a:satMod val="350000"/>
+              </a:schemeClr>
+            </a:gs>
+          </a:gsLst>
+          <a:lin ang="16200000" scaled="1"/>
+        </a:gradFill>
+        <a:gradFill rotWithShape="1">
+          <a:gsLst>
+            <a:gs pos="0">
+              <a:schemeClr val="phClr">
+                <a:shade val="51000"/>
+                <a:satMod val="130000"/>
+              </a:schemeClr>
+            </a:gs>
+            <a:gs pos="80000">
+              <a:schemeClr val="phClr">
+                <a:shade val="93000"/>
+                <a:satMod val="130000"/>
+              </a:schemeClr>
+            </a:gs>
+            <a:gs pos="100000">
+              <a:schemeClr val="phClr">
+                <a:shade val="94000"/>
+                <a:satMod val="135000"/>
+              </a:schemeClr>
+            </a:gs>
+          </a:gsLst>
+          <a:lin ang="16200000" scaled="0"/>
+        </a:gradFill>
+      </a:fillStyleLst>
+      <a:lnStyleLst>
+        <a:ln w="9525" cap="flat" cmpd="sng" algn="ctr">
+          <a:solidFill>
+            <a:schemeClr val="phClr">
+              <a:shade val="95000"/>
+              <a:satMod val="105000"/>
+            </a:schemeClr>
+          </a:solidFill>
+          <a:prstDash val="solid"/>
+        </a:ln>
+        <a:ln w="25400" cap="flat" cmpd="sng" algn="ctr">
+          <a:solidFill>
+            <a:schemeClr val="phClr"/>
+          </a:solidFill>
+          <a:prstDash val="solid"/>
+        </a:ln>
+        <a:ln w="38100" cap="flat" cmpd="sng" algn="ctr">
+          <a:solidFill>
+            <a:schemeClr val="phClr"/>
+          </a:solidFill>
+          <a:prstDash val="solid"/>
+        </a:ln>
+      </a:lnStyleLst>
+      <a:effectStyleLst>
+        <a:effectStyle>
+          <a:effectLst>
+            <a:outerShdw blurRad="40000" dist="20000" dir="5400000" rotWithShape="0">
+              <a:srgbClr val="000000">
+                <a:alpha val="38000"/>
+              </a:srgbClr>
+            </a:outerShdw>
+          </a:effectLst>
+        </a:effectStyle>
+        <a:effectStyle>
+          <a:effectLst>
+            <a:outerShdw blurRad="40000" dist="23000" dir="5400000" rotWithShape="0">
+              <a:srgbClr val="000000">
+                <a:alpha val="35000"/>
+              </a:srgbClr>
+            </a:outerShdw>
+          </a:effectLst>
+        </a:effectStyle>
+        <a:effectStyle>
+          <a:effectLst>
+            <a:outerShdw blurRad="40000" dist="23000" dir="5400000" rotWithShape="0">
+              <a:srgbClr val="000000">
+                <a:alpha val="35000"/>
+              </a:srgbClr>
+            </a:outerShdw>
+          </a:effectLst>
+          <a:scene3d>
+            <a:camera prst="orthographicFront">
+              <a:rot lat="0" lon="0" rev="0"/>
+            </a:camera>
+            <a:lightRig rig="threePt" dir="t">
+              <a:rot lat="0" lon="0" rev="1200000"/>
+            </a:lightRig>
+          </a:scene3d>
+          <a:sp3d>
+            <a:bevelT w="63500" h="25400"/>
+          </a:sp3d>
+        </a:effectStyle>
+      </a:effectStyleLst>
+      <a:bgFillStyleLst>
+        <a:solidFill>
+          <a:schemeClr val="phClr"/>
+        </a:solidFill>
+        <a:gradFill rotWithShape="1">
+          <a:gsLst>
+            <a:gs pos="0">
+              <a:schemeClr val="phClr">
+                <a:tint val="40000"/>
+                <a:satMod val="350000"/>
+              </a:schemeClr>
+            </a:gs>
+            <a:gs pos="40000">
+              <a:schemeClr val="phClr">
+                <a:tint val="45000"/>
+                <a:shade val="99000"/>
+                <a:satMod val="350000"/>
+              </a:schemeClr>
+            </a:gs>
+            <a:gs pos="100000">
+              <a:schemeClr val="phClr">
+                <a:shade val="20000"/>
+                <a:satMod val="255000"/>
+              </a:schemeClr>
+            </a:gs>
+          </a:gsLst>
+          <a:path path="circle">
+            <a:fillToRect l="50000" t="-80000" r="50000" b="180000"/>
+          </a:path>
+        </a:gradFill>
+        <a:gradFill rotWithShape="1">
+          <a:gsLst>
+            <a:gs pos="0">
+              <a:schemeClr val="phClr">
+                <a:tint val="80000"/>
+                <a:satMod val="300000"/>
+              </a:schemeClr>
+            </a:gs>
+            <a:gs pos="100000">
+              <a:schemeClr val="phClr">
+                <a:shade val="30000"/>
+                <a:satMod val="200000"/>
+              </a:schemeClr>
+            </a:gs>
+          </a:gsLst>
+          <a:path path="circle">
+            <a:fillToRect l="50000" t="50000" r="50000" b="50000"/>
+          </a:path>
+        </a:gradFill>
+      </a:bgFillStyleLst>
+    </a:fmtScheme>
+  </a:themeElements>
+  <a:objectDefaults/>
+  <a:extraClrSchemeLst/>
+</a:theme>
 </file>
</xml_diff>

<commit_message>
Handling Issue 437 [Modify Add Course page to handle multiple instructors] Update Issue 437 Merge with default
</commit_message>
<xml_diff>
--- a/doc/diagrams/packageDiagram.pptx
+++ b/doc/diagrams/packageDiagram.pptx
@@ -4,17 +4,20 @@
   <p:sldMasterIdLst>
     <p:sldMasterId id="2147483648" r:id="rId1"/>
   </p:sldMasterIdLst>
+  <p:notesMasterIdLst>
+    <p:notesMasterId r:id="rId3"/>
+  </p:notesMasterIdLst>
   <p:sldIdLst>
     <p:sldId id="256" r:id="rId2"/>
   </p:sldIdLst>
-  <p:sldSz cx="9144000" cy="6858000" type="screen4x3"/>
+  <p:sldSz cx="8640763" cy="6300788"/>
   <p:notesSz cx="6858000" cy="9144000"/>
   <p:defaultTextStyle>
     <a:defPPr>
       <a:defRPr lang="en-US"/>
     </a:defPPr>
-    <a:lvl1pPr marL="0" algn="l" defTabSz="914400" rtl="0" eaLnBrk="1" latinLnBrk="0" hangingPunct="1">
-      <a:defRPr sz="1800" kern="1200">
+    <a:lvl1pPr marL="0" algn="l" defTabSz="853775" rtl="0" eaLnBrk="1" latinLnBrk="0" hangingPunct="1">
+      <a:defRPr sz="1700" kern="1200">
         <a:solidFill>
           <a:schemeClr val="tx1"/>
         </a:solidFill>
@@ -23,8 +26,8 @@
         <a:cs typeface="+mn-cs"/>
       </a:defRPr>
     </a:lvl1pPr>
-    <a:lvl2pPr marL="457200" algn="l" defTabSz="914400" rtl="0" eaLnBrk="1" latinLnBrk="0" hangingPunct="1">
-      <a:defRPr sz="1800" kern="1200">
+    <a:lvl2pPr marL="426888" algn="l" defTabSz="853775" rtl="0" eaLnBrk="1" latinLnBrk="0" hangingPunct="1">
+      <a:defRPr sz="1700" kern="1200">
         <a:solidFill>
           <a:schemeClr val="tx1"/>
         </a:solidFill>
@@ -33,8 +36,8 @@
         <a:cs typeface="+mn-cs"/>
       </a:defRPr>
     </a:lvl2pPr>
-    <a:lvl3pPr marL="914400" algn="l" defTabSz="914400" rtl="0" eaLnBrk="1" latinLnBrk="0" hangingPunct="1">
-      <a:defRPr sz="1800" kern="1200">
+    <a:lvl3pPr marL="853775" algn="l" defTabSz="853775" rtl="0" eaLnBrk="1" latinLnBrk="0" hangingPunct="1">
+      <a:defRPr sz="1700" kern="1200">
         <a:solidFill>
           <a:schemeClr val="tx1"/>
         </a:solidFill>
@@ -43,8 +46,8 @@
         <a:cs typeface="+mn-cs"/>
       </a:defRPr>
     </a:lvl3pPr>
-    <a:lvl4pPr marL="1371600" algn="l" defTabSz="914400" rtl="0" eaLnBrk="1" latinLnBrk="0" hangingPunct="1">
-      <a:defRPr sz="1800" kern="1200">
+    <a:lvl4pPr marL="1280663" algn="l" defTabSz="853775" rtl="0" eaLnBrk="1" latinLnBrk="0" hangingPunct="1">
+      <a:defRPr sz="1700" kern="1200">
         <a:solidFill>
           <a:schemeClr val="tx1"/>
         </a:solidFill>
@@ -53,8 +56,8 @@
         <a:cs typeface="+mn-cs"/>
       </a:defRPr>
     </a:lvl4pPr>
-    <a:lvl5pPr marL="1828800" algn="l" defTabSz="914400" rtl="0" eaLnBrk="1" latinLnBrk="0" hangingPunct="1">
-      <a:defRPr sz="1800" kern="1200">
+    <a:lvl5pPr marL="1707551" algn="l" defTabSz="853775" rtl="0" eaLnBrk="1" latinLnBrk="0" hangingPunct="1">
+      <a:defRPr sz="1700" kern="1200">
         <a:solidFill>
           <a:schemeClr val="tx1"/>
         </a:solidFill>
@@ -63,8 +66,8 @@
         <a:cs typeface="+mn-cs"/>
       </a:defRPr>
     </a:lvl5pPr>
-    <a:lvl6pPr marL="2286000" algn="l" defTabSz="914400" rtl="0" eaLnBrk="1" latinLnBrk="0" hangingPunct="1">
-      <a:defRPr sz="1800" kern="1200">
+    <a:lvl6pPr marL="2134438" algn="l" defTabSz="853775" rtl="0" eaLnBrk="1" latinLnBrk="0" hangingPunct="1">
+      <a:defRPr sz="1700" kern="1200">
         <a:solidFill>
           <a:schemeClr val="tx1"/>
         </a:solidFill>
@@ -73,8 +76,8 @@
         <a:cs typeface="+mn-cs"/>
       </a:defRPr>
     </a:lvl6pPr>
-    <a:lvl7pPr marL="2743200" algn="l" defTabSz="914400" rtl="0" eaLnBrk="1" latinLnBrk="0" hangingPunct="1">
-      <a:defRPr sz="1800" kern="1200">
+    <a:lvl7pPr marL="2561326" algn="l" defTabSz="853775" rtl="0" eaLnBrk="1" latinLnBrk="0" hangingPunct="1">
+      <a:defRPr sz="1700" kern="1200">
         <a:solidFill>
           <a:schemeClr val="tx1"/>
         </a:solidFill>
@@ -83,8 +86,8 @@
         <a:cs typeface="+mn-cs"/>
       </a:defRPr>
     </a:lvl7pPr>
-    <a:lvl8pPr marL="3200400" algn="l" defTabSz="914400" rtl="0" eaLnBrk="1" latinLnBrk="0" hangingPunct="1">
-      <a:defRPr sz="1800" kern="1200">
+    <a:lvl8pPr marL="2988213" algn="l" defTabSz="853775" rtl="0" eaLnBrk="1" latinLnBrk="0" hangingPunct="1">
+      <a:defRPr sz="1700" kern="1200">
         <a:solidFill>
           <a:schemeClr val="tx1"/>
         </a:solidFill>
@@ -93,8 +96,8 @@
         <a:cs typeface="+mn-cs"/>
       </a:defRPr>
     </a:lvl8pPr>
-    <a:lvl9pPr marL="3657600" algn="l" defTabSz="914400" rtl="0" eaLnBrk="1" latinLnBrk="0" hangingPunct="1">
-      <a:defRPr sz="1800" kern="1200">
+    <a:lvl9pPr marL="3415101" algn="l" defTabSz="853775" rtl="0" eaLnBrk="1" latinLnBrk="0" hangingPunct="1">
+      <a:defRPr sz="1700" kern="1200">
         <a:solidFill>
           <a:schemeClr val="tx1"/>
         </a:solidFill>
@@ -105,6 +108,445 @@
     </a:lvl9pPr>
   </p:defaultTextStyle>
 </p:presentation>
+</file>
+
+<file path=ppt/notesMasters/notesMaster1.xml><?xml version="1.0" encoding="utf-8"?>
+<p:notesMaster xmlns:a="http://schemas.openxmlformats.org/drawingml/2006/main" xmlns:r="http://schemas.openxmlformats.org/officeDocument/2006/relationships" xmlns:p="http://schemas.openxmlformats.org/presentationml/2006/main">
+  <p:cSld>
+    <p:bg>
+      <p:bgRef idx="1001">
+        <a:schemeClr val="bg1"/>
+      </p:bgRef>
+    </p:bg>
+    <p:spTree>
+      <p:nvGrpSpPr>
+        <p:cNvPr id="1" name=""/>
+        <p:cNvGrpSpPr/>
+        <p:nvPr/>
+      </p:nvGrpSpPr>
+      <p:grpSpPr>
+        <a:xfrm>
+          <a:off x="0" y="0"/>
+          <a:ext cx="0" cy="0"/>
+          <a:chOff x="0" y="0"/>
+          <a:chExt cx="0" cy="0"/>
+        </a:xfrm>
+      </p:grpSpPr>
+      <p:sp>
+        <p:nvSpPr>
+          <p:cNvPr id="2" name="Header Placeholder 1"/>
+          <p:cNvSpPr>
+            <a:spLocks noGrp="1"/>
+          </p:cNvSpPr>
+          <p:nvPr>
+            <p:ph type="hdr" sz="quarter"/>
+          </p:nvPr>
+        </p:nvSpPr>
+        <p:spPr>
+          <a:xfrm>
+            <a:off x="0" y="0"/>
+            <a:ext cx="2971800" cy="457200"/>
+          </a:xfrm>
+          <a:prstGeom prst="rect">
+            <a:avLst/>
+          </a:prstGeom>
+        </p:spPr>
+        <p:txBody>
+          <a:bodyPr vert="horz" lIns="91440" tIns="45720" rIns="91440" bIns="45720" rtlCol="0"/>
+          <a:lstStyle>
+            <a:lvl1pPr algn="l">
+              <a:defRPr sz="1200"/>
+            </a:lvl1pPr>
+          </a:lstStyle>
+          <a:p>
+            <a:endParaRPr lang="en-SG"/>
+          </a:p>
+        </p:txBody>
+      </p:sp>
+      <p:sp>
+        <p:nvSpPr>
+          <p:cNvPr id="3" name="Date Placeholder 2"/>
+          <p:cNvSpPr>
+            <a:spLocks noGrp="1"/>
+          </p:cNvSpPr>
+          <p:nvPr>
+            <p:ph type="dt" idx="1"/>
+          </p:nvPr>
+        </p:nvSpPr>
+        <p:spPr>
+          <a:xfrm>
+            <a:off x="3884613" y="0"/>
+            <a:ext cx="2971800" cy="457200"/>
+          </a:xfrm>
+          <a:prstGeom prst="rect">
+            <a:avLst/>
+          </a:prstGeom>
+        </p:spPr>
+        <p:txBody>
+          <a:bodyPr vert="horz" lIns="91440" tIns="45720" rIns="91440" bIns="45720" rtlCol="0"/>
+          <a:lstStyle>
+            <a:lvl1pPr algn="r">
+              <a:defRPr sz="1200"/>
+            </a:lvl1pPr>
+          </a:lstStyle>
+          <a:p>
+            <a:fld id="{5D8FA8FF-20DC-44E5-8C35-13EAF0A5698C}" type="datetimeFigureOut">
+              <a:rPr lang="en-SG" smtClean="0"/>
+              <a:t>18/12/2012</a:t>
+            </a:fld>
+            <a:endParaRPr lang="en-SG"/>
+          </a:p>
+        </p:txBody>
+      </p:sp>
+      <p:sp>
+        <p:nvSpPr>
+          <p:cNvPr id="4" name="Slide Image Placeholder 3"/>
+          <p:cNvSpPr>
+            <a:spLocks noGrp="1" noRot="1" noChangeAspect="1"/>
+          </p:cNvSpPr>
+          <p:nvPr>
+            <p:ph type="sldImg" idx="2"/>
+          </p:nvPr>
+        </p:nvSpPr>
+        <p:spPr>
+          <a:xfrm>
+            <a:off x="1077913" y="685800"/>
+            <a:ext cx="4702175" cy="3429000"/>
+          </a:xfrm>
+          <a:prstGeom prst="rect">
+            <a:avLst/>
+          </a:prstGeom>
+          <a:noFill/>
+          <a:ln w="12700">
+            <a:solidFill>
+              <a:prstClr val="black"/>
+            </a:solidFill>
+          </a:ln>
+        </p:spPr>
+        <p:txBody>
+          <a:bodyPr vert="horz" lIns="91440" tIns="45720" rIns="91440" bIns="45720" rtlCol="0" anchor="ctr"/>
+          <a:lstStyle/>
+          <a:p>
+            <a:endParaRPr lang="en-SG"/>
+          </a:p>
+        </p:txBody>
+      </p:sp>
+      <p:sp>
+        <p:nvSpPr>
+          <p:cNvPr id="5" name="Notes Placeholder 4"/>
+          <p:cNvSpPr>
+            <a:spLocks noGrp="1"/>
+          </p:cNvSpPr>
+          <p:nvPr>
+            <p:ph type="body" sz="quarter" idx="3"/>
+          </p:nvPr>
+        </p:nvSpPr>
+        <p:spPr>
+          <a:xfrm>
+            <a:off x="685800" y="4343400"/>
+            <a:ext cx="5486400" cy="4114800"/>
+          </a:xfrm>
+          <a:prstGeom prst="rect">
+            <a:avLst/>
+          </a:prstGeom>
+        </p:spPr>
+        <p:txBody>
+          <a:bodyPr vert="horz" lIns="91440" tIns="45720" rIns="91440" bIns="45720" rtlCol="0"/>
+          <a:lstStyle/>
+          <a:p>
+            <a:pPr lvl="0"/>
+            <a:r>
+              <a:rPr lang="en-US" smtClean="0"/>
+              <a:t>Click to edit Master text styles</a:t>
+            </a:r>
+          </a:p>
+          <a:p>
+            <a:pPr lvl="1"/>
+            <a:r>
+              <a:rPr lang="en-US" smtClean="0"/>
+              <a:t>Second level</a:t>
+            </a:r>
+          </a:p>
+          <a:p>
+            <a:pPr lvl="2"/>
+            <a:r>
+              <a:rPr lang="en-US" smtClean="0"/>
+              <a:t>Third level</a:t>
+            </a:r>
+          </a:p>
+          <a:p>
+            <a:pPr lvl="3"/>
+            <a:r>
+              <a:rPr lang="en-US" smtClean="0"/>
+              <a:t>Fourth level</a:t>
+            </a:r>
+          </a:p>
+          <a:p>
+            <a:pPr lvl="4"/>
+            <a:r>
+              <a:rPr lang="en-US" smtClean="0"/>
+              <a:t>Fifth level</a:t>
+            </a:r>
+            <a:endParaRPr lang="en-SG"/>
+          </a:p>
+        </p:txBody>
+      </p:sp>
+      <p:sp>
+        <p:nvSpPr>
+          <p:cNvPr id="6" name="Footer Placeholder 5"/>
+          <p:cNvSpPr>
+            <a:spLocks noGrp="1"/>
+          </p:cNvSpPr>
+          <p:nvPr>
+            <p:ph type="ftr" sz="quarter" idx="4"/>
+          </p:nvPr>
+        </p:nvSpPr>
+        <p:spPr>
+          <a:xfrm>
+            <a:off x="0" y="8685213"/>
+            <a:ext cx="2971800" cy="457200"/>
+          </a:xfrm>
+          <a:prstGeom prst="rect">
+            <a:avLst/>
+          </a:prstGeom>
+        </p:spPr>
+        <p:txBody>
+          <a:bodyPr vert="horz" lIns="91440" tIns="45720" rIns="91440" bIns="45720" rtlCol="0" anchor="b"/>
+          <a:lstStyle>
+            <a:lvl1pPr algn="l">
+              <a:defRPr sz="1200"/>
+            </a:lvl1pPr>
+          </a:lstStyle>
+          <a:p>
+            <a:endParaRPr lang="en-SG"/>
+          </a:p>
+        </p:txBody>
+      </p:sp>
+      <p:sp>
+        <p:nvSpPr>
+          <p:cNvPr id="7" name="Slide Number Placeholder 6"/>
+          <p:cNvSpPr>
+            <a:spLocks noGrp="1"/>
+          </p:cNvSpPr>
+          <p:nvPr>
+            <p:ph type="sldNum" sz="quarter" idx="5"/>
+          </p:nvPr>
+        </p:nvSpPr>
+        <p:spPr>
+          <a:xfrm>
+            <a:off x="3884613" y="8685213"/>
+            <a:ext cx="2971800" cy="457200"/>
+          </a:xfrm>
+          <a:prstGeom prst="rect">
+            <a:avLst/>
+          </a:prstGeom>
+        </p:spPr>
+        <p:txBody>
+          <a:bodyPr vert="horz" lIns="91440" tIns="45720" rIns="91440" bIns="45720" rtlCol="0" anchor="b"/>
+          <a:lstStyle>
+            <a:lvl1pPr algn="r">
+              <a:defRPr sz="1200"/>
+            </a:lvl1pPr>
+          </a:lstStyle>
+          <a:p>
+            <a:fld id="{533A5AA4-18D7-48CB-8D4B-C9F7395BD002}" type="slidenum">
+              <a:rPr lang="en-SG" smtClean="0"/>
+              <a:t>‹#›</a:t>
+            </a:fld>
+            <a:endParaRPr lang="en-SG"/>
+          </a:p>
+        </p:txBody>
+      </p:sp>
+    </p:spTree>
+    <p:extLst>
+      <p:ext uri="{BB962C8B-B14F-4D97-AF65-F5344CB8AC3E}">
+        <p14:creationId xmlns:p14="http://schemas.microsoft.com/office/powerpoint/2010/main" val="2591710806"/>
+      </p:ext>
+    </p:extLst>
+  </p:cSld>
+  <p:clrMap bg1="lt1" tx1="dk1" bg2="lt2" tx2="dk2" accent1="accent1" accent2="accent2" accent3="accent3" accent4="accent4" accent5="accent5" accent6="accent6" hlink="hlink" folHlink="folHlink"/>
+  <p:notesStyle>
+    <a:lvl1pPr marL="0" algn="l" defTabSz="853775" rtl="0" eaLnBrk="1" latinLnBrk="0" hangingPunct="1">
+      <a:defRPr sz="1100" kern="1200">
+        <a:solidFill>
+          <a:schemeClr val="tx1"/>
+        </a:solidFill>
+        <a:latin typeface="+mn-lt"/>
+        <a:ea typeface="+mn-ea"/>
+        <a:cs typeface="+mn-cs"/>
+      </a:defRPr>
+    </a:lvl1pPr>
+    <a:lvl2pPr marL="426888" algn="l" defTabSz="853775" rtl="0" eaLnBrk="1" latinLnBrk="0" hangingPunct="1">
+      <a:defRPr sz="1100" kern="1200">
+        <a:solidFill>
+          <a:schemeClr val="tx1"/>
+        </a:solidFill>
+        <a:latin typeface="+mn-lt"/>
+        <a:ea typeface="+mn-ea"/>
+        <a:cs typeface="+mn-cs"/>
+      </a:defRPr>
+    </a:lvl2pPr>
+    <a:lvl3pPr marL="853775" algn="l" defTabSz="853775" rtl="0" eaLnBrk="1" latinLnBrk="0" hangingPunct="1">
+      <a:defRPr sz="1100" kern="1200">
+        <a:solidFill>
+          <a:schemeClr val="tx1"/>
+        </a:solidFill>
+        <a:latin typeface="+mn-lt"/>
+        <a:ea typeface="+mn-ea"/>
+        <a:cs typeface="+mn-cs"/>
+      </a:defRPr>
+    </a:lvl3pPr>
+    <a:lvl4pPr marL="1280663" algn="l" defTabSz="853775" rtl="0" eaLnBrk="1" latinLnBrk="0" hangingPunct="1">
+      <a:defRPr sz="1100" kern="1200">
+        <a:solidFill>
+          <a:schemeClr val="tx1"/>
+        </a:solidFill>
+        <a:latin typeface="+mn-lt"/>
+        <a:ea typeface="+mn-ea"/>
+        <a:cs typeface="+mn-cs"/>
+      </a:defRPr>
+    </a:lvl4pPr>
+    <a:lvl5pPr marL="1707551" algn="l" defTabSz="853775" rtl="0" eaLnBrk="1" latinLnBrk="0" hangingPunct="1">
+      <a:defRPr sz="1100" kern="1200">
+        <a:solidFill>
+          <a:schemeClr val="tx1"/>
+        </a:solidFill>
+        <a:latin typeface="+mn-lt"/>
+        <a:ea typeface="+mn-ea"/>
+        <a:cs typeface="+mn-cs"/>
+      </a:defRPr>
+    </a:lvl5pPr>
+    <a:lvl6pPr marL="2134438" algn="l" defTabSz="853775" rtl="0" eaLnBrk="1" latinLnBrk="0" hangingPunct="1">
+      <a:defRPr sz="1100" kern="1200">
+        <a:solidFill>
+          <a:schemeClr val="tx1"/>
+        </a:solidFill>
+        <a:latin typeface="+mn-lt"/>
+        <a:ea typeface="+mn-ea"/>
+        <a:cs typeface="+mn-cs"/>
+      </a:defRPr>
+    </a:lvl6pPr>
+    <a:lvl7pPr marL="2561326" algn="l" defTabSz="853775" rtl="0" eaLnBrk="1" latinLnBrk="0" hangingPunct="1">
+      <a:defRPr sz="1100" kern="1200">
+        <a:solidFill>
+          <a:schemeClr val="tx1"/>
+        </a:solidFill>
+        <a:latin typeface="+mn-lt"/>
+        <a:ea typeface="+mn-ea"/>
+        <a:cs typeface="+mn-cs"/>
+      </a:defRPr>
+    </a:lvl7pPr>
+    <a:lvl8pPr marL="2988213" algn="l" defTabSz="853775" rtl="0" eaLnBrk="1" latinLnBrk="0" hangingPunct="1">
+      <a:defRPr sz="1100" kern="1200">
+        <a:solidFill>
+          <a:schemeClr val="tx1"/>
+        </a:solidFill>
+        <a:latin typeface="+mn-lt"/>
+        <a:ea typeface="+mn-ea"/>
+        <a:cs typeface="+mn-cs"/>
+      </a:defRPr>
+    </a:lvl8pPr>
+    <a:lvl9pPr marL="3415101" algn="l" defTabSz="853775" rtl="0" eaLnBrk="1" latinLnBrk="0" hangingPunct="1">
+      <a:defRPr sz="1100" kern="1200">
+        <a:solidFill>
+          <a:schemeClr val="tx1"/>
+        </a:solidFill>
+        <a:latin typeface="+mn-lt"/>
+        <a:ea typeface="+mn-ea"/>
+        <a:cs typeface="+mn-cs"/>
+      </a:defRPr>
+    </a:lvl9pPr>
+  </p:notesStyle>
+</p:notesMaster>
+</file>
+
+<file path=ppt/notesSlides/notesSlide1.xml><?xml version="1.0" encoding="utf-8"?>
+<p:notes xmlns:a="http://schemas.openxmlformats.org/drawingml/2006/main" xmlns:r="http://schemas.openxmlformats.org/officeDocument/2006/relationships" xmlns:p="http://schemas.openxmlformats.org/presentationml/2006/main">
+  <p:cSld>
+    <p:spTree>
+      <p:nvGrpSpPr>
+        <p:cNvPr id="1" name=""/>
+        <p:cNvGrpSpPr/>
+        <p:nvPr/>
+      </p:nvGrpSpPr>
+      <p:grpSpPr>
+        <a:xfrm>
+          <a:off x="0" y="0"/>
+          <a:ext cx="0" cy="0"/>
+          <a:chOff x="0" y="0"/>
+          <a:chExt cx="0" cy="0"/>
+        </a:xfrm>
+      </p:grpSpPr>
+      <p:sp>
+        <p:nvSpPr>
+          <p:cNvPr id="2" name="Slide Image Placeholder 1"/>
+          <p:cNvSpPr>
+            <a:spLocks noGrp="1" noRot="1" noChangeAspect="1"/>
+          </p:cNvSpPr>
+          <p:nvPr>
+            <p:ph type="sldImg"/>
+          </p:nvPr>
+        </p:nvSpPr>
+        <p:spPr>
+          <a:xfrm>
+            <a:off x="1077913" y="685800"/>
+            <a:ext cx="4702175" cy="3429000"/>
+          </a:xfrm>
+        </p:spPr>
+      </p:sp>
+      <p:sp>
+        <p:nvSpPr>
+          <p:cNvPr id="3" name="Notes Placeholder 2"/>
+          <p:cNvSpPr>
+            <a:spLocks noGrp="1"/>
+          </p:cNvSpPr>
+          <p:nvPr>
+            <p:ph type="body" idx="1"/>
+          </p:nvPr>
+        </p:nvSpPr>
+        <p:spPr/>
+        <p:txBody>
+          <a:bodyPr/>
+          <a:lstStyle/>
+          <a:p>
+            <a:endParaRPr lang="en-SG" dirty="0"/>
+          </a:p>
+        </p:txBody>
+      </p:sp>
+      <p:sp>
+        <p:nvSpPr>
+          <p:cNvPr id="4" name="Slide Number Placeholder 3"/>
+          <p:cNvSpPr>
+            <a:spLocks noGrp="1"/>
+          </p:cNvSpPr>
+          <p:nvPr>
+            <p:ph type="sldNum" sz="quarter" idx="10"/>
+          </p:nvPr>
+        </p:nvSpPr>
+        <p:spPr/>
+        <p:txBody>
+          <a:bodyPr/>
+          <a:lstStyle/>
+          <a:p>
+            <a:fld id="{533A5AA4-18D7-48CB-8D4B-C9F7395BD002}" type="slidenum">
+              <a:rPr lang="en-SG" smtClean="0"/>
+              <a:t>1</a:t>
+            </a:fld>
+            <a:endParaRPr lang="en-SG"/>
+          </a:p>
+        </p:txBody>
+      </p:sp>
+    </p:spTree>
+    <p:extLst>
+      <p:ext uri="{BB962C8B-B14F-4D97-AF65-F5344CB8AC3E}">
+        <p14:creationId xmlns:p14="http://schemas.microsoft.com/office/powerpoint/2010/main" val="3432613659"/>
+      </p:ext>
+    </p:extLst>
+  </p:cSld>
+  <p:clrMapOvr>
+    <a:masterClrMapping/>
+  </p:clrMapOvr>
+</p:notes>
 </file>
 
 <file path=ppt/slideLayouts/slideLayout1.xml><?xml version="1.0" encoding="utf-8"?>
@@ -136,8 +578,8 @@
         </p:nvSpPr>
         <p:spPr>
           <a:xfrm>
-            <a:off x="685800" y="2130425"/>
-            <a:ext cx="7772400" cy="1470025"/>
+            <a:off x="648057" y="1957328"/>
+            <a:ext cx="7344649" cy="1350586"/>
           </a:xfrm>
         </p:spPr>
         <p:txBody>
@@ -164,8 +606,8 @@
         </p:nvSpPr>
         <p:spPr>
           <a:xfrm>
-            <a:off x="1371600" y="3886200"/>
-            <a:ext cx="6400800" cy="1752600"/>
+            <a:off x="1296115" y="3570447"/>
+            <a:ext cx="6048534" cy="1610201"/>
           </a:xfrm>
         </p:spPr>
         <p:txBody>
@@ -181,7 +623,7 @@
                 </a:solidFill>
               </a:defRPr>
             </a:lvl1pPr>
-            <a:lvl2pPr marL="457200" indent="0" algn="ctr">
+            <a:lvl2pPr marL="426888" indent="0" algn="ctr">
               <a:buNone/>
               <a:defRPr>
                 <a:solidFill>
@@ -191,7 +633,7 @@
                 </a:solidFill>
               </a:defRPr>
             </a:lvl2pPr>
-            <a:lvl3pPr marL="914400" indent="0" algn="ctr">
+            <a:lvl3pPr marL="853775" indent="0" algn="ctr">
               <a:buNone/>
               <a:defRPr>
                 <a:solidFill>
@@ -201,7 +643,7 @@
                 </a:solidFill>
               </a:defRPr>
             </a:lvl3pPr>
-            <a:lvl4pPr marL="1371600" indent="0" algn="ctr">
+            <a:lvl4pPr marL="1280663" indent="0" algn="ctr">
               <a:buNone/>
               <a:defRPr>
                 <a:solidFill>
@@ -211,7 +653,7 @@
                 </a:solidFill>
               </a:defRPr>
             </a:lvl4pPr>
-            <a:lvl5pPr marL="1828800" indent="0" algn="ctr">
+            <a:lvl5pPr marL="1707551" indent="0" algn="ctr">
               <a:buNone/>
               <a:defRPr>
                 <a:solidFill>
@@ -221,7 +663,7 @@
                 </a:solidFill>
               </a:defRPr>
             </a:lvl5pPr>
-            <a:lvl6pPr marL="2286000" indent="0" algn="ctr">
+            <a:lvl6pPr marL="2134438" indent="0" algn="ctr">
               <a:buNone/>
               <a:defRPr>
                 <a:solidFill>
@@ -231,7 +673,7 @@
                 </a:solidFill>
               </a:defRPr>
             </a:lvl6pPr>
-            <a:lvl7pPr marL="2743200" indent="0" algn="ctr">
+            <a:lvl7pPr marL="2561326" indent="0" algn="ctr">
               <a:buNone/>
               <a:defRPr>
                 <a:solidFill>
@@ -241,7 +683,7 @@
                 </a:solidFill>
               </a:defRPr>
             </a:lvl7pPr>
-            <a:lvl8pPr marL="3200400" indent="0" algn="ctr">
+            <a:lvl8pPr marL="2988213" indent="0" algn="ctr">
               <a:buNone/>
               <a:defRPr>
                 <a:solidFill>
@@ -251,7 +693,7 @@
                 </a:solidFill>
               </a:defRPr>
             </a:lvl8pPr>
-            <a:lvl9pPr marL="3657600" indent="0" algn="ctr">
+            <a:lvl9pPr marL="3415101" indent="0" algn="ctr">
               <a:buNone/>
               <a:defRPr>
                 <a:solidFill>
@@ -289,7 +731,7 @@
             <a:fld id="{1D8BD707-D9CF-40AE-B4C6-C98DA3205C09}" type="datetimeFigureOut">
               <a:rPr lang="en-US" smtClean="0"/>
               <a:pPr/>
-              <a:t>7/12/2012</a:t>
+              <a:t>12/18/2012</a:t>
             </a:fld>
             <a:endParaRPr lang="en-US"/>
           </a:p>
@@ -456,7 +898,7 @@
             <a:fld id="{1D8BD707-D9CF-40AE-B4C6-C98DA3205C09}" type="datetimeFigureOut">
               <a:rPr lang="en-US" smtClean="0"/>
               <a:pPr/>
-              <a:t>7/12/2012</a:t>
+              <a:t>12/18/2012</a:t>
             </a:fld>
             <a:endParaRPr lang="en-US"/>
           </a:p>
@@ -542,8 +984,8 @@
         </p:nvSpPr>
         <p:spPr>
           <a:xfrm>
-            <a:off x="6629400" y="274638"/>
-            <a:ext cx="2057400" cy="5851525"/>
+            <a:off x="6264553" y="252324"/>
+            <a:ext cx="1944172" cy="5376089"/>
           </a:xfrm>
         </p:spPr>
         <p:txBody>
@@ -570,8 +1012,8 @@
         </p:nvSpPr>
         <p:spPr>
           <a:xfrm>
-            <a:off x="457200" y="274638"/>
-            <a:ext cx="6019800" cy="5851525"/>
+            <a:off x="432038" y="252324"/>
+            <a:ext cx="5688502" cy="5376089"/>
           </a:xfrm>
         </p:spPr>
         <p:txBody>
@@ -633,7 +1075,7 @@
             <a:fld id="{1D8BD707-D9CF-40AE-B4C6-C98DA3205C09}" type="datetimeFigureOut">
               <a:rPr lang="en-US" smtClean="0"/>
               <a:pPr/>
-              <a:t>7/12/2012</a:t>
+              <a:t>12/18/2012</a:t>
             </a:fld>
             <a:endParaRPr lang="en-US"/>
           </a:p>
@@ -800,7 +1242,7 @@
             <a:fld id="{1D8BD707-D9CF-40AE-B4C6-C98DA3205C09}" type="datetimeFigureOut">
               <a:rPr lang="en-US" smtClean="0"/>
               <a:pPr/>
-              <a:t>7/12/2012</a:t>
+              <a:t>12/18/2012</a:t>
             </a:fld>
             <a:endParaRPr lang="en-US"/>
           </a:p>
@@ -886,15 +1328,15 @@
         </p:nvSpPr>
         <p:spPr>
           <a:xfrm>
-            <a:off x="722313" y="4406900"/>
-            <a:ext cx="7772400" cy="1362075"/>
+            <a:off x="682561" y="4048840"/>
+            <a:ext cx="7344649" cy="1251407"/>
           </a:xfrm>
         </p:spPr>
         <p:txBody>
           <a:bodyPr anchor="t"/>
           <a:lstStyle>
             <a:lvl1pPr algn="l">
-              <a:defRPr sz="4000" b="1" cap="all"/>
+              <a:defRPr sz="3700" b="1" cap="all"/>
             </a:lvl1pPr>
           </a:lstStyle>
           <a:p>
@@ -918,8 +1360,8 @@
         </p:nvSpPr>
         <p:spPr>
           <a:xfrm>
-            <a:off x="722313" y="2906713"/>
-            <a:ext cx="7772400" cy="1500187"/>
+            <a:off x="682561" y="2670543"/>
+            <a:ext cx="7344649" cy="1378297"/>
           </a:xfrm>
         </p:spPr>
         <p:txBody>
@@ -927,7 +1369,7 @@
           <a:lstStyle>
             <a:lvl1pPr marL="0" indent="0">
               <a:buNone/>
-              <a:defRPr sz="2000">
+              <a:defRPr sz="1900">
                 <a:solidFill>
                   <a:schemeClr val="tx1">
                     <a:tint val="75000"/>
@@ -935,9 +1377,9 @@
                 </a:solidFill>
               </a:defRPr>
             </a:lvl1pPr>
-            <a:lvl2pPr marL="457200" indent="0">
+            <a:lvl2pPr marL="426888" indent="0">
               <a:buNone/>
-              <a:defRPr sz="1800">
+              <a:defRPr sz="1700">
                 <a:solidFill>
                   <a:schemeClr val="tx1">
                     <a:tint val="75000"/>
@@ -945,9 +1387,9 @@
                 </a:solidFill>
               </a:defRPr>
             </a:lvl2pPr>
-            <a:lvl3pPr marL="914400" indent="0">
+            <a:lvl3pPr marL="853775" indent="0">
               <a:buNone/>
-              <a:defRPr sz="1600">
+              <a:defRPr sz="1500">
                 <a:solidFill>
                   <a:schemeClr val="tx1">
                     <a:tint val="75000"/>
@@ -955,9 +1397,9 @@
                 </a:solidFill>
               </a:defRPr>
             </a:lvl3pPr>
-            <a:lvl4pPr marL="1371600" indent="0">
+            <a:lvl4pPr marL="1280663" indent="0">
               <a:buNone/>
-              <a:defRPr sz="1400">
+              <a:defRPr sz="1300">
                 <a:solidFill>
                   <a:schemeClr val="tx1">
                     <a:tint val="75000"/>
@@ -965,9 +1407,9 @@
                 </a:solidFill>
               </a:defRPr>
             </a:lvl4pPr>
-            <a:lvl5pPr marL="1828800" indent="0">
+            <a:lvl5pPr marL="1707551" indent="0">
               <a:buNone/>
-              <a:defRPr sz="1400">
+              <a:defRPr sz="1300">
                 <a:solidFill>
                   <a:schemeClr val="tx1">
                     <a:tint val="75000"/>
@@ -975,9 +1417,9 @@
                 </a:solidFill>
               </a:defRPr>
             </a:lvl5pPr>
-            <a:lvl6pPr marL="2286000" indent="0">
+            <a:lvl6pPr marL="2134438" indent="0">
               <a:buNone/>
-              <a:defRPr sz="1400">
+              <a:defRPr sz="1300">
                 <a:solidFill>
                   <a:schemeClr val="tx1">
                     <a:tint val="75000"/>
@@ -985,9 +1427,9 @@
                 </a:solidFill>
               </a:defRPr>
             </a:lvl6pPr>
-            <a:lvl7pPr marL="2743200" indent="0">
+            <a:lvl7pPr marL="2561326" indent="0">
               <a:buNone/>
-              <a:defRPr sz="1400">
+              <a:defRPr sz="1300">
                 <a:solidFill>
                   <a:schemeClr val="tx1">
                     <a:tint val="75000"/>
@@ -995,9 +1437,9 @@
                 </a:solidFill>
               </a:defRPr>
             </a:lvl7pPr>
-            <a:lvl8pPr marL="3200400" indent="0">
+            <a:lvl8pPr marL="2988213" indent="0">
               <a:buNone/>
-              <a:defRPr sz="1400">
+              <a:defRPr sz="1300">
                 <a:solidFill>
                   <a:schemeClr val="tx1">
                     <a:tint val="75000"/>
@@ -1005,9 +1447,9 @@
                 </a:solidFill>
               </a:defRPr>
             </a:lvl8pPr>
-            <a:lvl9pPr marL="3657600" indent="0">
+            <a:lvl9pPr marL="3415101" indent="0">
               <a:buNone/>
-              <a:defRPr sz="1400">
+              <a:defRPr sz="1300">
                 <a:solidFill>
                   <a:schemeClr val="tx1">
                     <a:tint val="75000"/>
@@ -1043,7 +1485,7 @@
             <a:fld id="{1D8BD707-D9CF-40AE-B4C6-C98DA3205C09}" type="datetimeFigureOut">
               <a:rPr lang="en-US" smtClean="0"/>
               <a:pPr/>
-              <a:t>7/12/2012</a:t>
+              <a:t>12/18/2012</a:t>
             </a:fld>
             <a:endParaRPr lang="en-US"/>
           </a:p>
@@ -1152,39 +1594,39 @@
         </p:nvSpPr>
         <p:spPr>
           <a:xfrm>
-            <a:off x="457200" y="1600200"/>
-            <a:ext cx="4038600" cy="4525963"/>
+            <a:off x="432038" y="1470184"/>
+            <a:ext cx="3816337" cy="4158229"/>
           </a:xfrm>
         </p:spPr>
         <p:txBody>
           <a:bodyPr/>
           <a:lstStyle>
             <a:lvl1pPr>
-              <a:defRPr sz="2800"/>
+              <a:defRPr sz="2600"/>
             </a:lvl1pPr>
             <a:lvl2pPr>
-              <a:defRPr sz="2400"/>
+              <a:defRPr sz="2200"/>
             </a:lvl2pPr>
             <a:lvl3pPr>
-              <a:defRPr sz="2000"/>
+              <a:defRPr sz="1900"/>
             </a:lvl3pPr>
             <a:lvl4pPr>
-              <a:defRPr sz="1800"/>
+              <a:defRPr sz="1700"/>
             </a:lvl4pPr>
             <a:lvl5pPr>
-              <a:defRPr sz="1800"/>
+              <a:defRPr sz="1700"/>
             </a:lvl5pPr>
             <a:lvl6pPr>
-              <a:defRPr sz="1800"/>
+              <a:defRPr sz="1700"/>
             </a:lvl6pPr>
             <a:lvl7pPr>
-              <a:defRPr sz="1800"/>
+              <a:defRPr sz="1700"/>
             </a:lvl7pPr>
             <a:lvl8pPr>
-              <a:defRPr sz="1800"/>
+              <a:defRPr sz="1700"/>
             </a:lvl8pPr>
             <a:lvl9pPr>
-              <a:defRPr sz="1800"/>
+              <a:defRPr sz="1700"/>
             </a:lvl9pPr>
           </a:lstStyle>
           <a:p>
@@ -1237,39 +1679,39 @@
         </p:nvSpPr>
         <p:spPr>
           <a:xfrm>
-            <a:off x="4648200" y="1600200"/>
-            <a:ext cx="4038600" cy="4525963"/>
+            <a:off x="4392388" y="1470184"/>
+            <a:ext cx="3816337" cy="4158229"/>
           </a:xfrm>
         </p:spPr>
         <p:txBody>
           <a:bodyPr/>
           <a:lstStyle>
             <a:lvl1pPr>
-              <a:defRPr sz="2800"/>
+              <a:defRPr sz="2600"/>
             </a:lvl1pPr>
             <a:lvl2pPr>
-              <a:defRPr sz="2400"/>
+              <a:defRPr sz="2200"/>
             </a:lvl2pPr>
             <a:lvl3pPr>
-              <a:defRPr sz="2000"/>
+              <a:defRPr sz="1900"/>
             </a:lvl3pPr>
             <a:lvl4pPr>
-              <a:defRPr sz="1800"/>
+              <a:defRPr sz="1700"/>
             </a:lvl4pPr>
             <a:lvl5pPr>
-              <a:defRPr sz="1800"/>
+              <a:defRPr sz="1700"/>
             </a:lvl5pPr>
             <a:lvl6pPr>
-              <a:defRPr sz="1800"/>
+              <a:defRPr sz="1700"/>
             </a:lvl6pPr>
             <a:lvl7pPr>
-              <a:defRPr sz="1800"/>
+              <a:defRPr sz="1700"/>
             </a:lvl7pPr>
             <a:lvl8pPr>
-              <a:defRPr sz="1800"/>
+              <a:defRPr sz="1700"/>
             </a:lvl8pPr>
             <a:lvl9pPr>
-              <a:defRPr sz="1800"/>
+              <a:defRPr sz="1700"/>
             </a:lvl9pPr>
           </a:lstStyle>
           <a:p>
@@ -1328,7 +1770,7 @@
             <a:fld id="{1D8BD707-D9CF-40AE-B4C6-C98DA3205C09}" type="datetimeFigureOut">
               <a:rPr lang="en-US" smtClean="0"/>
               <a:pPr/>
-              <a:t>7/12/2012</a:t>
+              <a:t>12/18/2012</a:t>
             </a:fld>
             <a:endParaRPr lang="en-US"/>
           </a:p>
@@ -1441,8 +1883,8 @@
         </p:nvSpPr>
         <p:spPr>
           <a:xfrm>
-            <a:off x="457200" y="1535113"/>
-            <a:ext cx="4040188" cy="639762"/>
+            <a:off x="432038" y="1410385"/>
+            <a:ext cx="3817838" cy="587781"/>
           </a:xfrm>
         </p:spPr>
         <p:txBody>
@@ -1450,39 +1892,39 @@
           <a:lstStyle>
             <a:lvl1pPr marL="0" indent="0">
               <a:buNone/>
-              <a:defRPr sz="2400" b="1"/>
+              <a:defRPr sz="2200" b="1"/>
             </a:lvl1pPr>
-            <a:lvl2pPr marL="457200" indent="0">
+            <a:lvl2pPr marL="426888" indent="0">
               <a:buNone/>
-              <a:defRPr sz="2000" b="1"/>
+              <a:defRPr sz="1900" b="1"/>
             </a:lvl2pPr>
-            <a:lvl3pPr marL="914400" indent="0">
+            <a:lvl3pPr marL="853775" indent="0">
               <a:buNone/>
-              <a:defRPr sz="1800" b="1"/>
+              <a:defRPr sz="1700" b="1"/>
             </a:lvl3pPr>
-            <a:lvl4pPr marL="1371600" indent="0">
+            <a:lvl4pPr marL="1280663" indent="0">
               <a:buNone/>
-              <a:defRPr sz="1600" b="1"/>
+              <a:defRPr sz="1500" b="1"/>
             </a:lvl4pPr>
-            <a:lvl5pPr marL="1828800" indent="0">
+            <a:lvl5pPr marL="1707551" indent="0">
               <a:buNone/>
-              <a:defRPr sz="1600" b="1"/>
+              <a:defRPr sz="1500" b="1"/>
             </a:lvl5pPr>
-            <a:lvl6pPr marL="2286000" indent="0">
+            <a:lvl6pPr marL="2134438" indent="0">
               <a:buNone/>
-              <a:defRPr sz="1600" b="1"/>
+              <a:defRPr sz="1500" b="1"/>
             </a:lvl6pPr>
-            <a:lvl7pPr marL="2743200" indent="0">
+            <a:lvl7pPr marL="2561326" indent="0">
               <a:buNone/>
-              <a:defRPr sz="1600" b="1"/>
+              <a:defRPr sz="1500" b="1"/>
             </a:lvl7pPr>
-            <a:lvl8pPr marL="3200400" indent="0">
+            <a:lvl8pPr marL="2988213" indent="0">
               <a:buNone/>
-              <a:defRPr sz="1600" b="1"/>
+              <a:defRPr sz="1500" b="1"/>
             </a:lvl8pPr>
-            <a:lvl9pPr marL="3657600" indent="0">
+            <a:lvl9pPr marL="3415101" indent="0">
               <a:buNone/>
-              <a:defRPr sz="1600" b="1"/>
+              <a:defRPr sz="1500" b="1"/>
             </a:lvl9pPr>
           </a:lstStyle>
           <a:p>
@@ -1506,39 +1948,39 @@
         </p:nvSpPr>
         <p:spPr>
           <a:xfrm>
-            <a:off x="457200" y="2174875"/>
-            <a:ext cx="4040188" cy="3951288"/>
+            <a:off x="432038" y="1998167"/>
+            <a:ext cx="3817838" cy="3630246"/>
           </a:xfrm>
         </p:spPr>
         <p:txBody>
           <a:bodyPr/>
           <a:lstStyle>
             <a:lvl1pPr>
-              <a:defRPr sz="2400"/>
+              <a:defRPr sz="2200"/>
             </a:lvl1pPr>
             <a:lvl2pPr>
-              <a:defRPr sz="2000"/>
+              <a:defRPr sz="1900"/>
             </a:lvl2pPr>
             <a:lvl3pPr>
-              <a:defRPr sz="1800"/>
+              <a:defRPr sz="1700"/>
             </a:lvl3pPr>
             <a:lvl4pPr>
-              <a:defRPr sz="1600"/>
+              <a:defRPr sz="1500"/>
             </a:lvl4pPr>
             <a:lvl5pPr>
-              <a:defRPr sz="1600"/>
+              <a:defRPr sz="1500"/>
             </a:lvl5pPr>
             <a:lvl6pPr>
-              <a:defRPr sz="1600"/>
+              <a:defRPr sz="1500"/>
             </a:lvl6pPr>
             <a:lvl7pPr>
-              <a:defRPr sz="1600"/>
+              <a:defRPr sz="1500"/>
             </a:lvl7pPr>
             <a:lvl8pPr>
-              <a:defRPr sz="1600"/>
+              <a:defRPr sz="1500"/>
             </a:lvl8pPr>
             <a:lvl9pPr>
-              <a:defRPr sz="1600"/>
+              <a:defRPr sz="1500"/>
             </a:lvl9pPr>
           </a:lstStyle>
           <a:p>
@@ -1591,8 +2033,8 @@
         </p:nvSpPr>
         <p:spPr>
           <a:xfrm>
-            <a:off x="4645025" y="1535113"/>
-            <a:ext cx="4041775" cy="639762"/>
+            <a:off x="4389388" y="1410385"/>
+            <a:ext cx="3819337" cy="587781"/>
           </a:xfrm>
         </p:spPr>
         <p:txBody>
@@ -1600,39 +2042,39 @@
           <a:lstStyle>
             <a:lvl1pPr marL="0" indent="0">
               <a:buNone/>
-              <a:defRPr sz="2400" b="1"/>
+              <a:defRPr sz="2200" b="1"/>
             </a:lvl1pPr>
-            <a:lvl2pPr marL="457200" indent="0">
+            <a:lvl2pPr marL="426888" indent="0">
               <a:buNone/>
-              <a:defRPr sz="2000" b="1"/>
+              <a:defRPr sz="1900" b="1"/>
             </a:lvl2pPr>
-            <a:lvl3pPr marL="914400" indent="0">
+            <a:lvl3pPr marL="853775" indent="0">
               <a:buNone/>
-              <a:defRPr sz="1800" b="1"/>
+              <a:defRPr sz="1700" b="1"/>
             </a:lvl3pPr>
-            <a:lvl4pPr marL="1371600" indent="0">
+            <a:lvl4pPr marL="1280663" indent="0">
               <a:buNone/>
-              <a:defRPr sz="1600" b="1"/>
+              <a:defRPr sz="1500" b="1"/>
             </a:lvl4pPr>
-            <a:lvl5pPr marL="1828800" indent="0">
+            <a:lvl5pPr marL="1707551" indent="0">
               <a:buNone/>
-              <a:defRPr sz="1600" b="1"/>
+              <a:defRPr sz="1500" b="1"/>
             </a:lvl5pPr>
-            <a:lvl6pPr marL="2286000" indent="0">
+            <a:lvl6pPr marL="2134438" indent="0">
               <a:buNone/>
-              <a:defRPr sz="1600" b="1"/>
+              <a:defRPr sz="1500" b="1"/>
             </a:lvl6pPr>
-            <a:lvl7pPr marL="2743200" indent="0">
+            <a:lvl7pPr marL="2561326" indent="0">
               <a:buNone/>
-              <a:defRPr sz="1600" b="1"/>
+              <a:defRPr sz="1500" b="1"/>
             </a:lvl7pPr>
-            <a:lvl8pPr marL="3200400" indent="0">
+            <a:lvl8pPr marL="2988213" indent="0">
               <a:buNone/>
-              <a:defRPr sz="1600" b="1"/>
+              <a:defRPr sz="1500" b="1"/>
             </a:lvl8pPr>
-            <a:lvl9pPr marL="3657600" indent="0">
+            <a:lvl9pPr marL="3415101" indent="0">
               <a:buNone/>
-              <a:defRPr sz="1600" b="1"/>
+              <a:defRPr sz="1500" b="1"/>
             </a:lvl9pPr>
           </a:lstStyle>
           <a:p>
@@ -1656,39 +2098,39 @@
         </p:nvSpPr>
         <p:spPr>
           <a:xfrm>
-            <a:off x="4645025" y="2174875"/>
-            <a:ext cx="4041775" cy="3951288"/>
+            <a:off x="4389388" y="1998167"/>
+            <a:ext cx="3819337" cy="3630246"/>
           </a:xfrm>
         </p:spPr>
         <p:txBody>
           <a:bodyPr/>
           <a:lstStyle>
             <a:lvl1pPr>
-              <a:defRPr sz="2400"/>
+              <a:defRPr sz="2200"/>
             </a:lvl1pPr>
             <a:lvl2pPr>
-              <a:defRPr sz="2000"/>
+              <a:defRPr sz="1900"/>
             </a:lvl2pPr>
             <a:lvl3pPr>
-              <a:defRPr sz="1800"/>
+              <a:defRPr sz="1700"/>
             </a:lvl3pPr>
             <a:lvl4pPr>
-              <a:defRPr sz="1600"/>
+              <a:defRPr sz="1500"/>
             </a:lvl4pPr>
             <a:lvl5pPr>
-              <a:defRPr sz="1600"/>
+              <a:defRPr sz="1500"/>
             </a:lvl5pPr>
             <a:lvl6pPr>
-              <a:defRPr sz="1600"/>
+              <a:defRPr sz="1500"/>
             </a:lvl6pPr>
             <a:lvl7pPr>
-              <a:defRPr sz="1600"/>
+              <a:defRPr sz="1500"/>
             </a:lvl7pPr>
             <a:lvl8pPr>
-              <a:defRPr sz="1600"/>
+              <a:defRPr sz="1500"/>
             </a:lvl8pPr>
             <a:lvl9pPr>
-              <a:defRPr sz="1600"/>
+              <a:defRPr sz="1500"/>
             </a:lvl9pPr>
           </a:lstStyle>
           <a:p>
@@ -1747,7 +2189,7 @@
             <a:fld id="{1D8BD707-D9CF-40AE-B4C6-C98DA3205C09}" type="datetimeFigureOut">
               <a:rPr lang="en-US" smtClean="0"/>
               <a:pPr/>
-              <a:t>7/12/2012</a:t>
+              <a:t>12/18/2012</a:t>
             </a:fld>
             <a:endParaRPr lang="en-US"/>
           </a:p>
@@ -1862,7 +2304,7 @@
             <a:fld id="{1D8BD707-D9CF-40AE-B4C6-C98DA3205C09}" type="datetimeFigureOut">
               <a:rPr lang="en-US" smtClean="0"/>
               <a:pPr/>
-              <a:t>7/12/2012</a:t>
+              <a:t>12/18/2012</a:t>
             </a:fld>
             <a:endParaRPr lang="en-US"/>
           </a:p>
@@ -1954,7 +2396,7 @@
             <a:fld id="{1D8BD707-D9CF-40AE-B4C6-C98DA3205C09}" type="datetimeFigureOut">
               <a:rPr lang="en-US" smtClean="0"/>
               <a:pPr/>
-              <a:t>7/12/2012</a:t>
+              <a:t>12/18/2012</a:t>
             </a:fld>
             <a:endParaRPr lang="en-US"/>
           </a:p>
@@ -2040,15 +2482,15 @@
         </p:nvSpPr>
         <p:spPr>
           <a:xfrm>
-            <a:off x="457200" y="273050"/>
-            <a:ext cx="3008313" cy="1162050"/>
+            <a:off x="432039" y="250864"/>
+            <a:ext cx="2842751" cy="1067634"/>
           </a:xfrm>
         </p:spPr>
         <p:txBody>
           <a:bodyPr anchor="b"/>
           <a:lstStyle>
             <a:lvl1pPr algn="l">
-              <a:defRPr sz="2000" b="1"/>
+              <a:defRPr sz="1900" b="1"/>
             </a:lvl1pPr>
           </a:lstStyle>
           <a:p>
@@ -2072,39 +2514,39 @@
         </p:nvSpPr>
         <p:spPr>
           <a:xfrm>
-            <a:off x="3575050" y="273050"/>
-            <a:ext cx="5111750" cy="5853113"/>
+            <a:off x="3378298" y="250865"/>
+            <a:ext cx="4830427" cy="5377548"/>
           </a:xfrm>
         </p:spPr>
         <p:txBody>
           <a:bodyPr/>
           <a:lstStyle>
             <a:lvl1pPr>
-              <a:defRPr sz="3200"/>
+              <a:defRPr sz="3000"/>
             </a:lvl1pPr>
             <a:lvl2pPr>
-              <a:defRPr sz="2800"/>
+              <a:defRPr sz="2600"/>
             </a:lvl2pPr>
             <a:lvl3pPr>
-              <a:defRPr sz="2400"/>
+              <a:defRPr sz="2200"/>
             </a:lvl3pPr>
             <a:lvl4pPr>
-              <a:defRPr sz="2000"/>
+              <a:defRPr sz="1900"/>
             </a:lvl4pPr>
             <a:lvl5pPr>
-              <a:defRPr sz="2000"/>
+              <a:defRPr sz="1900"/>
             </a:lvl5pPr>
             <a:lvl6pPr>
-              <a:defRPr sz="2000"/>
+              <a:defRPr sz="1900"/>
             </a:lvl6pPr>
             <a:lvl7pPr>
-              <a:defRPr sz="2000"/>
+              <a:defRPr sz="1900"/>
             </a:lvl7pPr>
             <a:lvl8pPr>
-              <a:defRPr sz="2000"/>
+              <a:defRPr sz="1900"/>
             </a:lvl8pPr>
             <a:lvl9pPr>
-              <a:defRPr sz="2000"/>
+              <a:defRPr sz="1900"/>
             </a:lvl9pPr>
           </a:lstStyle>
           <a:p>
@@ -2157,8 +2599,8 @@
         </p:nvSpPr>
         <p:spPr>
           <a:xfrm>
-            <a:off x="457200" y="1435100"/>
-            <a:ext cx="3008313" cy="4691063"/>
+            <a:off x="432039" y="1318499"/>
+            <a:ext cx="2842751" cy="4309914"/>
           </a:xfrm>
         </p:spPr>
         <p:txBody>
@@ -2166,39 +2608,39 @@
           <a:lstStyle>
             <a:lvl1pPr marL="0" indent="0">
               <a:buNone/>
-              <a:defRPr sz="1400"/>
+              <a:defRPr sz="1300"/>
             </a:lvl1pPr>
-            <a:lvl2pPr marL="457200" indent="0">
+            <a:lvl2pPr marL="426888" indent="0">
               <a:buNone/>
-              <a:defRPr sz="1200"/>
+              <a:defRPr sz="1100"/>
             </a:lvl2pPr>
-            <a:lvl3pPr marL="914400" indent="0">
-              <a:buNone/>
-              <a:defRPr sz="1000"/>
-            </a:lvl3pPr>
-            <a:lvl4pPr marL="1371600" indent="0">
+            <a:lvl3pPr marL="853775" indent="0">
               <a:buNone/>
               <a:defRPr sz="900"/>
+            </a:lvl3pPr>
+            <a:lvl4pPr marL="1280663" indent="0">
+              <a:buNone/>
+              <a:defRPr sz="800"/>
             </a:lvl4pPr>
-            <a:lvl5pPr marL="1828800" indent="0">
+            <a:lvl5pPr marL="1707551" indent="0">
               <a:buNone/>
-              <a:defRPr sz="900"/>
+              <a:defRPr sz="800"/>
             </a:lvl5pPr>
-            <a:lvl6pPr marL="2286000" indent="0">
+            <a:lvl6pPr marL="2134438" indent="0">
               <a:buNone/>
-              <a:defRPr sz="900"/>
+              <a:defRPr sz="800"/>
             </a:lvl6pPr>
-            <a:lvl7pPr marL="2743200" indent="0">
+            <a:lvl7pPr marL="2561326" indent="0">
               <a:buNone/>
-              <a:defRPr sz="900"/>
+              <a:defRPr sz="800"/>
             </a:lvl7pPr>
-            <a:lvl8pPr marL="3200400" indent="0">
+            <a:lvl8pPr marL="2988213" indent="0">
               <a:buNone/>
-              <a:defRPr sz="900"/>
+              <a:defRPr sz="800"/>
             </a:lvl8pPr>
-            <a:lvl9pPr marL="3657600" indent="0">
+            <a:lvl9pPr marL="3415101" indent="0">
               <a:buNone/>
-              <a:defRPr sz="900"/>
+              <a:defRPr sz="800"/>
             </a:lvl9pPr>
           </a:lstStyle>
           <a:p>
@@ -2228,7 +2670,7 @@
             <a:fld id="{1D8BD707-D9CF-40AE-B4C6-C98DA3205C09}" type="datetimeFigureOut">
               <a:rPr lang="en-US" smtClean="0"/>
               <a:pPr/>
-              <a:t>7/12/2012</a:t>
+              <a:t>12/18/2012</a:t>
             </a:fld>
             <a:endParaRPr lang="en-US"/>
           </a:p>
@@ -2314,15 +2756,15 @@
         </p:nvSpPr>
         <p:spPr>
           <a:xfrm>
-            <a:off x="1792288" y="4800600"/>
-            <a:ext cx="5486400" cy="566738"/>
+            <a:off x="1693650" y="4410551"/>
+            <a:ext cx="5184458" cy="520691"/>
           </a:xfrm>
         </p:spPr>
         <p:txBody>
           <a:bodyPr anchor="b"/>
           <a:lstStyle>
             <a:lvl1pPr algn="l">
-              <a:defRPr sz="2000" b="1"/>
+              <a:defRPr sz="1900" b="1"/>
             </a:lvl1pPr>
           </a:lstStyle>
           <a:p>
@@ -2346,8 +2788,8 @@
         </p:nvSpPr>
         <p:spPr>
           <a:xfrm>
-            <a:off x="1792288" y="612775"/>
-            <a:ext cx="5486400" cy="4114800"/>
+            <a:off x="1693650" y="562987"/>
+            <a:ext cx="5184458" cy="3780473"/>
           </a:xfrm>
         </p:spPr>
         <p:txBody>
@@ -2355,39 +2797,39 @@
           <a:lstStyle>
             <a:lvl1pPr marL="0" indent="0">
               <a:buNone/>
-              <a:defRPr sz="3200"/>
+              <a:defRPr sz="3000"/>
             </a:lvl1pPr>
-            <a:lvl2pPr marL="457200" indent="0">
+            <a:lvl2pPr marL="426888" indent="0">
               <a:buNone/>
-              <a:defRPr sz="2800"/>
+              <a:defRPr sz="2600"/>
             </a:lvl2pPr>
-            <a:lvl3pPr marL="914400" indent="0">
+            <a:lvl3pPr marL="853775" indent="0">
               <a:buNone/>
-              <a:defRPr sz="2400"/>
+              <a:defRPr sz="2200"/>
             </a:lvl3pPr>
-            <a:lvl4pPr marL="1371600" indent="0">
+            <a:lvl4pPr marL="1280663" indent="0">
               <a:buNone/>
-              <a:defRPr sz="2000"/>
+              <a:defRPr sz="1900"/>
             </a:lvl4pPr>
-            <a:lvl5pPr marL="1828800" indent="0">
+            <a:lvl5pPr marL="1707551" indent="0">
               <a:buNone/>
-              <a:defRPr sz="2000"/>
+              <a:defRPr sz="1900"/>
             </a:lvl5pPr>
-            <a:lvl6pPr marL="2286000" indent="0">
+            <a:lvl6pPr marL="2134438" indent="0">
               <a:buNone/>
-              <a:defRPr sz="2000"/>
+              <a:defRPr sz="1900"/>
             </a:lvl6pPr>
-            <a:lvl7pPr marL="2743200" indent="0">
+            <a:lvl7pPr marL="2561326" indent="0">
               <a:buNone/>
-              <a:defRPr sz="2000"/>
+              <a:defRPr sz="1900"/>
             </a:lvl7pPr>
-            <a:lvl8pPr marL="3200400" indent="0">
+            <a:lvl8pPr marL="2988213" indent="0">
               <a:buNone/>
-              <a:defRPr sz="2000"/>
+              <a:defRPr sz="1900"/>
             </a:lvl8pPr>
-            <a:lvl9pPr marL="3657600" indent="0">
+            <a:lvl9pPr marL="3415101" indent="0">
               <a:buNone/>
-              <a:defRPr sz="2000"/>
+              <a:defRPr sz="1900"/>
             </a:lvl9pPr>
           </a:lstStyle>
           <a:p>
@@ -2407,8 +2849,8 @@
         </p:nvSpPr>
         <p:spPr>
           <a:xfrm>
-            <a:off x="1792288" y="5367338"/>
-            <a:ext cx="5486400" cy="804862"/>
+            <a:off x="1693650" y="4931242"/>
+            <a:ext cx="5184458" cy="739467"/>
           </a:xfrm>
         </p:spPr>
         <p:txBody>
@@ -2416,39 +2858,39 @@
           <a:lstStyle>
             <a:lvl1pPr marL="0" indent="0">
               <a:buNone/>
-              <a:defRPr sz="1400"/>
+              <a:defRPr sz="1300"/>
             </a:lvl1pPr>
-            <a:lvl2pPr marL="457200" indent="0">
+            <a:lvl2pPr marL="426888" indent="0">
               <a:buNone/>
-              <a:defRPr sz="1200"/>
+              <a:defRPr sz="1100"/>
             </a:lvl2pPr>
-            <a:lvl3pPr marL="914400" indent="0">
-              <a:buNone/>
-              <a:defRPr sz="1000"/>
-            </a:lvl3pPr>
-            <a:lvl4pPr marL="1371600" indent="0">
+            <a:lvl3pPr marL="853775" indent="0">
               <a:buNone/>
               <a:defRPr sz="900"/>
+            </a:lvl3pPr>
+            <a:lvl4pPr marL="1280663" indent="0">
+              <a:buNone/>
+              <a:defRPr sz="800"/>
             </a:lvl4pPr>
-            <a:lvl5pPr marL="1828800" indent="0">
+            <a:lvl5pPr marL="1707551" indent="0">
               <a:buNone/>
-              <a:defRPr sz="900"/>
+              <a:defRPr sz="800"/>
             </a:lvl5pPr>
-            <a:lvl6pPr marL="2286000" indent="0">
+            <a:lvl6pPr marL="2134438" indent="0">
               <a:buNone/>
-              <a:defRPr sz="900"/>
+              <a:defRPr sz="800"/>
             </a:lvl6pPr>
-            <a:lvl7pPr marL="2743200" indent="0">
+            <a:lvl7pPr marL="2561326" indent="0">
               <a:buNone/>
-              <a:defRPr sz="900"/>
+              <a:defRPr sz="800"/>
             </a:lvl7pPr>
-            <a:lvl8pPr marL="3200400" indent="0">
+            <a:lvl8pPr marL="2988213" indent="0">
               <a:buNone/>
-              <a:defRPr sz="900"/>
+              <a:defRPr sz="800"/>
             </a:lvl8pPr>
-            <a:lvl9pPr marL="3657600" indent="0">
+            <a:lvl9pPr marL="3415101" indent="0">
               <a:buNone/>
-              <a:defRPr sz="900"/>
+              <a:defRPr sz="800"/>
             </a:lvl9pPr>
           </a:lstStyle>
           <a:p>
@@ -2478,7 +2920,7 @@
             <a:fld id="{1D8BD707-D9CF-40AE-B4C6-C98DA3205C09}" type="datetimeFigureOut">
               <a:rPr lang="en-US" smtClean="0"/>
               <a:pPr/>
-              <a:t>7/12/2012</a:t>
+              <a:t>12/18/2012</a:t>
             </a:fld>
             <a:endParaRPr lang="en-US"/>
           </a:p>
@@ -2569,15 +3011,15 @@
         </p:nvSpPr>
         <p:spPr>
           <a:xfrm>
-            <a:off x="457200" y="274638"/>
-            <a:ext cx="8229600" cy="1143000"/>
+            <a:off x="432038" y="252324"/>
+            <a:ext cx="7776687" cy="1050131"/>
           </a:xfrm>
           <a:prstGeom prst="rect">
             <a:avLst/>
           </a:prstGeom>
         </p:spPr>
         <p:txBody>
-          <a:bodyPr vert="horz" lIns="91440" tIns="45720" rIns="91440" bIns="45720" rtlCol="0" anchor="ctr">
+          <a:bodyPr vert="horz" lIns="85378" tIns="42689" rIns="85378" bIns="42689" rtlCol="0" anchor="ctr">
             <a:normAutofit/>
           </a:bodyPr>
           <a:lstStyle/>
@@ -2602,15 +3044,15 @@
         </p:nvSpPr>
         <p:spPr>
           <a:xfrm>
-            <a:off x="457200" y="1600200"/>
-            <a:ext cx="8229600" cy="4525963"/>
+            <a:off x="432038" y="1470184"/>
+            <a:ext cx="7776687" cy="4158229"/>
           </a:xfrm>
           <a:prstGeom prst="rect">
             <a:avLst/>
           </a:prstGeom>
         </p:spPr>
         <p:txBody>
-          <a:bodyPr vert="horz" lIns="91440" tIns="45720" rIns="91440" bIns="45720" rtlCol="0">
+          <a:bodyPr vert="horz" lIns="85378" tIns="42689" rIns="85378" bIns="42689" rtlCol="0">
             <a:normAutofit/>
           </a:bodyPr>
           <a:lstStyle/>
@@ -2664,18 +3106,18 @@
         </p:nvSpPr>
         <p:spPr>
           <a:xfrm>
-            <a:off x="457200" y="6356350"/>
-            <a:ext cx="2133600" cy="365125"/>
+            <a:off x="432038" y="5839897"/>
+            <a:ext cx="2016178" cy="335459"/>
           </a:xfrm>
           <a:prstGeom prst="rect">
             <a:avLst/>
           </a:prstGeom>
         </p:spPr>
         <p:txBody>
-          <a:bodyPr vert="horz" lIns="91440" tIns="45720" rIns="91440" bIns="45720" rtlCol="0" anchor="ctr"/>
+          <a:bodyPr vert="horz" lIns="85378" tIns="42689" rIns="85378" bIns="42689" rtlCol="0" anchor="ctr"/>
           <a:lstStyle>
             <a:lvl1pPr algn="l">
-              <a:defRPr sz="1200">
+              <a:defRPr sz="1100">
                 <a:solidFill>
                   <a:schemeClr val="tx1">
                     <a:tint val="75000"/>
@@ -2688,7 +3130,7 @@
             <a:fld id="{1D8BD707-D9CF-40AE-B4C6-C98DA3205C09}" type="datetimeFigureOut">
               <a:rPr lang="en-US" smtClean="0"/>
               <a:pPr/>
-              <a:t>7/12/2012</a:t>
+              <a:t>12/18/2012</a:t>
             </a:fld>
             <a:endParaRPr lang="en-US"/>
           </a:p>
@@ -2706,18 +3148,18 @@
         </p:nvSpPr>
         <p:spPr>
           <a:xfrm>
-            <a:off x="3124200" y="6356350"/>
-            <a:ext cx="2895600" cy="365125"/>
+            <a:off x="2952261" y="5839897"/>
+            <a:ext cx="2736242" cy="335459"/>
           </a:xfrm>
           <a:prstGeom prst="rect">
             <a:avLst/>
           </a:prstGeom>
         </p:spPr>
         <p:txBody>
-          <a:bodyPr vert="horz" lIns="91440" tIns="45720" rIns="91440" bIns="45720" rtlCol="0" anchor="ctr"/>
+          <a:bodyPr vert="horz" lIns="85378" tIns="42689" rIns="85378" bIns="42689" rtlCol="0" anchor="ctr"/>
           <a:lstStyle>
             <a:lvl1pPr algn="ctr">
-              <a:defRPr sz="1200">
+              <a:defRPr sz="1100">
                 <a:solidFill>
                   <a:schemeClr val="tx1">
                     <a:tint val="75000"/>
@@ -2743,18 +3185,18 @@
         </p:nvSpPr>
         <p:spPr>
           <a:xfrm>
-            <a:off x="6553200" y="6356350"/>
-            <a:ext cx="2133600" cy="365125"/>
+            <a:off x="6192547" y="5839897"/>
+            <a:ext cx="2016178" cy="335459"/>
           </a:xfrm>
           <a:prstGeom prst="rect">
             <a:avLst/>
           </a:prstGeom>
         </p:spPr>
         <p:txBody>
-          <a:bodyPr vert="horz" lIns="91440" tIns="45720" rIns="91440" bIns="45720" rtlCol="0" anchor="ctr"/>
+          <a:bodyPr vert="horz" lIns="85378" tIns="42689" rIns="85378" bIns="42689" rtlCol="0" anchor="ctr"/>
           <a:lstStyle>
             <a:lvl1pPr algn="r">
-              <a:defRPr sz="1200">
+              <a:defRPr sz="1100">
                 <a:solidFill>
                   <a:schemeClr val="tx1">
                     <a:tint val="75000"/>
@@ -2791,12 +3233,12 @@
   </p:sldLayoutIdLst>
   <p:txStyles>
     <p:titleStyle>
-      <a:lvl1pPr algn="ctr" defTabSz="914400" rtl="0" eaLnBrk="1" latinLnBrk="0" hangingPunct="1">
+      <a:lvl1pPr algn="ctr" defTabSz="853775" rtl="0" eaLnBrk="1" latinLnBrk="0" hangingPunct="1">
         <a:spcBef>
           <a:spcPct val="0"/>
         </a:spcBef>
         <a:buNone/>
-        <a:defRPr sz="4400" kern="1200">
+        <a:defRPr sz="4100" kern="1200">
           <a:solidFill>
             <a:schemeClr val="tx1"/>
           </a:solidFill>
@@ -2807,13 +3249,13 @@
       </a:lvl1pPr>
     </p:titleStyle>
     <p:bodyStyle>
-      <a:lvl1pPr marL="342900" indent="-342900" algn="l" defTabSz="914400" rtl="0" eaLnBrk="1" latinLnBrk="0" hangingPunct="1">
+      <a:lvl1pPr marL="320166" indent="-320166" algn="l" defTabSz="853775" rtl="0" eaLnBrk="1" latinLnBrk="0" hangingPunct="1">
         <a:spcBef>
           <a:spcPct val="20000"/>
         </a:spcBef>
         <a:buFont typeface="Arial" pitchFamily="34" charset="0"/>
         <a:buChar char="•"/>
-        <a:defRPr sz="3200" kern="1200">
+        <a:defRPr sz="3000" kern="1200">
           <a:solidFill>
             <a:schemeClr val="tx1"/>
           </a:solidFill>
@@ -2822,13 +3264,13 @@
           <a:cs typeface="+mn-cs"/>
         </a:defRPr>
       </a:lvl1pPr>
-      <a:lvl2pPr marL="742950" indent="-285750" algn="l" defTabSz="914400" rtl="0" eaLnBrk="1" latinLnBrk="0" hangingPunct="1">
+      <a:lvl2pPr marL="693692" indent="-266805" algn="l" defTabSz="853775" rtl="0" eaLnBrk="1" latinLnBrk="0" hangingPunct="1">
         <a:spcBef>
           <a:spcPct val="20000"/>
         </a:spcBef>
         <a:buFont typeface="Arial" pitchFamily="34" charset="0"/>
         <a:buChar char="–"/>
-        <a:defRPr sz="2800" kern="1200">
+        <a:defRPr sz="2600" kern="1200">
           <a:solidFill>
             <a:schemeClr val="tx1"/>
           </a:solidFill>
@@ -2837,13 +3279,13 @@
           <a:cs typeface="+mn-cs"/>
         </a:defRPr>
       </a:lvl2pPr>
-      <a:lvl3pPr marL="1143000" indent="-228600" algn="l" defTabSz="914400" rtl="0" eaLnBrk="1" latinLnBrk="0" hangingPunct="1">
+      <a:lvl3pPr marL="1067219" indent="-213444" algn="l" defTabSz="853775" rtl="0" eaLnBrk="1" latinLnBrk="0" hangingPunct="1">
         <a:spcBef>
           <a:spcPct val="20000"/>
         </a:spcBef>
         <a:buFont typeface="Arial" pitchFamily="34" charset="0"/>
         <a:buChar char="•"/>
-        <a:defRPr sz="2400" kern="1200">
+        <a:defRPr sz="2200" kern="1200">
           <a:solidFill>
             <a:schemeClr val="tx1"/>
           </a:solidFill>
@@ -2852,13 +3294,13 @@
           <a:cs typeface="+mn-cs"/>
         </a:defRPr>
       </a:lvl3pPr>
-      <a:lvl4pPr marL="1600200" indent="-228600" algn="l" defTabSz="914400" rtl="0" eaLnBrk="1" latinLnBrk="0" hangingPunct="1">
+      <a:lvl4pPr marL="1494107" indent="-213444" algn="l" defTabSz="853775" rtl="0" eaLnBrk="1" latinLnBrk="0" hangingPunct="1">
         <a:spcBef>
           <a:spcPct val="20000"/>
         </a:spcBef>
         <a:buFont typeface="Arial" pitchFamily="34" charset="0"/>
         <a:buChar char="–"/>
-        <a:defRPr sz="2000" kern="1200">
+        <a:defRPr sz="1900" kern="1200">
           <a:solidFill>
             <a:schemeClr val="tx1"/>
           </a:solidFill>
@@ -2867,13 +3309,13 @@
           <a:cs typeface="+mn-cs"/>
         </a:defRPr>
       </a:lvl4pPr>
-      <a:lvl5pPr marL="2057400" indent="-228600" algn="l" defTabSz="914400" rtl="0" eaLnBrk="1" latinLnBrk="0" hangingPunct="1">
+      <a:lvl5pPr marL="1920994" indent="-213444" algn="l" defTabSz="853775" rtl="0" eaLnBrk="1" latinLnBrk="0" hangingPunct="1">
         <a:spcBef>
           <a:spcPct val="20000"/>
         </a:spcBef>
         <a:buFont typeface="Arial" pitchFamily="34" charset="0"/>
         <a:buChar char="»"/>
-        <a:defRPr sz="2000" kern="1200">
+        <a:defRPr sz="1900" kern="1200">
           <a:solidFill>
             <a:schemeClr val="tx1"/>
           </a:solidFill>
@@ -2882,13 +3324,13 @@
           <a:cs typeface="+mn-cs"/>
         </a:defRPr>
       </a:lvl5pPr>
-      <a:lvl6pPr marL="2514600" indent="-228600" algn="l" defTabSz="914400" rtl="0" eaLnBrk="1" latinLnBrk="0" hangingPunct="1">
+      <a:lvl6pPr marL="2347882" indent="-213444" algn="l" defTabSz="853775" rtl="0" eaLnBrk="1" latinLnBrk="0" hangingPunct="1">
         <a:spcBef>
           <a:spcPct val="20000"/>
         </a:spcBef>
         <a:buFont typeface="Arial" pitchFamily="34" charset="0"/>
         <a:buChar char="•"/>
-        <a:defRPr sz="2000" kern="1200">
+        <a:defRPr sz="1900" kern="1200">
           <a:solidFill>
             <a:schemeClr val="tx1"/>
           </a:solidFill>
@@ -2897,13 +3339,13 @@
           <a:cs typeface="+mn-cs"/>
         </a:defRPr>
       </a:lvl6pPr>
-      <a:lvl7pPr marL="2971800" indent="-228600" algn="l" defTabSz="914400" rtl="0" eaLnBrk="1" latinLnBrk="0" hangingPunct="1">
+      <a:lvl7pPr marL="2774770" indent="-213444" algn="l" defTabSz="853775" rtl="0" eaLnBrk="1" latinLnBrk="0" hangingPunct="1">
         <a:spcBef>
           <a:spcPct val="20000"/>
         </a:spcBef>
         <a:buFont typeface="Arial" pitchFamily="34" charset="0"/>
         <a:buChar char="•"/>
-        <a:defRPr sz="2000" kern="1200">
+        <a:defRPr sz="1900" kern="1200">
           <a:solidFill>
             <a:schemeClr val="tx1"/>
           </a:solidFill>
@@ -2912,13 +3354,13 @@
           <a:cs typeface="+mn-cs"/>
         </a:defRPr>
       </a:lvl7pPr>
-      <a:lvl8pPr marL="3429000" indent="-228600" algn="l" defTabSz="914400" rtl="0" eaLnBrk="1" latinLnBrk="0" hangingPunct="1">
+      <a:lvl8pPr marL="3201657" indent="-213444" algn="l" defTabSz="853775" rtl="0" eaLnBrk="1" latinLnBrk="0" hangingPunct="1">
         <a:spcBef>
           <a:spcPct val="20000"/>
         </a:spcBef>
         <a:buFont typeface="Arial" pitchFamily="34" charset="0"/>
         <a:buChar char="•"/>
-        <a:defRPr sz="2000" kern="1200">
+        <a:defRPr sz="1900" kern="1200">
           <a:solidFill>
             <a:schemeClr val="tx1"/>
           </a:solidFill>
@@ -2927,13 +3369,13 @@
           <a:cs typeface="+mn-cs"/>
         </a:defRPr>
       </a:lvl8pPr>
-      <a:lvl9pPr marL="3886200" indent="-228600" algn="l" defTabSz="914400" rtl="0" eaLnBrk="1" latinLnBrk="0" hangingPunct="1">
+      <a:lvl9pPr marL="3628545" indent="-213444" algn="l" defTabSz="853775" rtl="0" eaLnBrk="1" latinLnBrk="0" hangingPunct="1">
         <a:spcBef>
           <a:spcPct val="20000"/>
         </a:spcBef>
         <a:buFont typeface="Arial" pitchFamily="34" charset="0"/>
         <a:buChar char="•"/>
-        <a:defRPr sz="2000" kern="1200">
+        <a:defRPr sz="1900" kern="1200">
           <a:solidFill>
             <a:schemeClr val="tx1"/>
           </a:solidFill>
@@ -2947,8 +3389,8 @@
       <a:defPPr>
         <a:defRPr lang="en-US"/>
       </a:defPPr>
-      <a:lvl1pPr marL="0" algn="l" defTabSz="914400" rtl="0" eaLnBrk="1" latinLnBrk="0" hangingPunct="1">
-        <a:defRPr sz="1800" kern="1200">
+      <a:lvl1pPr marL="0" algn="l" defTabSz="853775" rtl="0" eaLnBrk="1" latinLnBrk="0" hangingPunct="1">
+        <a:defRPr sz="1700" kern="1200">
           <a:solidFill>
             <a:schemeClr val="tx1"/>
           </a:solidFill>
@@ -2957,8 +3399,8 @@
           <a:cs typeface="+mn-cs"/>
         </a:defRPr>
       </a:lvl1pPr>
-      <a:lvl2pPr marL="457200" algn="l" defTabSz="914400" rtl="0" eaLnBrk="1" latinLnBrk="0" hangingPunct="1">
-        <a:defRPr sz="1800" kern="1200">
+      <a:lvl2pPr marL="426888" algn="l" defTabSz="853775" rtl="0" eaLnBrk="1" latinLnBrk="0" hangingPunct="1">
+        <a:defRPr sz="1700" kern="1200">
           <a:solidFill>
             <a:schemeClr val="tx1"/>
           </a:solidFill>
@@ -2967,8 +3409,8 @@
           <a:cs typeface="+mn-cs"/>
         </a:defRPr>
       </a:lvl2pPr>
-      <a:lvl3pPr marL="914400" algn="l" defTabSz="914400" rtl="0" eaLnBrk="1" latinLnBrk="0" hangingPunct="1">
-        <a:defRPr sz="1800" kern="1200">
+      <a:lvl3pPr marL="853775" algn="l" defTabSz="853775" rtl="0" eaLnBrk="1" latinLnBrk="0" hangingPunct="1">
+        <a:defRPr sz="1700" kern="1200">
           <a:solidFill>
             <a:schemeClr val="tx1"/>
           </a:solidFill>
@@ -2977,8 +3419,8 @@
           <a:cs typeface="+mn-cs"/>
         </a:defRPr>
       </a:lvl3pPr>
-      <a:lvl4pPr marL="1371600" algn="l" defTabSz="914400" rtl="0" eaLnBrk="1" latinLnBrk="0" hangingPunct="1">
-        <a:defRPr sz="1800" kern="1200">
+      <a:lvl4pPr marL="1280663" algn="l" defTabSz="853775" rtl="0" eaLnBrk="1" latinLnBrk="0" hangingPunct="1">
+        <a:defRPr sz="1700" kern="1200">
           <a:solidFill>
             <a:schemeClr val="tx1"/>
           </a:solidFill>
@@ -2987,8 +3429,8 @@
           <a:cs typeface="+mn-cs"/>
         </a:defRPr>
       </a:lvl4pPr>
-      <a:lvl5pPr marL="1828800" algn="l" defTabSz="914400" rtl="0" eaLnBrk="1" latinLnBrk="0" hangingPunct="1">
-        <a:defRPr sz="1800" kern="1200">
+      <a:lvl5pPr marL="1707551" algn="l" defTabSz="853775" rtl="0" eaLnBrk="1" latinLnBrk="0" hangingPunct="1">
+        <a:defRPr sz="1700" kern="1200">
           <a:solidFill>
             <a:schemeClr val="tx1"/>
           </a:solidFill>
@@ -2997,8 +3439,8 @@
           <a:cs typeface="+mn-cs"/>
         </a:defRPr>
       </a:lvl5pPr>
-      <a:lvl6pPr marL="2286000" algn="l" defTabSz="914400" rtl="0" eaLnBrk="1" latinLnBrk="0" hangingPunct="1">
-        <a:defRPr sz="1800" kern="1200">
+      <a:lvl6pPr marL="2134438" algn="l" defTabSz="853775" rtl="0" eaLnBrk="1" latinLnBrk="0" hangingPunct="1">
+        <a:defRPr sz="1700" kern="1200">
           <a:solidFill>
             <a:schemeClr val="tx1"/>
           </a:solidFill>
@@ -3007,8 +3449,8 @@
           <a:cs typeface="+mn-cs"/>
         </a:defRPr>
       </a:lvl6pPr>
-      <a:lvl7pPr marL="2743200" algn="l" defTabSz="914400" rtl="0" eaLnBrk="1" latinLnBrk="0" hangingPunct="1">
-        <a:defRPr sz="1800" kern="1200">
+      <a:lvl7pPr marL="2561326" algn="l" defTabSz="853775" rtl="0" eaLnBrk="1" latinLnBrk="0" hangingPunct="1">
+        <a:defRPr sz="1700" kern="1200">
           <a:solidFill>
             <a:schemeClr val="tx1"/>
           </a:solidFill>
@@ -3017,8 +3459,8 @@
           <a:cs typeface="+mn-cs"/>
         </a:defRPr>
       </a:lvl7pPr>
-      <a:lvl8pPr marL="3200400" algn="l" defTabSz="914400" rtl="0" eaLnBrk="1" latinLnBrk="0" hangingPunct="1">
-        <a:defRPr sz="1800" kern="1200">
+      <a:lvl8pPr marL="2988213" algn="l" defTabSz="853775" rtl="0" eaLnBrk="1" latinLnBrk="0" hangingPunct="1">
+        <a:defRPr sz="1700" kern="1200">
           <a:solidFill>
             <a:schemeClr val="tx1"/>
           </a:solidFill>
@@ -3027,8 +3469,8 @@
           <a:cs typeface="+mn-cs"/>
         </a:defRPr>
       </a:lvl8pPr>
-      <a:lvl9pPr marL="3657600" algn="l" defTabSz="914400" rtl="0" eaLnBrk="1" latinLnBrk="0" hangingPunct="1">
-        <a:defRPr sz="1800" kern="1200">
+      <a:lvl9pPr marL="3415101" algn="l" defTabSz="853775" rtl="0" eaLnBrk="1" latinLnBrk="0" hangingPunct="1">
+        <a:defRPr sz="1700" kern="1200">
           <a:solidFill>
             <a:schemeClr val="tx1"/>
           </a:solidFill>
@@ -3061,14 +3503,14 @@
       </p:grpSpPr>
       <p:sp>
         <p:nvSpPr>
-          <p:cNvPr id="4" name="Rounded Rectangle 3"/>
+          <p:cNvPr id="89" name="Rounded Rectangle 88"/>
           <p:cNvSpPr/>
           <p:nvPr/>
         </p:nvSpPr>
         <p:spPr>
           <a:xfrm>
-            <a:off x="381000" y="4644640"/>
-            <a:ext cx="2133600" cy="1984760"/>
+            <a:off x="129381" y="4111239"/>
+            <a:ext cx="2133600" cy="2060961"/>
           </a:xfrm>
           <a:prstGeom prst="roundRect">
             <a:avLst>
@@ -3107,10 +3549,9 @@
           </a:fontRef>
         </p:style>
         <p:txBody>
-          <a:bodyPr rtlCol="0" anchor="t" anchorCtr="1"/>
+          <a:bodyPr rtlCol="0" anchor="t" anchorCtr="0"/>
           <a:lstStyle/>
           <a:p>
-            <a:pPr algn="ctr"/>
             <a:r>
               <a:rPr lang="en-US" sz="1600" b="1" dirty="0" smtClean="0"/>
               <a:t>Test Driver</a:t>
@@ -3121,13 +3562,13 @@
       </p:sp>
       <p:sp>
         <p:nvSpPr>
-          <p:cNvPr id="5" name="Rounded Rectangle 4"/>
+          <p:cNvPr id="90" name="Rounded Rectangle 89"/>
           <p:cNvSpPr/>
           <p:nvPr/>
         </p:nvSpPr>
         <p:spPr>
           <a:xfrm>
-            <a:off x="3810000" y="1905713"/>
+            <a:off x="3558381" y="1372313"/>
             <a:ext cx="2286000" cy="4799888"/>
           </a:xfrm>
           <a:prstGeom prst="roundRect">
@@ -3181,13 +3622,13 @@
       </p:sp>
       <p:sp>
         <p:nvSpPr>
-          <p:cNvPr id="6" name="Rounded Rectangle 5"/>
+          <p:cNvPr id="91" name="Rounded Rectangle 90"/>
           <p:cNvSpPr/>
           <p:nvPr/>
         </p:nvSpPr>
         <p:spPr>
           <a:xfrm>
-            <a:off x="6477000" y="1905712"/>
+            <a:off x="6225381" y="1372312"/>
             <a:ext cx="2286000" cy="4799889"/>
           </a:xfrm>
           <a:prstGeom prst="roundRect">
@@ -3241,13 +3682,13 @@
       </p:sp>
       <p:sp>
         <p:nvSpPr>
-          <p:cNvPr id="7" name="Rounded Rectangle 6"/>
+          <p:cNvPr id="92" name="Rounded Rectangle 91"/>
           <p:cNvSpPr/>
           <p:nvPr/>
         </p:nvSpPr>
         <p:spPr>
           <a:xfrm>
-            <a:off x="1219200" y="1905000"/>
+            <a:off x="967581" y="1371600"/>
             <a:ext cx="1752600" cy="2514600"/>
           </a:xfrm>
           <a:prstGeom prst="roundRect">
@@ -3301,14 +3742,14 @@
       </p:sp>
       <p:sp>
         <p:nvSpPr>
-          <p:cNvPr id="8" name="Rounded Rectangle 7"/>
+          <p:cNvPr id="93" name="Rounded Rectangle 92"/>
           <p:cNvSpPr/>
           <p:nvPr/>
         </p:nvSpPr>
         <p:spPr>
           <a:xfrm>
-            <a:off x="381000" y="152400"/>
-            <a:ext cx="8382000" cy="1295400"/>
+            <a:off x="129381" y="76200"/>
+            <a:ext cx="8382000" cy="838200"/>
           </a:xfrm>
           <a:prstGeom prst="roundRect">
             <a:avLst>
@@ -3360,13 +3801,13 @@
       </p:sp>
       <p:grpSp>
         <p:nvGrpSpPr>
-          <p:cNvPr id="11" name="Group 10"/>
+          <p:cNvPr id="94" name="Group 93"/>
           <p:cNvGrpSpPr/>
           <p:nvPr/>
         </p:nvGrpSpPr>
         <p:grpSpPr>
           <a:xfrm>
-            <a:off x="1447800" y="3505200"/>
+            <a:off x="1196181" y="3124200"/>
             <a:ext cx="1371600" cy="609600"/>
             <a:chOff x="-228600" y="1371600"/>
             <a:chExt cx="1371600" cy="609600"/>
@@ -3377,7 +3818,7 @@
         </p:grpSpPr>
         <p:sp>
           <p:nvSpPr>
-            <p:cNvPr id="9" name="Rectangle 8"/>
+            <p:cNvPr id="95" name="Rectangle 94"/>
             <p:cNvSpPr/>
             <p:nvPr/>
           </p:nvSpPr>
@@ -3438,7 +3879,7 @@
         </p:sp>
         <p:sp>
           <p:nvSpPr>
-            <p:cNvPr id="10" name="Rectangle 9"/>
+            <p:cNvPr id="96" name="Rectangle 95"/>
             <p:cNvSpPr/>
             <p:nvPr/>
           </p:nvSpPr>
@@ -3484,13 +3925,13 @@
       </p:grpSp>
       <p:grpSp>
         <p:nvGrpSpPr>
-          <p:cNvPr id="15" name="Group 14"/>
+          <p:cNvPr id="97" name="Group 96"/>
           <p:cNvGrpSpPr/>
           <p:nvPr/>
         </p:nvGrpSpPr>
         <p:grpSpPr>
           <a:xfrm>
-            <a:off x="4267200" y="2362200"/>
+            <a:off x="4015581" y="1828800"/>
             <a:ext cx="1371600" cy="762000"/>
             <a:chOff x="-228600" y="1371600"/>
             <a:chExt cx="1371600" cy="762000"/>
@@ -3501,7 +3942,7 @@
         </p:grpSpPr>
         <p:sp>
           <p:nvSpPr>
-            <p:cNvPr id="16" name="Rectangle 15"/>
+            <p:cNvPr id="98" name="Rectangle 97"/>
             <p:cNvSpPr/>
             <p:nvPr/>
           </p:nvSpPr>
@@ -3559,7 +4000,7 @@
         </p:sp>
         <p:sp>
           <p:nvSpPr>
-            <p:cNvPr id="17" name="Rectangle 16"/>
+            <p:cNvPr id="99" name="Rectangle 98"/>
             <p:cNvSpPr/>
             <p:nvPr/>
           </p:nvSpPr>
@@ -3610,13 +4051,13 @@
       </p:grpSp>
       <p:grpSp>
         <p:nvGrpSpPr>
-          <p:cNvPr id="18" name="Group 17"/>
+          <p:cNvPr id="100" name="Group 99"/>
           <p:cNvGrpSpPr/>
           <p:nvPr/>
         </p:nvGrpSpPr>
         <p:grpSpPr>
           <a:xfrm>
-            <a:off x="6858000" y="2514600"/>
+            <a:off x="6606381" y="1981200"/>
             <a:ext cx="1600200" cy="762000"/>
             <a:chOff x="-457200" y="1371600"/>
             <a:chExt cx="1600200" cy="762000"/>
@@ -3627,7 +4068,7 @@
         </p:grpSpPr>
         <p:sp>
           <p:nvSpPr>
-            <p:cNvPr id="19" name="Rectangle 18"/>
+            <p:cNvPr id="101" name="Rectangle 100"/>
             <p:cNvSpPr/>
             <p:nvPr/>
           </p:nvSpPr>
@@ -3685,7 +4126,7 @@
         </p:sp>
         <p:sp>
           <p:nvSpPr>
-            <p:cNvPr id="20" name="Rectangle 19"/>
+            <p:cNvPr id="102" name="Rectangle 101"/>
             <p:cNvSpPr/>
             <p:nvPr/>
           </p:nvSpPr>
@@ -3736,13 +4177,13 @@
       </p:grpSp>
       <p:grpSp>
         <p:nvGrpSpPr>
-          <p:cNvPr id="21" name="Group 20"/>
+          <p:cNvPr id="103" name="Group 102"/>
           <p:cNvGrpSpPr/>
           <p:nvPr/>
         </p:nvGrpSpPr>
         <p:grpSpPr>
           <a:xfrm>
-            <a:off x="6858000" y="3958839"/>
+            <a:off x="6606381" y="3425439"/>
             <a:ext cx="1600200" cy="762000"/>
             <a:chOff x="-457200" y="1371600"/>
             <a:chExt cx="1600200" cy="762000"/>
@@ -3753,7 +4194,7 @@
         </p:grpSpPr>
         <p:sp>
           <p:nvSpPr>
-            <p:cNvPr id="22" name="Rectangle 21"/>
+            <p:cNvPr id="104" name="Rectangle 103"/>
             <p:cNvSpPr/>
             <p:nvPr/>
           </p:nvSpPr>
@@ -3799,15 +4240,7 @@
                     <a:srgbClr val="00B050"/>
                   </a:solidFill>
                 </a:rPr>
-                <a:t>storage</a:t>
-              </a:r>
-              <a:r>
-                <a:rPr lang="en-US" sz="1400" b="1" dirty="0" smtClean="0">
-                  <a:solidFill>
-                    <a:srgbClr val="00B050"/>
-                  </a:solidFill>
-                </a:rPr>
-                <a:t>::</a:t>
+                <a:t>storage::</a:t>
               </a:r>
               <a:r>
                 <a:rPr lang="en-US" sz="1400" b="1" dirty="0" err="1" smtClean="0">
@@ -3835,7 +4268,7 @@
         </p:sp>
         <p:sp>
           <p:nvSpPr>
-            <p:cNvPr id="23" name="Rectangle 22"/>
+            <p:cNvPr id="105" name="Rectangle 104"/>
             <p:cNvSpPr/>
             <p:nvPr/>
           </p:nvSpPr>
@@ -3886,16 +4319,16 @@
       </p:grpSp>
       <p:grpSp>
         <p:nvGrpSpPr>
-          <p:cNvPr id="24" name="Group 23"/>
+          <p:cNvPr id="106" name="Group 105"/>
           <p:cNvGrpSpPr/>
           <p:nvPr/>
         </p:nvGrpSpPr>
         <p:grpSpPr>
           <a:xfrm>
-            <a:off x="762000" y="5863839"/>
-            <a:ext cx="1371600" cy="536961"/>
+            <a:off x="510381" y="4980061"/>
+            <a:ext cx="1371600" cy="506339"/>
             <a:chOff x="-228600" y="1371600"/>
-            <a:chExt cx="1371600" cy="536961"/>
+            <a:chExt cx="1371600" cy="506339"/>
           </a:xfrm>
           <a:solidFill>
             <a:schemeClr val="bg1"/>
@@ -3903,14 +4336,14 @@
         </p:grpSpPr>
         <p:sp>
           <p:nvSpPr>
-            <p:cNvPr id="25" name="Rectangle 24"/>
+            <p:cNvPr id="107" name="Rectangle 106"/>
             <p:cNvSpPr/>
             <p:nvPr/>
           </p:nvSpPr>
           <p:spPr>
             <a:xfrm>
               <a:off x="-228600" y="1524000"/>
-              <a:ext cx="1371600" cy="384561"/>
+              <a:ext cx="1371600" cy="353939"/>
             </a:xfrm>
             <a:prstGeom prst="rect">
               <a:avLst/>
@@ -3967,7 +4400,7 @@
         </p:sp>
         <p:sp>
           <p:nvSpPr>
-            <p:cNvPr id="26" name="Rectangle 25"/>
+            <p:cNvPr id="108" name="Rectangle 107"/>
             <p:cNvSpPr/>
             <p:nvPr/>
           </p:nvSpPr>
@@ -4022,16 +4455,16 @@
       </p:grpSp>
       <p:grpSp>
         <p:nvGrpSpPr>
-          <p:cNvPr id="30" name="Group 29"/>
+          <p:cNvPr id="109" name="Group 108"/>
           <p:cNvGrpSpPr/>
           <p:nvPr/>
         </p:nvGrpSpPr>
         <p:grpSpPr>
           <a:xfrm>
-            <a:off x="762000" y="4998578"/>
-            <a:ext cx="1371600" cy="602833"/>
-            <a:chOff x="-228600" y="1371600"/>
-            <a:chExt cx="1371600" cy="602833"/>
+            <a:off x="1196181" y="254950"/>
+            <a:ext cx="1676400" cy="507050"/>
+            <a:chOff x="-533400" y="1371600"/>
+            <a:chExt cx="1676400" cy="507050"/>
           </a:xfrm>
           <a:solidFill>
             <a:schemeClr val="bg1"/>
@@ -4039,297 +4472,14 @@
         </p:grpSpPr>
         <p:sp>
           <p:nvSpPr>
-            <p:cNvPr id="31" name="Rectangle 30"/>
+            <p:cNvPr id="110" name="Rectangle 109"/>
             <p:cNvSpPr/>
             <p:nvPr/>
           </p:nvSpPr>
           <p:spPr>
             <a:xfrm>
-              <a:off x="-228600" y="1524000"/>
-              <a:ext cx="1371600" cy="450433"/>
-            </a:xfrm>
-            <a:prstGeom prst="rect">
-              <a:avLst/>
-            </a:prstGeom>
-            <a:grpFill/>
-            <a:ln>
-              <a:solidFill>
-                <a:schemeClr val="accent2">
-                  <a:lumMod val="75000"/>
-                </a:schemeClr>
-              </a:solidFill>
-            </a:ln>
-          </p:spPr>
-          <p:style>
-            <a:lnRef idx="2">
-              <a:schemeClr val="accent1">
-                <a:shade val="50000"/>
-              </a:schemeClr>
-            </a:lnRef>
-            <a:fillRef idx="1">
-              <a:schemeClr val="accent1"/>
-            </a:fillRef>
-            <a:effectRef idx="0">
-              <a:schemeClr val="accent1"/>
-            </a:effectRef>
-            <a:fontRef idx="minor">
-              <a:schemeClr val="lt1"/>
-            </a:fontRef>
-          </p:style>
-          <p:txBody>
-            <a:bodyPr rtlCol="0" anchor="ctr"/>
-            <a:lstStyle/>
-            <a:p>
-              <a:pPr algn="ctr"/>
-              <a:r>
-                <a:rPr lang="en-US" sz="1400" b="1" dirty="0" smtClean="0">
-                  <a:solidFill>
-                    <a:schemeClr val="accent2">
-                      <a:lumMod val="75000"/>
-                    </a:schemeClr>
-                  </a:solidFill>
-                </a:rPr>
-                <a:t>test::cases</a:t>
-              </a:r>
-              <a:endParaRPr lang="en-SG" sz="1400" b="1" dirty="0">
-                <a:solidFill>
-                  <a:schemeClr val="accent2">
-                    <a:lumMod val="75000"/>
-                  </a:schemeClr>
-                </a:solidFill>
-              </a:endParaRPr>
-            </a:p>
-          </p:txBody>
-        </p:sp>
-        <p:sp>
-          <p:nvSpPr>
-            <p:cNvPr id="32" name="Rectangle 31"/>
-            <p:cNvSpPr/>
-            <p:nvPr/>
-          </p:nvSpPr>
-          <p:spPr>
-            <a:xfrm>
-              <a:off x="647700" y="1371600"/>
-              <a:ext cx="495300" cy="152400"/>
-            </a:xfrm>
-            <a:prstGeom prst="rect">
-              <a:avLst/>
-            </a:prstGeom>
-            <a:grpFill/>
-            <a:ln>
-              <a:solidFill>
-                <a:schemeClr val="accent2">
-                  <a:lumMod val="75000"/>
-                </a:schemeClr>
-              </a:solidFill>
-            </a:ln>
-          </p:spPr>
-          <p:style>
-            <a:lnRef idx="2">
-              <a:schemeClr val="accent1">
-                <a:shade val="50000"/>
-              </a:schemeClr>
-            </a:lnRef>
-            <a:fillRef idx="1">
-              <a:schemeClr val="accent1"/>
-            </a:fillRef>
-            <a:effectRef idx="0">
-              <a:schemeClr val="accent1"/>
-            </a:effectRef>
-            <a:fontRef idx="minor">
-              <a:schemeClr val="lt1"/>
-            </a:fontRef>
-          </p:style>
-          <p:txBody>
-            <a:bodyPr rtlCol="0" anchor="ctr"/>
-            <a:lstStyle/>
-            <a:p>
-              <a:pPr algn="ctr"/>
-              <a:endParaRPr lang="en-SG" sz="1400" b="1">
-                <a:solidFill>
-                  <a:schemeClr val="accent2">
-                    <a:lumMod val="75000"/>
-                  </a:schemeClr>
-                </a:solidFill>
-              </a:endParaRPr>
-            </a:p>
-          </p:txBody>
-        </p:sp>
-      </p:grpSp>
-      <p:grpSp>
-        <p:nvGrpSpPr>
-          <p:cNvPr id="33" name="Group 32"/>
-          <p:cNvGrpSpPr/>
-          <p:nvPr/>
-        </p:nvGrpSpPr>
-        <p:grpSpPr>
-          <a:xfrm>
-            <a:off x="6705600" y="430849"/>
-            <a:ext cx="1371600" cy="762000"/>
-            <a:chOff x="-228600" y="1371600"/>
-            <a:chExt cx="1371600" cy="762000"/>
-          </a:xfrm>
-          <a:solidFill>
-            <a:schemeClr val="bg1"/>
-          </a:solidFill>
-        </p:grpSpPr>
-        <p:sp>
-          <p:nvSpPr>
-            <p:cNvPr id="34" name="Rectangle 33"/>
-            <p:cNvSpPr/>
-            <p:nvPr/>
-          </p:nvSpPr>
-          <p:spPr>
-            <a:xfrm>
-              <a:off x="-228600" y="1524000"/>
-              <a:ext cx="1371600" cy="609600"/>
-            </a:xfrm>
-            <a:prstGeom prst="rect">
-              <a:avLst/>
-            </a:prstGeom>
-            <a:grpFill/>
-            <a:ln>
-              <a:solidFill>
-                <a:schemeClr val="accent5"/>
-              </a:solidFill>
-            </a:ln>
-          </p:spPr>
-          <p:style>
-            <a:lnRef idx="2">
-              <a:schemeClr val="accent1">
-                <a:shade val="50000"/>
-              </a:schemeClr>
-            </a:lnRef>
-            <a:fillRef idx="1">
-              <a:schemeClr val="accent1"/>
-            </a:fillRef>
-            <a:effectRef idx="0">
-              <a:schemeClr val="accent1"/>
-            </a:effectRef>
-            <a:fontRef idx="minor">
-              <a:schemeClr val="lt1"/>
-            </a:fontRef>
-          </p:style>
-          <p:txBody>
-            <a:bodyPr rtlCol="0" anchor="ctr"/>
-            <a:lstStyle/>
-            <a:p>
-              <a:r>
-                <a:rPr lang="en-US" sz="1400" b="1" dirty="0" smtClean="0">
-                  <a:solidFill>
-                    <a:schemeClr val="accent5"/>
-                  </a:solidFill>
-                </a:rPr>
-                <a:t>common</a:t>
-              </a:r>
-              <a:br>
-                <a:rPr lang="en-US" sz="1400" b="1" dirty="0" smtClean="0">
-                  <a:solidFill>
-                    <a:schemeClr val="accent5"/>
-                  </a:solidFill>
-                </a:rPr>
-              </a:br>
-              <a:r>
-                <a:rPr lang="en-US" sz="1400" b="1" dirty="0" smtClean="0">
-                  <a:solidFill>
-                    <a:schemeClr val="accent5"/>
-                  </a:solidFill>
-                </a:rPr>
-                <a:t>    ::</a:t>
-              </a:r>
-              <a:r>
-                <a:rPr lang="en-US" sz="1400" b="1" dirty="0" err="1" smtClean="0">
-                  <a:solidFill>
-                    <a:schemeClr val="accent5"/>
-                  </a:solidFill>
-                </a:rPr>
-                <a:t>datatransfer</a:t>
-              </a:r>
-              <a:endParaRPr lang="en-SG" sz="1400" b="1" dirty="0">
-                <a:solidFill>
-                  <a:schemeClr val="accent5"/>
-                </a:solidFill>
-              </a:endParaRPr>
-            </a:p>
-          </p:txBody>
-        </p:sp>
-        <p:sp>
-          <p:nvSpPr>
-            <p:cNvPr id="35" name="Rectangle 34"/>
-            <p:cNvSpPr/>
-            <p:nvPr/>
-          </p:nvSpPr>
-          <p:spPr>
-            <a:xfrm>
-              <a:off x="647700" y="1371600"/>
-              <a:ext cx="495300" cy="152400"/>
-            </a:xfrm>
-            <a:prstGeom prst="rect">
-              <a:avLst/>
-            </a:prstGeom>
-            <a:grpFill/>
-            <a:ln>
-              <a:solidFill>
-                <a:schemeClr val="accent5"/>
-              </a:solidFill>
-            </a:ln>
-          </p:spPr>
-          <p:style>
-            <a:lnRef idx="2">
-              <a:schemeClr val="accent1">
-                <a:shade val="50000"/>
-              </a:schemeClr>
-            </a:lnRef>
-            <a:fillRef idx="1">
-              <a:schemeClr val="accent1"/>
-            </a:fillRef>
-            <a:effectRef idx="0">
-              <a:schemeClr val="accent1"/>
-            </a:effectRef>
-            <a:fontRef idx="minor">
-              <a:schemeClr val="lt1"/>
-            </a:fontRef>
-          </p:style>
-          <p:txBody>
-            <a:bodyPr rtlCol="0" anchor="ctr"/>
-            <a:lstStyle/>
-            <a:p>
-              <a:endParaRPr lang="en-SG" sz="1400" b="1">
-                <a:solidFill>
-                  <a:schemeClr val="accent5"/>
-                </a:solidFill>
-              </a:endParaRPr>
-            </a:p>
-          </p:txBody>
-        </p:sp>
-      </p:grpSp>
-      <p:grpSp>
-        <p:nvGrpSpPr>
-          <p:cNvPr id="36" name="Group 35"/>
-          <p:cNvGrpSpPr/>
-          <p:nvPr/>
-        </p:nvGrpSpPr>
-        <p:grpSpPr>
-          <a:xfrm>
-            <a:off x="1981200" y="380999"/>
-            <a:ext cx="1371600" cy="762000"/>
-            <a:chOff x="-228600" y="1371600"/>
-            <a:chExt cx="1371600" cy="762000"/>
-          </a:xfrm>
-          <a:solidFill>
-            <a:schemeClr val="bg1"/>
-          </a:solidFill>
-        </p:grpSpPr>
-        <p:sp>
-          <p:nvSpPr>
-            <p:cNvPr id="37" name="Rectangle 36"/>
-            <p:cNvSpPr/>
-            <p:nvPr/>
-          </p:nvSpPr>
-          <p:spPr>
-            <a:xfrm>
-              <a:off x="-228600" y="1524000"/>
-              <a:ext cx="1371600" cy="609600"/>
+              <a:off x="-533400" y="1524000"/>
+              <a:ext cx="1676400" cy="354650"/>
             </a:xfrm>
             <a:prstGeom prst="rect">
               <a:avLst/>
@@ -4380,7 +4530,7 @@
         </p:sp>
         <p:sp>
           <p:nvSpPr>
-            <p:cNvPr id="38" name="Rectangle 37"/>
+            <p:cNvPr id="111" name="Rectangle 110"/>
             <p:cNvSpPr/>
             <p:nvPr/>
           </p:nvSpPr>
@@ -4431,13 +4581,13 @@
       </p:grpSp>
       <p:cxnSp>
         <p:nvCxnSpPr>
-          <p:cNvPr id="40" name="Straight Arrow Connector 39"/>
+          <p:cNvPr id="112" name="Straight Arrow Connector 111"/>
           <p:cNvCxnSpPr/>
           <p:nvPr/>
         </p:nvCxnSpPr>
         <p:spPr>
           <a:xfrm>
-            <a:off x="6096000" y="4495800"/>
+            <a:off x="5844381" y="3962400"/>
             <a:ext cx="762000" cy="0"/>
           </a:xfrm>
           <a:prstGeom prst="straightConnector1">
@@ -4448,7 +4598,8 @@
               <a:srgbClr val="7030A0"/>
             </a:solidFill>
             <a:prstDash val="sysDot"/>
-            <a:tailEnd type="arrow"/>
+            <a:headEnd type="none" w="med" len="med"/>
+            <a:tailEnd type="triangle" w="med" len="med"/>
           </a:ln>
         </p:spPr>
         <p:style>
@@ -4468,13 +4619,13 @@
       </p:cxnSp>
       <p:cxnSp>
         <p:nvCxnSpPr>
-          <p:cNvPr id="44" name="Straight Arrow Connector 43"/>
+          <p:cNvPr id="113" name="Straight Arrow Connector 112"/>
           <p:cNvCxnSpPr/>
           <p:nvPr/>
         </p:nvCxnSpPr>
         <p:spPr>
           <a:xfrm>
-            <a:off x="2514600" y="5105400"/>
+            <a:off x="2262981" y="4572000"/>
             <a:ext cx="1752600" cy="0"/>
           </a:xfrm>
           <a:prstGeom prst="straightConnector1">
@@ -4487,7 +4638,8 @@
               </a:schemeClr>
             </a:solidFill>
             <a:prstDash val="sysDot"/>
-            <a:tailEnd type="arrow"/>
+            <a:headEnd type="none" w="med" len="med"/>
+            <a:tailEnd type="triangle" w="med" len="med"/>
           </a:ln>
         </p:spPr>
         <p:style>
@@ -4507,13 +4659,13 @@
       </p:cxnSp>
       <p:cxnSp>
         <p:nvCxnSpPr>
-          <p:cNvPr id="49" name="Straight Arrow Connector 48"/>
+          <p:cNvPr id="114" name="Straight Arrow Connector 113"/>
           <p:cNvCxnSpPr/>
           <p:nvPr/>
         </p:nvCxnSpPr>
         <p:spPr>
           <a:xfrm flipV="1">
-            <a:off x="7620000" y="3276600"/>
+            <a:off x="7368381" y="2743200"/>
             <a:ext cx="0" cy="834640"/>
           </a:xfrm>
           <a:prstGeom prst="straightConnector1">
@@ -4524,7 +4676,8 @@
               <a:srgbClr val="00B050"/>
             </a:solidFill>
             <a:prstDash val="sysDot"/>
-            <a:tailEnd type="arrow"/>
+            <a:headEnd type="none" w="med" len="med"/>
+            <a:tailEnd type="triangle" w="med" len="med"/>
           </a:ln>
         </p:spPr>
         <p:style>
@@ -4544,13 +4697,13 @@
       </p:cxnSp>
       <p:cxnSp>
         <p:nvCxnSpPr>
-          <p:cNvPr id="52" name="Straight Arrow Connector 51"/>
+          <p:cNvPr id="115" name="Straight Arrow Connector 114"/>
           <p:cNvCxnSpPr/>
           <p:nvPr/>
         </p:nvCxnSpPr>
         <p:spPr>
           <a:xfrm>
-            <a:off x="2057400" y="1441391"/>
+            <a:off x="1805781" y="907991"/>
             <a:ext cx="0" cy="457198"/>
           </a:xfrm>
           <a:prstGeom prst="straightConnector1">
@@ -4561,7 +4714,7 @@
               <a:schemeClr val="accent1"/>
             </a:solidFill>
             <a:prstDash val="sysDot"/>
-            <a:headEnd type="arrow" w="med" len="med"/>
+            <a:headEnd type="triangle" w="med" len="med"/>
             <a:tailEnd type="none" w="med" len="med"/>
           </a:ln>
         </p:spPr>
@@ -4582,13 +4735,13 @@
       </p:cxnSp>
       <p:cxnSp>
         <p:nvCxnSpPr>
-          <p:cNvPr id="54" name="Straight Arrow Connector 53"/>
+          <p:cNvPr id="116" name="Straight Arrow Connector 115"/>
           <p:cNvCxnSpPr/>
           <p:nvPr/>
         </p:nvCxnSpPr>
         <p:spPr>
           <a:xfrm>
-            <a:off x="4876800" y="1443528"/>
+            <a:off x="4625181" y="910128"/>
             <a:ext cx="0" cy="457198"/>
           </a:xfrm>
           <a:prstGeom prst="straightConnector1">
@@ -4599,7 +4752,7 @@
               <a:srgbClr val="7030A0"/>
             </a:solidFill>
             <a:prstDash val="sysDot"/>
-            <a:headEnd type="arrow" w="med" len="med"/>
+            <a:headEnd type="triangle" w="med" len="med"/>
             <a:tailEnd type="none" w="med" len="med"/>
           </a:ln>
         </p:spPr>
@@ -4620,13 +4773,13 @@
       </p:cxnSp>
       <p:cxnSp>
         <p:nvCxnSpPr>
-          <p:cNvPr id="55" name="Straight Arrow Connector 54"/>
+          <p:cNvPr id="117" name="Straight Arrow Connector 116"/>
           <p:cNvCxnSpPr/>
           <p:nvPr/>
         </p:nvCxnSpPr>
         <p:spPr>
           <a:xfrm>
-            <a:off x="7620000" y="1192849"/>
+            <a:off x="7368381" y="659449"/>
             <a:ext cx="0" cy="1460975"/>
           </a:xfrm>
           <a:prstGeom prst="straightConnector1">
@@ -4638,7 +4791,7 @@
             </a:solidFill>
             <a:prstDash val="sysDot"/>
             <a:headEnd type="none" w="med" len="med"/>
-            <a:tailEnd type="arrow" w="med" len="med"/>
+            <a:tailEnd type="triangle" w="med" len="med"/>
           </a:ln>
         </p:spPr>
         <p:style>
@@ -4658,13 +4811,13 @@
       </p:cxnSp>
       <p:cxnSp>
         <p:nvCxnSpPr>
-          <p:cNvPr id="56" name="Straight Arrow Connector 55"/>
+          <p:cNvPr id="118" name="Straight Arrow Connector 117"/>
           <p:cNvCxnSpPr/>
           <p:nvPr/>
         </p:nvCxnSpPr>
         <p:spPr>
           <a:xfrm>
-            <a:off x="750962" y="1447802"/>
+            <a:off x="499343" y="914402"/>
             <a:ext cx="11038" cy="3200398"/>
           </a:xfrm>
           <a:prstGeom prst="straightConnector1">
@@ -4677,7 +4830,7 @@
               </a:schemeClr>
             </a:solidFill>
             <a:prstDash val="sysDot"/>
-            <a:headEnd type="arrow" w="med" len="med"/>
+            <a:headEnd type="triangle" w="med" len="med"/>
             <a:tailEnd type="none" w="med" len="med"/>
           </a:ln>
         </p:spPr>
@@ -4698,13 +4851,13 @@
       </p:cxnSp>
       <p:cxnSp>
         <p:nvCxnSpPr>
-          <p:cNvPr id="59" name="Straight Arrow Connector 58"/>
+          <p:cNvPr id="119" name="Straight Arrow Connector 118"/>
           <p:cNvCxnSpPr/>
           <p:nvPr/>
         </p:nvCxnSpPr>
         <p:spPr>
           <a:xfrm>
-            <a:off x="4876800" y="3124200"/>
+            <a:off x="4625181" y="2590800"/>
             <a:ext cx="0" cy="457200"/>
           </a:xfrm>
           <a:prstGeom prst="straightConnector1">
@@ -4715,7 +4868,7 @@
               <a:srgbClr val="7030A0"/>
             </a:solidFill>
             <a:prstDash val="sysDot"/>
-            <a:headEnd type="arrow" w="med" len="med"/>
+            <a:headEnd type="triangle" w="med" len="med"/>
             <a:tailEnd type="none" w="med" len="med"/>
           </a:ln>
         </p:spPr>
@@ -4736,13 +4889,13 @@
       </p:cxnSp>
       <p:cxnSp>
         <p:nvCxnSpPr>
-          <p:cNvPr id="63" name="Straight Arrow Connector 62"/>
+          <p:cNvPr id="120" name="Straight Arrow Connector 119"/>
           <p:cNvCxnSpPr/>
           <p:nvPr/>
         </p:nvCxnSpPr>
         <p:spPr>
           <a:xfrm>
-            <a:off x="1219200" y="5638800"/>
+            <a:off x="967581" y="4755022"/>
             <a:ext cx="0" cy="379221"/>
           </a:xfrm>
           <a:prstGeom prst="straightConnector1">
@@ -4756,7 +4909,7 @@
             </a:solidFill>
             <a:prstDash val="sysDot"/>
             <a:headEnd type="none" w="med" len="med"/>
-            <a:tailEnd type="arrow" w="med" len="med"/>
+            <a:tailEnd type="triangle" w="med" len="med"/>
           </a:ln>
         </p:spPr>
         <p:style>
@@ -4776,13 +4929,13 @@
       </p:cxnSp>
       <p:grpSp>
         <p:nvGrpSpPr>
-          <p:cNvPr id="69" name="Group 68"/>
+          <p:cNvPr id="121" name="Group 120"/>
           <p:cNvGrpSpPr/>
           <p:nvPr/>
         </p:nvGrpSpPr>
         <p:grpSpPr>
           <a:xfrm>
-            <a:off x="4267200" y="4648200"/>
+            <a:off x="4015581" y="4114800"/>
             <a:ext cx="1371600" cy="762000"/>
             <a:chOff x="-228600" y="1371600"/>
             <a:chExt cx="1371600" cy="762000"/>
@@ -4793,7 +4946,7 @@
         </p:grpSpPr>
         <p:sp>
           <p:nvSpPr>
-            <p:cNvPr id="70" name="Rectangle 69"/>
+            <p:cNvPr id="122" name="Rectangle 121"/>
             <p:cNvSpPr/>
             <p:nvPr/>
           </p:nvSpPr>
@@ -4851,7 +5004,7 @@
         </p:sp>
         <p:sp>
           <p:nvSpPr>
-            <p:cNvPr id="71" name="Rectangle 70"/>
+            <p:cNvPr id="123" name="Rectangle 122"/>
             <p:cNvSpPr/>
             <p:nvPr/>
           </p:nvSpPr>
@@ -4902,13 +5055,13 @@
       </p:grpSp>
       <p:cxnSp>
         <p:nvCxnSpPr>
-          <p:cNvPr id="72" name="Straight Arrow Connector 71"/>
+          <p:cNvPr id="124" name="Straight Arrow Connector 123"/>
           <p:cNvCxnSpPr/>
           <p:nvPr/>
         </p:nvCxnSpPr>
         <p:spPr>
           <a:xfrm>
-            <a:off x="4876800" y="4191000"/>
+            <a:off x="4625181" y="3657600"/>
             <a:ext cx="0" cy="609600"/>
           </a:xfrm>
           <a:prstGeom prst="straightConnector1">
@@ -4919,7 +5072,7 @@
               <a:srgbClr val="7030A0"/>
             </a:solidFill>
             <a:prstDash val="sysDot"/>
-            <a:headEnd type="arrow" w="med" len="med"/>
+            <a:headEnd type="triangle" w="med" len="med"/>
             <a:tailEnd type="none" w="med" len="med"/>
           </a:ln>
         </p:spPr>
@@ -4940,13 +5093,13 @@
       </p:cxnSp>
       <p:cxnSp>
         <p:nvCxnSpPr>
-          <p:cNvPr id="75" name="Straight Arrow Connector 74"/>
+          <p:cNvPr id="125" name="Straight Arrow Connector 124"/>
           <p:cNvCxnSpPr/>
           <p:nvPr/>
         </p:nvCxnSpPr>
         <p:spPr>
           <a:xfrm flipV="1">
-            <a:off x="7010400" y="1443528"/>
+            <a:off x="6758781" y="910128"/>
             <a:ext cx="0" cy="462186"/>
           </a:xfrm>
           <a:prstGeom prst="straightConnector1">
@@ -4958,7 +5111,7 @@
             </a:solidFill>
             <a:prstDash val="sysDot"/>
             <a:headEnd type="none" w="med" len="med"/>
-            <a:tailEnd type="arrow" w="med" len="med"/>
+            <a:tailEnd type="triangle" w="med" len="med"/>
           </a:ln>
         </p:spPr>
         <p:style>
@@ -4978,13 +5131,13 @@
       </p:cxnSp>
       <p:grpSp>
         <p:nvGrpSpPr>
-          <p:cNvPr id="12" name="Group 11"/>
+          <p:cNvPr id="126" name="Group 125"/>
           <p:cNvGrpSpPr/>
           <p:nvPr/>
         </p:nvGrpSpPr>
         <p:grpSpPr>
           <a:xfrm>
-            <a:off x="4267200" y="3429000"/>
+            <a:off x="4015581" y="2895600"/>
             <a:ext cx="1371600" cy="762000"/>
             <a:chOff x="-228600" y="1371600"/>
             <a:chExt cx="1371600" cy="762000"/>
@@ -4995,7 +5148,7 @@
         </p:grpSpPr>
         <p:sp>
           <p:nvSpPr>
-            <p:cNvPr id="13" name="Rectangle 12"/>
+            <p:cNvPr id="127" name="Rectangle 126"/>
             <p:cNvSpPr/>
             <p:nvPr/>
           </p:nvSpPr>
@@ -5061,7 +5214,7 @@
         </p:sp>
         <p:sp>
           <p:nvSpPr>
-            <p:cNvPr id="14" name="Rectangle 13"/>
+            <p:cNvPr id="128" name="Rectangle 127"/>
             <p:cNvSpPr/>
             <p:nvPr/>
           </p:nvSpPr>
@@ -5112,13 +5265,13 @@
       </p:grpSp>
       <p:grpSp>
         <p:nvGrpSpPr>
-          <p:cNvPr id="57" name="Group 56"/>
+          <p:cNvPr id="129" name="Group 128"/>
           <p:cNvGrpSpPr/>
           <p:nvPr/>
         </p:nvGrpSpPr>
         <p:grpSpPr>
           <a:xfrm>
-            <a:off x="4191000" y="5867400"/>
+            <a:off x="3939381" y="5334000"/>
             <a:ext cx="1447800" cy="762000"/>
             <a:chOff x="-304800" y="1371600"/>
             <a:chExt cx="1447800" cy="762000"/>
@@ -5129,7 +5282,7 @@
         </p:grpSpPr>
         <p:sp>
           <p:nvSpPr>
-            <p:cNvPr id="58" name="Rectangle 57"/>
+            <p:cNvPr id="130" name="Rectangle 129"/>
             <p:cNvSpPr/>
             <p:nvPr/>
           </p:nvSpPr>
@@ -5187,7 +5340,7 @@
         </p:sp>
         <p:sp>
           <p:nvSpPr>
-            <p:cNvPr id="60" name="Rectangle 59"/>
+            <p:cNvPr id="131" name="Rectangle 130"/>
             <p:cNvSpPr/>
             <p:nvPr/>
           </p:nvSpPr>
@@ -5238,13 +5391,13 @@
       </p:grpSp>
       <p:cxnSp>
         <p:nvCxnSpPr>
-          <p:cNvPr id="62" name="Straight Arrow Connector 61"/>
+          <p:cNvPr id="132" name="Straight Arrow Connector 131"/>
           <p:cNvCxnSpPr/>
           <p:nvPr/>
         </p:nvCxnSpPr>
         <p:spPr>
           <a:xfrm>
-            <a:off x="4876800" y="5410200"/>
+            <a:off x="4625181" y="4876800"/>
             <a:ext cx="0" cy="609600"/>
           </a:xfrm>
           <a:prstGeom prst="straightConnector1">
@@ -5255,7 +5408,7 @@
               <a:srgbClr val="7030A0"/>
             </a:solidFill>
             <a:prstDash val="sysDot"/>
-            <a:headEnd type="arrow" w="med" len="med"/>
+            <a:headEnd type="triangle" w="med" len="med"/>
             <a:tailEnd type="none" w="med" len="med"/>
           </a:ln>
         </p:spPr>
@@ -5276,15 +5429,15 @@
       </p:cxnSp>
       <p:cxnSp>
         <p:nvCxnSpPr>
-          <p:cNvPr id="41" name="Elbow Connector 40"/>
+          <p:cNvPr id="133" name="Elbow Connector 132"/>
           <p:cNvCxnSpPr>
-            <a:endCxn id="16" idx="3"/>
+            <a:endCxn id="98" idx="3"/>
           </p:cNvCxnSpPr>
           <p:nvPr/>
         </p:nvCxnSpPr>
         <p:spPr>
           <a:xfrm rot="5400000" flipH="1" flipV="1">
-            <a:off x="4419600" y="3276600"/>
+            <a:off x="4167981" y="2743200"/>
             <a:ext cx="1676400" cy="762000"/>
           </a:xfrm>
           <a:prstGeom prst="bentConnector4">
@@ -5299,7 +5452,7 @@
             </a:solidFill>
             <a:prstDash val="sysDot"/>
             <a:headEnd type="none" w="med" len="med"/>
-            <a:tailEnd type="arrow" w="med" len="med"/>
+            <a:tailEnd type="triangle" w="med" len="med"/>
           </a:ln>
         </p:spPr>
         <p:style>
@@ -5319,15 +5472,15 @@
       </p:cxnSp>
       <p:cxnSp>
         <p:nvCxnSpPr>
-          <p:cNvPr id="64" name="Straight Arrow Connector 63"/>
+          <p:cNvPr id="134" name="Straight Arrow Connector 133"/>
           <p:cNvCxnSpPr>
-            <a:stCxn id="13" idx="1"/>
+            <a:stCxn id="127" idx="1"/>
           </p:cNvCxnSpPr>
           <p:nvPr/>
         </p:nvCxnSpPr>
         <p:spPr>
           <a:xfrm flipH="1">
-            <a:off x="2819400" y="3886200"/>
+            <a:off x="2567781" y="3352800"/>
             <a:ext cx="1447800" cy="0"/>
           </a:xfrm>
           <a:prstGeom prst="straightConnector1">
@@ -5338,7 +5491,7 @@
               <a:schemeClr val="accent1"/>
             </a:solidFill>
             <a:prstDash val="sysDot"/>
-            <a:headEnd type="arrow" w="med" len="med"/>
+            <a:headEnd type="triangle" w="med" len="med"/>
             <a:tailEnd type="none" w="med" len="med"/>
           </a:ln>
         </p:spPr>
@@ -5359,16 +5512,16 @@
       </p:cxnSp>
       <p:grpSp>
         <p:nvGrpSpPr>
-          <p:cNvPr id="73" name="Group 72"/>
+          <p:cNvPr id="135" name="Group 134"/>
           <p:cNvGrpSpPr/>
           <p:nvPr/>
         </p:nvGrpSpPr>
         <p:grpSpPr>
           <a:xfrm>
-            <a:off x="4343400" y="380999"/>
-            <a:ext cx="1371600" cy="762000"/>
-            <a:chOff x="-228600" y="1371600"/>
-            <a:chExt cx="1371600" cy="762000"/>
+            <a:off x="3786981" y="254950"/>
+            <a:ext cx="1676400" cy="507050"/>
+            <a:chOff x="-533400" y="1371600"/>
+            <a:chExt cx="1676400" cy="507050"/>
           </a:xfrm>
           <a:solidFill>
             <a:schemeClr val="bg1"/>
@@ -5376,14 +5529,14 @@
         </p:grpSpPr>
         <p:sp>
           <p:nvSpPr>
-            <p:cNvPr id="74" name="Rectangle 73"/>
+            <p:cNvPr id="136" name="Rectangle 135"/>
             <p:cNvSpPr/>
             <p:nvPr/>
           </p:nvSpPr>
           <p:spPr>
             <a:xfrm>
-              <a:off x="-228600" y="1524000"/>
-              <a:ext cx="1371600" cy="609600"/>
+              <a:off x="-533400" y="1524000"/>
+              <a:ext cx="1676400" cy="354650"/>
             </a:xfrm>
             <a:prstGeom prst="rect">
               <a:avLst/>
@@ -5421,22 +5574,15 @@
                     <a:schemeClr val="accent5"/>
                   </a:solidFill>
                 </a:rPr>
-                <a:t>common</a:t>
+                <a:t>common::</a:t>
               </a:r>
-              <a:br>
-                <a:rPr lang="en-US" sz="1400" b="1" dirty="0" smtClean="0">
-                  <a:solidFill>
-                    <a:schemeClr val="accent5"/>
-                  </a:solidFill>
-                </a:rPr>
-              </a:br>
               <a:r>
                 <a:rPr lang="en-US" sz="1400" b="1" dirty="0" smtClean="0">
                   <a:solidFill>
                     <a:schemeClr val="accent5"/>
                   </a:solidFill>
                 </a:rPr>
-                <a:t>    ::exception</a:t>
+                <a:t>exception</a:t>
               </a:r>
               <a:endParaRPr lang="en-SG" sz="1400" b="1" dirty="0">
                 <a:solidFill>
@@ -5448,7 +5594,7 @@
         </p:sp>
         <p:sp>
           <p:nvSpPr>
-            <p:cNvPr id="76" name="Rectangle 75"/>
+            <p:cNvPr id="137" name="Rectangle 136"/>
             <p:cNvSpPr/>
             <p:nvPr/>
           </p:nvSpPr>
@@ -5498,13 +5644,13 @@
       </p:grpSp>
       <p:grpSp>
         <p:nvGrpSpPr>
-          <p:cNvPr id="77" name="Group 76"/>
+          <p:cNvPr id="138" name="Group 137"/>
           <p:cNvGrpSpPr/>
           <p:nvPr/>
         </p:nvGrpSpPr>
         <p:grpSpPr>
           <a:xfrm>
-            <a:off x="6781800" y="5422306"/>
+            <a:off x="6530181" y="4888906"/>
             <a:ext cx="1676400" cy="762000"/>
             <a:chOff x="-533400" y="1371600"/>
             <a:chExt cx="1676400" cy="762000"/>
@@ -5515,7 +5661,7 @@
         </p:grpSpPr>
         <p:sp>
           <p:nvSpPr>
-            <p:cNvPr id="78" name="Rectangle 77"/>
+            <p:cNvPr id="139" name="Rectangle 138"/>
             <p:cNvSpPr/>
             <p:nvPr/>
           </p:nvSpPr>
@@ -5589,7 +5735,7 @@
         </p:sp>
         <p:sp>
           <p:nvSpPr>
-            <p:cNvPr id="79" name="Rectangle 78"/>
+            <p:cNvPr id="140" name="Rectangle 139"/>
             <p:cNvSpPr/>
             <p:nvPr/>
           </p:nvSpPr>
@@ -5640,13 +5786,13 @@
       </p:grpSp>
       <p:cxnSp>
         <p:nvCxnSpPr>
-          <p:cNvPr id="80" name="Straight Arrow Connector 79"/>
+          <p:cNvPr id="141" name="Straight Arrow Connector 140"/>
           <p:cNvCxnSpPr/>
           <p:nvPr/>
         </p:nvCxnSpPr>
         <p:spPr>
           <a:xfrm>
-            <a:off x="7620000" y="4724400"/>
+            <a:off x="7368381" y="4191000"/>
             <a:ext cx="0" cy="841403"/>
           </a:xfrm>
           <a:prstGeom prst="straightConnector1">
@@ -5658,7 +5804,7 @@
             </a:solidFill>
             <a:prstDash val="sysDot"/>
             <a:headEnd type="none" w="med" len="med"/>
-            <a:tailEnd type="arrow" w="med" len="med"/>
+            <a:tailEnd type="triangle" w="med" len="med"/>
           </a:ln>
         </p:spPr>
         <p:style>
@@ -5678,13 +5824,13 @@
       </p:cxnSp>
       <p:grpSp>
         <p:nvGrpSpPr>
-          <p:cNvPr id="84" name="Group 83"/>
+          <p:cNvPr id="142" name="Group 141"/>
           <p:cNvGrpSpPr/>
           <p:nvPr/>
         </p:nvGrpSpPr>
         <p:grpSpPr>
           <a:xfrm>
-            <a:off x="1447800" y="2286000"/>
+            <a:off x="1196181" y="2362200"/>
             <a:ext cx="1371600" cy="609600"/>
             <a:chOff x="-228600" y="1371600"/>
             <a:chExt cx="1371600" cy="609600"/>
@@ -5695,7 +5841,7 @@
         </p:grpSpPr>
         <p:sp>
           <p:nvSpPr>
-            <p:cNvPr id="85" name="Rectangle 84"/>
+            <p:cNvPr id="143" name="Rectangle 142"/>
             <p:cNvSpPr/>
             <p:nvPr/>
           </p:nvSpPr>
@@ -5756,7 +5902,7 @@
         </p:sp>
         <p:sp>
           <p:nvSpPr>
-            <p:cNvPr id="86" name="Rectangle 85"/>
+            <p:cNvPr id="144" name="Rectangle 143"/>
             <p:cNvSpPr/>
             <p:nvPr/>
           </p:nvSpPr>
@@ -5802,14 +5948,14 @@
       </p:grpSp>
       <p:cxnSp>
         <p:nvCxnSpPr>
-          <p:cNvPr id="87" name="Straight Arrow Connector 86"/>
+          <p:cNvPr id="145" name="Straight Arrow Connector 144"/>
           <p:cNvCxnSpPr/>
           <p:nvPr/>
         </p:nvCxnSpPr>
         <p:spPr>
           <a:xfrm flipV="1">
-            <a:off x="2057400" y="2895600"/>
-            <a:ext cx="0" cy="762000"/>
+            <a:off x="1805781" y="2971800"/>
+            <a:ext cx="0" cy="304800"/>
           </a:xfrm>
           <a:prstGeom prst="straightConnector1">
             <a:avLst/>
@@ -5819,7 +5965,7 @@
               <a:schemeClr val="accent1"/>
             </a:solidFill>
             <a:prstDash val="sysDot"/>
-            <a:headEnd type="arrow" w="med" len="med"/>
+            <a:headEnd type="triangle" w="med" len="med"/>
             <a:tailEnd type="none" w="med" len="med"/>
           </a:ln>
         </p:spPr>
@@ -5838,6 +5984,592 @@
           </a:fontRef>
         </p:style>
       </p:cxnSp>
+      <p:grpSp>
+        <p:nvGrpSpPr>
+          <p:cNvPr id="146" name="Group 145"/>
+          <p:cNvGrpSpPr/>
+          <p:nvPr/>
+        </p:nvGrpSpPr>
+        <p:grpSpPr>
+          <a:xfrm>
+            <a:off x="1196181" y="1600200"/>
+            <a:ext cx="1371600" cy="609600"/>
+            <a:chOff x="-228600" y="1371600"/>
+            <a:chExt cx="1371600" cy="609600"/>
+          </a:xfrm>
+          <a:solidFill>
+            <a:schemeClr val="bg1"/>
+          </a:solidFill>
+        </p:grpSpPr>
+        <p:sp>
+          <p:nvSpPr>
+            <p:cNvPr id="147" name="Rectangle 146"/>
+            <p:cNvSpPr/>
+            <p:nvPr/>
+          </p:nvSpPr>
+          <p:spPr>
+            <a:xfrm>
+              <a:off x="-228600" y="1524000"/>
+              <a:ext cx="1371600" cy="457200"/>
+            </a:xfrm>
+            <a:prstGeom prst="rect">
+              <a:avLst/>
+            </a:prstGeom>
+            <a:grpFill/>
+          </p:spPr>
+          <p:style>
+            <a:lnRef idx="2">
+              <a:schemeClr val="accent1">
+                <a:shade val="50000"/>
+              </a:schemeClr>
+            </a:lnRef>
+            <a:fillRef idx="1">
+              <a:schemeClr val="accent1"/>
+            </a:fillRef>
+            <a:effectRef idx="0">
+              <a:schemeClr val="accent1"/>
+            </a:effectRef>
+            <a:fontRef idx="minor">
+              <a:schemeClr val="lt1"/>
+            </a:fontRef>
+          </p:style>
+          <p:txBody>
+            <a:bodyPr rtlCol="0" anchor="ctr"/>
+            <a:lstStyle/>
+            <a:p>
+              <a:pPr algn="ctr"/>
+              <a:r>
+                <a:rPr lang="en-US" sz="1400" b="1" dirty="0" err="1" smtClean="0">
+                  <a:solidFill>
+                    <a:schemeClr val="tx2"/>
+                  </a:solidFill>
+                </a:rPr>
+                <a:t>ui</a:t>
+              </a:r>
+              <a:r>
+                <a:rPr lang="en-US" sz="1400" b="1" dirty="0" smtClean="0">
+                  <a:solidFill>
+                    <a:schemeClr val="tx2"/>
+                  </a:solidFill>
+                </a:rPr>
+                <a:t>::</a:t>
+              </a:r>
+              <a:r>
+                <a:rPr lang="en-US" sz="1400" b="1" dirty="0" smtClean="0">
+                  <a:solidFill>
+                    <a:schemeClr val="tx2"/>
+                  </a:solidFill>
+                </a:rPr>
+                <a:t>website</a:t>
+              </a:r>
+              <a:endParaRPr lang="en-SG" sz="1400" b="1" dirty="0">
+                <a:solidFill>
+                  <a:schemeClr val="tx2"/>
+                </a:solidFill>
+              </a:endParaRPr>
+            </a:p>
+          </p:txBody>
+        </p:sp>
+        <p:sp>
+          <p:nvSpPr>
+            <p:cNvPr id="148" name="Rectangle 147"/>
+            <p:cNvSpPr/>
+            <p:nvPr/>
+          </p:nvSpPr>
+          <p:spPr>
+            <a:xfrm>
+              <a:off x="647700" y="1371600"/>
+              <a:ext cx="495300" cy="152400"/>
+            </a:xfrm>
+            <a:prstGeom prst="rect">
+              <a:avLst/>
+            </a:prstGeom>
+            <a:grpFill/>
+          </p:spPr>
+          <p:style>
+            <a:lnRef idx="2">
+              <a:schemeClr val="accent1">
+                <a:shade val="50000"/>
+              </a:schemeClr>
+            </a:lnRef>
+            <a:fillRef idx="1">
+              <a:schemeClr val="accent1"/>
+            </a:fillRef>
+            <a:effectRef idx="0">
+              <a:schemeClr val="accent1"/>
+            </a:effectRef>
+            <a:fontRef idx="minor">
+              <a:schemeClr val="lt1"/>
+            </a:fontRef>
+          </p:style>
+          <p:txBody>
+            <a:bodyPr rtlCol="0" anchor="ctr"/>
+            <a:lstStyle/>
+            <a:p>
+              <a:pPr algn="ctr"/>
+              <a:endParaRPr lang="en-SG" sz="1400" b="1">
+                <a:solidFill>
+                  <a:schemeClr val="tx2"/>
+                </a:solidFill>
+              </a:endParaRPr>
+            </a:p>
+          </p:txBody>
+        </p:sp>
+      </p:grpSp>
+      <p:grpSp>
+        <p:nvGrpSpPr>
+          <p:cNvPr id="149" name="Group 148"/>
+          <p:cNvGrpSpPr/>
+          <p:nvPr/>
+        </p:nvGrpSpPr>
+        <p:grpSpPr>
+          <a:xfrm>
+            <a:off x="510381" y="4343400"/>
+            <a:ext cx="1371600" cy="499929"/>
+            <a:chOff x="-228600" y="1371600"/>
+            <a:chExt cx="1371600" cy="499929"/>
+          </a:xfrm>
+          <a:solidFill>
+            <a:schemeClr val="bg1"/>
+          </a:solidFill>
+        </p:grpSpPr>
+        <p:sp>
+          <p:nvSpPr>
+            <p:cNvPr id="150" name="Rectangle 149"/>
+            <p:cNvSpPr/>
+            <p:nvPr/>
+          </p:nvSpPr>
+          <p:spPr>
+            <a:xfrm>
+              <a:off x="-228600" y="1524001"/>
+              <a:ext cx="1371600" cy="347528"/>
+            </a:xfrm>
+            <a:prstGeom prst="rect">
+              <a:avLst/>
+            </a:prstGeom>
+            <a:grpFill/>
+            <a:ln>
+              <a:solidFill>
+                <a:schemeClr val="accent2">
+                  <a:lumMod val="75000"/>
+                </a:schemeClr>
+              </a:solidFill>
+            </a:ln>
+          </p:spPr>
+          <p:style>
+            <a:lnRef idx="2">
+              <a:schemeClr val="accent1">
+                <a:shade val="50000"/>
+              </a:schemeClr>
+            </a:lnRef>
+            <a:fillRef idx="1">
+              <a:schemeClr val="accent1"/>
+            </a:fillRef>
+            <a:effectRef idx="0">
+              <a:schemeClr val="accent1"/>
+            </a:effectRef>
+            <a:fontRef idx="minor">
+              <a:schemeClr val="lt1"/>
+            </a:fontRef>
+          </p:style>
+          <p:txBody>
+            <a:bodyPr rtlCol="0" anchor="ctr"/>
+            <a:lstStyle/>
+            <a:p>
+              <a:pPr algn="ctr"/>
+              <a:r>
+                <a:rPr lang="en-US" sz="1400" b="1" dirty="0" smtClean="0">
+                  <a:solidFill>
+                    <a:schemeClr val="accent2">
+                      <a:lumMod val="75000"/>
+                    </a:schemeClr>
+                  </a:solidFill>
+                </a:rPr>
+                <a:t>test::cases</a:t>
+              </a:r>
+              <a:endParaRPr lang="en-SG" sz="1400" b="1" dirty="0">
+                <a:solidFill>
+                  <a:schemeClr val="accent2">
+                    <a:lumMod val="75000"/>
+                  </a:schemeClr>
+                </a:solidFill>
+              </a:endParaRPr>
+            </a:p>
+          </p:txBody>
+        </p:sp>
+        <p:sp>
+          <p:nvSpPr>
+            <p:cNvPr id="151" name="Rectangle 150"/>
+            <p:cNvSpPr/>
+            <p:nvPr/>
+          </p:nvSpPr>
+          <p:spPr>
+            <a:xfrm>
+              <a:off x="647700" y="1371600"/>
+              <a:ext cx="495300" cy="152400"/>
+            </a:xfrm>
+            <a:prstGeom prst="rect">
+              <a:avLst/>
+            </a:prstGeom>
+            <a:grpFill/>
+            <a:ln>
+              <a:solidFill>
+                <a:schemeClr val="accent2">
+                  <a:lumMod val="75000"/>
+                </a:schemeClr>
+              </a:solidFill>
+            </a:ln>
+          </p:spPr>
+          <p:style>
+            <a:lnRef idx="2">
+              <a:schemeClr val="accent1">
+                <a:shade val="50000"/>
+              </a:schemeClr>
+            </a:lnRef>
+            <a:fillRef idx="1">
+              <a:schemeClr val="accent1"/>
+            </a:fillRef>
+            <a:effectRef idx="0">
+              <a:schemeClr val="accent1"/>
+            </a:effectRef>
+            <a:fontRef idx="minor">
+              <a:schemeClr val="lt1"/>
+            </a:fontRef>
+          </p:style>
+          <p:txBody>
+            <a:bodyPr rtlCol="0" anchor="ctr"/>
+            <a:lstStyle/>
+            <a:p>
+              <a:pPr algn="ctr"/>
+              <a:endParaRPr lang="en-SG" sz="1400" b="1">
+                <a:solidFill>
+                  <a:schemeClr val="accent2">
+                    <a:lumMod val="75000"/>
+                  </a:schemeClr>
+                </a:solidFill>
+              </a:endParaRPr>
+            </a:p>
+          </p:txBody>
+        </p:sp>
+      </p:grpSp>
+      <p:grpSp>
+        <p:nvGrpSpPr>
+          <p:cNvPr id="152" name="Group 151"/>
+          <p:cNvGrpSpPr/>
+          <p:nvPr/>
+        </p:nvGrpSpPr>
+        <p:grpSpPr>
+          <a:xfrm>
+            <a:off x="510381" y="5589661"/>
+            <a:ext cx="1371600" cy="506339"/>
+            <a:chOff x="-228600" y="1371600"/>
+            <a:chExt cx="1371600" cy="506339"/>
+          </a:xfrm>
+          <a:solidFill>
+            <a:schemeClr val="bg1"/>
+          </a:solidFill>
+        </p:grpSpPr>
+        <p:sp>
+          <p:nvSpPr>
+            <p:cNvPr id="153" name="Rectangle 152"/>
+            <p:cNvSpPr/>
+            <p:nvPr/>
+          </p:nvSpPr>
+          <p:spPr>
+            <a:xfrm>
+              <a:off x="-228600" y="1524000"/>
+              <a:ext cx="1371600" cy="353939"/>
+            </a:xfrm>
+            <a:prstGeom prst="rect">
+              <a:avLst/>
+            </a:prstGeom>
+            <a:grpFill/>
+            <a:ln>
+              <a:solidFill>
+                <a:schemeClr val="accent2">
+                  <a:lumMod val="75000"/>
+                </a:schemeClr>
+              </a:solidFill>
+            </a:ln>
+          </p:spPr>
+          <p:style>
+            <a:lnRef idx="2">
+              <a:schemeClr val="accent1">
+                <a:shade val="50000"/>
+              </a:schemeClr>
+            </a:lnRef>
+            <a:fillRef idx="1">
+              <a:schemeClr val="accent1"/>
+            </a:fillRef>
+            <a:effectRef idx="0">
+              <a:schemeClr val="accent1"/>
+            </a:effectRef>
+            <a:fontRef idx="minor">
+              <a:schemeClr val="lt1"/>
+            </a:fontRef>
+          </p:style>
+          <p:txBody>
+            <a:bodyPr rtlCol="0" anchor="ctr"/>
+            <a:lstStyle/>
+            <a:p>
+              <a:pPr algn="ctr"/>
+              <a:r>
+                <a:rPr lang="en-US" sz="1400" b="1" dirty="0" smtClean="0">
+                  <a:solidFill>
+                    <a:schemeClr val="accent2">
+                      <a:lumMod val="75000"/>
+                    </a:schemeClr>
+                  </a:solidFill>
+                </a:rPr>
+                <a:t>test</a:t>
+              </a:r>
+              <a:r>
+                <a:rPr lang="en-US" sz="1400" b="1" dirty="0" smtClean="0">
+                  <a:solidFill>
+                    <a:schemeClr val="accent2">
+                      <a:lumMod val="75000"/>
+                    </a:schemeClr>
+                  </a:solidFill>
+                </a:rPr>
+                <a:t>::scripts</a:t>
+              </a:r>
+              <a:endParaRPr lang="en-SG" sz="1400" b="1" dirty="0">
+                <a:solidFill>
+                  <a:schemeClr val="accent2">
+                    <a:lumMod val="75000"/>
+                  </a:schemeClr>
+                </a:solidFill>
+              </a:endParaRPr>
+            </a:p>
+          </p:txBody>
+        </p:sp>
+        <p:sp>
+          <p:nvSpPr>
+            <p:cNvPr id="154" name="Rectangle 153"/>
+            <p:cNvSpPr/>
+            <p:nvPr/>
+          </p:nvSpPr>
+          <p:spPr>
+            <a:xfrm>
+              <a:off x="647700" y="1371600"/>
+              <a:ext cx="495300" cy="152400"/>
+            </a:xfrm>
+            <a:prstGeom prst="rect">
+              <a:avLst/>
+            </a:prstGeom>
+            <a:grpFill/>
+            <a:ln>
+              <a:solidFill>
+                <a:schemeClr val="accent2">
+                  <a:lumMod val="75000"/>
+                </a:schemeClr>
+              </a:solidFill>
+            </a:ln>
+          </p:spPr>
+          <p:style>
+            <a:lnRef idx="2">
+              <a:schemeClr val="accent1">
+                <a:shade val="50000"/>
+              </a:schemeClr>
+            </a:lnRef>
+            <a:fillRef idx="1">
+              <a:schemeClr val="accent1"/>
+            </a:fillRef>
+            <a:effectRef idx="0">
+              <a:schemeClr val="accent1"/>
+            </a:effectRef>
+            <a:fontRef idx="minor">
+              <a:schemeClr val="lt1"/>
+            </a:fontRef>
+          </p:style>
+          <p:txBody>
+            <a:bodyPr rtlCol="0" anchor="ctr"/>
+            <a:lstStyle/>
+            <a:p>
+              <a:pPr algn="ctr"/>
+              <a:endParaRPr lang="en-SG" sz="1400" b="1">
+                <a:solidFill>
+                  <a:schemeClr val="accent2">
+                    <a:lumMod val="75000"/>
+                  </a:schemeClr>
+                </a:solidFill>
+              </a:endParaRPr>
+            </a:p>
+          </p:txBody>
+        </p:sp>
+      </p:grpSp>
+      <p:cxnSp>
+        <p:nvCxnSpPr>
+          <p:cNvPr id="155" name="Straight Arrow Connector 154"/>
+          <p:cNvCxnSpPr/>
+          <p:nvPr/>
+        </p:nvCxnSpPr>
+        <p:spPr>
+          <a:xfrm flipV="1">
+            <a:off x="967581" y="5511682"/>
+            <a:ext cx="0" cy="230379"/>
+          </a:xfrm>
+          <a:prstGeom prst="straightConnector1">
+            <a:avLst/>
+          </a:prstGeom>
+          <a:ln w="38100">
+            <a:solidFill>
+              <a:schemeClr val="accent2">
+                <a:lumMod val="75000"/>
+              </a:schemeClr>
+            </a:solidFill>
+            <a:prstDash val="sysDot"/>
+            <a:headEnd type="none" w="med" len="med"/>
+            <a:tailEnd type="triangle" w="med" len="med"/>
+          </a:ln>
+        </p:spPr>
+        <p:style>
+          <a:lnRef idx="1">
+            <a:schemeClr val="accent1"/>
+          </a:lnRef>
+          <a:fillRef idx="0">
+            <a:schemeClr val="accent1"/>
+          </a:fillRef>
+          <a:effectRef idx="0">
+            <a:schemeClr val="accent1"/>
+          </a:effectRef>
+          <a:fontRef idx="minor">
+            <a:schemeClr val="tx1"/>
+          </a:fontRef>
+        </p:style>
+      </p:cxnSp>
+      <p:grpSp>
+        <p:nvGrpSpPr>
+          <p:cNvPr id="156" name="Group 155"/>
+          <p:cNvGrpSpPr/>
+          <p:nvPr/>
+        </p:nvGrpSpPr>
+        <p:grpSpPr>
+          <a:xfrm>
+            <a:off x="6225381" y="256308"/>
+            <a:ext cx="1905000" cy="505692"/>
+            <a:chOff x="-762000" y="1371600"/>
+            <a:chExt cx="1905000" cy="505692"/>
+          </a:xfrm>
+          <a:solidFill>
+            <a:schemeClr val="bg1"/>
+          </a:solidFill>
+        </p:grpSpPr>
+        <p:sp>
+          <p:nvSpPr>
+            <p:cNvPr id="157" name="Rectangle 156"/>
+            <p:cNvSpPr/>
+            <p:nvPr/>
+          </p:nvSpPr>
+          <p:spPr>
+            <a:xfrm>
+              <a:off x="-762000" y="1524000"/>
+              <a:ext cx="1905000" cy="353292"/>
+            </a:xfrm>
+            <a:prstGeom prst="rect">
+              <a:avLst/>
+            </a:prstGeom>
+            <a:grpFill/>
+            <a:ln>
+              <a:solidFill>
+                <a:schemeClr val="accent5"/>
+              </a:solidFill>
+            </a:ln>
+          </p:spPr>
+          <p:style>
+            <a:lnRef idx="2">
+              <a:schemeClr val="accent1">
+                <a:shade val="50000"/>
+              </a:schemeClr>
+            </a:lnRef>
+            <a:fillRef idx="1">
+              <a:schemeClr val="accent1"/>
+            </a:fillRef>
+            <a:effectRef idx="0">
+              <a:schemeClr val="accent1"/>
+            </a:effectRef>
+            <a:fontRef idx="minor">
+              <a:schemeClr val="lt1"/>
+            </a:fontRef>
+          </p:style>
+          <p:txBody>
+            <a:bodyPr rtlCol="0" anchor="ctr"/>
+            <a:lstStyle/>
+            <a:p>
+              <a:r>
+                <a:rPr lang="en-US" sz="1400" b="1" dirty="0" smtClean="0">
+                  <a:solidFill>
+                    <a:schemeClr val="accent5"/>
+                  </a:solidFill>
+                </a:rPr>
+                <a:t>common::</a:t>
+              </a:r>
+              <a:r>
+                <a:rPr lang="en-US" sz="1400" b="1" dirty="0" err="1" smtClean="0">
+                  <a:solidFill>
+                    <a:schemeClr val="accent5"/>
+                  </a:solidFill>
+                </a:rPr>
+                <a:t>datatransfer</a:t>
+              </a:r>
+              <a:endParaRPr lang="en-SG" sz="1400" b="1" dirty="0">
+                <a:solidFill>
+                  <a:schemeClr val="accent5"/>
+                </a:solidFill>
+              </a:endParaRPr>
+            </a:p>
+          </p:txBody>
+        </p:sp>
+        <p:sp>
+          <p:nvSpPr>
+            <p:cNvPr id="158" name="Rectangle 157"/>
+            <p:cNvSpPr/>
+            <p:nvPr/>
+          </p:nvSpPr>
+          <p:spPr>
+            <a:xfrm>
+              <a:off x="647700" y="1371600"/>
+              <a:ext cx="495300" cy="152400"/>
+            </a:xfrm>
+            <a:prstGeom prst="rect">
+              <a:avLst/>
+            </a:prstGeom>
+            <a:grpFill/>
+            <a:ln>
+              <a:solidFill>
+                <a:schemeClr val="accent5"/>
+              </a:solidFill>
+            </a:ln>
+          </p:spPr>
+          <p:style>
+            <a:lnRef idx="2">
+              <a:schemeClr val="accent1">
+                <a:shade val="50000"/>
+              </a:schemeClr>
+            </a:lnRef>
+            <a:fillRef idx="1">
+              <a:schemeClr val="accent1"/>
+            </a:fillRef>
+            <a:effectRef idx="0">
+              <a:schemeClr val="accent1"/>
+            </a:effectRef>
+            <a:fontRef idx="minor">
+              <a:schemeClr val="lt1"/>
+            </a:fontRef>
+          </p:style>
+          <p:txBody>
+            <a:bodyPr rtlCol="0" anchor="ctr"/>
+            <a:lstStyle/>
+            <a:p>
+              <a:endParaRPr lang="en-SG" sz="1400" b="1">
+                <a:solidFill>
+                  <a:schemeClr val="accent5"/>
+                </a:solidFill>
+              </a:endParaRPr>
+            </a:p>
+          </p:txBody>
+        </p:sp>
+      </p:grpSp>
     </p:spTree>
     <p:extLst>
       <p:ext uri="{BB962C8B-B14F-4D97-AF65-F5344CB8AC3E}">
@@ -6139,4 +6871,289 @@
   <a:objectDefaults/>
   <a:extraClrSchemeLst/>
 </a:theme>
+</file>
+
+<file path=ppt/theme/theme2.xml><?xml version="1.0" encoding="utf-8"?>
+<a:theme xmlns:a="http://schemas.openxmlformats.org/drawingml/2006/main" name="Office Theme">
+  <a:themeElements>
+    <a:clrScheme name="Office">
+      <a:dk1>
+        <a:sysClr val="windowText" lastClr="000000"/>
+      </a:dk1>
+      <a:lt1>
+        <a:sysClr val="window" lastClr="FFFFFF"/>
+      </a:lt1>
+      <a:dk2>
+        <a:srgbClr val="1F497D"/>
+      </a:dk2>
+      <a:lt2>
+        <a:srgbClr val="EEECE1"/>
+      </a:lt2>
+      <a:accent1>
+        <a:srgbClr val="4F81BD"/>
+      </a:accent1>
+      <a:accent2>
+        <a:srgbClr val="C0504D"/>
+      </a:accent2>
+      <a:accent3>
+        <a:srgbClr val="9BBB59"/>
+      </a:accent3>
+      <a:accent4>
+        <a:srgbClr val="8064A2"/>
+      </a:accent4>
+      <a:accent5>
+        <a:srgbClr val="4BACC6"/>
+      </a:accent5>
+      <a:accent6>
+        <a:srgbClr val="F79646"/>
+      </a:accent6>
+      <a:hlink>
+        <a:srgbClr val="0000FF"/>
+      </a:hlink>
+      <a:folHlink>
+        <a:srgbClr val="800080"/>
+      </a:folHlink>
+    </a:clrScheme>
+    <a:fontScheme name="Office">
+      <a:majorFont>
+        <a:latin typeface="Calibri"/>
+        <a:ea typeface=""/>
+        <a:cs typeface=""/>
+        <a:font script="Jpan" typeface="ＭＳ Ｐゴシック"/>
+        <a:font script="Hang" typeface="맑은 고딕"/>
+        <a:font script="Hans" typeface="宋体"/>
+        <a:font script="Hant" typeface="新細明體"/>
+        <a:font script="Arab" typeface="Times New Roman"/>
+        <a:font script="Hebr" typeface="Times New Roman"/>
+        <a:font script="Thai" typeface="Angsana New"/>
+        <a:font script="Ethi" typeface="Nyala"/>
+        <a:font script="Beng" typeface="Vrinda"/>
+        <a:font script="Gujr" typeface="Shruti"/>
+        <a:font script="Khmr" typeface="MoolBoran"/>
+        <a:font script="Knda" typeface="Tunga"/>
+        <a:font script="Guru" typeface="Raavi"/>
+        <a:font script="Cans" typeface="Euphemia"/>
+        <a:font script="Cher" typeface="Plantagenet Cherokee"/>
+        <a:font script="Yiii" typeface="Microsoft Yi Baiti"/>
+        <a:font script="Tibt" typeface="Microsoft Himalaya"/>
+        <a:font script="Thaa" typeface="MV Boli"/>
+        <a:font script="Deva" typeface="Mangal"/>
+        <a:font script="Telu" typeface="Gautami"/>
+        <a:font script="Taml" typeface="Latha"/>
+        <a:font script="Syrc" typeface="Estrangelo Edessa"/>
+        <a:font script="Orya" typeface="Kalinga"/>
+        <a:font script="Mlym" typeface="Kartika"/>
+        <a:font script="Laoo" typeface="DokChampa"/>
+        <a:font script="Sinh" typeface="Iskoola Pota"/>
+        <a:font script="Mong" typeface="Mongolian Baiti"/>
+        <a:font script="Viet" typeface="Times New Roman"/>
+        <a:font script="Uigh" typeface="Microsoft Uighur"/>
+        <a:font script="Geor" typeface="Sylfaen"/>
+      </a:majorFont>
+      <a:minorFont>
+        <a:latin typeface="Calibri"/>
+        <a:ea typeface=""/>
+        <a:cs typeface=""/>
+        <a:font script="Jpan" typeface="ＭＳ Ｐゴシック"/>
+        <a:font script="Hang" typeface="맑은 고딕"/>
+        <a:font script="Hans" typeface="宋体"/>
+        <a:font script="Hant" typeface="新細明體"/>
+        <a:font script="Arab" typeface="Arial"/>
+        <a:font script="Hebr" typeface="Arial"/>
+        <a:font script="Thai" typeface="Cordia New"/>
+        <a:font script="Ethi" typeface="Nyala"/>
+        <a:font script="Beng" typeface="Vrinda"/>
+        <a:font script="Gujr" typeface="Shruti"/>
+        <a:font script="Khmr" typeface="DaunPenh"/>
+        <a:font script="Knda" typeface="Tunga"/>
+        <a:font script="Guru" typeface="Raavi"/>
+        <a:font script="Cans" typeface="Euphemia"/>
+        <a:font script="Cher" typeface="Plantagenet Cherokee"/>
+        <a:font script="Yiii" typeface="Microsoft Yi Baiti"/>
+        <a:font script="Tibt" typeface="Microsoft Himalaya"/>
+        <a:font script="Thaa" typeface="MV Boli"/>
+        <a:font script="Deva" typeface="Mangal"/>
+        <a:font script="Telu" typeface="Gautami"/>
+        <a:font script="Taml" typeface="Latha"/>
+        <a:font script="Syrc" typeface="Estrangelo Edessa"/>
+        <a:font script="Orya" typeface="Kalinga"/>
+        <a:font script="Mlym" typeface="Kartika"/>
+        <a:font script="Laoo" typeface="DokChampa"/>
+        <a:font script="Sinh" typeface="Iskoola Pota"/>
+        <a:font script="Mong" typeface="Mongolian Baiti"/>
+        <a:font script="Viet" typeface="Arial"/>
+        <a:font script="Uigh" typeface="Microsoft Uighur"/>
+        <a:font script="Geor" typeface="Sylfaen"/>
+      </a:minorFont>
+    </a:fontScheme>
+    <a:fmtScheme name="Office">
+      <a:fillStyleLst>
+        <a:solidFill>
+          <a:schemeClr val="phClr"/>
+        </a:solidFill>
+        <a:gradFill rotWithShape="1">
+          <a:gsLst>
+            <a:gs pos="0">
+              <a:schemeClr val="phClr">
+                <a:tint val="50000"/>
+                <a:satMod val="300000"/>
+              </a:schemeClr>
+            </a:gs>
+            <a:gs pos="35000">
+              <a:schemeClr val="phClr">
+                <a:tint val="37000"/>
+                <a:satMod val="300000"/>
+              </a:schemeClr>
+            </a:gs>
+            <a:gs pos="100000">
+              <a:schemeClr val="phClr">
+                <a:tint val="15000"/>
+                <a:satMod val="350000"/>
+              </a:schemeClr>
+            </a:gs>
+          </a:gsLst>
+          <a:lin ang="16200000" scaled="1"/>
+        </a:gradFill>
+        <a:gradFill rotWithShape="1">
+          <a:gsLst>
+            <a:gs pos="0">
+              <a:schemeClr val="phClr">
+                <a:shade val="51000"/>
+                <a:satMod val="130000"/>
+              </a:schemeClr>
+            </a:gs>
+            <a:gs pos="80000">
+              <a:schemeClr val="phClr">
+                <a:shade val="93000"/>
+                <a:satMod val="130000"/>
+              </a:schemeClr>
+            </a:gs>
+            <a:gs pos="100000">
+              <a:schemeClr val="phClr">
+                <a:shade val="94000"/>
+                <a:satMod val="135000"/>
+              </a:schemeClr>
+            </a:gs>
+          </a:gsLst>
+          <a:lin ang="16200000" scaled="0"/>
+        </a:gradFill>
+      </a:fillStyleLst>
+      <a:lnStyleLst>
+        <a:ln w="9525" cap="flat" cmpd="sng" algn="ctr">
+          <a:solidFill>
+            <a:schemeClr val="phClr">
+              <a:shade val="95000"/>
+              <a:satMod val="105000"/>
+            </a:schemeClr>
+          </a:solidFill>
+          <a:prstDash val="solid"/>
+        </a:ln>
+        <a:ln w="25400" cap="flat" cmpd="sng" algn="ctr">
+          <a:solidFill>
+            <a:schemeClr val="phClr"/>
+          </a:solidFill>
+          <a:prstDash val="solid"/>
+        </a:ln>
+        <a:ln w="38100" cap="flat" cmpd="sng" algn="ctr">
+          <a:solidFill>
+            <a:schemeClr val="phClr"/>
+          </a:solidFill>
+          <a:prstDash val="solid"/>
+        </a:ln>
+      </a:lnStyleLst>
+      <a:effectStyleLst>
+        <a:effectStyle>
+          <a:effectLst>
+            <a:outerShdw blurRad="40000" dist="20000" dir="5400000" rotWithShape="0">
+              <a:srgbClr val="000000">
+                <a:alpha val="38000"/>
+              </a:srgbClr>
+            </a:outerShdw>
+          </a:effectLst>
+        </a:effectStyle>
+        <a:effectStyle>
+          <a:effectLst>
+            <a:outerShdw blurRad="40000" dist="23000" dir="5400000" rotWithShape="0">
+              <a:srgbClr val="000000">
+                <a:alpha val="35000"/>
+              </a:srgbClr>
+            </a:outerShdw>
+          </a:effectLst>
+        </a:effectStyle>
+        <a:effectStyle>
+          <a:effectLst>
+            <a:outerShdw blurRad="40000" dist="23000" dir="5400000" rotWithShape="0">
+              <a:srgbClr val="000000">
+                <a:alpha val="35000"/>
+              </a:srgbClr>
+            </a:outerShdw>
+          </a:effectLst>
+          <a:scene3d>
+            <a:camera prst="orthographicFront">
+              <a:rot lat="0" lon="0" rev="0"/>
+            </a:camera>
+            <a:lightRig rig="threePt" dir="t">
+              <a:rot lat="0" lon="0" rev="1200000"/>
+            </a:lightRig>
+          </a:scene3d>
+          <a:sp3d>
+            <a:bevelT w="63500" h="25400"/>
+          </a:sp3d>
+        </a:effectStyle>
+      </a:effectStyleLst>
+      <a:bgFillStyleLst>
+        <a:solidFill>
+          <a:schemeClr val="phClr"/>
+        </a:solidFill>
+        <a:gradFill rotWithShape="1">
+          <a:gsLst>
+            <a:gs pos="0">
+              <a:schemeClr val="phClr">
+                <a:tint val="40000"/>
+                <a:satMod val="350000"/>
+              </a:schemeClr>
+            </a:gs>
+            <a:gs pos="40000">
+              <a:schemeClr val="phClr">
+                <a:tint val="45000"/>
+                <a:shade val="99000"/>
+                <a:satMod val="350000"/>
+              </a:schemeClr>
+            </a:gs>
+            <a:gs pos="100000">
+              <a:schemeClr val="phClr">
+                <a:shade val="20000"/>
+                <a:satMod val="255000"/>
+              </a:schemeClr>
+            </a:gs>
+          </a:gsLst>
+          <a:path path="circle">
+            <a:fillToRect l="50000" t="-80000" r="50000" b="180000"/>
+          </a:path>
+        </a:gradFill>
+        <a:gradFill rotWithShape="1">
+          <a:gsLst>
+            <a:gs pos="0">
+              <a:schemeClr val="phClr">
+                <a:tint val="80000"/>
+                <a:satMod val="300000"/>
+              </a:schemeClr>
+            </a:gs>
+            <a:gs pos="100000">
+              <a:schemeClr val="phClr">
+                <a:shade val="30000"/>
+                <a:satMod val="200000"/>
+              </a:schemeClr>
+            </a:gs>
+          </a:gsLst>
+          <a:path path="circle">
+            <a:fillToRect l="50000" t="50000" r="50000" b="50000"/>
+          </a:path>
+        </a:gradFill>
+      </a:bgFillStyleLst>
+    </a:fmtScheme>
+  </a:themeElements>
+  <a:objectDefaults/>
+  <a:extraClrSchemeLst/>
+</a:theme>
 </file>
</xml_diff>

<commit_message>
End phase 1 - Issue 433 Update Issue 433 merge with default Beginning phase 2 - Implementation and incoporation of Account entity
</commit_message>
<xml_diff>
--- a/doc/diagrams/packageDiagram.pptx
+++ b/doc/diagrams/packageDiagram.pptx
@@ -4,17 +4,20 @@
   <p:sldMasterIdLst>
     <p:sldMasterId id="2147483648" r:id="rId1"/>
   </p:sldMasterIdLst>
+  <p:notesMasterIdLst>
+    <p:notesMasterId r:id="rId3"/>
+  </p:notesMasterIdLst>
   <p:sldIdLst>
     <p:sldId id="256" r:id="rId2"/>
   </p:sldIdLst>
-  <p:sldSz cx="9144000" cy="6858000" type="screen4x3"/>
+  <p:sldSz cx="8640763" cy="6300788"/>
   <p:notesSz cx="6858000" cy="9144000"/>
   <p:defaultTextStyle>
     <a:defPPr>
       <a:defRPr lang="en-US"/>
     </a:defPPr>
-    <a:lvl1pPr marL="0" algn="l" defTabSz="914400" rtl="0" eaLnBrk="1" latinLnBrk="0" hangingPunct="1">
-      <a:defRPr sz="1800" kern="1200">
+    <a:lvl1pPr marL="0" algn="l" defTabSz="853775" rtl="0" eaLnBrk="1" latinLnBrk="0" hangingPunct="1">
+      <a:defRPr sz="1700" kern="1200">
         <a:solidFill>
           <a:schemeClr val="tx1"/>
         </a:solidFill>
@@ -23,8 +26,8 @@
         <a:cs typeface="+mn-cs"/>
       </a:defRPr>
     </a:lvl1pPr>
-    <a:lvl2pPr marL="457200" algn="l" defTabSz="914400" rtl="0" eaLnBrk="1" latinLnBrk="0" hangingPunct="1">
-      <a:defRPr sz="1800" kern="1200">
+    <a:lvl2pPr marL="426888" algn="l" defTabSz="853775" rtl="0" eaLnBrk="1" latinLnBrk="0" hangingPunct="1">
+      <a:defRPr sz="1700" kern="1200">
         <a:solidFill>
           <a:schemeClr val="tx1"/>
         </a:solidFill>
@@ -33,8 +36,8 @@
         <a:cs typeface="+mn-cs"/>
       </a:defRPr>
     </a:lvl2pPr>
-    <a:lvl3pPr marL="914400" algn="l" defTabSz="914400" rtl="0" eaLnBrk="1" latinLnBrk="0" hangingPunct="1">
-      <a:defRPr sz="1800" kern="1200">
+    <a:lvl3pPr marL="853775" algn="l" defTabSz="853775" rtl="0" eaLnBrk="1" latinLnBrk="0" hangingPunct="1">
+      <a:defRPr sz="1700" kern="1200">
         <a:solidFill>
           <a:schemeClr val="tx1"/>
         </a:solidFill>
@@ -43,8 +46,8 @@
         <a:cs typeface="+mn-cs"/>
       </a:defRPr>
     </a:lvl3pPr>
-    <a:lvl4pPr marL="1371600" algn="l" defTabSz="914400" rtl="0" eaLnBrk="1" latinLnBrk="0" hangingPunct="1">
-      <a:defRPr sz="1800" kern="1200">
+    <a:lvl4pPr marL="1280663" algn="l" defTabSz="853775" rtl="0" eaLnBrk="1" latinLnBrk="0" hangingPunct="1">
+      <a:defRPr sz="1700" kern="1200">
         <a:solidFill>
           <a:schemeClr val="tx1"/>
         </a:solidFill>
@@ -53,8 +56,8 @@
         <a:cs typeface="+mn-cs"/>
       </a:defRPr>
     </a:lvl4pPr>
-    <a:lvl5pPr marL="1828800" algn="l" defTabSz="914400" rtl="0" eaLnBrk="1" latinLnBrk="0" hangingPunct="1">
-      <a:defRPr sz="1800" kern="1200">
+    <a:lvl5pPr marL="1707551" algn="l" defTabSz="853775" rtl="0" eaLnBrk="1" latinLnBrk="0" hangingPunct="1">
+      <a:defRPr sz="1700" kern="1200">
         <a:solidFill>
           <a:schemeClr val="tx1"/>
         </a:solidFill>
@@ -63,8 +66,8 @@
         <a:cs typeface="+mn-cs"/>
       </a:defRPr>
     </a:lvl5pPr>
-    <a:lvl6pPr marL="2286000" algn="l" defTabSz="914400" rtl="0" eaLnBrk="1" latinLnBrk="0" hangingPunct="1">
-      <a:defRPr sz="1800" kern="1200">
+    <a:lvl6pPr marL="2134438" algn="l" defTabSz="853775" rtl="0" eaLnBrk="1" latinLnBrk="0" hangingPunct="1">
+      <a:defRPr sz="1700" kern="1200">
         <a:solidFill>
           <a:schemeClr val="tx1"/>
         </a:solidFill>
@@ -73,8 +76,8 @@
         <a:cs typeface="+mn-cs"/>
       </a:defRPr>
     </a:lvl6pPr>
-    <a:lvl7pPr marL="2743200" algn="l" defTabSz="914400" rtl="0" eaLnBrk="1" latinLnBrk="0" hangingPunct="1">
-      <a:defRPr sz="1800" kern="1200">
+    <a:lvl7pPr marL="2561326" algn="l" defTabSz="853775" rtl="0" eaLnBrk="1" latinLnBrk="0" hangingPunct="1">
+      <a:defRPr sz="1700" kern="1200">
         <a:solidFill>
           <a:schemeClr val="tx1"/>
         </a:solidFill>
@@ -83,8 +86,8 @@
         <a:cs typeface="+mn-cs"/>
       </a:defRPr>
     </a:lvl7pPr>
-    <a:lvl8pPr marL="3200400" algn="l" defTabSz="914400" rtl="0" eaLnBrk="1" latinLnBrk="0" hangingPunct="1">
-      <a:defRPr sz="1800" kern="1200">
+    <a:lvl8pPr marL="2988213" algn="l" defTabSz="853775" rtl="0" eaLnBrk="1" latinLnBrk="0" hangingPunct="1">
+      <a:defRPr sz="1700" kern="1200">
         <a:solidFill>
           <a:schemeClr val="tx1"/>
         </a:solidFill>
@@ -93,8 +96,8 @@
         <a:cs typeface="+mn-cs"/>
       </a:defRPr>
     </a:lvl8pPr>
-    <a:lvl9pPr marL="3657600" algn="l" defTabSz="914400" rtl="0" eaLnBrk="1" latinLnBrk="0" hangingPunct="1">
-      <a:defRPr sz="1800" kern="1200">
+    <a:lvl9pPr marL="3415101" algn="l" defTabSz="853775" rtl="0" eaLnBrk="1" latinLnBrk="0" hangingPunct="1">
+      <a:defRPr sz="1700" kern="1200">
         <a:solidFill>
           <a:schemeClr val="tx1"/>
         </a:solidFill>
@@ -105,6 +108,445 @@
     </a:lvl9pPr>
   </p:defaultTextStyle>
 </p:presentation>
+</file>
+
+<file path=ppt/notesMasters/notesMaster1.xml><?xml version="1.0" encoding="utf-8"?>
+<p:notesMaster xmlns:a="http://schemas.openxmlformats.org/drawingml/2006/main" xmlns:r="http://schemas.openxmlformats.org/officeDocument/2006/relationships" xmlns:p="http://schemas.openxmlformats.org/presentationml/2006/main">
+  <p:cSld>
+    <p:bg>
+      <p:bgRef idx="1001">
+        <a:schemeClr val="bg1"/>
+      </p:bgRef>
+    </p:bg>
+    <p:spTree>
+      <p:nvGrpSpPr>
+        <p:cNvPr id="1" name=""/>
+        <p:cNvGrpSpPr/>
+        <p:nvPr/>
+      </p:nvGrpSpPr>
+      <p:grpSpPr>
+        <a:xfrm>
+          <a:off x="0" y="0"/>
+          <a:ext cx="0" cy="0"/>
+          <a:chOff x="0" y="0"/>
+          <a:chExt cx="0" cy="0"/>
+        </a:xfrm>
+      </p:grpSpPr>
+      <p:sp>
+        <p:nvSpPr>
+          <p:cNvPr id="2" name="Header Placeholder 1"/>
+          <p:cNvSpPr>
+            <a:spLocks noGrp="1"/>
+          </p:cNvSpPr>
+          <p:nvPr>
+            <p:ph type="hdr" sz="quarter"/>
+          </p:nvPr>
+        </p:nvSpPr>
+        <p:spPr>
+          <a:xfrm>
+            <a:off x="0" y="0"/>
+            <a:ext cx="2971800" cy="457200"/>
+          </a:xfrm>
+          <a:prstGeom prst="rect">
+            <a:avLst/>
+          </a:prstGeom>
+        </p:spPr>
+        <p:txBody>
+          <a:bodyPr vert="horz" lIns="91440" tIns="45720" rIns="91440" bIns="45720" rtlCol="0"/>
+          <a:lstStyle>
+            <a:lvl1pPr algn="l">
+              <a:defRPr sz="1200"/>
+            </a:lvl1pPr>
+          </a:lstStyle>
+          <a:p>
+            <a:endParaRPr lang="en-SG"/>
+          </a:p>
+        </p:txBody>
+      </p:sp>
+      <p:sp>
+        <p:nvSpPr>
+          <p:cNvPr id="3" name="Date Placeholder 2"/>
+          <p:cNvSpPr>
+            <a:spLocks noGrp="1"/>
+          </p:cNvSpPr>
+          <p:nvPr>
+            <p:ph type="dt" idx="1"/>
+          </p:nvPr>
+        </p:nvSpPr>
+        <p:spPr>
+          <a:xfrm>
+            <a:off x="3884613" y="0"/>
+            <a:ext cx="2971800" cy="457200"/>
+          </a:xfrm>
+          <a:prstGeom prst="rect">
+            <a:avLst/>
+          </a:prstGeom>
+        </p:spPr>
+        <p:txBody>
+          <a:bodyPr vert="horz" lIns="91440" tIns="45720" rIns="91440" bIns="45720" rtlCol="0"/>
+          <a:lstStyle>
+            <a:lvl1pPr algn="r">
+              <a:defRPr sz="1200"/>
+            </a:lvl1pPr>
+          </a:lstStyle>
+          <a:p>
+            <a:fld id="{5D8FA8FF-20DC-44E5-8C35-13EAF0A5698C}" type="datetimeFigureOut">
+              <a:rPr lang="en-SG" smtClean="0"/>
+              <a:t>18/12/2012</a:t>
+            </a:fld>
+            <a:endParaRPr lang="en-SG"/>
+          </a:p>
+        </p:txBody>
+      </p:sp>
+      <p:sp>
+        <p:nvSpPr>
+          <p:cNvPr id="4" name="Slide Image Placeholder 3"/>
+          <p:cNvSpPr>
+            <a:spLocks noGrp="1" noRot="1" noChangeAspect="1"/>
+          </p:cNvSpPr>
+          <p:nvPr>
+            <p:ph type="sldImg" idx="2"/>
+          </p:nvPr>
+        </p:nvSpPr>
+        <p:spPr>
+          <a:xfrm>
+            <a:off x="1077913" y="685800"/>
+            <a:ext cx="4702175" cy="3429000"/>
+          </a:xfrm>
+          <a:prstGeom prst="rect">
+            <a:avLst/>
+          </a:prstGeom>
+          <a:noFill/>
+          <a:ln w="12700">
+            <a:solidFill>
+              <a:prstClr val="black"/>
+            </a:solidFill>
+          </a:ln>
+        </p:spPr>
+        <p:txBody>
+          <a:bodyPr vert="horz" lIns="91440" tIns="45720" rIns="91440" bIns="45720" rtlCol="0" anchor="ctr"/>
+          <a:lstStyle/>
+          <a:p>
+            <a:endParaRPr lang="en-SG"/>
+          </a:p>
+        </p:txBody>
+      </p:sp>
+      <p:sp>
+        <p:nvSpPr>
+          <p:cNvPr id="5" name="Notes Placeholder 4"/>
+          <p:cNvSpPr>
+            <a:spLocks noGrp="1"/>
+          </p:cNvSpPr>
+          <p:nvPr>
+            <p:ph type="body" sz="quarter" idx="3"/>
+          </p:nvPr>
+        </p:nvSpPr>
+        <p:spPr>
+          <a:xfrm>
+            <a:off x="685800" y="4343400"/>
+            <a:ext cx="5486400" cy="4114800"/>
+          </a:xfrm>
+          <a:prstGeom prst="rect">
+            <a:avLst/>
+          </a:prstGeom>
+        </p:spPr>
+        <p:txBody>
+          <a:bodyPr vert="horz" lIns="91440" tIns="45720" rIns="91440" bIns="45720" rtlCol="0"/>
+          <a:lstStyle/>
+          <a:p>
+            <a:pPr lvl="0"/>
+            <a:r>
+              <a:rPr lang="en-US" smtClean="0"/>
+              <a:t>Click to edit Master text styles</a:t>
+            </a:r>
+          </a:p>
+          <a:p>
+            <a:pPr lvl="1"/>
+            <a:r>
+              <a:rPr lang="en-US" smtClean="0"/>
+              <a:t>Second level</a:t>
+            </a:r>
+          </a:p>
+          <a:p>
+            <a:pPr lvl="2"/>
+            <a:r>
+              <a:rPr lang="en-US" smtClean="0"/>
+              <a:t>Third level</a:t>
+            </a:r>
+          </a:p>
+          <a:p>
+            <a:pPr lvl="3"/>
+            <a:r>
+              <a:rPr lang="en-US" smtClean="0"/>
+              <a:t>Fourth level</a:t>
+            </a:r>
+          </a:p>
+          <a:p>
+            <a:pPr lvl="4"/>
+            <a:r>
+              <a:rPr lang="en-US" smtClean="0"/>
+              <a:t>Fifth level</a:t>
+            </a:r>
+            <a:endParaRPr lang="en-SG"/>
+          </a:p>
+        </p:txBody>
+      </p:sp>
+      <p:sp>
+        <p:nvSpPr>
+          <p:cNvPr id="6" name="Footer Placeholder 5"/>
+          <p:cNvSpPr>
+            <a:spLocks noGrp="1"/>
+          </p:cNvSpPr>
+          <p:nvPr>
+            <p:ph type="ftr" sz="quarter" idx="4"/>
+          </p:nvPr>
+        </p:nvSpPr>
+        <p:spPr>
+          <a:xfrm>
+            <a:off x="0" y="8685213"/>
+            <a:ext cx="2971800" cy="457200"/>
+          </a:xfrm>
+          <a:prstGeom prst="rect">
+            <a:avLst/>
+          </a:prstGeom>
+        </p:spPr>
+        <p:txBody>
+          <a:bodyPr vert="horz" lIns="91440" tIns="45720" rIns="91440" bIns="45720" rtlCol="0" anchor="b"/>
+          <a:lstStyle>
+            <a:lvl1pPr algn="l">
+              <a:defRPr sz="1200"/>
+            </a:lvl1pPr>
+          </a:lstStyle>
+          <a:p>
+            <a:endParaRPr lang="en-SG"/>
+          </a:p>
+        </p:txBody>
+      </p:sp>
+      <p:sp>
+        <p:nvSpPr>
+          <p:cNvPr id="7" name="Slide Number Placeholder 6"/>
+          <p:cNvSpPr>
+            <a:spLocks noGrp="1"/>
+          </p:cNvSpPr>
+          <p:nvPr>
+            <p:ph type="sldNum" sz="quarter" idx="5"/>
+          </p:nvPr>
+        </p:nvSpPr>
+        <p:spPr>
+          <a:xfrm>
+            <a:off x="3884613" y="8685213"/>
+            <a:ext cx="2971800" cy="457200"/>
+          </a:xfrm>
+          <a:prstGeom prst="rect">
+            <a:avLst/>
+          </a:prstGeom>
+        </p:spPr>
+        <p:txBody>
+          <a:bodyPr vert="horz" lIns="91440" tIns="45720" rIns="91440" bIns="45720" rtlCol="0" anchor="b"/>
+          <a:lstStyle>
+            <a:lvl1pPr algn="r">
+              <a:defRPr sz="1200"/>
+            </a:lvl1pPr>
+          </a:lstStyle>
+          <a:p>
+            <a:fld id="{533A5AA4-18D7-48CB-8D4B-C9F7395BD002}" type="slidenum">
+              <a:rPr lang="en-SG" smtClean="0"/>
+              <a:t>‹#›</a:t>
+            </a:fld>
+            <a:endParaRPr lang="en-SG"/>
+          </a:p>
+        </p:txBody>
+      </p:sp>
+    </p:spTree>
+    <p:extLst>
+      <p:ext uri="{BB962C8B-B14F-4D97-AF65-F5344CB8AC3E}">
+        <p14:creationId xmlns:p14="http://schemas.microsoft.com/office/powerpoint/2010/main" val="2591710806"/>
+      </p:ext>
+    </p:extLst>
+  </p:cSld>
+  <p:clrMap bg1="lt1" tx1="dk1" bg2="lt2" tx2="dk2" accent1="accent1" accent2="accent2" accent3="accent3" accent4="accent4" accent5="accent5" accent6="accent6" hlink="hlink" folHlink="folHlink"/>
+  <p:notesStyle>
+    <a:lvl1pPr marL="0" algn="l" defTabSz="853775" rtl="0" eaLnBrk="1" latinLnBrk="0" hangingPunct="1">
+      <a:defRPr sz="1100" kern="1200">
+        <a:solidFill>
+          <a:schemeClr val="tx1"/>
+        </a:solidFill>
+        <a:latin typeface="+mn-lt"/>
+        <a:ea typeface="+mn-ea"/>
+        <a:cs typeface="+mn-cs"/>
+      </a:defRPr>
+    </a:lvl1pPr>
+    <a:lvl2pPr marL="426888" algn="l" defTabSz="853775" rtl="0" eaLnBrk="1" latinLnBrk="0" hangingPunct="1">
+      <a:defRPr sz="1100" kern="1200">
+        <a:solidFill>
+          <a:schemeClr val="tx1"/>
+        </a:solidFill>
+        <a:latin typeface="+mn-lt"/>
+        <a:ea typeface="+mn-ea"/>
+        <a:cs typeface="+mn-cs"/>
+      </a:defRPr>
+    </a:lvl2pPr>
+    <a:lvl3pPr marL="853775" algn="l" defTabSz="853775" rtl="0" eaLnBrk="1" latinLnBrk="0" hangingPunct="1">
+      <a:defRPr sz="1100" kern="1200">
+        <a:solidFill>
+          <a:schemeClr val="tx1"/>
+        </a:solidFill>
+        <a:latin typeface="+mn-lt"/>
+        <a:ea typeface="+mn-ea"/>
+        <a:cs typeface="+mn-cs"/>
+      </a:defRPr>
+    </a:lvl3pPr>
+    <a:lvl4pPr marL="1280663" algn="l" defTabSz="853775" rtl="0" eaLnBrk="1" latinLnBrk="0" hangingPunct="1">
+      <a:defRPr sz="1100" kern="1200">
+        <a:solidFill>
+          <a:schemeClr val="tx1"/>
+        </a:solidFill>
+        <a:latin typeface="+mn-lt"/>
+        <a:ea typeface="+mn-ea"/>
+        <a:cs typeface="+mn-cs"/>
+      </a:defRPr>
+    </a:lvl4pPr>
+    <a:lvl5pPr marL="1707551" algn="l" defTabSz="853775" rtl="0" eaLnBrk="1" latinLnBrk="0" hangingPunct="1">
+      <a:defRPr sz="1100" kern="1200">
+        <a:solidFill>
+          <a:schemeClr val="tx1"/>
+        </a:solidFill>
+        <a:latin typeface="+mn-lt"/>
+        <a:ea typeface="+mn-ea"/>
+        <a:cs typeface="+mn-cs"/>
+      </a:defRPr>
+    </a:lvl5pPr>
+    <a:lvl6pPr marL="2134438" algn="l" defTabSz="853775" rtl="0" eaLnBrk="1" latinLnBrk="0" hangingPunct="1">
+      <a:defRPr sz="1100" kern="1200">
+        <a:solidFill>
+          <a:schemeClr val="tx1"/>
+        </a:solidFill>
+        <a:latin typeface="+mn-lt"/>
+        <a:ea typeface="+mn-ea"/>
+        <a:cs typeface="+mn-cs"/>
+      </a:defRPr>
+    </a:lvl6pPr>
+    <a:lvl7pPr marL="2561326" algn="l" defTabSz="853775" rtl="0" eaLnBrk="1" latinLnBrk="0" hangingPunct="1">
+      <a:defRPr sz="1100" kern="1200">
+        <a:solidFill>
+          <a:schemeClr val="tx1"/>
+        </a:solidFill>
+        <a:latin typeface="+mn-lt"/>
+        <a:ea typeface="+mn-ea"/>
+        <a:cs typeface="+mn-cs"/>
+      </a:defRPr>
+    </a:lvl7pPr>
+    <a:lvl8pPr marL="2988213" algn="l" defTabSz="853775" rtl="0" eaLnBrk="1" latinLnBrk="0" hangingPunct="1">
+      <a:defRPr sz="1100" kern="1200">
+        <a:solidFill>
+          <a:schemeClr val="tx1"/>
+        </a:solidFill>
+        <a:latin typeface="+mn-lt"/>
+        <a:ea typeface="+mn-ea"/>
+        <a:cs typeface="+mn-cs"/>
+      </a:defRPr>
+    </a:lvl8pPr>
+    <a:lvl9pPr marL="3415101" algn="l" defTabSz="853775" rtl="0" eaLnBrk="1" latinLnBrk="0" hangingPunct="1">
+      <a:defRPr sz="1100" kern="1200">
+        <a:solidFill>
+          <a:schemeClr val="tx1"/>
+        </a:solidFill>
+        <a:latin typeface="+mn-lt"/>
+        <a:ea typeface="+mn-ea"/>
+        <a:cs typeface="+mn-cs"/>
+      </a:defRPr>
+    </a:lvl9pPr>
+  </p:notesStyle>
+</p:notesMaster>
+</file>
+
+<file path=ppt/notesSlides/notesSlide1.xml><?xml version="1.0" encoding="utf-8"?>
+<p:notes xmlns:a="http://schemas.openxmlformats.org/drawingml/2006/main" xmlns:r="http://schemas.openxmlformats.org/officeDocument/2006/relationships" xmlns:p="http://schemas.openxmlformats.org/presentationml/2006/main">
+  <p:cSld>
+    <p:spTree>
+      <p:nvGrpSpPr>
+        <p:cNvPr id="1" name=""/>
+        <p:cNvGrpSpPr/>
+        <p:nvPr/>
+      </p:nvGrpSpPr>
+      <p:grpSpPr>
+        <a:xfrm>
+          <a:off x="0" y="0"/>
+          <a:ext cx="0" cy="0"/>
+          <a:chOff x="0" y="0"/>
+          <a:chExt cx="0" cy="0"/>
+        </a:xfrm>
+      </p:grpSpPr>
+      <p:sp>
+        <p:nvSpPr>
+          <p:cNvPr id="2" name="Slide Image Placeholder 1"/>
+          <p:cNvSpPr>
+            <a:spLocks noGrp="1" noRot="1" noChangeAspect="1"/>
+          </p:cNvSpPr>
+          <p:nvPr>
+            <p:ph type="sldImg"/>
+          </p:nvPr>
+        </p:nvSpPr>
+        <p:spPr>
+          <a:xfrm>
+            <a:off x="1077913" y="685800"/>
+            <a:ext cx="4702175" cy="3429000"/>
+          </a:xfrm>
+        </p:spPr>
+      </p:sp>
+      <p:sp>
+        <p:nvSpPr>
+          <p:cNvPr id="3" name="Notes Placeholder 2"/>
+          <p:cNvSpPr>
+            <a:spLocks noGrp="1"/>
+          </p:cNvSpPr>
+          <p:nvPr>
+            <p:ph type="body" idx="1"/>
+          </p:nvPr>
+        </p:nvSpPr>
+        <p:spPr/>
+        <p:txBody>
+          <a:bodyPr/>
+          <a:lstStyle/>
+          <a:p>
+            <a:endParaRPr lang="en-SG" dirty="0"/>
+          </a:p>
+        </p:txBody>
+      </p:sp>
+      <p:sp>
+        <p:nvSpPr>
+          <p:cNvPr id="4" name="Slide Number Placeholder 3"/>
+          <p:cNvSpPr>
+            <a:spLocks noGrp="1"/>
+          </p:cNvSpPr>
+          <p:nvPr>
+            <p:ph type="sldNum" sz="quarter" idx="10"/>
+          </p:nvPr>
+        </p:nvSpPr>
+        <p:spPr/>
+        <p:txBody>
+          <a:bodyPr/>
+          <a:lstStyle/>
+          <a:p>
+            <a:fld id="{533A5AA4-18D7-48CB-8D4B-C9F7395BD002}" type="slidenum">
+              <a:rPr lang="en-SG" smtClean="0"/>
+              <a:t>1</a:t>
+            </a:fld>
+            <a:endParaRPr lang="en-SG"/>
+          </a:p>
+        </p:txBody>
+      </p:sp>
+    </p:spTree>
+    <p:extLst>
+      <p:ext uri="{BB962C8B-B14F-4D97-AF65-F5344CB8AC3E}">
+        <p14:creationId xmlns:p14="http://schemas.microsoft.com/office/powerpoint/2010/main" val="3432613659"/>
+      </p:ext>
+    </p:extLst>
+  </p:cSld>
+  <p:clrMapOvr>
+    <a:masterClrMapping/>
+  </p:clrMapOvr>
+</p:notes>
 </file>
 
 <file path=ppt/slideLayouts/slideLayout1.xml><?xml version="1.0" encoding="utf-8"?>
@@ -136,8 +578,8 @@
         </p:nvSpPr>
         <p:spPr>
           <a:xfrm>
-            <a:off x="685800" y="2130425"/>
-            <a:ext cx="7772400" cy="1470025"/>
+            <a:off x="648057" y="1957328"/>
+            <a:ext cx="7344649" cy="1350586"/>
           </a:xfrm>
         </p:spPr>
         <p:txBody>
@@ -164,8 +606,8 @@
         </p:nvSpPr>
         <p:spPr>
           <a:xfrm>
-            <a:off x="1371600" y="3886200"/>
-            <a:ext cx="6400800" cy="1752600"/>
+            <a:off x="1296115" y="3570447"/>
+            <a:ext cx="6048534" cy="1610201"/>
           </a:xfrm>
         </p:spPr>
         <p:txBody>
@@ -181,7 +623,7 @@
                 </a:solidFill>
               </a:defRPr>
             </a:lvl1pPr>
-            <a:lvl2pPr marL="457200" indent="0" algn="ctr">
+            <a:lvl2pPr marL="426888" indent="0" algn="ctr">
               <a:buNone/>
               <a:defRPr>
                 <a:solidFill>
@@ -191,7 +633,7 @@
                 </a:solidFill>
               </a:defRPr>
             </a:lvl2pPr>
-            <a:lvl3pPr marL="914400" indent="0" algn="ctr">
+            <a:lvl3pPr marL="853775" indent="0" algn="ctr">
               <a:buNone/>
               <a:defRPr>
                 <a:solidFill>
@@ -201,7 +643,7 @@
                 </a:solidFill>
               </a:defRPr>
             </a:lvl3pPr>
-            <a:lvl4pPr marL="1371600" indent="0" algn="ctr">
+            <a:lvl4pPr marL="1280663" indent="0" algn="ctr">
               <a:buNone/>
               <a:defRPr>
                 <a:solidFill>
@@ -211,7 +653,7 @@
                 </a:solidFill>
               </a:defRPr>
             </a:lvl4pPr>
-            <a:lvl5pPr marL="1828800" indent="0" algn="ctr">
+            <a:lvl5pPr marL="1707551" indent="0" algn="ctr">
               <a:buNone/>
               <a:defRPr>
                 <a:solidFill>
@@ -221,7 +663,7 @@
                 </a:solidFill>
               </a:defRPr>
             </a:lvl5pPr>
-            <a:lvl6pPr marL="2286000" indent="0" algn="ctr">
+            <a:lvl6pPr marL="2134438" indent="0" algn="ctr">
               <a:buNone/>
               <a:defRPr>
                 <a:solidFill>
@@ -231,7 +673,7 @@
                 </a:solidFill>
               </a:defRPr>
             </a:lvl6pPr>
-            <a:lvl7pPr marL="2743200" indent="0" algn="ctr">
+            <a:lvl7pPr marL="2561326" indent="0" algn="ctr">
               <a:buNone/>
               <a:defRPr>
                 <a:solidFill>
@@ -241,7 +683,7 @@
                 </a:solidFill>
               </a:defRPr>
             </a:lvl7pPr>
-            <a:lvl8pPr marL="3200400" indent="0" algn="ctr">
+            <a:lvl8pPr marL="2988213" indent="0" algn="ctr">
               <a:buNone/>
               <a:defRPr>
                 <a:solidFill>
@@ -251,7 +693,7 @@
                 </a:solidFill>
               </a:defRPr>
             </a:lvl8pPr>
-            <a:lvl9pPr marL="3657600" indent="0" algn="ctr">
+            <a:lvl9pPr marL="3415101" indent="0" algn="ctr">
               <a:buNone/>
               <a:defRPr>
                 <a:solidFill>
@@ -289,7 +731,7 @@
             <a:fld id="{1D8BD707-D9CF-40AE-B4C6-C98DA3205C09}" type="datetimeFigureOut">
               <a:rPr lang="en-US" smtClean="0"/>
               <a:pPr/>
-              <a:t>7/12/2012</a:t>
+              <a:t>12/18/2012</a:t>
             </a:fld>
             <a:endParaRPr lang="en-US"/>
           </a:p>
@@ -456,7 +898,7 @@
             <a:fld id="{1D8BD707-D9CF-40AE-B4C6-C98DA3205C09}" type="datetimeFigureOut">
               <a:rPr lang="en-US" smtClean="0"/>
               <a:pPr/>
-              <a:t>7/12/2012</a:t>
+              <a:t>12/18/2012</a:t>
             </a:fld>
             <a:endParaRPr lang="en-US"/>
           </a:p>
@@ -542,8 +984,8 @@
         </p:nvSpPr>
         <p:spPr>
           <a:xfrm>
-            <a:off x="6629400" y="274638"/>
-            <a:ext cx="2057400" cy="5851525"/>
+            <a:off x="6264553" y="252324"/>
+            <a:ext cx="1944172" cy="5376089"/>
           </a:xfrm>
         </p:spPr>
         <p:txBody>
@@ -570,8 +1012,8 @@
         </p:nvSpPr>
         <p:spPr>
           <a:xfrm>
-            <a:off x="457200" y="274638"/>
-            <a:ext cx="6019800" cy="5851525"/>
+            <a:off x="432038" y="252324"/>
+            <a:ext cx="5688502" cy="5376089"/>
           </a:xfrm>
         </p:spPr>
         <p:txBody>
@@ -633,7 +1075,7 @@
             <a:fld id="{1D8BD707-D9CF-40AE-B4C6-C98DA3205C09}" type="datetimeFigureOut">
               <a:rPr lang="en-US" smtClean="0"/>
               <a:pPr/>
-              <a:t>7/12/2012</a:t>
+              <a:t>12/18/2012</a:t>
             </a:fld>
             <a:endParaRPr lang="en-US"/>
           </a:p>
@@ -800,7 +1242,7 @@
             <a:fld id="{1D8BD707-D9CF-40AE-B4C6-C98DA3205C09}" type="datetimeFigureOut">
               <a:rPr lang="en-US" smtClean="0"/>
               <a:pPr/>
-              <a:t>7/12/2012</a:t>
+              <a:t>12/18/2012</a:t>
             </a:fld>
             <a:endParaRPr lang="en-US"/>
           </a:p>
@@ -886,15 +1328,15 @@
         </p:nvSpPr>
         <p:spPr>
           <a:xfrm>
-            <a:off x="722313" y="4406900"/>
-            <a:ext cx="7772400" cy="1362075"/>
+            <a:off x="682561" y="4048840"/>
+            <a:ext cx="7344649" cy="1251407"/>
           </a:xfrm>
         </p:spPr>
         <p:txBody>
           <a:bodyPr anchor="t"/>
           <a:lstStyle>
             <a:lvl1pPr algn="l">
-              <a:defRPr sz="4000" b="1" cap="all"/>
+              <a:defRPr sz="3700" b="1" cap="all"/>
             </a:lvl1pPr>
           </a:lstStyle>
           <a:p>
@@ -918,8 +1360,8 @@
         </p:nvSpPr>
         <p:spPr>
           <a:xfrm>
-            <a:off x="722313" y="2906713"/>
-            <a:ext cx="7772400" cy="1500187"/>
+            <a:off x="682561" y="2670543"/>
+            <a:ext cx="7344649" cy="1378297"/>
           </a:xfrm>
         </p:spPr>
         <p:txBody>
@@ -927,7 +1369,7 @@
           <a:lstStyle>
             <a:lvl1pPr marL="0" indent="0">
               <a:buNone/>
-              <a:defRPr sz="2000">
+              <a:defRPr sz="1900">
                 <a:solidFill>
                   <a:schemeClr val="tx1">
                     <a:tint val="75000"/>
@@ -935,9 +1377,9 @@
                 </a:solidFill>
               </a:defRPr>
             </a:lvl1pPr>
-            <a:lvl2pPr marL="457200" indent="0">
+            <a:lvl2pPr marL="426888" indent="0">
               <a:buNone/>
-              <a:defRPr sz="1800">
+              <a:defRPr sz="1700">
                 <a:solidFill>
                   <a:schemeClr val="tx1">
                     <a:tint val="75000"/>
@@ -945,9 +1387,9 @@
                 </a:solidFill>
               </a:defRPr>
             </a:lvl2pPr>
-            <a:lvl3pPr marL="914400" indent="0">
+            <a:lvl3pPr marL="853775" indent="0">
               <a:buNone/>
-              <a:defRPr sz="1600">
+              <a:defRPr sz="1500">
                 <a:solidFill>
                   <a:schemeClr val="tx1">
                     <a:tint val="75000"/>
@@ -955,9 +1397,9 @@
                 </a:solidFill>
               </a:defRPr>
             </a:lvl3pPr>
-            <a:lvl4pPr marL="1371600" indent="0">
+            <a:lvl4pPr marL="1280663" indent="0">
               <a:buNone/>
-              <a:defRPr sz="1400">
+              <a:defRPr sz="1300">
                 <a:solidFill>
                   <a:schemeClr val="tx1">
                     <a:tint val="75000"/>
@@ -965,9 +1407,9 @@
                 </a:solidFill>
               </a:defRPr>
             </a:lvl4pPr>
-            <a:lvl5pPr marL="1828800" indent="0">
+            <a:lvl5pPr marL="1707551" indent="0">
               <a:buNone/>
-              <a:defRPr sz="1400">
+              <a:defRPr sz="1300">
                 <a:solidFill>
                   <a:schemeClr val="tx1">
                     <a:tint val="75000"/>
@@ -975,9 +1417,9 @@
                 </a:solidFill>
               </a:defRPr>
             </a:lvl5pPr>
-            <a:lvl6pPr marL="2286000" indent="0">
+            <a:lvl6pPr marL="2134438" indent="0">
               <a:buNone/>
-              <a:defRPr sz="1400">
+              <a:defRPr sz="1300">
                 <a:solidFill>
                   <a:schemeClr val="tx1">
                     <a:tint val="75000"/>
@@ -985,9 +1427,9 @@
                 </a:solidFill>
               </a:defRPr>
             </a:lvl6pPr>
-            <a:lvl7pPr marL="2743200" indent="0">
+            <a:lvl7pPr marL="2561326" indent="0">
               <a:buNone/>
-              <a:defRPr sz="1400">
+              <a:defRPr sz="1300">
                 <a:solidFill>
                   <a:schemeClr val="tx1">
                     <a:tint val="75000"/>
@@ -995,9 +1437,9 @@
                 </a:solidFill>
               </a:defRPr>
             </a:lvl7pPr>
-            <a:lvl8pPr marL="3200400" indent="0">
+            <a:lvl8pPr marL="2988213" indent="0">
               <a:buNone/>
-              <a:defRPr sz="1400">
+              <a:defRPr sz="1300">
                 <a:solidFill>
                   <a:schemeClr val="tx1">
                     <a:tint val="75000"/>
@@ -1005,9 +1447,9 @@
                 </a:solidFill>
               </a:defRPr>
             </a:lvl8pPr>
-            <a:lvl9pPr marL="3657600" indent="0">
+            <a:lvl9pPr marL="3415101" indent="0">
               <a:buNone/>
-              <a:defRPr sz="1400">
+              <a:defRPr sz="1300">
                 <a:solidFill>
                   <a:schemeClr val="tx1">
                     <a:tint val="75000"/>
@@ -1043,7 +1485,7 @@
             <a:fld id="{1D8BD707-D9CF-40AE-B4C6-C98DA3205C09}" type="datetimeFigureOut">
               <a:rPr lang="en-US" smtClean="0"/>
               <a:pPr/>
-              <a:t>7/12/2012</a:t>
+              <a:t>12/18/2012</a:t>
             </a:fld>
             <a:endParaRPr lang="en-US"/>
           </a:p>
@@ -1152,39 +1594,39 @@
         </p:nvSpPr>
         <p:spPr>
           <a:xfrm>
-            <a:off x="457200" y="1600200"/>
-            <a:ext cx="4038600" cy="4525963"/>
+            <a:off x="432038" y="1470184"/>
+            <a:ext cx="3816337" cy="4158229"/>
           </a:xfrm>
         </p:spPr>
         <p:txBody>
           <a:bodyPr/>
           <a:lstStyle>
             <a:lvl1pPr>
-              <a:defRPr sz="2800"/>
+              <a:defRPr sz="2600"/>
             </a:lvl1pPr>
             <a:lvl2pPr>
-              <a:defRPr sz="2400"/>
+              <a:defRPr sz="2200"/>
             </a:lvl2pPr>
             <a:lvl3pPr>
-              <a:defRPr sz="2000"/>
+              <a:defRPr sz="1900"/>
             </a:lvl3pPr>
             <a:lvl4pPr>
-              <a:defRPr sz="1800"/>
+              <a:defRPr sz="1700"/>
             </a:lvl4pPr>
             <a:lvl5pPr>
-              <a:defRPr sz="1800"/>
+              <a:defRPr sz="1700"/>
             </a:lvl5pPr>
             <a:lvl6pPr>
-              <a:defRPr sz="1800"/>
+              <a:defRPr sz="1700"/>
             </a:lvl6pPr>
             <a:lvl7pPr>
-              <a:defRPr sz="1800"/>
+              <a:defRPr sz="1700"/>
             </a:lvl7pPr>
             <a:lvl8pPr>
-              <a:defRPr sz="1800"/>
+              <a:defRPr sz="1700"/>
             </a:lvl8pPr>
             <a:lvl9pPr>
-              <a:defRPr sz="1800"/>
+              <a:defRPr sz="1700"/>
             </a:lvl9pPr>
           </a:lstStyle>
           <a:p>
@@ -1237,39 +1679,39 @@
         </p:nvSpPr>
         <p:spPr>
           <a:xfrm>
-            <a:off x="4648200" y="1600200"/>
-            <a:ext cx="4038600" cy="4525963"/>
+            <a:off x="4392388" y="1470184"/>
+            <a:ext cx="3816337" cy="4158229"/>
           </a:xfrm>
         </p:spPr>
         <p:txBody>
           <a:bodyPr/>
           <a:lstStyle>
             <a:lvl1pPr>
-              <a:defRPr sz="2800"/>
+              <a:defRPr sz="2600"/>
             </a:lvl1pPr>
             <a:lvl2pPr>
-              <a:defRPr sz="2400"/>
+              <a:defRPr sz="2200"/>
             </a:lvl2pPr>
             <a:lvl3pPr>
-              <a:defRPr sz="2000"/>
+              <a:defRPr sz="1900"/>
             </a:lvl3pPr>
             <a:lvl4pPr>
-              <a:defRPr sz="1800"/>
+              <a:defRPr sz="1700"/>
             </a:lvl4pPr>
             <a:lvl5pPr>
-              <a:defRPr sz="1800"/>
+              <a:defRPr sz="1700"/>
             </a:lvl5pPr>
             <a:lvl6pPr>
-              <a:defRPr sz="1800"/>
+              <a:defRPr sz="1700"/>
             </a:lvl6pPr>
             <a:lvl7pPr>
-              <a:defRPr sz="1800"/>
+              <a:defRPr sz="1700"/>
             </a:lvl7pPr>
             <a:lvl8pPr>
-              <a:defRPr sz="1800"/>
+              <a:defRPr sz="1700"/>
             </a:lvl8pPr>
             <a:lvl9pPr>
-              <a:defRPr sz="1800"/>
+              <a:defRPr sz="1700"/>
             </a:lvl9pPr>
           </a:lstStyle>
           <a:p>
@@ -1328,7 +1770,7 @@
             <a:fld id="{1D8BD707-D9CF-40AE-B4C6-C98DA3205C09}" type="datetimeFigureOut">
               <a:rPr lang="en-US" smtClean="0"/>
               <a:pPr/>
-              <a:t>7/12/2012</a:t>
+              <a:t>12/18/2012</a:t>
             </a:fld>
             <a:endParaRPr lang="en-US"/>
           </a:p>
@@ -1441,8 +1883,8 @@
         </p:nvSpPr>
         <p:spPr>
           <a:xfrm>
-            <a:off x="457200" y="1535113"/>
-            <a:ext cx="4040188" cy="639762"/>
+            <a:off x="432038" y="1410385"/>
+            <a:ext cx="3817838" cy="587781"/>
           </a:xfrm>
         </p:spPr>
         <p:txBody>
@@ -1450,39 +1892,39 @@
           <a:lstStyle>
             <a:lvl1pPr marL="0" indent="0">
               <a:buNone/>
-              <a:defRPr sz="2400" b="1"/>
+              <a:defRPr sz="2200" b="1"/>
             </a:lvl1pPr>
-            <a:lvl2pPr marL="457200" indent="0">
+            <a:lvl2pPr marL="426888" indent="0">
               <a:buNone/>
-              <a:defRPr sz="2000" b="1"/>
+              <a:defRPr sz="1900" b="1"/>
             </a:lvl2pPr>
-            <a:lvl3pPr marL="914400" indent="0">
+            <a:lvl3pPr marL="853775" indent="0">
               <a:buNone/>
-              <a:defRPr sz="1800" b="1"/>
+              <a:defRPr sz="1700" b="1"/>
             </a:lvl3pPr>
-            <a:lvl4pPr marL="1371600" indent="0">
+            <a:lvl4pPr marL="1280663" indent="0">
               <a:buNone/>
-              <a:defRPr sz="1600" b="1"/>
+              <a:defRPr sz="1500" b="1"/>
             </a:lvl4pPr>
-            <a:lvl5pPr marL="1828800" indent="0">
+            <a:lvl5pPr marL="1707551" indent="0">
               <a:buNone/>
-              <a:defRPr sz="1600" b="1"/>
+              <a:defRPr sz="1500" b="1"/>
             </a:lvl5pPr>
-            <a:lvl6pPr marL="2286000" indent="0">
+            <a:lvl6pPr marL="2134438" indent="0">
               <a:buNone/>
-              <a:defRPr sz="1600" b="1"/>
+              <a:defRPr sz="1500" b="1"/>
             </a:lvl6pPr>
-            <a:lvl7pPr marL="2743200" indent="0">
+            <a:lvl7pPr marL="2561326" indent="0">
               <a:buNone/>
-              <a:defRPr sz="1600" b="1"/>
+              <a:defRPr sz="1500" b="1"/>
             </a:lvl7pPr>
-            <a:lvl8pPr marL="3200400" indent="0">
+            <a:lvl8pPr marL="2988213" indent="0">
               <a:buNone/>
-              <a:defRPr sz="1600" b="1"/>
+              <a:defRPr sz="1500" b="1"/>
             </a:lvl8pPr>
-            <a:lvl9pPr marL="3657600" indent="0">
+            <a:lvl9pPr marL="3415101" indent="0">
               <a:buNone/>
-              <a:defRPr sz="1600" b="1"/>
+              <a:defRPr sz="1500" b="1"/>
             </a:lvl9pPr>
           </a:lstStyle>
           <a:p>
@@ -1506,39 +1948,39 @@
         </p:nvSpPr>
         <p:spPr>
           <a:xfrm>
-            <a:off x="457200" y="2174875"/>
-            <a:ext cx="4040188" cy="3951288"/>
+            <a:off x="432038" y="1998167"/>
+            <a:ext cx="3817838" cy="3630246"/>
           </a:xfrm>
         </p:spPr>
         <p:txBody>
           <a:bodyPr/>
           <a:lstStyle>
             <a:lvl1pPr>
-              <a:defRPr sz="2400"/>
+              <a:defRPr sz="2200"/>
             </a:lvl1pPr>
             <a:lvl2pPr>
-              <a:defRPr sz="2000"/>
+              <a:defRPr sz="1900"/>
             </a:lvl2pPr>
             <a:lvl3pPr>
-              <a:defRPr sz="1800"/>
+              <a:defRPr sz="1700"/>
             </a:lvl3pPr>
             <a:lvl4pPr>
-              <a:defRPr sz="1600"/>
+              <a:defRPr sz="1500"/>
             </a:lvl4pPr>
             <a:lvl5pPr>
-              <a:defRPr sz="1600"/>
+              <a:defRPr sz="1500"/>
             </a:lvl5pPr>
             <a:lvl6pPr>
-              <a:defRPr sz="1600"/>
+              <a:defRPr sz="1500"/>
             </a:lvl6pPr>
             <a:lvl7pPr>
-              <a:defRPr sz="1600"/>
+              <a:defRPr sz="1500"/>
             </a:lvl7pPr>
             <a:lvl8pPr>
-              <a:defRPr sz="1600"/>
+              <a:defRPr sz="1500"/>
             </a:lvl8pPr>
             <a:lvl9pPr>
-              <a:defRPr sz="1600"/>
+              <a:defRPr sz="1500"/>
             </a:lvl9pPr>
           </a:lstStyle>
           <a:p>
@@ -1591,8 +2033,8 @@
         </p:nvSpPr>
         <p:spPr>
           <a:xfrm>
-            <a:off x="4645025" y="1535113"/>
-            <a:ext cx="4041775" cy="639762"/>
+            <a:off x="4389388" y="1410385"/>
+            <a:ext cx="3819337" cy="587781"/>
           </a:xfrm>
         </p:spPr>
         <p:txBody>
@@ -1600,39 +2042,39 @@
           <a:lstStyle>
             <a:lvl1pPr marL="0" indent="0">
               <a:buNone/>
-              <a:defRPr sz="2400" b="1"/>
+              <a:defRPr sz="2200" b="1"/>
             </a:lvl1pPr>
-            <a:lvl2pPr marL="457200" indent="0">
+            <a:lvl2pPr marL="426888" indent="0">
               <a:buNone/>
-              <a:defRPr sz="2000" b="1"/>
+              <a:defRPr sz="1900" b="1"/>
             </a:lvl2pPr>
-            <a:lvl3pPr marL="914400" indent="0">
+            <a:lvl3pPr marL="853775" indent="0">
               <a:buNone/>
-              <a:defRPr sz="1800" b="1"/>
+              <a:defRPr sz="1700" b="1"/>
             </a:lvl3pPr>
-            <a:lvl4pPr marL="1371600" indent="0">
+            <a:lvl4pPr marL="1280663" indent="0">
               <a:buNone/>
-              <a:defRPr sz="1600" b="1"/>
+              <a:defRPr sz="1500" b="1"/>
             </a:lvl4pPr>
-            <a:lvl5pPr marL="1828800" indent="0">
+            <a:lvl5pPr marL="1707551" indent="0">
               <a:buNone/>
-              <a:defRPr sz="1600" b="1"/>
+              <a:defRPr sz="1500" b="1"/>
             </a:lvl5pPr>
-            <a:lvl6pPr marL="2286000" indent="0">
+            <a:lvl6pPr marL="2134438" indent="0">
               <a:buNone/>
-              <a:defRPr sz="1600" b="1"/>
+              <a:defRPr sz="1500" b="1"/>
             </a:lvl6pPr>
-            <a:lvl7pPr marL="2743200" indent="0">
+            <a:lvl7pPr marL="2561326" indent="0">
               <a:buNone/>
-              <a:defRPr sz="1600" b="1"/>
+              <a:defRPr sz="1500" b="1"/>
             </a:lvl7pPr>
-            <a:lvl8pPr marL="3200400" indent="0">
+            <a:lvl8pPr marL="2988213" indent="0">
               <a:buNone/>
-              <a:defRPr sz="1600" b="1"/>
+              <a:defRPr sz="1500" b="1"/>
             </a:lvl8pPr>
-            <a:lvl9pPr marL="3657600" indent="0">
+            <a:lvl9pPr marL="3415101" indent="0">
               <a:buNone/>
-              <a:defRPr sz="1600" b="1"/>
+              <a:defRPr sz="1500" b="1"/>
             </a:lvl9pPr>
           </a:lstStyle>
           <a:p>
@@ -1656,39 +2098,39 @@
         </p:nvSpPr>
         <p:spPr>
           <a:xfrm>
-            <a:off x="4645025" y="2174875"/>
-            <a:ext cx="4041775" cy="3951288"/>
+            <a:off x="4389388" y="1998167"/>
+            <a:ext cx="3819337" cy="3630246"/>
           </a:xfrm>
         </p:spPr>
         <p:txBody>
           <a:bodyPr/>
           <a:lstStyle>
             <a:lvl1pPr>
-              <a:defRPr sz="2400"/>
+              <a:defRPr sz="2200"/>
             </a:lvl1pPr>
             <a:lvl2pPr>
-              <a:defRPr sz="2000"/>
+              <a:defRPr sz="1900"/>
             </a:lvl2pPr>
             <a:lvl3pPr>
-              <a:defRPr sz="1800"/>
+              <a:defRPr sz="1700"/>
             </a:lvl3pPr>
             <a:lvl4pPr>
-              <a:defRPr sz="1600"/>
+              <a:defRPr sz="1500"/>
             </a:lvl4pPr>
             <a:lvl5pPr>
-              <a:defRPr sz="1600"/>
+              <a:defRPr sz="1500"/>
             </a:lvl5pPr>
             <a:lvl6pPr>
-              <a:defRPr sz="1600"/>
+              <a:defRPr sz="1500"/>
             </a:lvl6pPr>
             <a:lvl7pPr>
-              <a:defRPr sz="1600"/>
+              <a:defRPr sz="1500"/>
             </a:lvl7pPr>
             <a:lvl8pPr>
-              <a:defRPr sz="1600"/>
+              <a:defRPr sz="1500"/>
             </a:lvl8pPr>
             <a:lvl9pPr>
-              <a:defRPr sz="1600"/>
+              <a:defRPr sz="1500"/>
             </a:lvl9pPr>
           </a:lstStyle>
           <a:p>
@@ -1747,7 +2189,7 @@
             <a:fld id="{1D8BD707-D9CF-40AE-B4C6-C98DA3205C09}" type="datetimeFigureOut">
               <a:rPr lang="en-US" smtClean="0"/>
               <a:pPr/>
-              <a:t>7/12/2012</a:t>
+              <a:t>12/18/2012</a:t>
             </a:fld>
             <a:endParaRPr lang="en-US"/>
           </a:p>
@@ -1862,7 +2304,7 @@
             <a:fld id="{1D8BD707-D9CF-40AE-B4C6-C98DA3205C09}" type="datetimeFigureOut">
               <a:rPr lang="en-US" smtClean="0"/>
               <a:pPr/>
-              <a:t>7/12/2012</a:t>
+              <a:t>12/18/2012</a:t>
             </a:fld>
             <a:endParaRPr lang="en-US"/>
           </a:p>
@@ -1954,7 +2396,7 @@
             <a:fld id="{1D8BD707-D9CF-40AE-B4C6-C98DA3205C09}" type="datetimeFigureOut">
               <a:rPr lang="en-US" smtClean="0"/>
               <a:pPr/>
-              <a:t>7/12/2012</a:t>
+              <a:t>12/18/2012</a:t>
             </a:fld>
             <a:endParaRPr lang="en-US"/>
           </a:p>
@@ -2040,15 +2482,15 @@
         </p:nvSpPr>
         <p:spPr>
           <a:xfrm>
-            <a:off x="457200" y="273050"/>
-            <a:ext cx="3008313" cy="1162050"/>
+            <a:off x="432039" y="250864"/>
+            <a:ext cx="2842751" cy="1067634"/>
           </a:xfrm>
         </p:spPr>
         <p:txBody>
           <a:bodyPr anchor="b"/>
           <a:lstStyle>
             <a:lvl1pPr algn="l">
-              <a:defRPr sz="2000" b="1"/>
+              <a:defRPr sz="1900" b="1"/>
             </a:lvl1pPr>
           </a:lstStyle>
           <a:p>
@@ -2072,39 +2514,39 @@
         </p:nvSpPr>
         <p:spPr>
           <a:xfrm>
-            <a:off x="3575050" y="273050"/>
-            <a:ext cx="5111750" cy="5853113"/>
+            <a:off x="3378298" y="250865"/>
+            <a:ext cx="4830427" cy="5377548"/>
           </a:xfrm>
         </p:spPr>
         <p:txBody>
           <a:bodyPr/>
           <a:lstStyle>
             <a:lvl1pPr>
-              <a:defRPr sz="3200"/>
+              <a:defRPr sz="3000"/>
             </a:lvl1pPr>
             <a:lvl2pPr>
-              <a:defRPr sz="2800"/>
+              <a:defRPr sz="2600"/>
             </a:lvl2pPr>
             <a:lvl3pPr>
-              <a:defRPr sz="2400"/>
+              <a:defRPr sz="2200"/>
             </a:lvl3pPr>
             <a:lvl4pPr>
-              <a:defRPr sz="2000"/>
+              <a:defRPr sz="1900"/>
             </a:lvl4pPr>
             <a:lvl5pPr>
-              <a:defRPr sz="2000"/>
+              <a:defRPr sz="1900"/>
             </a:lvl5pPr>
             <a:lvl6pPr>
-              <a:defRPr sz="2000"/>
+              <a:defRPr sz="1900"/>
             </a:lvl6pPr>
             <a:lvl7pPr>
-              <a:defRPr sz="2000"/>
+              <a:defRPr sz="1900"/>
             </a:lvl7pPr>
             <a:lvl8pPr>
-              <a:defRPr sz="2000"/>
+              <a:defRPr sz="1900"/>
             </a:lvl8pPr>
             <a:lvl9pPr>
-              <a:defRPr sz="2000"/>
+              <a:defRPr sz="1900"/>
             </a:lvl9pPr>
           </a:lstStyle>
           <a:p>
@@ -2157,8 +2599,8 @@
         </p:nvSpPr>
         <p:spPr>
           <a:xfrm>
-            <a:off x="457200" y="1435100"/>
-            <a:ext cx="3008313" cy="4691063"/>
+            <a:off x="432039" y="1318499"/>
+            <a:ext cx="2842751" cy="4309914"/>
           </a:xfrm>
         </p:spPr>
         <p:txBody>
@@ -2166,39 +2608,39 @@
           <a:lstStyle>
             <a:lvl1pPr marL="0" indent="0">
               <a:buNone/>
-              <a:defRPr sz="1400"/>
+              <a:defRPr sz="1300"/>
             </a:lvl1pPr>
-            <a:lvl2pPr marL="457200" indent="0">
+            <a:lvl2pPr marL="426888" indent="0">
               <a:buNone/>
-              <a:defRPr sz="1200"/>
+              <a:defRPr sz="1100"/>
             </a:lvl2pPr>
-            <a:lvl3pPr marL="914400" indent="0">
-              <a:buNone/>
-              <a:defRPr sz="1000"/>
-            </a:lvl3pPr>
-            <a:lvl4pPr marL="1371600" indent="0">
+            <a:lvl3pPr marL="853775" indent="0">
               <a:buNone/>
               <a:defRPr sz="900"/>
+            </a:lvl3pPr>
+            <a:lvl4pPr marL="1280663" indent="0">
+              <a:buNone/>
+              <a:defRPr sz="800"/>
             </a:lvl4pPr>
-            <a:lvl5pPr marL="1828800" indent="0">
+            <a:lvl5pPr marL="1707551" indent="0">
               <a:buNone/>
-              <a:defRPr sz="900"/>
+              <a:defRPr sz="800"/>
             </a:lvl5pPr>
-            <a:lvl6pPr marL="2286000" indent="0">
+            <a:lvl6pPr marL="2134438" indent="0">
               <a:buNone/>
-              <a:defRPr sz="900"/>
+              <a:defRPr sz="800"/>
             </a:lvl6pPr>
-            <a:lvl7pPr marL="2743200" indent="0">
+            <a:lvl7pPr marL="2561326" indent="0">
               <a:buNone/>
-              <a:defRPr sz="900"/>
+              <a:defRPr sz="800"/>
             </a:lvl7pPr>
-            <a:lvl8pPr marL="3200400" indent="0">
+            <a:lvl8pPr marL="2988213" indent="0">
               <a:buNone/>
-              <a:defRPr sz="900"/>
+              <a:defRPr sz="800"/>
             </a:lvl8pPr>
-            <a:lvl9pPr marL="3657600" indent="0">
+            <a:lvl9pPr marL="3415101" indent="0">
               <a:buNone/>
-              <a:defRPr sz="900"/>
+              <a:defRPr sz="800"/>
             </a:lvl9pPr>
           </a:lstStyle>
           <a:p>
@@ -2228,7 +2670,7 @@
             <a:fld id="{1D8BD707-D9CF-40AE-B4C6-C98DA3205C09}" type="datetimeFigureOut">
               <a:rPr lang="en-US" smtClean="0"/>
               <a:pPr/>
-              <a:t>7/12/2012</a:t>
+              <a:t>12/18/2012</a:t>
             </a:fld>
             <a:endParaRPr lang="en-US"/>
           </a:p>
@@ -2314,15 +2756,15 @@
         </p:nvSpPr>
         <p:spPr>
           <a:xfrm>
-            <a:off x="1792288" y="4800600"/>
-            <a:ext cx="5486400" cy="566738"/>
+            <a:off x="1693650" y="4410551"/>
+            <a:ext cx="5184458" cy="520691"/>
           </a:xfrm>
         </p:spPr>
         <p:txBody>
           <a:bodyPr anchor="b"/>
           <a:lstStyle>
             <a:lvl1pPr algn="l">
-              <a:defRPr sz="2000" b="1"/>
+              <a:defRPr sz="1900" b="1"/>
             </a:lvl1pPr>
           </a:lstStyle>
           <a:p>
@@ -2346,8 +2788,8 @@
         </p:nvSpPr>
         <p:spPr>
           <a:xfrm>
-            <a:off x="1792288" y="612775"/>
-            <a:ext cx="5486400" cy="4114800"/>
+            <a:off x="1693650" y="562987"/>
+            <a:ext cx="5184458" cy="3780473"/>
           </a:xfrm>
         </p:spPr>
         <p:txBody>
@@ -2355,39 +2797,39 @@
           <a:lstStyle>
             <a:lvl1pPr marL="0" indent="0">
               <a:buNone/>
-              <a:defRPr sz="3200"/>
+              <a:defRPr sz="3000"/>
             </a:lvl1pPr>
-            <a:lvl2pPr marL="457200" indent="0">
+            <a:lvl2pPr marL="426888" indent="0">
               <a:buNone/>
-              <a:defRPr sz="2800"/>
+              <a:defRPr sz="2600"/>
             </a:lvl2pPr>
-            <a:lvl3pPr marL="914400" indent="0">
+            <a:lvl3pPr marL="853775" indent="0">
               <a:buNone/>
-              <a:defRPr sz="2400"/>
+              <a:defRPr sz="2200"/>
             </a:lvl3pPr>
-            <a:lvl4pPr marL="1371600" indent="0">
+            <a:lvl4pPr marL="1280663" indent="0">
               <a:buNone/>
-              <a:defRPr sz="2000"/>
+              <a:defRPr sz="1900"/>
             </a:lvl4pPr>
-            <a:lvl5pPr marL="1828800" indent="0">
+            <a:lvl5pPr marL="1707551" indent="0">
               <a:buNone/>
-              <a:defRPr sz="2000"/>
+              <a:defRPr sz="1900"/>
             </a:lvl5pPr>
-            <a:lvl6pPr marL="2286000" indent="0">
+            <a:lvl6pPr marL="2134438" indent="0">
               <a:buNone/>
-              <a:defRPr sz="2000"/>
+              <a:defRPr sz="1900"/>
             </a:lvl6pPr>
-            <a:lvl7pPr marL="2743200" indent="0">
+            <a:lvl7pPr marL="2561326" indent="0">
               <a:buNone/>
-              <a:defRPr sz="2000"/>
+              <a:defRPr sz="1900"/>
             </a:lvl7pPr>
-            <a:lvl8pPr marL="3200400" indent="0">
+            <a:lvl8pPr marL="2988213" indent="0">
               <a:buNone/>
-              <a:defRPr sz="2000"/>
+              <a:defRPr sz="1900"/>
             </a:lvl8pPr>
-            <a:lvl9pPr marL="3657600" indent="0">
+            <a:lvl9pPr marL="3415101" indent="0">
               <a:buNone/>
-              <a:defRPr sz="2000"/>
+              <a:defRPr sz="1900"/>
             </a:lvl9pPr>
           </a:lstStyle>
           <a:p>
@@ -2407,8 +2849,8 @@
         </p:nvSpPr>
         <p:spPr>
           <a:xfrm>
-            <a:off x="1792288" y="5367338"/>
-            <a:ext cx="5486400" cy="804862"/>
+            <a:off x="1693650" y="4931242"/>
+            <a:ext cx="5184458" cy="739467"/>
           </a:xfrm>
         </p:spPr>
         <p:txBody>
@@ -2416,39 +2858,39 @@
           <a:lstStyle>
             <a:lvl1pPr marL="0" indent="0">
               <a:buNone/>
-              <a:defRPr sz="1400"/>
+              <a:defRPr sz="1300"/>
             </a:lvl1pPr>
-            <a:lvl2pPr marL="457200" indent="0">
+            <a:lvl2pPr marL="426888" indent="0">
               <a:buNone/>
-              <a:defRPr sz="1200"/>
+              <a:defRPr sz="1100"/>
             </a:lvl2pPr>
-            <a:lvl3pPr marL="914400" indent="0">
-              <a:buNone/>
-              <a:defRPr sz="1000"/>
-            </a:lvl3pPr>
-            <a:lvl4pPr marL="1371600" indent="0">
+            <a:lvl3pPr marL="853775" indent="0">
               <a:buNone/>
               <a:defRPr sz="900"/>
+            </a:lvl3pPr>
+            <a:lvl4pPr marL="1280663" indent="0">
+              <a:buNone/>
+              <a:defRPr sz="800"/>
             </a:lvl4pPr>
-            <a:lvl5pPr marL="1828800" indent="0">
+            <a:lvl5pPr marL="1707551" indent="0">
               <a:buNone/>
-              <a:defRPr sz="900"/>
+              <a:defRPr sz="800"/>
             </a:lvl5pPr>
-            <a:lvl6pPr marL="2286000" indent="0">
+            <a:lvl6pPr marL="2134438" indent="0">
               <a:buNone/>
-              <a:defRPr sz="900"/>
+              <a:defRPr sz="800"/>
             </a:lvl6pPr>
-            <a:lvl7pPr marL="2743200" indent="0">
+            <a:lvl7pPr marL="2561326" indent="0">
               <a:buNone/>
-              <a:defRPr sz="900"/>
+              <a:defRPr sz="800"/>
             </a:lvl7pPr>
-            <a:lvl8pPr marL="3200400" indent="0">
+            <a:lvl8pPr marL="2988213" indent="0">
               <a:buNone/>
-              <a:defRPr sz="900"/>
+              <a:defRPr sz="800"/>
             </a:lvl8pPr>
-            <a:lvl9pPr marL="3657600" indent="0">
+            <a:lvl9pPr marL="3415101" indent="0">
               <a:buNone/>
-              <a:defRPr sz="900"/>
+              <a:defRPr sz="800"/>
             </a:lvl9pPr>
           </a:lstStyle>
           <a:p>
@@ -2478,7 +2920,7 @@
             <a:fld id="{1D8BD707-D9CF-40AE-B4C6-C98DA3205C09}" type="datetimeFigureOut">
               <a:rPr lang="en-US" smtClean="0"/>
               <a:pPr/>
-              <a:t>7/12/2012</a:t>
+              <a:t>12/18/2012</a:t>
             </a:fld>
             <a:endParaRPr lang="en-US"/>
           </a:p>
@@ -2569,15 +3011,15 @@
         </p:nvSpPr>
         <p:spPr>
           <a:xfrm>
-            <a:off x="457200" y="274638"/>
-            <a:ext cx="8229600" cy="1143000"/>
+            <a:off x="432038" y="252324"/>
+            <a:ext cx="7776687" cy="1050131"/>
           </a:xfrm>
           <a:prstGeom prst="rect">
             <a:avLst/>
           </a:prstGeom>
         </p:spPr>
         <p:txBody>
-          <a:bodyPr vert="horz" lIns="91440" tIns="45720" rIns="91440" bIns="45720" rtlCol="0" anchor="ctr">
+          <a:bodyPr vert="horz" lIns="85378" tIns="42689" rIns="85378" bIns="42689" rtlCol="0" anchor="ctr">
             <a:normAutofit/>
           </a:bodyPr>
           <a:lstStyle/>
@@ -2602,15 +3044,15 @@
         </p:nvSpPr>
         <p:spPr>
           <a:xfrm>
-            <a:off x="457200" y="1600200"/>
-            <a:ext cx="8229600" cy="4525963"/>
+            <a:off x="432038" y="1470184"/>
+            <a:ext cx="7776687" cy="4158229"/>
           </a:xfrm>
           <a:prstGeom prst="rect">
             <a:avLst/>
           </a:prstGeom>
         </p:spPr>
         <p:txBody>
-          <a:bodyPr vert="horz" lIns="91440" tIns="45720" rIns="91440" bIns="45720" rtlCol="0">
+          <a:bodyPr vert="horz" lIns="85378" tIns="42689" rIns="85378" bIns="42689" rtlCol="0">
             <a:normAutofit/>
           </a:bodyPr>
           <a:lstStyle/>
@@ -2664,18 +3106,18 @@
         </p:nvSpPr>
         <p:spPr>
           <a:xfrm>
-            <a:off x="457200" y="6356350"/>
-            <a:ext cx="2133600" cy="365125"/>
+            <a:off x="432038" y="5839897"/>
+            <a:ext cx="2016178" cy="335459"/>
           </a:xfrm>
           <a:prstGeom prst="rect">
             <a:avLst/>
           </a:prstGeom>
         </p:spPr>
         <p:txBody>
-          <a:bodyPr vert="horz" lIns="91440" tIns="45720" rIns="91440" bIns="45720" rtlCol="0" anchor="ctr"/>
+          <a:bodyPr vert="horz" lIns="85378" tIns="42689" rIns="85378" bIns="42689" rtlCol="0" anchor="ctr"/>
           <a:lstStyle>
             <a:lvl1pPr algn="l">
-              <a:defRPr sz="1200">
+              <a:defRPr sz="1100">
                 <a:solidFill>
                   <a:schemeClr val="tx1">
                     <a:tint val="75000"/>
@@ -2688,7 +3130,7 @@
             <a:fld id="{1D8BD707-D9CF-40AE-B4C6-C98DA3205C09}" type="datetimeFigureOut">
               <a:rPr lang="en-US" smtClean="0"/>
               <a:pPr/>
-              <a:t>7/12/2012</a:t>
+              <a:t>12/18/2012</a:t>
             </a:fld>
             <a:endParaRPr lang="en-US"/>
           </a:p>
@@ -2706,18 +3148,18 @@
         </p:nvSpPr>
         <p:spPr>
           <a:xfrm>
-            <a:off x="3124200" y="6356350"/>
-            <a:ext cx="2895600" cy="365125"/>
+            <a:off x="2952261" y="5839897"/>
+            <a:ext cx="2736242" cy="335459"/>
           </a:xfrm>
           <a:prstGeom prst="rect">
             <a:avLst/>
           </a:prstGeom>
         </p:spPr>
         <p:txBody>
-          <a:bodyPr vert="horz" lIns="91440" tIns="45720" rIns="91440" bIns="45720" rtlCol="0" anchor="ctr"/>
+          <a:bodyPr vert="horz" lIns="85378" tIns="42689" rIns="85378" bIns="42689" rtlCol="0" anchor="ctr"/>
           <a:lstStyle>
             <a:lvl1pPr algn="ctr">
-              <a:defRPr sz="1200">
+              <a:defRPr sz="1100">
                 <a:solidFill>
                   <a:schemeClr val="tx1">
                     <a:tint val="75000"/>
@@ -2743,18 +3185,18 @@
         </p:nvSpPr>
         <p:spPr>
           <a:xfrm>
-            <a:off x="6553200" y="6356350"/>
-            <a:ext cx="2133600" cy="365125"/>
+            <a:off x="6192547" y="5839897"/>
+            <a:ext cx="2016178" cy="335459"/>
           </a:xfrm>
           <a:prstGeom prst="rect">
             <a:avLst/>
           </a:prstGeom>
         </p:spPr>
         <p:txBody>
-          <a:bodyPr vert="horz" lIns="91440" tIns="45720" rIns="91440" bIns="45720" rtlCol="0" anchor="ctr"/>
+          <a:bodyPr vert="horz" lIns="85378" tIns="42689" rIns="85378" bIns="42689" rtlCol="0" anchor="ctr"/>
           <a:lstStyle>
             <a:lvl1pPr algn="r">
-              <a:defRPr sz="1200">
+              <a:defRPr sz="1100">
                 <a:solidFill>
                   <a:schemeClr val="tx1">
                     <a:tint val="75000"/>
@@ -2791,12 +3233,12 @@
   </p:sldLayoutIdLst>
   <p:txStyles>
     <p:titleStyle>
-      <a:lvl1pPr algn="ctr" defTabSz="914400" rtl="0" eaLnBrk="1" latinLnBrk="0" hangingPunct="1">
+      <a:lvl1pPr algn="ctr" defTabSz="853775" rtl="0" eaLnBrk="1" latinLnBrk="0" hangingPunct="1">
         <a:spcBef>
           <a:spcPct val="0"/>
         </a:spcBef>
         <a:buNone/>
-        <a:defRPr sz="4400" kern="1200">
+        <a:defRPr sz="4100" kern="1200">
           <a:solidFill>
             <a:schemeClr val="tx1"/>
           </a:solidFill>
@@ -2807,13 +3249,13 @@
       </a:lvl1pPr>
     </p:titleStyle>
     <p:bodyStyle>
-      <a:lvl1pPr marL="342900" indent="-342900" algn="l" defTabSz="914400" rtl="0" eaLnBrk="1" latinLnBrk="0" hangingPunct="1">
+      <a:lvl1pPr marL="320166" indent="-320166" algn="l" defTabSz="853775" rtl="0" eaLnBrk="1" latinLnBrk="0" hangingPunct="1">
         <a:spcBef>
           <a:spcPct val="20000"/>
         </a:spcBef>
         <a:buFont typeface="Arial" pitchFamily="34" charset="0"/>
         <a:buChar char="•"/>
-        <a:defRPr sz="3200" kern="1200">
+        <a:defRPr sz="3000" kern="1200">
           <a:solidFill>
             <a:schemeClr val="tx1"/>
           </a:solidFill>
@@ -2822,13 +3264,13 @@
           <a:cs typeface="+mn-cs"/>
         </a:defRPr>
       </a:lvl1pPr>
-      <a:lvl2pPr marL="742950" indent="-285750" algn="l" defTabSz="914400" rtl="0" eaLnBrk="1" latinLnBrk="0" hangingPunct="1">
+      <a:lvl2pPr marL="693692" indent="-266805" algn="l" defTabSz="853775" rtl="0" eaLnBrk="1" latinLnBrk="0" hangingPunct="1">
         <a:spcBef>
           <a:spcPct val="20000"/>
         </a:spcBef>
         <a:buFont typeface="Arial" pitchFamily="34" charset="0"/>
         <a:buChar char="–"/>
-        <a:defRPr sz="2800" kern="1200">
+        <a:defRPr sz="2600" kern="1200">
           <a:solidFill>
             <a:schemeClr val="tx1"/>
           </a:solidFill>
@@ -2837,13 +3279,13 @@
           <a:cs typeface="+mn-cs"/>
         </a:defRPr>
       </a:lvl2pPr>
-      <a:lvl3pPr marL="1143000" indent="-228600" algn="l" defTabSz="914400" rtl="0" eaLnBrk="1" latinLnBrk="0" hangingPunct="1">
+      <a:lvl3pPr marL="1067219" indent="-213444" algn="l" defTabSz="853775" rtl="0" eaLnBrk="1" latinLnBrk="0" hangingPunct="1">
         <a:spcBef>
           <a:spcPct val="20000"/>
         </a:spcBef>
         <a:buFont typeface="Arial" pitchFamily="34" charset="0"/>
         <a:buChar char="•"/>
-        <a:defRPr sz="2400" kern="1200">
+        <a:defRPr sz="2200" kern="1200">
           <a:solidFill>
             <a:schemeClr val="tx1"/>
           </a:solidFill>
@@ -2852,13 +3294,13 @@
           <a:cs typeface="+mn-cs"/>
         </a:defRPr>
       </a:lvl3pPr>
-      <a:lvl4pPr marL="1600200" indent="-228600" algn="l" defTabSz="914400" rtl="0" eaLnBrk="1" latinLnBrk="0" hangingPunct="1">
+      <a:lvl4pPr marL="1494107" indent="-213444" algn="l" defTabSz="853775" rtl="0" eaLnBrk="1" latinLnBrk="0" hangingPunct="1">
         <a:spcBef>
           <a:spcPct val="20000"/>
         </a:spcBef>
         <a:buFont typeface="Arial" pitchFamily="34" charset="0"/>
         <a:buChar char="–"/>
-        <a:defRPr sz="2000" kern="1200">
+        <a:defRPr sz="1900" kern="1200">
           <a:solidFill>
             <a:schemeClr val="tx1"/>
           </a:solidFill>
@@ -2867,13 +3309,13 @@
           <a:cs typeface="+mn-cs"/>
         </a:defRPr>
       </a:lvl4pPr>
-      <a:lvl5pPr marL="2057400" indent="-228600" algn="l" defTabSz="914400" rtl="0" eaLnBrk="1" latinLnBrk="0" hangingPunct="1">
+      <a:lvl5pPr marL="1920994" indent="-213444" algn="l" defTabSz="853775" rtl="0" eaLnBrk="1" latinLnBrk="0" hangingPunct="1">
         <a:spcBef>
           <a:spcPct val="20000"/>
         </a:spcBef>
         <a:buFont typeface="Arial" pitchFamily="34" charset="0"/>
         <a:buChar char="»"/>
-        <a:defRPr sz="2000" kern="1200">
+        <a:defRPr sz="1900" kern="1200">
           <a:solidFill>
             <a:schemeClr val="tx1"/>
           </a:solidFill>
@@ -2882,13 +3324,13 @@
           <a:cs typeface="+mn-cs"/>
         </a:defRPr>
       </a:lvl5pPr>
-      <a:lvl6pPr marL="2514600" indent="-228600" algn="l" defTabSz="914400" rtl="0" eaLnBrk="1" latinLnBrk="0" hangingPunct="1">
+      <a:lvl6pPr marL="2347882" indent="-213444" algn="l" defTabSz="853775" rtl="0" eaLnBrk="1" latinLnBrk="0" hangingPunct="1">
         <a:spcBef>
           <a:spcPct val="20000"/>
         </a:spcBef>
         <a:buFont typeface="Arial" pitchFamily="34" charset="0"/>
         <a:buChar char="•"/>
-        <a:defRPr sz="2000" kern="1200">
+        <a:defRPr sz="1900" kern="1200">
           <a:solidFill>
             <a:schemeClr val="tx1"/>
           </a:solidFill>
@@ -2897,13 +3339,13 @@
           <a:cs typeface="+mn-cs"/>
         </a:defRPr>
       </a:lvl6pPr>
-      <a:lvl7pPr marL="2971800" indent="-228600" algn="l" defTabSz="914400" rtl="0" eaLnBrk="1" latinLnBrk="0" hangingPunct="1">
+      <a:lvl7pPr marL="2774770" indent="-213444" algn="l" defTabSz="853775" rtl="0" eaLnBrk="1" latinLnBrk="0" hangingPunct="1">
         <a:spcBef>
           <a:spcPct val="20000"/>
         </a:spcBef>
         <a:buFont typeface="Arial" pitchFamily="34" charset="0"/>
         <a:buChar char="•"/>
-        <a:defRPr sz="2000" kern="1200">
+        <a:defRPr sz="1900" kern="1200">
           <a:solidFill>
             <a:schemeClr val="tx1"/>
           </a:solidFill>
@@ -2912,13 +3354,13 @@
           <a:cs typeface="+mn-cs"/>
         </a:defRPr>
       </a:lvl7pPr>
-      <a:lvl8pPr marL="3429000" indent="-228600" algn="l" defTabSz="914400" rtl="0" eaLnBrk="1" latinLnBrk="0" hangingPunct="1">
+      <a:lvl8pPr marL="3201657" indent="-213444" algn="l" defTabSz="853775" rtl="0" eaLnBrk="1" latinLnBrk="0" hangingPunct="1">
         <a:spcBef>
           <a:spcPct val="20000"/>
         </a:spcBef>
         <a:buFont typeface="Arial" pitchFamily="34" charset="0"/>
         <a:buChar char="•"/>
-        <a:defRPr sz="2000" kern="1200">
+        <a:defRPr sz="1900" kern="1200">
           <a:solidFill>
             <a:schemeClr val="tx1"/>
           </a:solidFill>
@@ -2927,13 +3369,13 @@
           <a:cs typeface="+mn-cs"/>
         </a:defRPr>
       </a:lvl8pPr>
-      <a:lvl9pPr marL="3886200" indent="-228600" algn="l" defTabSz="914400" rtl="0" eaLnBrk="1" latinLnBrk="0" hangingPunct="1">
+      <a:lvl9pPr marL="3628545" indent="-213444" algn="l" defTabSz="853775" rtl="0" eaLnBrk="1" latinLnBrk="0" hangingPunct="1">
         <a:spcBef>
           <a:spcPct val="20000"/>
         </a:spcBef>
         <a:buFont typeface="Arial" pitchFamily="34" charset="0"/>
         <a:buChar char="•"/>
-        <a:defRPr sz="2000" kern="1200">
+        <a:defRPr sz="1900" kern="1200">
           <a:solidFill>
             <a:schemeClr val="tx1"/>
           </a:solidFill>
@@ -2947,8 +3389,8 @@
       <a:defPPr>
         <a:defRPr lang="en-US"/>
       </a:defPPr>
-      <a:lvl1pPr marL="0" algn="l" defTabSz="914400" rtl="0" eaLnBrk="1" latinLnBrk="0" hangingPunct="1">
-        <a:defRPr sz="1800" kern="1200">
+      <a:lvl1pPr marL="0" algn="l" defTabSz="853775" rtl="0" eaLnBrk="1" latinLnBrk="0" hangingPunct="1">
+        <a:defRPr sz="1700" kern="1200">
           <a:solidFill>
             <a:schemeClr val="tx1"/>
           </a:solidFill>
@@ -2957,8 +3399,8 @@
           <a:cs typeface="+mn-cs"/>
         </a:defRPr>
       </a:lvl1pPr>
-      <a:lvl2pPr marL="457200" algn="l" defTabSz="914400" rtl="0" eaLnBrk="1" latinLnBrk="0" hangingPunct="1">
-        <a:defRPr sz="1800" kern="1200">
+      <a:lvl2pPr marL="426888" algn="l" defTabSz="853775" rtl="0" eaLnBrk="1" latinLnBrk="0" hangingPunct="1">
+        <a:defRPr sz="1700" kern="1200">
           <a:solidFill>
             <a:schemeClr val="tx1"/>
           </a:solidFill>
@@ -2967,8 +3409,8 @@
           <a:cs typeface="+mn-cs"/>
         </a:defRPr>
       </a:lvl2pPr>
-      <a:lvl3pPr marL="914400" algn="l" defTabSz="914400" rtl="0" eaLnBrk="1" latinLnBrk="0" hangingPunct="1">
-        <a:defRPr sz="1800" kern="1200">
+      <a:lvl3pPr marL="853775" algn="l" defTabSz="853775" rtl="0" eaLnBrk="1" latinLnBrk="0" hangingPunct="1">
+        <a:defRPr sz="1700" kern="1200">
           <a:solidFill>
             <a:schemeClr val="tx1"/>
           </a:solidFill>
@@ -2977,8 +3419,8 @@
           <a:cs typeface="+mn-cs"/>
         </a:defRPr>
       </a:lvl3pPr>
-      <a:lvl4pPr marL="1371600" algn="l" defTabSz="914400" rtl="0" eaLnBrk="1" latinLnBrk="0" hangingPunct="1">
-        <a:defRPr sz="1800" kern="1200">
+      <a:lvl4pPr marL="1280663" algn="l" defTabSz="853775" rtl="0" eaLnBrk="1" latinLnBrk="0" hangingPunct="1">
+        <a:defRPr sz="1700" kern="1200">
           <a:solidFill>
             <a:schemeClr val="tx1"/>
           </a:solidFill>
@@ -2987,8 +3429,8 @@
           <a:cs typeface="+mn-cs"/>
         </a:defRPr>
       </a:lvl4pPr>
-      <a:lvl5pPr marL="1828800" algn="l" defTabSz="914400" rtl="0" eaLnBrk="1" latinLnBrk="0" hangingPunct="1">
-        <a:defRPr sz="1800" kern="1200">
+      <a:lvl5pPr marL="1707551" algn="l" defTabSz="853775" rtl="0" eaLnBrk="1" latinLnBrk="0" hangingPunct="1">
+        <a:defRPr sz="1700" kern="1200">
           <a:solidFill>
             <a:schemeClr val="tx1"/>
           </a:solidFill>
@@ -2997,8 +3439,8 @@
           <a:cs typeface="+mn-cs"/>
         </a:defRPr>
       </a:lvl5pPr>
-      <a:lvl6pPr marL="2286000" algn="l" defTabSz="914400" rtl="0" eaLnBrk="1" latinLnBrk="0" hangingPunct="1">
-        <a:defRPr sz="1800" kern="1200">
+      <a:lvl6pPr marL="2134438" algn="l" defTabSz="853775" rtl="0" eaLnBrk="1" latinLnBrk="0" hangingPunct="1">
+        <a:defRPr sz="1700" kern="1200">
           <a:solidFill>
             <a:schemeClr val="tx1"/>
           </a:solidFill>
@@ -3007,8 +3449,8 @@
           <a:cs typeface="+mn-cs"/>
         </a:defRPr>
       </a:lvl6pPr>
-      <a:lvl7pPr marL="2743200" algn="l" defTabSz="914400" rtl="0" eaLnBrk="1" latinLnBrk="0" hangingPunct="1">
-        <a:defRPr sz="1800" kern="1200">
+      <a:lvl7pPr marL="2561326" algn="l" defTabSz="853775" rtl="0" eaLnBrk="1" latinLnBrk="0" hangingPunct="1">
+        <a:defRPr sz="1700" kern="1200">
           <a:solidFill>
             <a:schemeClr val="tx1"/>
           </a:solidFill>
@@ -3017,8 +3459,8 @@
           <a:cs typeface="+mn-cs"/>
         </a:defRPr>
       </a:lvl7pPr>
-      <a:lvl8pPr marL="3200400" algn="l" defTabSz="914400" rtl="0" eaLnBrk="1" latinLnBrk="0" hangingPunct="1">
-        <a:defRPr sz="1800" kern="1200">
+      <a:lvl8pPr marL="2988213" algn="l" defTabSz="853775" rtl="0" eaLnBrk="1" latinLnBrk="0" hangingPunct="1">
+        <a:defRPr sz="1700" kern="1200">
           <a:solidFill>
             <a:schemeClr val="tx1"/>
           </a:solidFill>
@@ -3027,8 +3469,8 @@
           <a:cs typeface="+mn-cs"/>
         </a:defRPr>
       </a:lvl8pPr>
-      <a:lvl9pPr marL="3657600" algn="l" defTabSz="914400" rtl="0" eaLnBrk="1" latinLnBrk="0" hangingPunct="1">
-        <a:defRPr sz="1800" kern="1200">
+      <a:lvl9pPr marL="3415101" algn="l" defTabSz="853775" rtl="0" eaLnBrk="1" latinLnBrk="0" hangingPunct="1">
+        <a:defRPr sz="1700" kern="1200">
           <a:solidFill>
             <a:schemeClr val="tx1"/>
           </a:solidFill>
@@ -3061,14 +3503,14 @@
       </p:grpSpPr>
       <p:sp>
         <p:nvSpPr>
-          <p:cNvPr id="4" name="Rounded Rectangle 3"/>
+          <p:cNvPr id="89" name="Rounded Rectangle 88"/>
           <p:cNvSpPr/>
           <p:nvPr/>
         </p:nvSpPr>
         <p:spPr>
           <a:xfrm>
-            <a:off x="381000" y="4644640"/>
-            <a:ext cx="2133600" cy="1984760"/>
+            <a:off x="129381" y="4111239"/>
+            <a:ext cx="2133600" cy="2060961"/>
           </a:xfrm>
           <a:prstGeom prst="roundRect">
             <a:avLst>
@@ -3107,10 +3549,9 @@
           </a:fontRef>
         </p:style>
         <p:txBody>
-          <a:bodyPr rtlCol="0" anchor="t" anchorCtr="1"/>
+          <a:bodyPr rtlCol="0" anchor="t" anchorCtr="0"/>
           <a:lstStyle/>
           <a:p>
-            <a:pPr algn="ctr"/>
             <a:r>
               <a:rPr lang="en-US" sz="1600" b="1" dirty="0" smtClean="0"/>
               <a:t>Test Driver</a:t>
@@ -3121,13 +3562,13 @@
       </p:sp>
       <p:sp>
         <p:nvSpPr>
-          <p:cNvPr id="5" name="Rounded Rectangle 4"/>
+          <p:cNvPr id="90" name="Rounded Rectangle 89"/>
           <p:cNvSpPr/>
           <p:nvPr/>
         </p:nvSpPr>
         <p:spPr>
           <a:xfrm>
-            <a:off x="3810000" y="1905713"/>
+            <a:off x="3558381" y="1372313"/>
             <a:ext cx="2286000" cy="4799888"/>
           </a:xfrm>
           <a:prstGeom prst="roundRect">
@@ -3181,13 +3622,13 @@
       </p:sp>
       <p:sp>
         <p:nvSpPr>
-          <p:cNvPr id="6" name="Rounded Rectangle 5"/>
+          <p:cNvPr id="91" name="Rounded Rectangle 90"/>
           <p:cNvSpPr/>
           <p:nvPr/>
         </p:nvSpPr>
         <p:spPr>
           <a:xfrm>
-            <a:off x="6477000" y="1905712"/>
+            <a:off x="6225381" y="1372312"/>
             <a:ext cx="2286000" cy="4799889"/>
           </a:xfrm>
           <a:prstGeom prst="roundRect">
@@ -3241,13 +3682,13 @@
       </p:sp>
       <p:sp>
         <p:nvSpPr>
-          <p:cNvPr id="7" name="Rounded Rectangle 6"/>
+          <p:cNvPr id="92" name="Rounded Rectangle 91"/>
           <p:cNvSpPr/>
           <p:nvPr/>
         </p:nvSpPr>
         <p:spPr>
           <a:xfrm>
-            <a:off x="1219200" y="1905000"/>
+            <a:off x="967581" y="1371600"/>
             <a:ext cx="1752600" cy="2514600"/>
           </a:xfrm>
           <a:prstGeom prst="roundRect">
@@ -3301,14 +3742,14 @@
       </p:sp>
       <p:sp>
         <p:nvSpPr>
-          <p:cNvPr id="8" name="Rounded Rectangle 7"/>
+          <p:cNvPr id="93" name="Rounded Rectangle 92"/>
           <p:cNvSpPr/>
           <p:nvPr/>
         </p:nvSpPr>
         <p:spPr>
           <a:xfrm>
-            <a:off x="381000" y="152400"/>
-            <a:ext cx="8382000" cy="1295400"/>
+            <a:off x="129381" y="76200"/>
+            <a:ext cx="8382000" cy="838200"/>
           </a:xfrm>
           <a:prstGeom prst="roundRect">
             <a:avLst>
@@ -3360,13 +3801,13 @@
       </p:sp>
       <p:grpSp>
         <p:nvGrpSpPr>
-          <p:cNvPr id="11" name="Group 10"/>
+          <p:cNvPr id="94" name="Group 93"/>
           <p:cNvGrpSpPr/>
           <p:nvPr/>
         </p:nvGrpSpPr>
         <p:grpSpPr>
           <a:xfrm>
-            <a:off x="1447800" y="3505200"/>
+            <a:off x="1196181" y="3124200"/>
             <a:ext cx="1371600" cy="609600"/>
             <a:chOff x="-228600" y="1371600"/>
             <a:chExt cx="1371600" cy="609600"/>
@@ -3377,7 +3818,7 @@
         </p:grpSpPr>
         <p:sp>
           <p:nvSpPr>
-            <p:cNvPr id="9" name="Rectangle 8"/>
+            <p:cNvPr id="95" name="Rectangle 94"/>
             <p:cNvSpPr/>
             <p:nvPr/>
           </p:nvSpPr>
@@ -3438,7 +3879,7 @@
         </p:sp>
         <p:sp>
           <p:nvSpPr>
-            <p:cNvPr id="10" name="Rectangle 9"/>
+            <p:cNvPr id="96" name="Rectangle 95"/>
             <p:cNvSpPr/>
             <p:nvPr/>
           </p:nvSpPr>
@@ -3484,13 +3925,13 @@
       </p:grpSp>
       <p:grpSp>
         <p:nvGrpSpPr>
-          <p:cNvPr id="15" name="Group 14"/>
+          <p:cNvPr id="97" name="Group 96"/>
           <p:cNvGrpSpPr/>
           <p:nvPr/>
         </p:nvGrpSpPr>
         <p:grpSpPr>
           <a:xfrm>
-            <a:off x="4267200" y="2362200"/>
+            <a:off x="4015581" y="1828800"/>
             <a:ext cx="1371600" cy="762000"/>
             <a:chOff x="-228600" y="1371600"/>
             <a:chExt cx="1371600" cy="762000"/>
@@ -3501,7 +3942,7 @@
         </p:grpSpPr>
         <p:sp>
           <p:nvSpPr>
-            <p:cNvPr id="16" name="Rectangle 15"/>
+            <p:cNvPr id="98" name="Rectangle 97"/>
             <p:cNvSpPr/>
             <p:nvPr/>
           </p:nvSpPr>
@@ -3559,7 +4000,7 @@
         </p:sp>
         <p:sp>
           <p:nvSpPr>
-            <p:cNvPr id="17" name="Rectangle 16"/>
+            <p:cNvPr id="99" name="Rectangle 98"/>
             <p:cNvSpPr/>
             <p:nvPr/>
           </p:nvSpPr>
@@ -3610,13 +4051,13 @@
       </p:grpSp>
       <p:grpSp>
         <p:nvGrpSpPr>
-          <p:cNvPr id="18" name="Group 17"/>
+          <p:cNvPr id="100" name="Group 99"/>
           <p:cNvGrpSpPr/>
           <p:nvPr/>
         </p:nvGrpSpPr>
         <p:grpSpPr>
           <a:xfrm>
-            <a:off x="6858000" y="2514600"/>
+            <a:off x="6606381" y="1981200"/>
             <a:ext cx="1600200" cy="762000"/>
             <a:chOff x="-457200" y="1371600"/>
             <a:chExt cx="1600200" cy="762000"/>
@@ -3627,7 +4068,7 @@
         </p:grpSpPr>
         <p:sp>
           <p:nvSpPr>
-            <p:cNvPr id="19" name="Rectangle 18"/>
+            <p:cNvPr id="101" name="Rectangle 100"/>
             <p:cNvSpPr/>
             <p:nvPr/>
           </p:nvSpPr>
@@ -3685,7 +4126,7 @@
         </p:sp>
         <p:sp>
           <p:nvSpPr>
-            <p:cNvPr id="20" name="Rectangle 19"/>
+            <p:cNvPr id="102" name="Rectangle 101"/>
             <p:cNvSpPr/>
             <p:nvPr/>
           </p:nvSpPr>
@@ -3736,13 +4177,13 @@
       </p:grpSp>
       <p:grpSp>
         <p:nvGrpSpPr>
-          <p:cNvPr id="21" name="Group 20"/>
+          <p:cNvPr id="103" name="Group 102"/>
           <p:cNvGrpSpPr/>
           <p:nvPr/>
         </p:nvGrpSpPr>
         <p:grpSpPr>
           <a:xfrm>
-            <a:off x="6858000" y="3958839"/>
+            <a:off x="6606381" y="3425439"/>
             <a:ext cx="1600200" cy="762000"/>
             <a:chOff x="-457200" y="1371600"/>
             <a:chExt cx="1600200" cy="762000"/>
@@ -3753,7 +4194,7 @@
         </p:grpSpPr>
         <p:sp>
           <p:nvSpPr>
-            <p:cNvPr id="22" name="Rectangle 21"/>
+            <p:cNvPr id="104" name="Rectangle 103"/>
             <p:cNvSpPr/>
             <p:nvPr/>
           </p:nvSpPr>
@@ -3799,15 +4240,7 @@
                     <a:srgbClr val="00B050"/>
                   </a:solidFill>
                 </a:rPr>
-                <a:t>storage</a:t>
-              </a:r>
-              <a:r>
-                <a:rPr lang="en-US" sz="1400" b="1" dirty="0" smtClean="0">
-                  <a:solidFill>
-                    <a:srgbClr val="00B050"/>
-                  </a:solidFill>
-                </a:rPr>
-                <a:t>::</a:t>
+                <a:t>storage::</a:t>
               </a:r>
               <a:r>
                 <a:rPr lang="en-US" sz="1400" b="1" dirty="0" err="1" smtClean="0">
@@ -3835,7 +4268,7 @@
         </p:sp>
         <p:sp>
           <p:nvSpPr>
-            <p:cNvPr id="23" name="Rectangle 22"/>
+            <p:cNvPr id="105" name="Rectangle 104"/>
             <p:cNvSpPr/>
             <p:nvPr/>
           </p:nvSpPr>
@@ -3886,16 +4319,16 @@
       </p:grpSp>
       <p:grpSp>
         <p:nvGrpSpPr>
-          <p:cNvPr id="24" name="Group 23"/>
+          <p:cNvPr id="106" name="Group 105"/>
           <p:cNvGrpSpPr/>
           <p:nvPr/>
         </p:nvGrpSpPr>
         <p:grpSpPr>
           <a:xfrm>
-            <a:off x="762000" y="5863839"/>
-            <a:ext cx="1371600" cy="536961"/>
+            <a:off x="510381" y="4980061"/>
+            <a:ext cx="1371600" cy="506339"/>
             <a:chOff x="-228600" y="1371600"/>
-            <a:chExt cx="1371600" cy="536961"/>
+            <a:chExt cx="1371600" cy="506339"/>
           </a:xfrm>
           <a:solidFill>
             <a:schemeClr val="bg1"/>
@@ -3903,14 +4336,14 @@
         </p:grpSpPr>
         <p:sp>
           <p:nvSpPr>
-            <p:cNvPr id="25" name="Rectangle 24"/>
+            <p:cNvPr id="107" name="Rectangle 106"/>
             <p:cNvSpPr/>
             <p:nvPr/>
           </p:nvSpPr>
           <p:spPr>
             <a:xfrm>
               <a:off x="-228600" y="1524000"/>
-              <a:ext cx="1371600" cy="384561"/>
+              <a:ext cx="1371600" cy="353939"/>
             </a:xfrm>
             <a:prstGeom prst="rect">
               <a:avLst/>
@@ -3967,7 +4400,7 @@
         </p:sp>
         <p:sp>
           <p:nvSpPr>
-            <p:cNvPr id="26" name="Rectangle 25"/>
+            <p:cNvPr id="108" name="Rectangle 107"/>
             <p:cNvSpPr/>
             <p:nvPr/>
           </p:nvSpPr>
@@ -4022,16 +4455,16 @@
       </p:grpSp>
       <p:grpSp>
         <p:nvGrpSpPr>
-          <p:cNvPr id="30" name="Group 29"/>
+          <p:cNvPr id="109" name="Group 108"/>
           <p:cNvGrpSpPr/>
           <p:nvPr/>
         </p:nvGrpSpPr>
         <p:grpSpPr>
           <a:xfrm>
-            <a:off x="762000" y="4998578"/>
-            <a:ext cx="1371600" cy="602833"/>
-            <a:chOff x="-228600" y="1371600"/>
-            <a:chExt cx="1371600" cy="602833"/>
+            <a:off x="1196181" y="254950"/>
+            <a:ext cx="1676400" cy="507050"/>
+            <a:chOff x="-533400" y="1371600"/>
+            <a:chExt cx="1676400" cy="507050"/>
           </a:xfrm>
           <a:solidFill>
             <a:schemeClr val="bg1"/>
@@ -4039,297 +4472,14 @@
         </p:grpSpPr>
         <p:sp>
           <p:nvSpPr>
-            <p:cNvPr id="31" name="Rectangle 30"/>
+            <p:cNvPr id="110" name="Rectangle 109"/>
             <p:cNvSpPr/>
             <p:nvPr/>
           </p:nvSpPr>
           <p:spPr>
             <a:xfrm>
-              <a:off x="-228600" y="1524000"/>
-              <a:ext cx="1371600" cy="450433"/>
-            </a:xfrm>
-            <a:prstGeom prst="rect">
-              <a:avLst/>
-            </a:prstGeom>
-            <a:grpFill/>
-            <a:ln>
-              <a:solidFill>
-                <a:schemeClr val="accent2">
-                  <a:lumMod val="75000"/>
-                </a:schemeClr>
-              </a:solidFill>
-            </a:ln>
-          </p:spPr>
-          <p:style>
-            <a:lnRef idx="2">
-              <a:schemeClr val="accent1">
-                <a:shade val="50000"/>
-              </a:schemeClr>
-            </a:lnRef>
-            <a:fillRef idx="1">
-              <a:schemeClr val="accent1"/>
-            </a:fillRef>
-            <a:effectRef idx="0">
-              <a:schemeClr val="accent1"/>
-            </a:effectRef>
-            <a:fontRef idx="minor">
-              <a:schemeClr val="lt1"/>
-            </a:fontRef>
-          </p:style>
-          <p:txBody>
-            <a:bodyPr rtlCol="0" anchor="ctr"/>
-            <a:lstStyle/>
-            <a:p>
-              <a:pPr algn="ctr"/>
-              <a:r>
-                <a:rPr lang="en-US" sz="1400" b="1" dirty="0" smtClean="0">
-                  <a:solidFill>
-                    <a:schemeClr val="accent2">
-                      <a:lumMod val="75000"/>
-                    </a:schemeClr>
-                  </a:solidFill>
-                </a:rPr>
-                <a:t>test::cases</a:t>
-              </a:r>
-              <a:endParaRPr lang="en-SG" sz="1400" b="1" dirty="0">
-                <a:solidFill>
-                  <a:schemeClr val="accent2">
-                    <a:lumMod val="75000"/>
-                  </a:schemeClr>
-                </a:solidFill>
-              </a:endParaRPr>
-            </a:p>
-          </p:txBody>
-        </p:sp>
-        <p:sp>
-          <p:nvSpPr>
-            <p:cNvPr id="32" name="Rectangle 31"/>
-            <p:cNvSpPr/>
-            <p:nvPr/>
-          </p:nvSpPr>
-          <p:spPr>
-            <a:xfrm>
-              <a:off x="647700" y="1371600"/>
-              <a:ext cx="495300" cy="152400"/>
-            </a:xfrm>
-            <a:prstGeom prst="rect">
-              <a:avLst/>
-            </a:prstGeom>
-            <a:grpFill/>
-            <a:ln>
-              <a:solidFill>
-                <a:schemeClr val="accent2">
-                  <a:lumMod val="75000"/>
-                </a:schemeClr>
-              </a:solidFill>
-            </a:ln>
-          </p:spPr>
-          <p:style>
-            <a:lnRef idx="2">
-              <a:schemeClr val="accent1">
-                <a:shade val="50000"/>
-              </a:schemeClr>
-            </a:lnRef>
-            <a:fillRef idx="1">
-              <a:schemeClr val="accent1"/>
-            </a:fillRef>
-            <a:effectRef idx="0">
-              <a:schemeClr val="accent1"/>
-            </a:effectRef>
-            <a:fontRef idx="minor">
-              <a:schemeClr val="lt1"/>
-            </a:fontRef>
-          </p:style>
-          <p:txBody>
-            <a:bodyPr rtlCol="0" anchor="ctr"/>
-            <a:lstStyle/>
-            <a:p>
-              <a:pPr algn="ctr"/>
-              <a:endParaRPr lang="en-SG" sz="1400" b="1">
-                <a:solidFill>
-                  <a:schemeClr val="accent2">
-                    <a:lumMod val="75000"/>
-                  </a:schemeClr>
-                </a:solidFill>
-              </a:endParaRPr>
-            </a:p>
-          </p:txBody>
-        </p:sp>
-      </p:grpSp>
-      <p:grpSp>
-        <p:nvGrpSpPr>
-          <p:cNvPr id="33" name="Group 32"/>
-          <p:cNvGrpSpPr/>
-          <p:nvPr/>
-        </p:nvGrpSpPr>
-        <p:grpSpPr>
-          <a:xfrm>
-            <a:off x="6705600" y="430849"/>
-            <a:ext cx="1371600" cy="762000"/>
-            <a:chOff x="-228600" y="1371600"/>
-            <a:chExt cx="1371600" cy="762000"/>
-          </a:xfrm>
-          <a:solidFill>
-            <a:schemeClr val="bg1"/>
-          </a:solidFill>
-        </p:grpSpPr>
-        <p:sp>
-          <p:nvSpPr>
-            <p:cNvPr id="34" name="Rectangle 33"/>
-            <p:cNvSpPr/>
-            <p:nvPr/>
-          </p:nvSpPr>
-          <p:spPr>
-            <a:xfrm>
-              <a:off x="-228600" y="1524000"/>
-              <a:ext cx="1371600" cy="609600"/>
-            </a:xfrm>
-            <a:prstGeom prst="rect">
-              <a:avLst/>
-            </a:prstGeom>
-            <a:grpFill/>
-            <a:ln>
-              <a:solidFill>
-                <a:schemeClr val="accent5"/>
-              </a:solidFill>
-            </a:ln>
-          </p:spPr>
-          <p:style>
-            <a:lnRef idx="2">
-              <a:schemeClr val="accent1">
-                <a:shade val="50000"/>
-              </a:schemeClr>
-            </a:lnRef>
-            <a:fillRef idx="1">
-              <a:schemeClr val="accent1"/>
-            </a:fillRef>
-            <a:effectRef idx="0">
-              <a:schemeClr val="accent1"/>
-            </a:effectRef>
-            <a:fontRef idx="minor">
-              <a:schemeClr val="lt1"/>
-            </a:fontRef>
-          </p:style>
-          <p:txBody>
-            <a:bodyPr rtlCol="0" anchor="ctr"/>
-            <a:lstStyle/>
-            <a:p>
-              <a:r>
-                <a:rPr lang="en-US" sz="1400" b="1" dirty="0" smtClean="0">
-                  <a:solidFill>
-                    <a:schemeClr val="accent5"/>
-                  </a:solidFill>
-                </a:rPr>
-                <a:t>common</a:t>
-              </a:r>
-              <a:br>
-                <a:rPr lang="en-US" sz="1400" b="1" dirty="0" smtClean="0">
-                  <a:solidFill>
-                    <a:schemeClr val="accent5"/>
-                  </a:solidFill>
-                </a:rPr>
-              </a:br>
-              <a:r>
-                <a:rPr lang="en-US" sz="1400" b="1" dirty="0" smtClean="0">
-                  <a:solidFill>
-                    <a:schemeClr val="accent5"/>
-                  </a:solidFill>
-                </a:rPr>
-                <a:t>    ::</a:t>
-              </a:r>
-              <a:r>
-                <a:rPr lang="en-US" sz="1400" b="1" dirty="0" err="1" smtClean="0">
-                  <a:solidFill>
-                    <a:schemeClr val="accent5"/>
-                  </a:solidFill>
-                </a:rPr>
-                <a:t>datatransfer</a:t>
-              </a:r>
-              <a:endParaRPr lang="en-SG" sz="1400" b="1" dirty="0">
-                <a:solidFill>
-                  <a:schemeClr val="accent5"/>
-                </a:solidFill>
-              </a:endParaRPr>
-            </a:p>
-          </p:txBody>
-        </p:sp>
-        <p:sp>
-          <p:nvSpPr>
-            <p:cNvPr id="35" name="Rectangle 34"/>
-            <p:cNvSpPr/>
-            <p:nvPr/>
-          </p:nvSpPr>
-          <p:spPr>
-            <a:xfrm>
-              <a:off x="647700" y="1371600"/>
-              <a:ext cx="495300" cy="152400"/>
-            </a:xfrm>
-            <a:prstGeom prst="rect">
-              <a:avLst/>
-            </a:prstGeom>
-            <a:grpFill/>
-            <a:ln>
-              <a:solidFill>
-                <a:schemeClr val="accent5"/>
-              </a:solidFill>
-            </a:ln>
-          </p:spPr>
-          <p:style>
-            <a:lnRef idx="2">
-              <a:schemeClr val="accent1">
-                <a:shade val="50000"/>
-              </a:schemeClr>
-            </a:lnRef>
-            <a:fillRef idx="1">
-              <a:schemeClr val="accent1"/>
-            </a:fillRef>
-            <a:effectRef idx="0">
-              <a:schemeClr val="accent1"/>
-            </a:effectRef>
-            <a:fontRef idx="minor">
-              <a:schemeClr val="lt1"/>
-            </a:fontRef>
-          </p:style>
-          <p:txBody>
-            <a:bodyPr rtlCol="0" anchor="ctr"/>
-            <a:lstStyle/>
-            <a:p>
-              <a:endParaRPr lang="en-SG" sz="1400" b="1">
-                <a:solidFill>
-                  <a:schemeClr val="accent5"/>
-                </a:solidFill>
-              </a:endParaRPr>
-            </a:p>
-          </p:txBody>
-        </p:sp>
-      </p:grpSp>
-      <p:grpSp>
-        <p:nvGrpSpPr>
-          <p:cNvPr id="36" name="Group 35"/>
-          <p:cNvGrpSpPr/>
-          <p:nvPr/>
-        </p:nvGrpSpPr>
-        <p:grpSpPr>
-          <a:xfrm>
-            <a:off x="1981200" y="380999"/>
-            <a:ext cx="1371600" cy="762000"/>
-            <a:chOff x="-228600" y="1371600"/>
-            <a:chExt cx="1371600" cy="762000"/>
-          </a:xfrm>
-          <a:solidFill>
-            <a:schemeClr val="bg1"/>
-          </a:solidFill>
-        </p:grpSpPr>
-        <p:sp>
-          <p:nvSpPr>
-            <p:cNvPr id="37" name="Rectangle 36"/>
-            <p:cNvSpPr/>
-            <p:nvPr/>
-          </p:nvSpPr>
-          <p:spPr>
-            <a:xfrm>
-              <a:off x="-228600" y="1524000"/>
-              <a:ext cx="1371600" cy="609600"/>
+              <a:off x="-533400" y="1524000"/>
+              <a:ext cx="1676400" cy="354650"/>
             </a:xfrm>
             <a:prstGeom prst="rect">
               <a:avLst/>
@@ -4380,7 +4530,7 @@
         </p:sp>
         <p:sp>
           <p:nvSpPr>
-            <p:cNvPr id="38" name="Rectangle 37"/>
+            <p:cNvPr id="111" name="Rectangle 110"/>
             <p:cNvSpPr/>
             <p:nvPr/>
           </p:nvSpPr>
@@ -4431,13 +4581,13 @@
       </p:grpSp>
       <p:cxnSp>
         <p:nvCxnSpPr>
-          <p:cNvPr id="40" name="Straight Arrow Connector 39"/>
+          <p:cNvPr id="112" name="Straight Arrow Connector 111"/>
           <p:cNvCxnSpPr/>
           <p:nvPr/>
         </p:nvCxnSpPr>
         <p:spPr>
           <a:xfrm>
-            <a:off x="6096000" y="4495800"/>
+            <a:off x="5844381" y="3962400"/>
             <a:ext cx="762000" cy="0"/>
           </a:xfrm>
           <a:prstGeom prst="straightConnector1">
@@ -4448,7 +4598,8 @@
               <a:srgbClr val="7030A0"/>
             </a:solidFill>
             <a:prstDash val="sysDot"/>
-            <a:tailEnd type="arrow"/>
+            <a:headEnd type="none" w="med" len="med"/>
+            <a:tailEnd type="triangle" w="med" len="med"/>
           </a:ln>
         </p:spPr>
         <p:style>
@@ -4468,13 +4619,13 @@
       </p:cxnSp>
       <p:cxnSp>
         <p:nvCxnSpPr>
-          <p:cNvPr id="44" name="Straight Arrow Connector 43"/>
+          <p:cNvPr id="113" name="Straight Arrow Connector 112"/>
           <p:cNvCxnSpPr/>
           <p:nvPr/>
         </p:nvCxnSpPr>
         <p:spPr>
           <a:xfrm>
-            <a:off x="2514600" y="5105400"/>
+            <a:off x="2262981" y="4572000"/>
             <a:ext cx="1752600" cy="0"/>
           </a:xfrm>
           <a:prstGeom prst="straightConnector1">
@@ -4487,7 +4638,8 @@
               </a:schemeClr>
             </a:solidFill>
             <a:prstDash val="sysDot"/>
-            <a:tailEnd type="arrow"/>
+            <a:headEnd type="none" w="med" len="med"/>
+            <a:tailEnd type="triangle" w="med" len="med"/>
           </a:ln>
         </p:spPr>
         <p:style>
@@ -4507,13 +4659,13 @@
       </p:cxnSp>
       <p:cxnSp>
         <p:nvCxnSpPr>
-          <p:cNvPr id="49" name="Straight Arrow Connector 48"/>
+          <p:cNvPr id="114" name="Straight Arrow Connector 113"/>
           <p:cNvCxnSpPr/>
           <p:nvPr/>
         </p:nvCxnSpPr>
         <p:spPr>
           <a:xfrm flipV="1">
-            <a:off x="7620000" y="3276600"/>
+            <a:off x="7368381" y="2743200"/>
             <a:ext cx="0" cy="834640"/>
           </a:xfrm>
           <a:prstGeom prst="straightConnector1">
@@ -4524,7 +4676,8 @@
               <a:srgbClr val="00B050"/>
             </a:solidFill>
             <a:prstDash val="sysDot"/>
-            <a:tailEnd type="arrow"/>
+            <a:headEnd type="none" w="med" len="med"/>
+            <a:tailEnd type="triangle" w="med" len="med"/>
           </a:ln>
         </p:spPr>
         <p:style>
@@ -4544,13 +4697,13 @@
       </p:cxnSp>
       <p:cxnSp>
         <p:nvCxnSpPr>
-          <p:cNvPr id="52" name="Straight Arrow Connector 51"/>
+          <p:cNvPr id="115" name="Straight Arrow Connector 114"/>
           <p:cNvCxnSpPr/>
           <p:nvPr/>
         </p:nvCxnSpPr>
         <p:spPr>
           <a:xfrm>
-            <a:off x="2057400" y="1441391"/>
+            <a:off x="1805781" y="907991"/>
             <a:ext cx="0" cy="457198"/>
           </a:xfrm>
           <a:prstGeom prst="straightConnector1">
@@ -4561,7 +4714,7 @@
               <a:schemeClr val="accent1"/>
             </a:solidFill>
             <a:prstDash val="sysDot"/>
-            <a:headEnd type="arrow" w="med" len="med"/>
+            <a:headEnd type="triangle" w="med" len="med"/>
             <a:tailEnd type="none" w="med" len="med"/>
           </a:ln>
         </p:spPr>
@@ -4582,13 +4735,13 @@
       </p:cxnSp>
       <p:cxnSp>
         <p:nvCxnSpPr>
-          <p:cNvPr id="54" name="Straight Arrow Connector 53"/>
+          <p:cNvPr id="116" name="Straight Arrow Connector 115"/>
           <p:cNvCxnSpPr/>
           <p:nvPr/>
         </p:nvCxnSpPr>
         <p:spPr>
           <a:xfrm>
-            <a:off x="4876800" y="1443528"/>
+            <a:off x="4625181" y="910128"/>
             <a:ext cx="0" cy="457198"/>
           </a:xfrm>
           <a:prstGeom prst="straightConnector1">
@@ -4599,7 +4752,7 @@
               <a:srgbClr val="7030A0"/>
             </a:solidFill>
             <a:prstDash val="sysDot"/>
-            <a:headEnd type="arrow" w="med" len="med"/>
+            <a:headEnd type="triangle" w="med" len="med"/>
             <a:tailEnd type="none" w="med" len="med"/>
           </a:ln>
         </p:spPr>
@@ -4620,13 +4773,13 @@
       </p:cxnSp>
       <p:cxnSp>
         <p:nvCxnSpPr>
-          <p:cNvPr id="55" name="Straight Arrow Connector 54"/>
+          <p:cNvPr id="117" name="Straight Arrow Connector 116"/>
           <p:cNvCxnSpPr/>
           <p:nvPr/>
         </p:nvCxnSpPr>
         <p:spPr>
           <a:xfrm>
-            <a:off x="7620000" y="1192849"/>
+            <a:off x="7368381" y="659449"/>
             <a:ext cx="0" cy="1460975"/>
           </a:xfrm>
           <a:prstGeom prst="straightConnector1">
@@ -4638,7 +4791,7 @@
             </a:solidFill>
             <a:prstDash val="sysDot"/>
             <a:headEnd type="none" w="med" len="med"/>
-            <a:tailEnd type="arrow" w="med" len="med"/>
+            <a:tailEnd type="triangle" w="med" len="med"/>
           </a:ln>
         </p:spPr>
         <p:style>
@@ -4658,13 +4811,13 @@
       </p:cxnSp>
       <p:cxnSp>
         <p:nvCxnSpPr>
-          <p:cNvPr id="56" name="Straight Arrow Connector 55"/>
+          <p:cNvPr id="118" name="Straight Arrow Connector 117"/>
           <p:cNvCxnSpPr/>
           <p:nvPr/>
         </p:nvCxnSpPr>
         <p:spPr>
           <a:xfrm>
-            <a:off x="750962" y="1447802"/>
+            <a:off x="499343" y="914402"/>
             <a:ext cx="11038" cy="3200398"/>
           </a:xfrm>
           <a:prstGeom prst="straightConnector1">
@@ -4677,7 +4830,7 @@
               </a:schemeClr>
             </a:solidFill>
             <a:prstDash val="sysDot"/>
-            <a:headEnd type="arrow" w="med" len="med"/>
+            <a:headEnd type="triangle" w="med" len="med"/>
             <a:tailEnd type="none" w="med" len="med"/>
           </a:ln>
         </p:spPr>
@@ -4698,13 +4851,13 @@
       </p:cxnSp>
       <p:cxnSp>
         <p:nvCxnSpPr>
-          <p:cNvPr id="59" name="Straight Arrow Connector 58"/>
+          <p:cNvPr id="119" name="Straight Arrow Connector 118"/>
           <p:cNvCxnSpPr/>
           <p:nvPr/>
         </p:nvCxnSpPr>
         <p:spPr>
           <a:xfrm>
-            <a:off x="4876800" y="3124200"/>
+            <a:off x="4625181" y="2590800"/>
             <a:ext cx="0" cy="457200"/>
           </a:xfrm>
           <a:prstGeom prst="straightConnector1">
@@ -4715,7 +4868,7 @@
               <a:srgbClr val="7030A0"/>
             </a:solidFill>
             <a:prstDash val="sysDot"/>
-            <a:headEnd type="arrow" w="med" len="med"/>
+            <a:headEnd type="triangle" w="med" len="med"/>
             <a:tailEnd type="none" w="med" len="med"/>
           </a:ln>
         </p:spPr>
@@ -4736,13 +4889,13 @@
       </p:cxnSp>
       <p:cxnSp>
         <p:nvCxnSpPr>
-          <p:cNvPr id="63" name="Straight Arrow Connector 62"/>
+          <p:cNvPr id="120" name="Straight Arrow Connector 119"/>
           <p:cNvCxnSpPr/>
           <p:nvPr/>
         </p:nvCxnSpPr>
         <p:spPr>
           <a:xfrm>
-            <a:off x="1219200" y="5638800"/>
+            <a:off x="967581" y="4755022"/>
             <a:ext cx="0" cy="379221"/>
           </a:xfrm>
           <a:prstGeom prst="straightConnector1">
@@ -4756,7 +4909,7 @@
             </a:solidFill>
             <a:prstDash val="sysDot"/>
             <a:headEnd type="none" w="med" len="med"/>
-            <a:tailEnd type="arrow" w="med" len="med"/>
+            <a:tailEnd type="triangle" w="med" len="med"/>
           </a:ln>
         </p:spPr>
         <p:style>
@@ -4776,13 +4929,13 @@
       </p:cxnSp>
       <p:grpSp>
         <p:nvGrpSpPr>
-          <p:cNvPr id="69" name="Group 68"/>
+          <p:cNvPr id="121" name="Group 120"/>
           <p:cNvGrpSpPr/>
           <p:nvPr/>
         </p:nvGrpSpPr>
         <p:grpSpPr>
           <a:xfrm>
-            <a:off x="4267200" y="4648200"/>
+            <a:off x="4015581" y="4114800"/>
             <a:ext cx="1371600" cy="762000"/>
             <a:chOff x="-228600" y="1371600"/>
             <a:chExt cx="1371600" cy="762000"/>
@@ -4793,7 +4946,7 @@
         </p:grpSpPr>
         <p:sp>
           <p:nvSpPr>
-            <p:cNvPr id="70" name="Rectangle 69"/>
+            <p:cNvPr id="122" name="Rectangle 121"/>
             <p:cNvSpPr/>
             <p:nvPr/>
           </p:nvSpPr>
@@ -4851,7 +5004,7 @@
         </p:sp>
         <p:sp>
           <p:nvSpPr>
-            <p:cNvPr id="71" name="Rectangle 70"/>
+            <p:cNvPr id="123" name="Rectangle 122"/>
             <p:cNvSpPr/>
             <p:nvPr/>
           </p:nvSpPr>
@@ -4902,13 +5055,13 @@
       </p:grpSp>
       <p:cxnSp>
         <p:nvCxnSpPr>
-          <p:cNvPr id="72" name="Straight Arrow Connector 71"/>
+          <p:cNvPr id="124" name="Straight Arrow Connector 123"/>
           <p:cNvCxnSpPr/>
           <p:nvPr/>
         </p:nvCxnSpPr>
         <p:spPr>
           <a:xfrm>
-            <a:off x="4876800" y="4191000"/>
+            <a:off x="4625181" y="3657600"/>
             <a:ext cx="0" cy="609600"/>
           </a:xfrm>
           <a:prstGeom prst="straightConnector1">
@@ -4919,7 +5072,7 @@
               <a:srgbClr val="7030A0"/>
             </a:solidFill>
             <a:prstDash val="sysDot"/>
-            <a:headEnd type="arrow" w="med" len="med"/>
+            <a:headEnd type="triangle" w="med" len="med"/>
             <a:tailEnd type="none" w="med" len="med"/>
           </a:ln>
         </p:spPr>
@@ -4940,13 +5093,13 @@
       </p:cxnSp>
       <p:cxnSp>
         <p:nvCxnSpPr>
-          <p:cNvPr id="75" name="Straight Arrow Connector 74"/>
+          <p:cNvPr id="125" name="Straight Arrow Connector 124"/>
           <p:cNvCxnSpPr/>
           <p:nvPr/>
         </p:nvCxnSpPr>
         <p:spPr>
           <a:xfrm flipV="1">
-            <a:off x="7010400" y="1443528"/>
+            <a:off x="6758781" y="910128"/>
             <a:ext cx="0" cy="462186"/>
           </a:xfrm>
           <a:prstGeom prst="straightConnector1">
@@ -4958,7 +5111,7 @@
             </a:solidFill>
             <a:prstDash val="sysDot"/>
             <a:headEnd type="none" w="med" len="med"/>
-            <a:tailEnd type="arrow" w="med" len="med"/>
+            <a:tailEnd type="triangle" w="med" len="med"/>
           </a:ln>
         </p:spPr>
         <p:style>
@@ -4978,13 +5131,13 @@
       </p:cxnSp>
       <p:grpSp>
         <p:nvGrpSpPr>
-          <p:cNvPr id="12" name="Group 11"/>
+          <p:cNvPr id="126" name="Group 125"/>
           <p:cNvGrpSpPr/>
           <p:nvPr/>
         </p:nvGrpSpPr>
         <p:grpSpPr>
           <a:xfrm>
-            <a:off x="4267200" y="3429000"/>
+            <a:off x="4015581" y="2895600"/>
             <a:ext cx="1371600" cy="762000"/>
             <a:chOff x="-228600" y="1371600"/>
             <a:chExt cx="1371600" cy="762000"/>
@@ -4995,7 +5148,7 @@
         </p:grpSpPr>
         <p:sp>
           <p:nvSpPr>
-            <p:cNvPr id="13" name="Rectangle 12"/>
+            <p:cNvPr id="127" name="Rectangle 126"/>
             <p:cNvSpPr/>
             <p:nvPr/>
           </p:nvSpPr>
@@ -5061,7 +5214,7 @@
         </p:sp>
         <p:sp>
           <p:nvSpPr>
-            <p:cNvPr id="14" name="Rectangle 13"/>
+            <p:cNvPr id="128" name="Rectangle 127"/>
             <p:cNvSpPr/>
             <p:nvPr/>
           </p:nvSpPr>
@@ -5112,13 +5265,13 @@
       </p:grpSp>
       <p:grpSp>
         <p:nvGrpSpPr>
-          <p:cNvPr id="57" name="Group 56"/>
+          <p:cNvPr id="129" name="Group 128"/>
           <p:cNvGrpSpPr/>
           <p:nvPr/>
         </p:nvGrpSpPr>
         <p:grpSpPr>
           <a:xfrm>
-            <a:off x="4191000" y="5867400"/>
+            <a:off x="3939381" y="5334000"/>
             <a:ext cx="1447800" cy="762000"/>
             <a:chOff x="-304800" y="1371600"/>
             <a:chExt cx="1447800" cy="762000"/>
@@ -5129,7 +5282,7 @@
         </p:grpSpPr>
         <p:sp>
           <p:nvSpPr>
-            <p:cNvPr id="58" name="Rectangle 57"/>
+            <p:cNvPr id="130" name="Rectangle 129"/>
             <p:cNvSpPr/>
             <p:nvPr/>
           </p:nvSpPr>
@@ -5187,7 +5340,7 @@
         </p:sp>
         <p:sp>
           <p:nvSpPr>
-            <p:cNvPr id="60" name="Rectangle 59"/>
+            <p:cNvPr id="131" name="Rectangle 130"/>
             <p:cNvSpPr/>
             <p:nvPr/>
           </p:nvSpPr>
@@ -5238,13 +5391,13 @@
       </p:grpSp>
       <p:cxnSp>
         <p:nvCxnSpPr>
-          <p:cNvPr id="62" name="Straight Arrow Connector 61"/>
+          <p:cNvPr id="132" name="Straight Arrow Connector 131"/>
           <p:cNvCxnSpPr/>
           <p:nvPr/>
         </p:nvCxnSpPr>
         <p:spPr>
           <a:xfrm>
-            <a:off x="4876800" y="5410200"/>
+            <a:off x="4625181" y="4876800"/>
             <a:ext cx="0" cy="609600"/>
           </a:xfrm>
           <a:prstGeom prst="straightConnector1">
@@ -5255,7 +5408,7 @@
               <a:srgbClr val="7030A0"/>
             </a:solidFill>
             <a:prstDash val="sysDot"/>
-            <a:headEnd type="arrow" w="med" len="med"/>
+            <a:headEnd type="triangle" w="med" len="med"/>
             <a:tailEnd type="none" w="med" len="med"/>
           </a:ln>
         </p:spPr>
@@ -5276,15 +5429,15 @@
       </p:cxnSp>
       <p:cxnSp>
         <p:nvCxnSpPr>
-          <p:cNvPr id="41" name="Elbow Connector 40"/>
+          <p:cNvPr id="133" name="Elbow Connector 132"/>
           <p:cNvCxnSpPr>
-            <a:endCxn id="16" idx="3"/>
+            <a:endCxn id="98" idx="3"/>
           </p:cNvCxnSpPr>
           <p:nvPr/>
         </p:nvCxnSpPr>
         <p:spPr>
           <a:xfrm rot="5400000" flipH="1" flipV="1">
-            <a:off x="4419600" y="3276600"/>
+            <a:off x="4167981" y="2743200"/>
             <a:ext cx="1676400" cy="762000"/>
           </a:xfrm>
           <a:prstGeom prst="bentConnector4">
@@ -5299,7 +5452,7 @@
             </a:solidFill>
             <a:prstDash val="sysDot"/>
             <a:headEnd type="none" w="med" len="med"/>
-            <a:tailEnd type="arrow" w="med" len="med"/>
+            <a:tailEnd type="triangle" w="med" len="med"/>
           </a:ln>
         </p:spPr>
         <p:style>
@@ -5319,15 +5472,15 @@
       </p:cxnSp>
       <p:cxnSp>
         <p:nvCxnSpPr>
-          <p:cNvPr id="64" name="Straight Arrow Connector 63"/>
+          <p:cNvPr id="134" name="Straight Arrow Connector 133"/>
           <p:cNvCxnSpPr>
-            <a:stCxn id="13" idx="1"/>
+            <a:stCxn id="127" idx="1"/>
           </p:cNvCxnSpPr>
           <p:nvPr/>
         </p:nvCxnSpPr>
         <p:spPr>
           <a:xfrm flipH="1">
-            <a:off x="2819400" y="3886200"/>
+            <a:off x="2567781" y="3352800"/>
             <a:ext cx="1447800" cy="0"/>
           </a:xfrm>
           <a:prstGeom prst="straightConnector1">
@@ -5338,7 +5491,7 @@
               <a:schemeClr val="accent1"/>
             </a:solidFill>
             <a:prstDash val="sysDot"/>
-            <a:headEnd type="arrow" w="med" len="med"/>
+            <a:headEnd type="triangle" w="med" len="med"/>
             <a:tailEnd type="none" w="med" len="med"/>
           </a:ln>
         </p:spPr>
@@ -5359,16 +5512,16 @@
       </p:cxnSp>
       <p:grpSp>
         <p:nvGrpSpPr>
-          <p:cNvPr id="73" name="Group 72"/>
+          <p:cNvPr id="135" name="Group 134"/>
           <p:cNvGrpSpPr/>
           <p:nvPr/>
         </p:nvGrpSpPr>
         <p:grpSpPr>
           <a:xfrm>
-            <a:off x="4343400" y="380999"/>
-            <a:ext cx="1371600" cy="762000"/>
-            <a:chOff x="-228600" y="1371600"/>
-            <a:chExt cx="1371600" cy="762000"/>
+            <a:off x="3786981" y="254950"/>
+            <a:ext cx="1676400" cy="507050"/>
+            <a:chOff x="-533400" y="1371600"/>
+            <a:chExt cx="1676400" cy="507050"/>
           </a:xfrm>
           <a:solidFill>
             <a:schemeClr val="bg1"/>
@@ -5376,14 +5529,14 @@
         </p:grpSpPr>
         <p:sp>
           <p:nvSpPr>
-            <p:cNvPr id="74" name="Rectangle 73"/>
+            <p:cNvPr id="136" name="Rectangle 135"/>
             <p:cNvSpPr/>
             <p:nvPr/>
           </p:nvSpPr>
           <p:spPr>
             <a:xfrm>
-              <a:off x="-228600" y="1524000"/>
-              <a:ext cx="1371600" cy="609600"/>
+              <a:off x="-533400" y="1524000"/>
+              <a:ext cx="1676400" cy="354650"/>
             </a:xfrm>
             <a:prstGeom prst="rect">
               <a:avLst/>
@@ -5421,22 +5574,15 @@
                     <a:schemeClr val="accent5"/>
                   </a:solidFill>
                 </a:rPr>
-                <a:t>common</a:t>
+                <a:t>common::</a:t>
               </a:r>
-              <a:br>
-                <a:rPr lang="en-US" sz="1400" b="1" dirty="0" smtClean="0">
-                  <a:solidFill>
-                    <a:schemeClr val="accent5"/>
-                  </a:solidFill>
-                </a:rPr>
-              </a:br>
               <a:r>
                 <a:rPr lang="en-US" sz="1400" b="1" dirty="0" smtClean="0">
                   <a:solidFill>
                     <a:schemeClr val="accent5"/>
                   </a:solidFill>
                 </a:rPr>
-                <a:t>    ::exception</a:t>
+                <a:t>exception</a:t>
               </a:r>
               <a:endParaRPr lang="en-SG" sz="1400" b="1" dirty="0">
                 <a:solidFill>
@@ -5448,7 +5594,7 @@
         </p:sp>
         <p:sp>
           <p:nvSpPr>
-            <p:cNvPr id="76" name="Rectangle 75"/>
+            <p:cNvPr id="137" name="Rectangle 136"/>
             <p:cNvSpPr/>
             <p:nvPr/>
           </p:nvSpPr>
@@ -5498,13 +5644,13 @@
       </p:grpSp>
       <p:grpSp>
         <p:nvGrpSpPr>
-          <p:cNvPr id="77" name="Group 76"/>
+          <p:cNvPr id="138" name="Group 137"/>
           <p:cNvGrpSpPr/>
           <p:nvPr/>
         </p:nvGrpSpPr>
         <p:grpSpPr>
           <a:xfrm>
-            <a:off x="6781800" y="5422306"/>
+            <a:off x="6530181" y="4888906"/>
             <a:ext cx="1676400" cy="762000"/>
             <a:chOff x="-533400" y="1371600"/>
             <a:chExt cx="1676400" cy="762000"/>
@@ -5515,7 +5661,7 @@
         </p:grpSpPr>
         <p:sp>
           <p:nvSpPr>
-            <p:cNvPr id="78" name="Rectangle 77"/>
+            <p:cNvPr id="139" name="Rectangle 138"/>
             <p:cNvSpPr/>
             <p:nvPr/>
           </p:nvSpPr>
@@ -5589,7 +5735,7 @@
         </p:sp>
         <p:sp>
           <p:nvSpPr>
-            <p:cNvPr id="79" name="Rectangle 78"/>
+            <p:cNvPr id="140" name="Rectangle 139"/>
             <p:cNvSpPr/>
             <p:nvPr/>
           </p:nvSpPr>
@@ -5640,13 +5786,13 @@
       </p:grpSp>
       <p:cxnSp>
         <p:nvCxnSpPr>
-          <p:cNvPr id="80" name="Straight Arrow Connector 79"/>
+          <p:cNvPr id="141" name="Straight Arrow Connector 140"/>
           <p:cNvCxnSpPr/>
           <p:nvPr/>
         </p:nvCxnSpPr>
         <p:spPr>
           <a:xfrm>
-            <a:off x="7620000" y="4724400"/>
+            <a:off x="7368381" y="4191000"/>
             <a:ext cx="0" cy="841403"/>
           </a:xfrm>
           <a:prstGeom prst="straightConnector1">
@@ -5658,7 +5804,7 @@
             </a:solidFill>
             <a:prstDash val="sysDot"/>
             <a:headEnd type="none" w="med" len="med"/>
-            <a:tailEnd type="arrow" w="med" len="med"/>
+            <a:tailEnd type="triangle" w="med" len="med"/>
           </a:ln>
         </p:spPr>
         <p:style>
@@ -5678,13 +5824,13 @@
       </p:cxnSp>
       <p:grpSp>
         <p:nvGrpSpPr>
-          <p:cNvPr id="84" name="Group 83"/>
+          <p:cNvPr id="142" name="Group 141"/>
           <p:cNvGrpSpPr/>
           <p:nvPr/>
         </p:nvGrpSpPr>
         <p:grpSpPr>
           <a:xfrm>
-            <a:off x="1447800" y="2286000"/>
+            <a:off x="1196181" y="2362200"/>
             <a:ext cx="1371600" cy="609600"/>
             <a:chOff x="-228600" y="1371600"/>
             <a:chExt cx="1371600" cy="609600"/>
@@ -5695,7 +5841,7 @@
         </p:grpSpPr>
         <p:sp>
           <p:nvSpPr>
-            <p:cNvPr id="85" name="Rectangle 84"/>
+            <p:cNvPr id="143" name="Rectangle 142"/>
             <p:cNvSpPr/>
             <p:nvPr/>
           </p:nvSpPr>
@@ -5756,7 +5902,7 @@
         </p:sp>
         <p:sp>
           <p:nvSpPr>
-            <p:cNvPr id="86" name="Rectangle 85"/>
+            <p:cNvPr id="144" name="Rectangle 143"/>
             <p:cNvSpPr/>
             <p:nvPr/>
           </p:nvSpPr>
@@ -5802,14 +5948,14 @@
       </p:grpSp>
       <p:cxnSp>
         <p:nvCxnSpPr>
-          <p:cNvPr id="87" name="Straight Arrow Connector 86"/>
+          <p:cNvPr id="145" name="Straight Arrow Connector 144"/>
           <p:cNvCxnSpPr/>
           <p:nvPr/>
         </p:nvCxnSpPr>
         <p:spPr>
           <a:xfrm flipV="1">
-            <a:off x="2057400" y="2895600"/>
-            <a:ext cx="0" cy="762000"/>
+            <a:off x="1805781" y="2971800"/>
+            <a:ext cx="0" cy="304800"/>
           </a:xfrm>
           <a:prstGeom prst="straightConnector1">
             <a:avLst/>
@@ -5819,7 +5965,7 @@
               <a:schemeClr val="accent1"/>
             </a:solidFill>
             <a:prstDash val="sysDot"/>
-            <a:headEnd type="arrow" w="med" len="med"/>
+            <a:headEnd type="triangle" w="med" len="med"/>
             <a:tailEnd type="none" w="med" len="med"/>
           </a:ln>
         </p:spPr>
@@ -5838,6 +5984,592 @@
           </a:fontRef>
         </p:style>
       </p:cxnSp>
+      <p:grpSp>
+        <p:nvGrpSpPr>
+          <p:cNvPr id="146" name="Group 145"/>
+          <p:cNvGrpSpPr/>
+          <p:nvPr/>
+        </p:nvGrpSpPr>
+        <p:grpSpPr>
+          <a:xfrm>
+            <a:off x="1196181" y="1600200"/>
+            <a:ext cx="1371600" cy="609600"/>
+            <a:chOff x="-228600" y="1371600"/>
+            <a:chExt cx="1371600" cy="609600"/>
+          </a:xfrm>
+          <a:solidFill>
+            <a:schemeClr val="bg1"/>
+          </a:solidFill>
+        </p:grpSpPr>
+        <p:sp>
+          <p:nvSpPr>
+            <p:cNvPr id="147" name="Rectangle 146"/>
+            <p:cNvSpPr/>
+            <p:nvPr/>
+          </p:nvSpPr>
+          <p:spPr>
+            <a:xfrm>
+              <a:off x="-228600" y="1524000"/>
+              <a:ext cx="1371600" cy="457200"/>
+            </a:xfrm>
+            <a:prstGeom prst="rect">
+              <a:avLst/>
+            </a:prstGeom>
+            <a:grpFill/>
+          </p:spPr>
+          <p:style>
+            <a:lnRef idx="2">
+              <a:schemeClr val="accent1">
+                <a:shade val="50000"/>
+              </a:schemeClr>
+            </a:lnRef>
+            <a:fillRef idx="1">
+              <a:schemeClr val="accent1"/>
+            </a:fillRef>
+            <a:effectRef idx="0">
+              <a:schemeClr val="accent1"/>
+            </a:effectRef>
+            <a:fontRef idx="minor">
+              <a:schemeClr val="lt1"/>
+            </a:fontRef>
+          </p:style>
+          <p:txBody>
+            <a:bodyPr rtlCol="0" anchor="ctr"/>
+            <a:lstStyle/>
+            <a:p>
+              <a:pPr algn="ctr"/>
+              <a:r>
+                <a:rPr lang="en-US" sz="1400" b="1" dirty="0" err="1" smtClean="0">
+                  <a:solidFill>
+                    <a:schemeClr val="tx2"/>
+                  </a:solidFill>
+                </a:rPr>
+                <a:t>ui</a:t>
+              </a:r>
+              <a:r>
+                <a:rPr lang="en-US" sz="1400" b="1" dirty="0" smtClean="0">
+                  <a:solidFill>
+                    <a:schemeClr val="tx2"/>
+                  </a:solidFill>
+                </a:rPr>
+                <a:t>::</a:t>
+              </a:r>
+              <a:r>
+                <a:rPr lang="en-US" sz="1400" b="1" dirty="0" smtClean="0">
+                  <a:solidFill>
+                    <a:schemeClr val="tx2"/>
+                  </a:solidFill>
+                </a:rPr>
+                <a:t>website</a:t>
+              </a:r>
+              <a:endParaRPr lang="en-SG" sz="1400" b="1" dirty="0">
+                <a:solidFill>
+                  <a:schemeClr val="tx2"/>
+                </a:solidFill>
+              </a:endParaRPr>
+            </a:p>
+          </p:txBody>
+        </p:sp>
+        <p:sp>
+          <p:nvSpPr>
+            <p:cNvPr id="148" name="Rectangle 147"/>
+            <p:cNvSpPr/>
+            <p:nvPr/>
+          </p:nvSpPr>
+          <p:spPr>
+            <a:xfrm>
+              <a:off x="647700" y="1371600"/>
+              <a:ext cx="495300" cy="152400"/>
+            </a:xfrm>
+            <a:prstGeom prst="rect">
+              <a:avLst/>
+            </a:prstGeom>
+            <a:grpFill/>
+          </p:spPr>
+          <p:style>
+            <a:lnRef idx="2">
+              <a:schemeClr val="accent1">
+                <a:shade val="50000"/>
+              </a:schemeClr>
+            </a:lnRef>
+            <a:fillRef idx="1">
+              <a:schemeClr val="accent1"/>
+            </a:fillRef>
+            <a:effectRef idx="0">
+              <a:schemeClr val="accent1"/>
+            </a:effectRef>
+            <a:fontRef idx="minor">
+              <a:schemeClr val="lt1"/>
+            </a:fontRef>
+          </p:style>
+          <p:txBody>
+            <a:bodyPr rtlCol="0" anchor="ctr"/>
+            <a:lstStyle/>
+            <a:p>
+              <a:pPr algn="ctr"/>
+              <a:endParaRPr lang="en-SG" sz="1400" b="1">
+                <a:solidFill>
+                  <a:schemeClr val="tx2"/>
+                </a:solidFill>
+              </a:endParaRPr>
+            </a:p>
+          </p:txBody>
+        </p:sp>
+      </p:grpSp>
+      <p:grpSp>
+        <p:nvGrpSpPr>
+          <p:cNvPr id="149" name="Group 148"/>
+          <p:cNvGrpSpPr/>
+          <p:nvPr/>
+        </p:nvGrpSpPr>
+        <p:grpSpPr>
+          <a:xfrm>
+            <a:off x="510381" y="4343400"/>
+            <a:ext cx="1371600" cy="499929"/>
+            <a:chOff x="-228600" y="1371600"/>
+            <a:chExt cx="1371600" cy="499929"/>
+          </a:xfrm>
+          <a:solidFill>
+            <a:schemeClr val="bg1"/>
+          </a:solidFill>
+        </p:grpSpPr>
+        <p:sp>
+          <p:nvSpPr>
+            <p:cNvPr id="150" name="Rectangle 149"/>
+            <p:cNvSpPr/>
+            <p:nvPr/>
+          </p:nvSpPr>
+          <p:spPr>
+            <a:xfrm>
+              <a:off x="-228600" y="1524001"/>
+              <a:ext cx="1371600" cy="347528"/>
+            </a:xfrm>
+            <a:prstGeom prst="rect">
+              <a:avLst/>
+            </a:prstGeom>
+            <a:grpFill/>
+            <a:ln>
+              <a:solidFill>
+                <a:schemeClr val="accent2">
+                  <a:lumMod val="75000"/>
+                </a:schemeClr>
+              </a:solidFill>
+            </a:ln>
+          </p:spPr>
+          <p:style>
+            <a:lnRef idx="2">
+              <a:schemeClr val="accent1">
+                <a:shade val="50000"/>
+              </a:schemeClr>
+            </a:lnRef>
+            <a:fillRef idx="1">
+              <a:schemeClr val="accent1"/>
+            </a:fillRef>
+            <a:effectRef idx="0">
+              <a:schemeClr val="accent1"/>
+            </a:effectRef>
+            <a:fontRef idx="minor">
+              <a:schemeClr val="lt1"/>
+            </a:fontRef>
+          </p:style>
+          <p:txBody>
+            <a:bodyPr rtlCol="0" anchor="ctr"/>
+            <a:lstStyle/>
+            <a:p>
+              <a:pPr algn="ctr"/>
+              <a:r>
+                <a:rPr lang="en-US" sz="1400" b="1" dirty="0" smtClean="0">
+                  <a:solidFill>
+                    <a:schemeClr val="accent2">
+                      <a:lumMod val="75000"/>
+                    </a:schemeClr>
+                  </a:solidFill>
+                </a:rPr>
+                <a:t>test::cases</a:t>
+              </a:r>
+              <a:endParaRPr lang="en-SG" sz="1400" b="1" dirty="0">
+                <a:solidFill>
+                  <a:schemeClr val="accent2">
+                    <a:lumMod val="75000"/>
+                  </a:schemeClr>
+                </a:solidFill>
+              </a:endParaRPr>
+            </a:p>
+          </p:txBody>
+        </p:sp>
+        <p:sp>
+          <p:nvSpPr>
+            <p:cNvPr id="151" name="Rectangle 150"/>
+            <p:cNvSpPr/>
+            <p:nvPr/>
+          </p:nvSpPr>
+          <p:spPr>
+            <a:xfrm>
+              <a:off x="647700" y="1371600"/>
+              <a:ext cx="495300" cy="152400"/>
+            </a:xfrm>
+            <a:prstGeom prst="rect">
+              <a:avLst/>
+            </a:prstGeom>
+            <a:grpFill/>
+            <a:ln>
+              <a:solidFill>
+                <a:schemeClr val="accent2">
+                  <a:lumMod val="75000"/>
+                </a:schemeClr>
+              </a:solidFill>
+            </a:ln>
+          </p:spPr>
+          <p:style>
+            <a:lnRef idx="2">
+              <a:schemeClr val="accent1">
+                <a:shade val="50000"/>
+              </a:schemeClr>
+            </a:lnRef>
+            <a:fillRef idx="1">
+              <a:schemeClr val="accent1"/>
+            </a:fillRef>
+            <a:effectRef idx="0">
+              <a:schemeClr val="accent1"/>
+            </a:effectRef>
+            <a:fontRef idx="minor">
+              <a:schemeClr val="lt1"/>
+            </a:fontRef>
+          </p:style>
+          <p:txBody>
+            <a:bodyPr rtlCol="0" anchor="ctr"/>
+            <a:lstStyle/>
+            <a:p>
+              <a:pPr algn="ctr"/>
+              <a:endParaRPr lang="en-SG" sz="1400" b="1">
+                <a:solidFill>
+                  <a:schemeClr val="accent2">
+                    <a:lumMod val="75000"/>
+                  </a:schemeClr>
+                </a:solidFill>
+              </a:endParaRPr>
+            </a:p>
+          </p:txBody>
+        </p:sp>
+      </p:grpSp>
+      <p:grpSp>
+        <p:nvGrpSpPr>
+          <p:cNvPr id="152" name="Group 151"/>
+          <p:cNvGrpSpPr/>
+          <p:nvPr/>
+        </p:nvGrpSpPr>
+        <p:grpSpPr>
+          <a:xfrm>
+            <a:off x="510381" y="5589661"/>
+            <a:ext cx="1371600" cy="506339"/>
+            <a:chOff x="-228600" y="1371600"/>
+            <a:chExt cx="1371600" cy="506339"/>
+          </a:xfrm>
+          <a:solidFill>
+            <a:schemeClr val="bg1"/>
+          </a:solidFill>
+        </p:grpSpPr>
+        <p:sp>
+          <p:nvSpPr>
+            <p:cNvPr id="153" name="Rectangle 152"/>
+            <p:cNvSpPr/>
+            <p:nvPr/>
+          </p:nvSpPr>
+          <p:spPr>
+            <a:xfrm>
+              <a:off x="-228600" y="1524000"/>
+              <a:ext cx="1371600" cy="353939"/>
+            </a:xfrm>
+            <a:prstGeom prst="rect">
+              <a:avLst/>
+            </a:prstGeom>
+            <a:grpFill/>
+            <a:ln>
+              <a:solidFill>
+                <a:schemeClr val="accent2">
+                  <a:lumMod val="75000"/>
+                </a:schemeClr>
+              </a:solidFill>
+            </a:ln>
+          </p:spPr>
+          <p:style>
+            <a:lnRef idx="2">
+              <a:schemeClr val="accent1">
+                <a:shade val="50000"/>
+              </a:schemeClr>
+            </a:lnRef>
+            <a:fillRef idx="1">
+              <a:schemeClr val="accent1"/>
+            </a:fillRef>
+            <a:effectRef idx="0">
+              <a:schemeClr val="accent1"/>
+            </a:effectRef>
+            <a:fontRef idx="minor">
+              <a:schemeClr val="lt1"/>
+            </a:fontRef>
+          </p:style>
+          <p:txBody>
+            <a:bodyPr rtlCol="0" anchor="ctr"/>
+            <a:lstStyle/>
+            <a:p>
+              <a:pPr algn="ctr"/>
+              <a:r>
+                <a:rPr lang="en-US" sz="1400" b="1" dirty="0" smtClean="0">
+                  <a:solidFill>
+                    <a:schemeClr val="accent2">
+                      <a:lumMod val="75000"/>
+                    </a:schemeClr>
+                  </a:solidFill>
+                </a:rPr>
+                <a:t>test</a:t>
+              </a:r>
+              <a:r>
+                <a:rPr lang="en-US" sz="1400" b="1" dirty="0" smtClean="0">
+                  <a:solidFill>
+                    <a:schemeClr val="accent2">
+                      <a:lumMod val="75000"/>
+                    </a:schemeClr>
+                  </a:solidFill>
+                </a:rPr>
+                <a:t>::scripts</a:t>
+              </a:r>
+              <a:endParaRPr lang="en-SG" sz="1400" b="1" dirty="0">
+                <a:solidFill>
+                  <a:schemeClr val="accent2">
+                    <a:lumMod val="75000"/>
+                  </a:schemeClr>
+                </a:solidFill>
+              </a:endParaRPr>
+            </a:p>
+          </p:txBody>
+        </p:sp>
+        <p:sp>
+          <p:nvSpPr>
+            <p:cNvPr id="154" name="Rectangle 153"/>
+            <p:cNvSpPr/>
+            <p:nvPr/>
+          </p:nvSpPr>
+          <p:spPr>
+            <a:xfrm>
+              <a:off x="647700" y="1371600"/>
+              <a:ext cx="495300" cy="152400"/>
+            </a:xfrm>
+            <a:prstGeom prst="rect">
+              <a:avLst/>
+            </a:prstGeom>
+            <a:grpFill/>
+            <a:ln>
+              <a:solidFill>
+                <a:schemeClr val="accent2">
+                  <a:lumMod val="75000"/>
+                </a:schemeClr>
+              </a:solidFill>
+            </a:ln>
+          </p:spPr>
+          <p:style>
+            <a:lnRef idx="2">
+              <a:schemeClr val="accent1">
+                <a:shade val="50000"/>
+              </a:schemeClr>
+            </a:lnRef>
+            <a:fillRef idx="1">
+              <a:schemeClr val="accent1"/>
+            </a:fillRef>
+            <a:effectRef idx="0">
+              <a:schemeClr val="accent1"/>
+            </a:effectRef>
+            <a:fontRef idx="minor">
+              <a:schemeClr val="lt1"/>
+            </a:fontRef>
+          </p:style>
+          <p:txBody>
+            <a:bodyPr rtlCol="0" anchor="ctr"/>
+            <a:lstStyle/>
+            <a:p>
+              <a:pPr algn="ctr"/>
+              <a:endParaRPr lang="en-SG" sz="1400" b="1">
+                <a:solidFill>
+                  <a:schemeClr val="accent2">
+                    <a:lumMod val="75000"/>
+                  </a:schemeClr>
+                </a:solidFill>
+              </a:endParaRPr>
+            </a:p>
+          </p:txBody>
+        </p:sp>
+      </p:grpSp>
+      <p:cxnSp>
+        <p:nvCxnSpPr>
+          <p:cNvPr id="155" name="Straight Arrow Connector 154"/>
+          <p:cNvCxnSpPr/>
+          <p:nvPr/>
+        </p:nvCxnSpPr>
+        <p:spPr>
+          <a:xfrm flipV="1">
+            <a:off x="967581" y="5511682"/>
+            <a:ext cx="0" cy="230379"/>
+          </a:xfrm>
+          <a:prstGeom prst="straightConnector1">
+            <a:avLst/>
+          </a:prstGeom>
+          <a:ln w="38100">
+            <a:solidFill>
+              <a:schemeClr val="accent2">
+                <a:lumMod val="75000"/>
+              </a:schemeClr>
+            </a:solidFill>
+            <a:prstDash val="sysDot"/>
+            <a:headEnd type="none" w="med" len="med"/>
+            <a:tailEnd type="triangle" w="med" len="med"/>
+          </a:ln>
+        </p:spPr>
+        <p:style>
+          <a:lnRef idx="1">
+            <a:schemeClr val="accent1"/>
+          </a:lnRef>
+          <a:fillRef idx="0">
+            <a:schemeClr val="accent1"/>
+          </a:fillRef>
+          <a:effectRef idx="0">
+            <a:schemeClr val="accent1"/>
+          </a:effectRef>
+          <a:fontRef idx="minor">
+            <a:schemeClr val="tx1"/>
+          </a:fontRef>
+        </p:style>
+      </p:cxnSp>
+      <p:grpSp>
+        <p:nvGrpSpPr>
+          <p:cNvPr id="156" name="Group 155"/>
+          <p:cNvGrpSpPr/>
+          <p:nvPr/>
+        </p:nvGrpSpPr>
+        <p:grpSpPr>
+          <a:xfrm>
+            <a:off x="6225381" y="256308"/>
+            <a:ext cx="1905000" cy="505692"/>
+            <a:chOff x="-762000" y="1371600"/>
+            <a:chExt cx="1905000" cy="505692"/>
+          </a:xfrm>
+          <a:solidFill>
+            <a:schemeClr val="bg1"/>
+          </a:solidFill>
+        </p:grpSpPr>
+        <p:sp>
+          <p:nvSpPr>
+            <p:cNvPr id="157" name="Rectangle 156"/>
+            <p:cNvSpPr/>
+            <p:nvPr/>
+          </p:nvSpPr>
+          <p:spPr>
+            <a:xfrm>
+              <a:off x="-762000" y="1524000"/>
+              <a:ext cx="1905000" cy="353292"/>
+            </a:xfrm>
+            <a:prstGeom prst="rect">
+              <a:avLst/>
+            </a:prstGeom>
+            <a:grpFill/>
+            <a:ln>
+              <a:solidFill>
+                <a:schemeClr val="accent5"/>
+              </a:solidFill>
+            </a:ln>
+          </p:spPr>
+          <p:style>
+            <a:lnRef idx="2">
+              <a:schemeClr val="accent1">
+                <a:shade val="50000"/>
+              </a:schemeClr>
+            </a:lnRef>
+            <a:fillRef idx="1">
+              <a:schemeClr val="accent1"/>
+            </a:fillRef>
+            <a:effectRef idx="0">
+              <a:schemeClr val="accent1"/>
+            </a:effectRef>
+            <a:fontRef idx="minor">
+              <a:schemeClr val="lt1"/>
+            </a:fontRef>
+          </p:style>
+          <p:txBody>
+            <a:bodyPr rtlCol="0" anchor="ctr"/>
+            <a:lstStyle/>
+            <a:p>
+              <a:r>
+                <a:rPr lang="en-US" sz="1400" b="1" dirty="0" smtClean="0">
+                  <a:solidFill>
+                    <a:schemeClr val="accent5"/>
+                  </a:solidFill>
+                </a:rPr>
+                <a:t>common::</a:t>
+              </a:r>
+              <a:r>
+                <a:rPr lang="en-US" sz="1400" b="1" dirty="0" err="1" smtClean="0">
+                  <a:solidFill>
+                    <a:schemeClr val="accent5"/>
+                  </a:solidFill>
+                </a:rPr>
+                <a:t>datatransfer</a:t>
+              </a:r>
+              <a:endParaRPr lang="en-SG" sz="1400" b="1" dirty="0">
+                <a:solidFill>
+                  <a:schemeClr val="accent5"/>
+                </a:solidFill>
+              </a:endParaRPr>
+            </a:p>
+          </p:txBody>
+        </p:sp>
+        <p:sp>
+          <p:nvSpPr>
+            <p:cNvPr id="158" name="Rectangle 157"/>
+            <p:cNvSpPr/>
+            <p:nvPr/>
+          </p:nvSpPr>
+          <p:spPr>
+            <a:xfrm>
+              <a:off x="647700" y="1371600"/>
+              <a:ext cx="495300" cy="152400"/>
+            </a:xfrm>
+            <a:prstGeom prst="rect">
+              <a:avLst/>
+            </a:prstGeom>
+            <a:grpFill/>
+            <a:ln>
+              <a:solidFill>
+                <a:schemeClr val="accent5"/>
+              </a:solidFill>
+            </a:ln>
+          </p:spPr>
+          <p:style>
+            <a:lnRef idx="2">
+              <a:schemeClr val="accent1">
+                <a:shade val="50000"/>
+              </a:schemeClr>
+            </a:lnRef>
+            <a:fillRef idx="1">
+              <a:schemeClr val="accent1"/>
+            </a:fillRef>
+            <a:effectRef idx="0">
+              <a:schemeClr val="accent1"/>
+            </a:effectRef>
+            <a:fontRef idx="minor">
+              <a:schemeClr val="lt1"/>
+            </a:fontRef>
+          </p:style>
+          <p:txBody>
+            <a:bodyPr rtlCol="0" anchor="ctr"/>
+            <a:lstStyle/>
+            <a:p>
+              <a:endParaRPr lang="en-SG" sz="1400" b="1">
+                <a:solidFill>
+                  <a:schemeClr val="accent5"/>
+                </a:solidFill>
+              </a:endParaRPr>
+            </a:p>
+          </p:txBody>
+        </p:sp>
+      </p:grpSp>
     </p:spTree>
     <p:extLst>
       <p:ext uri="{BB962C8B-B14F-4D97-AF65-F5344CB8AC3E}">
@@ -6139,4 +6871,289 @@
   <a:objectDefaults/>
   <a:extraClrSchemeLst/>
 </a:theme>
+</file>
+
+<file path=ppt/theme/theme2.xml><?xml version="1.0" encoding="utf-8"?>
+<a:theme xmlns:a="http://schemas.openxmlformats.org/drawingml/2006/main" name="Office Theme">
+  <a:themeElements>
+    <a:clrScheme name="Office">
+      <a:dk1>
+        <a:sysClr val="windowText" lastClr="000000"/>
+      </a:dk1>
+      <a:lt1>
+        <a:sysClr val="window" lastClr="FFFFFF"/>
+      </a:lt1>
+      <a:dk2>
+        <a:srgbClr val="1F497D"/>
+      </a:dk2>
+      <a:lt2>
+        <a:srgbClr val="EEECE1"/>
+      </a:lt2>
+      <a:accent1>
+        <a:srgbClr val="4F81BD"/>
+      </a:accent1>
+      <a:accent2>
+        <a:srgbClr val="C0504D"/>
+      </a:accent2>
+      <a:accent3>
+        <a:srgbClr val="9BBB59"/>
+      </a:accent3>
+      <a:accent4>
+        <a:srgbClr val="8064A2"/>
+      </a:accent4>
+      <a:accent5>
+        <a:srgbClr val="4BACC6"/>
+      </a:accent5>
+      <a:accent6>
+        <a:srgbClr val="F79646"/>
+      </a:accent6>
+      <a:hlink>
+        <a:srgbClr val="0000FF"/>
+      </a:hlink>
+      <a:folHlink>
+        <a:srgbClr val="800080"/>
+      </a:folHlink>
+    </a:clrScheme>
+    <a:fontScheme name="Office">
+      <a:majorFont>
+        <a:latin typeface="Calibri"/>
+        <a:ea typeface=""/>
+        <a:cs typeface=""/>
+        <a:font script="Jpan" typeface="ＭＳ Ｐゴシック"/>
+        <a:font script="Hang" typeface="맑은 고딕"/>
+        <a:font script="Hans" typeface="宋体"/>
+        <a:font script="Hant" typeface="新細明體"/>
+        <a:font script="Arab" typeface="Times New Roman"/>
+        <a:font script="Hebr" typeface="Times New Roman"/>
+        <a:font script="Thai" typeface="Angsana New"/>
+        <a:font script="Ethi" typeface="Nyala"/>
+        <a:font script="Beng" typeface="Vrinda"/>
+        <a:font script="Gujr" typeface="Shruti"/>
+        <a:font script="Khmr" typeface="MoolBoran"/>
+        <a:font script="Knda" typeface="Tunga"/>
+        <a:font script="Guru" typeface="Raavi"/>
+        <a:font script="Cans" typeface="Euphemia"/>
+        <a:font script="Cher" typeface="Plantagenet Cherokee"/>
+        <a:font script="Yiii" typeface="Microsoft Yi Baiti"/>
+        <a:font script="Tibt" typeface="Microsoft Himalaya"/>
+        <a:font script="Thaa" typeface="MV Boli"/>
+        <a:font script="Deva" typeface="Mangal"/>
+        <a:font script="Telu" typeface="Gautami"/>
+        <a:font script="Taml" typeface="Latha"/>
+        <a:font script="Syrc" typeface="Estrangelo Edessa"/>
+        <a:font script="Orya" typeface="Kalinga"/>
+        <a:font script="Mlym" typeface="Kartika"/>
+        <a:font script="Laoo" typeface="DokChampa"/>
+        <a:font script="Sinh" typeface="Iskoola Pota"/>
+        <a:font script="Mong" typeface="Mongolian Baiti"/>
+        <a:font script="Viet" typeface="Times New Roman"/>
+        <a:font script="Uigh" typeface="Microsoft Uighur"/>
+        <a:font script="Geor" typeface="Sylfaen"/>
+      </a:majorFont>
+      <a:minorFont>
+        <a:latin typeface="Calibri"/>
+        <a:ea typeface=""/>
+        <a:cs typeface=""/>
+        <a:font script="Jpan" typeface="ＭＳ Ｐゴシック"/>
+        <a:font script="Hang" typeface="맑은 고딕"/>
+        <a:font script="Hans" typeface="宋体"/>
+        <a:font script="Hant" typeface="新細明體"/>
+        <a:font script="Arab" typeface="Arial"/>
+        <a:font script="Hebr" typeface="Arial"/>
+        <a:font script="Thai" typeface="Cordia New"/>
+        <a:font script="Ethi" typeface="Nyala"/>
+        <a:font script="Beng" typeface="Vrinda"/>
+        <a:font script="Gujr" typeface="Shruti"/>
+        <a:font script="Khmr" typeface="DaunPenh"/>
+        <a:font script="Knda" typeface="Tunga"/>
+        <a:font script="Guru" typeface="Raavi"/>
+        <a:font script="Cans" typeface="Euphemia"/>
+        <a:font script="Cher" typeface="Plantagenet Cherokee"/>
+        <a:font script="Yiii" typeface="Microsoft Yi Baiti"/>
+        <a:font script="Tibt" typeface="Microsoft Himalaya"/>
+        <a:font script="Thaa" typeface="MV Boli"/>
+        <a:font script="Deva" typeface="Mangal"/>
+        <a:font script="Telu" typeface="Gautami"/>
+        <a:font script="Taml" typeface="Latha"/>
+        <a:font script="Syrc" typeface="Estrangelo Edessa"/>
+        <a:font script="Orya" typeface="Kalinga"/>
+        <a:font script="Mlym" typeface="Kartika"/>
+        <a:font script="Laoo" typeface="DokChampa"/>
+        <a:font script="Sinh" typeface="Iskoola Pota"/>
+        <a:font script="Mong" typeface="Mongolian Baiti"/>
+        <a:font script="Viet" typeface="Arial"/>
+        <a:font script="Uigh" typeface="Microsoft Uighur"/>
+        <a:font script="Geor" typeface="Sylfaen"/>
+      </a:minorFont>
+    </a:fontScheme>
+    <a:fmtScheme name="Office">
+      <a:fillStyleLst>
+        <a:solidFill>
+          <a:schemeClr val="phClr"/>
+        </a:solidFill>
+        <a:gradFill rotWithShape="1">
+          <a:gsLst>
+            <a:gs pos="0">
+              <a:schemeClr val="phClr">
+                <a:tint val="50000"/>
+                <a:satMod val="300000"/>
+              </a:schemeClr>
+            </a:gs>
+            <a:gs pos="35000">
+              <a:schemeClr val="phClr">
+                <a:tint val="37000"/>
+                <a:satMod val="300000"/>
+              </a:schemeClr>
+            </a:gs>
+            <a:gs pos="100000">
+              <a:schemeClr val="phClr">
+                <a:tint val="15000"/>
+                <a:satMod val="350000"/>
+              </a:schemeClr>
+            </a:gs>
+          </a:gsLst>
+          <a:lin ang="16200000" scaled="1"/>
+        </a:gradFill>
+        <a:gradFill rotWithShape="1">
+          <a:gsLst>
+            <a:gs pos="0">
+              <a:schemeClr val="phClr">
+                <a:shade val="51000"/>
+                <a:satMod val="130000"/>
+              </a:schemeClr>
+            </a:gs>
+            <a:gs pos="80000">
+              <a:schemeClr val="phClr">
+                <a:shade val="93000"/>
+                <a:satMod val="130000"/>
+              </a:schemeClr>
+            </a:gs>
+            <a:gs pos="100000">
+              <a:schemeClr val="phClr">
+                <a:shade val="94000"/>
+                <a:satMod val="135000"/>
+              </a:schemeClr>
+            </a:gs>
+          </a:gsLst>
+          <a:lin ang="16200000" scaled="0"/>
+        </a:gradFill>
+      </a:fillStyleLst>
+      <a:lnStyleLst>
+        <a:ln w="9525" cap="flat" cmpd="sng" algn="ctr">
+          <a:solidFill>
+            <a:schemeClr val="phClr">
+              <a:shade val="95000"/>
+              <a:satMod val="105000"/>
+            </a:schemeClr>
+          </a:solidFill>
+          <a:prstDash val="solid"/>
+        </a:ln>
+        <a:ln w="25400" cap="flat" cmpd="sng" algn="ctr">
+          <a:solidFill>
+            <a:schemeClr val="phClr"/>
+          </a:solidFill>
+          <a:prstDash val="solid"/>
+        </a:ln>
+        <a:ln w="38100" cap="flat" cmpd="sng" algn="ctr">
+          <a:solidFill>
+            <a:schemeClr val="phClr"/>
+          </a:solidFill>
+          <a:prstDash val="solid"/>
+        </a:ln>
+      </a:lnStyleLst>
+      <a:effectStyleLst>
+        <a:effectStyle>
+          <a:effectLst>
+            <a:outerShdw blurRad="40000" dist="20000" dir="5400000" rotWithShape="0">
+              <a:srgbClr val="000000">
+                <a:alpha val="38000"/>
+              </a:srgbClr>
+            </a:outerShdw>
+          </a:effectLst>
+        </a:effectStyle>
+        <a:effectStyle>
+          <a:effectLst>
+            <a:outerShdw blurRad="40000" dist="23000" dir="5400000" rotWithShape="0">
+              <a:srgbClr val="000000">
+                <a:alpha val="35000"/>
+              </a:srgbClr>
+            </a:outerShdw>
+          </a:effectLst>
+        </a:effectStyle>
+        <a:effectStyle>
+          <a:effectLst>
+            <a:outerShdw blurRad="40000" dist="23000" dir="5400000" rotWithShape="0">
+              <a:srgbClr val="000000">
+                <a:alpha val="35000"/>
+              </a:srgbClr>
+            </a:outerShdw>
+          </a:effectLst>
+          <a:scene3d>
+            <a:camera prst="orthographicFront">
+              <a:rot lat="0" lon="0" rev="0"/>
+            </a:camera>
+            <a:lightRig rig="threePt" dir="t">
+              <a:rot lat="0" lon="0" rev="1200000"/>
+            </a:lightRig>
+          </a:scene3d>
+          <a:sp3d>
+            <a:bevelT w="63500" h="25400"/>
+          </a:sp3d>
+        </a:effectStyle>
+      </a:effectStyleLst>
+      <a:bgFillStyleLst>
+        <a:solidFill>
+          <a:schemeClr val="phClr"/>
+        </a:solidFill>
+        <a:gradFill rotWithShape="1">
+          <a:gsLst>
+            <a:gs pos="0">
+              <a:schemeClr val="phClr">
+                <a:tint val="40000"/>
+                <a:satMod val="350000"/>
+              </a:schemeClr>
+            </a:gs>
+            <a:gs pos="40000">
+              <a:schemeClr val="phClr">
+                <a:tint val="45000"/>
+                <a:shade val="99000"/>
+                <a:satMod val="350000"/>
+              </a:schemeClr>
+            </a:gs>
+            <a:gs pos="100000">
+              <a:schemeClr val="phClr">
+                <a:shade val="20000"/>
+                <a:satMod val="255000"/>
+              </a:schemeClr>
+            </a:gs>
+          </a:gsLst>
+          <a:path path="circle">
+            <a:fillToRect l="50000" t="-80000" r="50000" b="180000"/>
+          </a:path>
+        </a:gradFill>
+        <a:gradFill rotWithShape="1">
+          <a:gsLst>
+            <a:gs pos="0">
+              <a:schemeClr val="phClr">
+                <a:tint val="80000"/>
+                <a:satMod val="300000"/>
+              </a:schemeClr>
+            </a:gs>
+            <a:gs pos="100000">
+              <a:schemeClr val="phClr">
+                <a:shade val="30000"/>
+                <a:satMod val="200000"/>
+              </a:schemeClr>
+            </a:gs>
+          </a:gsLst>
+          <a:path path="circle">
+            <a:fillToRect l="50000" t="50000" r="50000" b="50000"/>
+          </a:path>
+        </a:gradFill>
+      </a:bgFillStyleLst>
+    </a:fmtScheme>
+  </a:themeElements>
+  <a:objectDefaults/>
+  <a:extraClrSchemeLst/>
+</a:theme>
 </file>
</xml_diff>